<commit_message>
Update documentation for building frontend.
</commit_message>
<xml_diff>
--- a/docs/design.pptx
+++ b/docs/design.pptx
@@ -8,10 +8,11 @@
     <p:sldId id="256" r:id="rId2"/>
     <p:sldId id="259" r:id="rId3"/>
     <p:sldId id="261" r:id="rId4"/>
-    <p:sldId id="257" r:id="rId5"/>
-    <p:sldId id="260" r:id="rId6"/>
-    <p:sldId id="258" r:id="rId7"/>
-    <p:sldId id="262" r:id="rId8"/>
+    <p:sldId id="260" r:id="rId5"/>
+    <p:sldId id="263" r:id="rId6"/>
+    <p:sldId id="257" r:id="rId7"/>
+    <p:sldId id="258" r:id="rId8"/>
+    <p:sldId id="262" r:id="rId9"/>
   </p:sldIdLst>
   <p:sldSz cx="12192000" cy="6858000"/>
   <p:notesSz cx="6858000" cy="9144000"/>
@@ -3402,13 +3403,8 @@
           <a:p>
             <a:r>
               <a:rPr lang="en-US" sz="2800" dirty="0" smtClean="0"/>
-              <a:t>Parse </a:t>
-            </a:r>
-            <a:r>
-              <a:rPr lang="en-US" sz="2800" dirty="0" smtClean="0"/>
-              <a:t>IMG Logic</a:t>
-            </a:r>
-            <a:endParaRPr lang="en-US" sz="2800" dirty="0" smtClean="0"/>
+              <a:t>Parse IMG Logic</a:t>
+            </a:r>
           </a:p>
           <a:p>
             <a:endParaRPr lang="en-US" dirty="0" smtClean="0"/>
@@ -3489,8 +3485,8 @@
         </p:nvSpPr>
         <p:spPr>
           <a:xfrm>
-            <a:off x="951722" y="1045029"/>
-            <a:ext cx="10608906" cy="2462213"/>
+            <a:off x="535474" y="192372"/>
+            <a:ext cx="10608906" cy="2339102"/>
           </a:xfrm>
           <a:prstGeom prst="rect">
             <a:avLst/>
@@ -3505,53 +3501,1221 @@
           <a:p>
             <a:r>
               <a:rPr lang="en-US" sz="2800" dirty="0" smtClean="0"/>
-              <a:t>Display</a:t>
-            </a:r>
+              <a:t>Database Tables</a:t>
+            </a:r>
+          </a:p>
+          <a:p>
+            <a:r>
+              <a:rPr lang="en-US" dirty="0" smtClean="0"/>
+              <a:t>IMAGE</a:t>
+            </a:r>
+            <a:endParaRPr lang="en-US" dirty="0"/>
+          </a:p>
+          <a:p>
+            <a:endParaRPr lang="en-US" sz="2800" dirty="0" smtClean="0"/>
+          </a:p>
+          <a:p>
+            <a:endParaRPr lang="en-US" dirty="0"/>
           </a:p>
           <a:p>
             <a:endParaRPr lang="en-US" dirty="0" smtClean="0"/>
           </a:p>
           <a:p>
-            <a:pPr marL="285750" indent="-285750">
-              <a:buFont typeface="Arial" panose="020B0604020202020204" pitchFamily="34" charset="0"/>
-              <a:buChar char="•"/>
-            </a:pPr>
+            <a:endParaRPr lang="en-US" dirty="0"/>
+          </a:p>
+          <a:p>
+            <a:endParaRPr lang="en-US" dirty="0" smtClean="0"/>
+          </a:p>
+        </p:txBody>
+      </p:sp>
+      <p:graphicFrame>
+        <p:nvGraphicFramePr>
+          <p:cNvPr id="2" name="Table 1"/>
+          <p:cNvGraphicFramePr>
+            <a:graphicFrameLocks noGrp="1"/>
+          </p:cNvGraphicFramePr>
+          <p:nvPr>
+            <p:extLst>
+              <p:ext uri="{D42A27DB-BD31-4B8C-83A1-F6EECF244321}">
+                <p14:modId xmlns:p14="http://schemas.microsoft.com/office/powerpoint/2010/main" val="3644437352"/>
+              </p:ext>
+            </p:extLst>
+          </p:nvPr>
+        </p:nvGraphicFramePr>
+        <p:xfrm>
+          <a:off x="2818879" y="709125"/>
+          <a:ext cx="6586376" cy="3477810"/>
+        </p:xfrm>
+        <a:graphic>
+          <a:graphicData uri="http://schemas.openxmlformats.org/drawingml/2006/table">
+            <a:tbl>
+              <a:tblPr firstRow="1" bandRow="1">
+                <a:tableStyleId>{5C22544A-7EE6-4342-B048-85BDC9FD1C3A}</a:tableStyleId>
+              </a:tblPr>
+              <a:tblGrid>
+                <a:gridCol w="1651425"/>
+                <a:gridCol w="1641763"/>
+                <a:gridCol w="1646594"/>
+                <a:gridCol w="1646594"/>
+              </a:tblGrid>
+              <a:tr h="205824">
+                <a:tc>
+                  <a:txBody>
+                    <a:bodyPr/>
+                    <a:lstStyle/>
+                    <a:p>
+                      <a:r>
+                        <a:rPr lang="en-US" sz="1000" dirty="0" smtClean="0"/>
+                        <a:t>Name</a:t>
+                      </a:r>
+                      <a:endParaRPr lang="en-US" sz="1000" dirty="0"/>
+                    </a:p>
+                  </a:txBody>
+                  <a:tcPr/>
+                </a:tc>
+                <a:tc>
+                  <a:txBody>
+                    <a:bodyPr/>
+                    <a:lstStyle/>
+                    <a:p>
+                      <a:r>
+                        <a:rPr lang="en-US" sz="1000" dirty="0" smtClean="0"/>
+                        <a:t>Type</a:t>
+                      </a:r>
+                      <a:endParaRPr lang="en-US" sz="1000" dirty="0"/>
+                    </a:p>
+                  </a:txBody>
+                  <a:tcPr/>
+                </a:tc>
+                <a:tc>
+                  <a:txBody>
+                    <a:bodyPr/>
+                    <a:lstStyle/>
+                    <a:p>
+                      <a:r>
+                        <a:rPr lang="en-US" sz="1000" dirty="0" smtClean="0"/>
+                        <a:t>Constraint</a:t>
+                      </a:r>
+                      <a:endParaRPr lang="en-US" sz="1000" dirty="0"/>
+                    </a:p>
+                  </a:txBody>
+                  <a:tcPr/>
+                </a:tc>
+                <a:tc>
+                  <a:txBody>
+                    <a:bodyPr/>
+                    <a:lstStyle/>
+                    <a:p>
+                      <a:r>
+                        <a:rPr lang="en-US" sz="1000" dirty="0" smtClean="0"/>
+                        <a:t>Description</a:t>
+                      </a:r>
+                      <a:endParaRPr lang="en-US" sz="1000" dirty="0"/>
+                    </a:p>
+                  </a:txBody>
+                  <a:tcPr/>
+                </a:tc>
+              </a:tr>
+              <a:tr h="274835">
+                <a:tc>
+                  <a:txBody>
+                    <a:bodyPr/>
+                    <a:lstStyle/>
+                    <a:p>
+                      <a:r>
+                        <a:rPr lang="en-US" sz="1000" dirty="0" smtClean="0"/>
+                        <a:t>id</a:t>
+                      </a:r>
+                      <a:endParaRPr lang="en-US" sz="1000" dirty="0"/>
+                    </a:p>
+                  </a:txBody>
+                  <a:tcPr/>
+                </a:tc>
+                <a:tc>
+                  <a:txBody>
+                    <a:bodyPr/>
+                    <a:lstStyle/>
+                    <a:p>
+                      <a:r>
+                        <a:rPr lang="en-US" sz="1000" dirty="0" smtClean="0"/>
+                        <a:t>INT</a:t>
+                      </a:r>
+                      <a:endParaRPr lang="en-US" sz="1000" dirty="0"/>
+                    </a:p>
+                  </a:txBody>
+                  <a:tcPr/>
+                </a:tc>
+                <a:tc>
+                  <a:txBody>
+                    <a:bodyPr/>
+                    <a:lstStyle/>
+                    <a:p>
+                      <a:r>
+                        <a:rPr lang="en-US" sz="1000" dirty="0" smtClean="0"/>
+                        <a:t>Primary Key, auto increment, not null</a:t>
+                      </a:r>
+                      <a:endParaRPr lang="en-US" sz="1000" dirty="0"/>
+                    </a:p>
+                  </a:txBody>
+                  <a:tcPr/>
+                </a:tc>
+                <a:tc>
+                  <a:txBody>
+                    <a:bodyPr/>
+                    <a:lstStyle/>
+                    <a:p>
+                      <a:r>
+                        <a:rPr lang="en-US" sz="1000" dirty="0" smtClean="0"/>
+                        <a:t>ID</a:t>
+                      </a:r>
+                      <a:endParaRPr lang="en-US" sz="1000" dirty="0"/>
+                    </a:p>
+                  </a:txBody>
+                  <a:tcPr/>
+                </a:tc>
+              </a:tr>
+              <a:tr h="274835">
+                <a:tc>
+                  <a:txBody>
+                    <a:bodyPr/>
+                    <a:lstStyle/>
+                    <a:p>
+                      <a:r>
+                        <a:rPr lang="en-US" sz="1000" dirty="0" smtClean="0"/>
+                        <a:t>time</a:t>
+                      </a:r>
+                      <a:endParaRPr lang="en-US" sz="1000" dirty="0"/>
+                    </a:p>
+                  </a:txBody>
+                  <a:tcPr/>
+                </a:tc>
+                <a:tc>
+                  <a:txBody>
+                    <a:bodyPr/>
+                    <a:lstStyle/>
+                    <a:p>
+                      <a:r>
+                        <a:rPr lang="en-US" sz="1000" dirty="0" smtClean="0"/>
+                        <a:t>Timestamp</a:t>
+                      </a:r>
+                      <a:endParaRPr lang="en-US" sz="1000" dirty="0"/>
+                    </a:p>
+                  </a:txBody>
+                  <a:tcPr/>
+                </a:tc>
+                <a:tc>
+                  <a:txBody>
+                    <a:bodyPr/>
+                    <a:lstStyle/>
+                    <a:p>
+                      <a:r>
+                        <a:rPr lang="en-US" sz="1000" dirty="0" smtClean="0"/>
+                        <a:t>Aut</a:t>
+                      </a:r>
+                      <a:r>
+                        <a:rPr lang="en-US" sz="1000" baseline="0" dirty="0" smtClean="0"/>
+                        <a:t>o generate</a:t>
+                      </a:r>
+                      <a:endParaRPr lang="en-US" sz="1000" dirty="0"/>
+                    </a:p>
+                  </a:txBody>
+                  <a:tcPr/>
+                </a:tc>
+                <a:tc>
+                  <a:txBody>
+                    <a:bodyPr/>
+                    <a:lstStyle/>
+                    <a:p>
+                      <a:r>
+                        <a:rPr lang="en-US" sz="1000" dirty="0" smtClean="0"/>
+                        <a:t>Discover</a:t>
+                      </a:r>
+                      <a:r>
+                        <a:rPr lang="en-US" sz="1000" baseline="0" dirty="0" smtClean="0"/>
+                        <a:t> timestamp</a:t>
+                      </a:r>
+                      <a:endParaRPr lang="en-US" sz="1000" dirty="0"/>
+                    </a:p>
+                  </a:txBody>
+                  <a:tcPr/>
+                </a:tc>
+              </a:tr>
+              <a:tr h="274835">
+                <a:tc>
+                  <a:txBody>
+                    <a:bodyPr/>
+                    <a:lstStyle/>
+                    <a:p>
+                      <a:r>
+                        <a:rPr lang="en-US" sz="1000" dirty="0" smtClean="0"/>
+                        <a:t>name</a:t>
+                      </a:r>
+                      <a:endParaRPr lang="en-US" sz="1000" dirty="0"/>
+                    </a:p>
+                  </a:txBody>
+                  <a:tcPr/>
+                </a:tc>
+                <a:tc>
+                  <a:txBody>
+                    <a:bodyPr/>
+                    <a:lstStyle/>
+                    <a:p>
+                      <a:r>
+                        <a:rPr lang="en-US" sz="1000" dirty="0" smtClean="0"/>
+                        <a:t>VARCHAR 255</a:t>
+                      </a:r>
+                      <a:endParaRPr lang="en-US" sz="1000" dirty="0"/>
+                    </a:p>
+                  </a:txBody>
+                  <a:tcPr/>
+                </a:tc>
+                <a:tc>
+                  <a:txBody>
+                    <a:bodyPr/>
+                    <a:lstStyle/>
+                    <a:p>
+                      <a:r>
+                        <a:rPr lang="en-US" sz="1000" dirty="0" smtClean="0"/>
+                        <a:t>not</a:t>
+                      </a:r>
+                      <a:r>
+                        <a:rPr lang="en-US" sz="1000" baseline="0" dirty="0" smtClean="0"/>
+                        <a:t> null</a:t>
+                      </a:r>
+                      <a:endParaRPr lang="en-US" sz="1000" dirty="0"/>
+                    </a:p>
+                  </a:txBody>
+                  <a:tcPr/>
+                </a:tc>
+                <a:tc>
+                  <a:txBody>
+                    <a:bodyPr/>
+                    <a:lstStyle/>
+                    <a:p>
+                      <a:r>
+                        <a:rPr lang="en-US" sz="1000" dirty="0" smtClean="0"/>
+                        <a:t>Name of image</a:t>
+                      </a:r>
+                      <a:endParaRPr lang="en-US" sz="1000" dirty="0"/>
+                    </a:p>
+                  </a:txBody>
+                  <a:tcPr/>
+                </a:tc>
+              </a:tr>
+              <a:tr h="274835">
+                <a:tc>
+                  <a:txBody>
+                    <a:bodyPr/>
+                    <a:lstStyle/>
+                    <a:p>
+                      <a:r>
+                        <a:rPr lang="en-US" sz="1000" dirty="0" err="1" smtClean="0"/>
+                        <a:t>source_url</a:t>
+                      </a:r>
+                      <a:endParaRPr lang="en-US" sz="1000" dirty="0"/>
+                    </a:p>
+                  </a:txBody>
+                  <a:tcPr/>
+                </a:tc>
+                <a:tc>
+                  <a:txBody>
+                    <a:bodyPr/>
+                    <a:lstStyle/>
+                    <a:p>
+                      <a:r>
+                        <a:rPr lang="en-US" sz="1000" dirty="0" smtClean="0"/>
+                        <a:t>VARCHAR 2045</a:t>
+                      </a:r>
+                      <a:endParaRPr lang="en-US" sz="1000" dirty="0"/>
+                    </a:p>
+                  </a:txBody>
+                  <a:tcPr/>
+                </a:tc>
+                <a:tc>
+                  <a:txBody>
+                    <a:bodyPr/>
+                    <a:lstStyle/>
+                    <a:p>
+                      <a:r>
+                        <a:rPr lang="en-US" sz="1000" dirty="0" smtClean="0"/>
+                        <a:t>unique</a:t>
+                      </a:r>
+                      <a:r>
+                        <a:rPr lang="en-US" sz="1000" baseline="0" dirty="0" smtClean="0"/>
+                        <a:t> +  </a:t>
+                      </a:r>
+                      <a:r>
+                        <a:rPr lang="en-US" sz="1000" baseline="0" dirty="0" err="1" smtClean="0"/>
+                        <a:t>image_url</a:t>
+                      </a:r>
+                      <a:r>
+                        <a:rPr lang="en-US" sz="1000" baseline="0" dirty="0" smtClean="0"/>
+                        <a:t>, not null</a:t>
+                      </a:r>
+                      <a:endParaRPr lang="en-US" sz="1000" dirty="0"/>
+                    </a:p>
+                  </a:txBody>
+                  <a:tcPr/>
+                </a:tc>
+                <a:tc>
+                  <a:txBody>
+                    <a:bodyPr/>
+                    <a:lstStyle/>
+                    <a:p>
+                      <a:r>
+                        <a:rPr lang="en-US" sz="1000" dirty="0" smtClean="0"/>
+                        <a:t>Page where</a:t>
+                      </a:r>
+                      <a:r>
+                        <a:rPr lang="en-US" sz="1000" baseline="0" dirty="0" smtClean="0"/>
+                        <a:t> image found</a:t>
+                      </a:r>
+                      <a:endParaRPr lang="en-US" sz="1000" dirty="0"/>
+                    </a:p>
+                  </a:txBody>
+                  <a:tcPr/>
+                </a:tc>
+              </a:tr>
+              <a:tr h="274835">
+                <a:tc>
+                  <a:txBody>
+                    <a:bodyPr/>
+                    <a:lstStyle/>
+                    <a:p>
+                      <a:r>
+                        <a:rPr lang="en-US" sz="1000" dirty="0" err="1" smtClean="0"/>
+                        <a:t>image_url</a:t>
+                      </a:r>
+                      <a:endParaRPr lang="en-US" sz="1000" dirty="0"/>
+                    </a:p>
+                  </a:txBody>
+                  <a:tcPr/>
+                </a:tc>
+                <a:tc>
+                  <a:txBody>
+                    <a:bodyPr/>
+                    <a:lstStyle/>
+                    <a:p>
+                      <a:r>
+                        <a:rPr lang="en-US" sz="1000" dirty="0" smtClean="0"/>
+                        <a:t>VARCHAR </a:t>
+                      </a:r>
+                      <a:r>
+                        <a:rPr lang="en-US" sz="1000" dirty="0" smtClean="0"/>
+                        <a:t>2045</a:t>
+                      </a:r>
+                      <a:endParaRPr lang="en-US" sz="1000" dirty="0"/>
+                    </a:p>
+                  </a:txBody>
+                  <a:tcPr/>
+                </a:tc>
+                <a:tc>
+                  <a:txBody>
+                    <a:bodyPr/>
+                    <a:lstStyle/>
+                    <a:p>
+                      <a:r>
+                        <a:rPr lang="en-US" sz="1000" dirty="0" smtClean="0"/>
+                        <a:t>unique + </a:t>
+                      </a:r>
+                      <a:r>
+                        <a:rPr lang="en-US" sz="1000" dirty="0" err="1" smtClean="0"/>
+                        <a:t>source_url</a:t>
+                      </a:r>
+                      <a:r>
+                        <a:rPr lang="en-US" sz="1000" dirty="0" smtClean="0"/>
+                        <a:t>, not null</a:t>
+                      </a:r>
+                      <a:endParaRPr lang="en-US" sz="1000" dirty="0"/>
+                    </a:p>
+                  </a:txBody>
+                  <a:tcPr/>
+                </a:tc>
+                <a:tc>
+                  <a:txBody>
+                    <a:bodyPr/>
+                    <a:lstStyle/>
+                    <a:p>
+                      <a:r>
+                        <a:rPr lang="en-US" sz="1000" dirty="0" smtClean="0"/>
+                        <a:t>URL of</a:t>
+                      </a:r>
+                      <a:r>
+                        <a:rPr lang="en-US" sz="1000" baseline="0" dirty="0" smtClean="0"/>
+                        <a:t> image</a:t>
+                      </a:r>
+                      <a:endParaRPr lang="en-US" sz="1000" dirty="0"/>
+                    </a:p>
+                  </a:txBody>
+                  <a:tcPr/>
+                </a:tc>
+              </a:tr>
+              <a:tr h="274835">
+                <a:tc>
+                  <a:txBody>
+                    <a:bodyPr/>
+                    <a:lstStyle/>
+                    <a:p>
+                      <a:r>
+                        <a:rPr lang="en-US" sz="1000" dirty="0" err="1" smtClean="0"/>
+                        <a:t>search_url</a:t>
+                      </a:r>
+                      <a:endParaRPr lang="en-US" sz="1000" dirty="0"/>
+                    </a:p>
+                  </a:txBody>
+                  <a:tcPr/>
+                </a:tc>
+                <a:tc>
+                  <a:txBody>
+                    <a:bodyPr/>
+                    <a:lstStyle/>
+                    <a:p>
+                      <a:r>
+                        <a:rPr lang="en-US" sz="1000" dirty="0" smtClean="0"/>
+                        <a:t>VARCHAR </a:t>
+                      </a:r>
+                      <a:r>
+                        <a:rPr lang="en-US" sz="1000" dirty="0" smtClean="0"/>
+                        <a:t>2045</a:t>
+                      </a:r>
+                      <a:endParaRPr lang="en-US" sz="1000" dirty="0"/>
+                    </a:p>
+                  </a:txBody>
+                  <a:tcPr/>
+                </a:tc>
+                <a:tc>
+                  <a:txBody>
+                    <a:bodyPr/>
+                    <a:lstStyle/>
+                    <a:p>
+                      <a:r>
+                        <a:rPr lang="en-US" sz="1000" dirty="0" smtClean="0"/>
+                        <a:t>Not null</a:t>
+                      </a:r>
+                      <a:endParaRPr lang="en-US" sz="1000" dirty="0"/>
+                    </a:p>
+                  </a:txBody>
+                  <a:tcPr/>
+                </a:tc>
+                <a:tc>
+                  <a:txBody>
+                    <a:bodyPr/>
+                    <a:lstStyle/>
+                    <a:p>
+                      <a:r>
+                        <a:rPr lang="en-US" sz="1000" dirty="0" smtClean="0"/>
+                        <a:t>Base</a:t>
+                      </a:r>
+                      <a:r>
+                        <a:rPr lang="en-US" sz="1000" baseline="0" dirty="0" smtClean="0"/>
+                        <a:t> search query  that found image</a:t>
+                      </a:r>
+                      <a:endParaRPr lang="en-US" sz="1000" dirty="0"/>
+                    </a:p>
+                  </a:txBody>
+                  <a:tcPr/>
+                </a:tc>
+              </a:tr>
+              <a:tr h="274835">
+                <a:tc>
+                  <a:txBody>
+                    <a:bodyPr/>
+                    <a:lstStyle/>
+                    <a:p>
+                      <a:r>
+                        <a:rPr lang="en-US" sz="1000" dirty="0" smtClean="0"/>
+                        <a:t>height</a:t>
+                      </a:r>
+                      <a:endParaRPr lang="en-US" sz="1000" dirty="0"/>
+                    </a:p>
+                  </a:txBody>
+                  <a:tcPr/>
+                </a:tc>
+                <a:tc>
+                  <a:txBody>
+                    <a:bodyPr/>
+                    <a:lstStyle/>
+                    <a:p>
+                      <a:r>
+                        <a:rPr lang="en-US" sz="1000" dirty="0" smtClean="0"/>
+                        <a:t>INT</a:t>
+                      </a:r>
+                      <a:endParaRPr lang="en-US" sz="1000" dirty="0"/>
+                    </a:p>
+                  </a:txBody>
+                  <a:tcPr/>
+                </a:tc>
+                <a:tc>
+                  <a:txBody>
+                    <a:bodyPr/>
+                    <a:lstStyle/>
+                    <a:p>
+                      <a:endParaRPr lang="en-US" sz="1000" dirty="0"/>
+                    </a:p>
+                  </a:txBody>
+                  <a:tcPr/>
+                </a:tc>
+                <a:tc>
+                  <a:txBody>
+                    <a:bodyPr/>
+                    <a:lstStyle/>
+                    <a:p>
+                      <a:r>
+                        <a:rPr lang="en-US" sz="1000" dirty="0" smtClean="0"/>
+                        <a:t>Height in pixels</a:t>
+                      </a:r>
+                      <a:endParaRPr lang="en-US" sz="1000" dirty="0"/>
+                    </a:p>
+                  </a:txBody>
+                  <a:tcPr/>
+                </a:tc>
+              </a:tr>
+              <a:tr h="274835">
+                <a:tc>
+                  <a:txBody>
+                    <a:bodyPr/>
+                    <a:lstStyle/>
+                    <a:p>
+                      <a:r>
+                        <a:rPr lang="en-US" sz="1000" dirty="0" smtClean="0"/>
+                        <a:t>width</a:t>
+                      </a:r>
+                      <a:endParaRPr lang="en-US" sz="1000" dirty="0"/>
+                    </a:p>
+                  </a:txBody>
+                  <a:tcPr/>
+                </a:tc>
+                <a:tc>
+                  <a:txBody>
+                    <a:bodyPr/>
+                    <a:lstStyle/>
+                    <a:p>
+                      <a:r>
+                        <a:rPr lang="en-US" sz="1000" dirty="0" smtClean="0"/>
+                        <a:t>INT</a:t>
+                      </a:r>
+                      <a:endParaRPr lang="en-US" sz="1000" dirty="0"/>
+                    </a:p>
+                  </a:txBody>
+                  <a:tcPr/>
+                </a:tc>
+                <a:tc>
+                  <a:txBody>
+                    <a:bodyPr/>
+                    <a:lstStyle/>
+                    <a:p>
+                      <a:endParaRPr lang="en-US" sz="1000" dirty="0"/>
+                    </a:p>
+                  </a:txBody>
+                  <a:tcPr/>
+                </a:tc>
+                <a:tc>
+                  <a:txBody>
+                    <a:bodyPr/>
+                    <a:lstStyle/>
+                    <a:p>
+                      <a:r>
+                        <a:rPr lang="en-US" sz="1000" dirty="0" smtClean="0"/>
+                        <a:t>Width in pixels</a:t>
+                      </a:r>
+                      <a:endParaRPr lang="en-US" sz="1000" dirty="0"/>
+                    </a:p>
+                  </a:txBody>
+                  <a:tcPr/>
+                </a:tc>
+              </a:tr>
+              <a:tr h="274835">
+                <a:tc>
+                  <a:txBody>
+                    <a:bodyPr/>
+                    <a:lstStyle/>
+                    <a:p>
+                      <a:r>
+                        <a:rPr lang="en-US" sz="1000" dirty="0" err="1" smtClean="0"/>
+                        <a:t>etag</a:t>
+                      </a:r>
+                      <a:endParaRPr lang="en-US" sz="1000" dirty="0"/>
+                    </a:p>
+                  </a:txBody>
+                  <a:tcPr/>
+                </a:tc>
+                <a:tc>
+                  <a:txBody>
+                    <a:bodyPr/>
+                    <a:lstStyle/>
+                    <a:p>
+                      <a:r>
+                        <a:rPr lang="en-US" sz="1000" dirty="0" smtClean="0"/>
+                        <a:t>VARCHAR 255</a:t>
+                      </a:r>
+                      <a:endParaRPr lang="en-US" sz="1000" dirty="0"/>
+                    </a:p>
+                  </a:txBody>
+                  <a:tcPr/>
+                </a:tc>
+                <a:tc>
+                  <a:txBody>
+                    <a:bodyPr/>
+                    <a:lstStyle/>
+                    <a:p>
+                      <a:r>
+                        <a:rPr lang="en-US" sz="1000" dirty="0" smtClean="0"/>
+                        <a:t>Not null</a:t>
+                      </a:r>
+                      <a:endParaRPr lang="en-US" sz="1000" dirty="0"/>
+                    </a:p>
+                  </a:txBody>
+                  <a:tcPr/>
+                </a:tc>
+                <a:tc>
+                  <a:txBody>
+                    <a:bodyPr/>
+                    <a:lstStyle/>
+                    <a:p>
+                      <a:r>
+                        <a:rPr lang="en-US" sz="1000" dirty="0" smtClean="0"/>
+                        <a:t>Last </a:t>
+                      </a:r>
+                      <a:r>
+                        <a:rPr lang="en-US" sz="1000" dirty="0" err="1" smtClean="0"/>
+                        <a:t>etag</a:t>
+                      </a:r>
+                      <a:r>
+                        <a:rPr lang="en-US" sz="1000" dirty="0" smtClean="0"/>
+                        <a:t> of URL</a:t>
+                      </a:r>
+                      <a:endParaRPr lang="en-US" sz="1000" dirty="0"/>
+                    </a:p>
+                  </a:txBody>
+                  <a:tcPr/>
+                </a:tc>
+              </a:tr>
+              <a:tr h="274835">
+                <a:tc>
+                  <a:txBody>
+                    <a:bodyPr/>
+                    <a:lstStyle/>
+                    <a:p>
+                      <a:r>
+                        <a:rPr lang="en-US" sz="1000" dirty="0" err="1" smtClean="0"/>
+                        <a:t>tshirt_size</a:t>
+                      </a:r>
+                      <a:endParaRPr lang="en-US" sz="1000" dirty="0"/>
+                    </a:p>
+                  </a:txBody>
+                  <a:tcPr/>
+                </a:tc>
+                <a:tc>
+                  <a:txBody>
+                    <a:bodyPr/>
+                    <a:lstStyle/>
+                    <a:p>
+                      <a:r>
+                        <a:rPr lang="en-US" sz="1000" dirty="0" smtClean="0"/>
+                        <a:t>VARCHAR 10</a:t>
+                      </a:r>
+                      <a:endParaRPr lang="en-US" sz="1000" dirty="0"/>
+                    </a:p>
+                  </a:txBody>
+                  <a:tcPr/>
+                </a:tc>
+                <a:tc>
+                  <a:txBody>
+                    <a:bodyPr/>
+                    <a:lstStyle/>
+                    <a:p>
+                      <a:endParaRPr lang="en-US" sz="1000" dirty="0"/>
+                    </a:p>
+                  </a:txBody>
+                  <a:tcPr/>
+                </a:tc>
+                <a:tc>
+                  <a:txBody>
+                    <a:bodyPr/>
+                    <a:lstStyle/>
+                    <a:p>
+                      <a:r>
+                        <a:rPr lang="en-US" sz="1000" dirty="0" smtClean="0"/>
+                        <a:t>Small, Medium, or Large</a:t>
+                      </a:r>
+                      <a:endParaRPr lang="en-US" sz="1000" dirty="0"/>
+                    </a:p>
+                  </a:txBody>
+                  <a:tcPr/>
+                </a:tc>
+              </a:tr>
+            </a:tbl>
+          </a:graphicData>
+        </a:graphic>
+      </p:graphicFrame>
+      <p:graphicFrame>
+        <p:nvGraphicFramePr>
+          <p:cNvPr id="4" name="Table 3"/>
+          <p:cNvGraphicFramePr>
+            <a:graphicFrameLocks noGrp="1"/>
+          </p:cNvGraphicFramePr>
+          <p:nvPr>
+            <p:extLst>
+              <p:ext uri="{D42A27DB-BD31-4B8C-83A1-F6EECF244321}">
+                <p14:modId xmlns:p14="http://schemas.microsoft.com/office/powerpoint/2010/main" val="2266411445"/>
+              </p:ext>
+            </p:extLst>
+          </p:nvPr>
+        </p:nvGraphicFramePr>
+        <p:xfrm>
+          <a:off x="2818879" y="4664982"/>
+          <a:ext cx="6586376" cy="1739420"/>
+        </p:xfrm>
+        <a:graphic>
+          <a:graphicData uri="http://schemas.openxmlformats.org/drawingml/2006/table">
+            <a:tbl>
+              <a:tblPr firstRow="1" bandRow="1">
+                <a:tableStyleId>{5C22544A-7EE6-4342-B048-85BDC9FD1C3A}</a:tableStyleId>
+              </a:tblPr>
+              <a:tblGrid>
+                <a:gridCol w="1651425"/>
+                <a:gridCol w="1641763"/>
+                <a:gridCol w="1646594"/>
+                <a:gridCol w="1646594"/>
+              </a:tblGrid>
+              <a:tr h="0">
+                <a:tc>
+                  <a:txBody>
+                    <a:bodyPr/>
+                    <a:lstStyle/>
+                    <a:p>
+                      <a:r>
+                        <a:rPr lang="en-US" sz="1000" dirty="0" smtClean="0"/>
+                        <a:t>Name</a:t>
+                      </a:r>
+                      <a:endParaRPr lang="en-US" sz="1000" dirty="0"/>
+                    </a:p>
+                  </a:txBody>
+                  <a:tcPr/>
+                </a:tc>
+                <a:tc>
+                  <a:txBody>
+                    <a:bodyPr/>
+                    <a:lstStyle/>
+                    <a:p>
+                      <a:r>
+                        <a:rPr lang="en-US" sz="1000" dirty="0" smtClean="0"/>
+                        <a:t>Type</a:t>
+                      </a:r>
+                      <a:endParaRPr lang="en-US" sz="1000" dirty="0"/>
+                    </a:p>
+                  </a:txBody>
+                  <a:tcPr/>
+                </a:tc>
+                <a:tc>
+                  <a:txBody>
+                    <a:bodyPr/>
+                    <a:lstStyle/>
+                    <a:p>
+                      <a:r>
+                        <a:rPr lang="en-US" sz="1000" dirty="0" smtClean="0"/>
+                        <a:t>Constraint</a:t>
+                      </a:r>
+                      <a:endParaRPr lang="en-US" sz="1000" dirty="0"/>
+                    </a:p>
+                  </a:txBody>
+                  <a:tcPr/>
+                </a:tc>
+                <a:tc>
+                  <a:txBody>
+                    <a:bodyPr/>
+                    <a:lstStyle/>
+                    <a:p>
+                      <a:r>
+                        <a:rPr lang="en-US" sz="1000" dirty="0" smtClean="0"/>
+                        <a:t>Description</a:t>
+                      </a:r>
+                      <a:endParaRPr lang="en-US" sz="1000" dirty="0"/>
+                    </a:p>
+                  </a:txBody>
+                  <a:tcPr/>
+                </a:tc>
+              </a:tr>
+              <a:tr h="274835">
+                <a:tc>
+                  <a:txBody>
+                    <a:bodyPr/>
+                    <a:lstStyle/>
+                    <a:p>
+                      <a:r>
+                        <a:rPr lang="en-US" sz="1000" dirty="0" smtClean="0"/>
+                        <a:t>id</a:t>
+                      </a:r>
+                      <a:endParaRPr lang="en-US" sz="1000" dirty="0"/>
+                    </a:p>
+                  </a:txBody>
+                  <a:tcPr/>
+                </a:tc>
+                <a:tc>
+                  <a:txBody>
+                    <a:bodyPr/>
+                    <a:lstStyle/>
+                    <a:p>
+                      <a:r>
+                        <a:rPr lang="en-US" sz="1000" dirty="0" smtClean="0"/>
+                        <a:t>INT</a:t>
+                      </a:r>
+                      <a:endParaRPr lang="en-US" sz="1000" dirty="0"/>
+                    </a:p>
+                  </a:txBody>
+                  <a:tcPr/>
+                </a:tc>
+                <a:tc>
+                  <a:txBody>
+                    <a:bodyPr/>
+                    <a:lstStyle/>
+                    <a:p>
+                      <a:r>
+                        <a:rPr lang="en-US" sz="1000" dirty="0" smtClean="0"/>
+                        <a:t>Primary Key, auto</a:t>
+                      </a:r>
+                      <a:r>
+                        <a:rPr lang="en-US" sz="1000" baseline="0" dirty="0" smtClean="0"/>
+                        <a:t> increment, not null</a:t>
+                      </a:r>
+                      <a:endParaRPr lang="en-US" sz="1000" dirty="0"/>
+                    </a:p>
+                  </a:txBody>
+                  <a:tcPr/>
+                </a:tc>
+                <a:tc>
+                  <a:txBody>
+                    <a:bodyPr/>
+                    <a:lstStyle/>
+                    <a:p>
+                      <a:r>
+                        <a:rPr lang="en-US" sz="1000" dirty="0" smtClean="0"/>
+                        <a:t>ID</a:t>
+                      </a:r>
+                      <a:endParaRPr lang="en-US" sz="1000" dirty="0"/>
+                    </a:p>
+                  </a:txBody>
+                  <a:tcPr/>
+                </a:tc>
+              </a:tr>
+              <a:tr h="274835">
+                <a:tc>
+                  <a:txBody>
+                    <a:bodyPr/>
+                    <a:lstStyle/>
+                    <a:p>
+                      <a:r>
+                        <a:rPr lang="en-US" sz="1000" dirty="0" err="1" smtClean="0"/>
+                        <a:t>img_id</a:t>
+                      </a:r>
+                      <a:endParaRPr lang="en-US" sz="1000" dirty="0"/>
+                    </a:p>
+                  </a:txBody>
+                  <a:tcPr/>
+                </a:tc>
+                <a:tc>
+                  <a:txBody>
+                    <a:bodyPr/>
+                    <a:lstStyle/>
+                    <a:p>
+                      <a:r>
+                        <a:rPr lang="en-US" sz="1000" dirty="0" smtClean="0"/>
+                        <a:t>INT</a:t>
+                      </a:r>
+                      <a:endParaRPr lang="en-US" sz="1000" dirty="0"/>
+                    </a:p>
+                  </a:txBody>
+                  <a:tcPr/>
+                </a:tc>
+                <a:tc>
+                  <a:txBody>
+                    <a:bodyPr/>
+                    <a:lstStyle/>
+                    <a:p>
+                      <a:r>
+                        <a:rPr lang="en-US" sz="1000" dirty="0" smtClean="0"/>
+                        <a:t>Foreign </a:t>
+                      </a:r>
+                      <a:r>
+                        <a:rPr lang="en-US" sz="1000" baseline="0" dirty="0" smtClean="0"/>
+                        <a:t>key to IMAGE ‘id’</a:t>
+                      </a:r>
+                      <a:endParaRPr lang="en-US" sz="1000" dirty="0"/>
+                    </a:p>
+                  </a:txBody>
+                  <a:tcPr/>
+                </a:tc>
+                <a:tc>
+                  <a:txBody>
+                    <a:bodyPr/>
+                    <a:lstStyle/>
+                    <a:p>
+                      <a:r>
+                        <a:rPr lang="en-US" sz="1000" dirty="0" smtClean="0"/>
+                        <a:t>Link to IMAGE table</a:t>
+                      </a:r>
+                      <a:endParaRPr lang="en-US" sz="1000" dirty="0"/>
+                    </a:p>
+                  </a:txBody>
+                  <a:tcPr/>
+                </a:tc>
+              </a:tr>
+              <a:tr h="274835">
+                <a:tc>
+                  <a:txBody>
+                    <a:bodyPr/>
+                    <a:lstStyle/>
+                    <a:p>
+                      <a:r>
+                        <a:rPr lang="en-US" sz="1000" dirty="0" err="1" smtClean="0"/>
+                        <a:t>d_path</a:t>
+                      </a:r>
+                      <a:endParaRPr lang="en-US" sz="1000" dirty="0"/>
+                    </a:p>
+                  </a:txBody>
+                  <a:tcPr/>
+                </a:tc>
+                <a:tc>
+                  <a:txBody>
+                    <a:bodyPr/>
+                    <a:lstStyle/>
+                    <a:p>
+                      <a:r>
+                        <a:rPr lang="en-US" sz="1000" dirty="0" smtClean="0"/>
+                        <a:t>VARCHAR </a:t>
+                      </a:r>
+                      <a:r>
+                        <a:rPr lang="en-US" sz="1000" dirty="0" smtClean="0"/>
+                        <a:t>255</a:t>
+                      </a:r>
+                      <a:endParaRPr lang="en-US" sz="1000" dirty="0"/>
+                    </a:p>
+                  </a:txBody>
+                  <a:tcPr/>
+                </a:tc>
+                <a:tc>
+                  <a:txBody>
+                    <a:bodyPr/>
+                    <a:lstStyle/>
+                    <a:p>
+                      <a:pPr marL="0" marR="0" lvl="0" indent="0" algn="l" defTabSz="914400" rtl="0" eaLnBrk="1" fontAlgn="auto" latinLnBrk="0" hangingPunct="1">
+                        <a:lnSpc>
+                          <a:spcPct val="100000"/>
+                        </a:lnSpc>
+                        <a:spcBef>
+                          <a:spcPts val="0"/>
+                        </a:spcBef>
+                        <a:spcAft>
+                          <a:spcPts val="0"/>
+                        </a:spcAft>
+                        <a:buClrTx/>
+                        <a:buSzTx/>
+                        <a:buFontTx/>
+                        <a:buNone/>
+                        <a:tabLst/>
+                        <a:defRPr/>
+                      </a:pPr>
+                      <a:r>
+                        <a:rPr lang="en-US" sz="1000" dirty="0" smtClean="0"/>
+                        <a:t>Unique, </a:t>
+                      </a:r>
+                      <a:r>
+                        <a:rPr lang="en-US" sz="1000" dirty="0" smtClean="0"/>
+                        <a:t>Not null</a:t>
+                      </a:r>
+                    </a:p>
+                  </a:txBody>
+                  <a:tcPr/>
+                </a:tc>
+                <a:tc>
+                  <a:txBody>
+                    <a:bodyPr/>
+                    <a:lstStyle/>
+                    <a:p>
+                      <a:r>
+                        <a:rPr lang="en-US" sz="1000" dirty="0" smtClean="0"/>
+                        <a:t>Download path</a:t>
+                      </a:r>
+                      <a:endParaRPr lang="en-US" sz="1000" dirty="0"/>
+                    </a:p>
+                  </a:txBody>
+                  <a:tcPr/>
+                </a:tc>
+              </a:tr>
+              <a:tr h="274835">
+                <a:tc>
+                  <a:txBody>
+                    <a:bodyPr/>
+                    <a:lstStyle/>
+                    <a:p>
+                      <a:r>
+                        <a:rPr lang="en-US" sz="1000" dirty="0" err="1" smtClean="0"/>
+                        <a:t>hash_num</a:t>
+                      </a:r>
+                      <a:endParaRPr lang="en-US" sz="1000" dirty="0"/>
+                    </a:p>
+                  </a:txBody>
+                  <a:tcPr/>
+                </a:tc>
+                <a:tc>
+                  <a:txBody>
+                    <a:bodyPr/>
+                    <a:lstStyle/>
+                    <a:p>
+                      <a:r>
+                        <a:rPr lang="en-US" sz="1000" dirty="0" smtClean="0"/>
+                        <a:t>VARCHAR </a:t>
+                      </a:r>
+                      <a:r>
+                        <a:rPr lang="en-US" sz="1000" dirty="0" smtClean="0"/>
+                        <a:t>255</a:t>
+                      </a:r>
+                      <a:endParaRPr lang="en-US" sz="1000" dirty="0"/>
+                    </a:p>
+                  </a:txBody>
+                  <a:tcPr/>
+                </a:tc>
+                <a:tc>
+                  <a:txBody>
+                    <a:bodyPr/>
+                    <a:lstStyle/>
+                    <a:p>
+                      <a:r>
+                        <a:rPr lang="en-US" sz="1000" dirty="0" smtClean="0"/>
+                        <a:t>Not null</a:t>
+                      </a:r>
+                      <a:endParaRPr lang="en-US" sz="1000" dirty="0"/>
+                    </a:p>
+                  </a:txBody>
+                  <a:tcPr/>
+                </a:tc>
+                <a:tc>
+                  <a:txBody>
+                    <a:bodyPr/>
+                    <a:lstStyle/>
+                    <a:p>
+                      <a:r>
+                        <a:rPr lang="en-US" sz="1000" dirty="0" smtClean="0"/>
+                        <a:t>Hash</a:t>
+                      </a:r>
+                      <a:r>
+                        <a:rPr lang="en-US" sz="1000" baseline="0" dirty="0" smtClean="0"/>
+                        <a:t> of image</a:t>
+                      </a:r>
+                      <a:endParaRPr lang="en-US" sz="1000" dirty="0"/>
+                    </a:p>
+                  </a:txBody>
+                  <a:tcPr/>
+                </a:tc>
+              </a:tr>
+              <a:tr h="274835">
+                <a:tc>
+                  <a:txBody>
+                    <a:bodyPr/>
+                    <a:lstStyle/>
+                    <a:p>
+                      <a:r>
+                        <a:rPr lang="en-US" sz="1000" dirty="0" err="1" smtClean="0"/>
+                        <a:t>b_size</a:t>
+                      </a:r>
+                      <a:endParaRPr lang="en-US" sz="1000" dirty="0"/>
+                    </a:p>
+                  </a:txBody>
+                  <a:tcPr/>
+                </a:tc>
+                <a:tc>
+                  <a:txBody>
+                    <a:bodyPr/>
+                    <a:lstStyle/>
+                    <a:p>
+                      <a:r>
+                        <a:rPr lang="en-US" sz="1000" dirty="0" smtClean="0"/>
+                        <a:t>INT</a:t>
+                      </a:r>
+                      <a:endParaRPr lang="en-US" sz="1000" dirty="0"/>
+                    </a:p>
+                  </a:txBody>
+                  <a:tcPr/>
+                </a:tc>
+                <a:tc>
+                  <a:txBody>
+                    <a:bodyPr/>
+                    <a:lstStyle/>
+                    <a:p>
+                      <a:pPr marL="0" marR="0" lvl="0" indent="0" algn="l" defTabSz="914400" rtl="0" eaLnBrk="1" fontAlgn="auto" latinLnBrk="0" hangingPunct="1">
+                        <a:lnSpc>
+                          <a:spcPct val="100000"/>
+                        </a:lnSpc>
+                        <a:spcBef>
+                          <a:spcPts val="0"/>
+                        </a:spcBef>
+                        <a:spcAft>
+                          <a:spcPts val="0"/>
+                        </a:spcAft>
+                        <a:buClrTx/>
+                        <a:buSzTx/>
+                        <a:buFontTx/>
+                        <a:buNone/>
+                        <a:tabLst/>
+                        <a:defRPr/>
+                      </a:pPr>
+                      <a:r>
+                        <a:rPr lang="en-US" sz="1000" dirty="0" smtClean="0"/>
+                        <a:t>Not null</a:t>
+                      </a:r>
+                    </a:p>
+                  </a:txBody>
+                  <a:tcPr/>
+                </a:tc>
+                <a:tc>
+                  <a:txBody>
+                    <a:bodyPr/>
+                    <a:lstStyle/>
+                    <a:p>
+                      <a:r>
+                        <a:rPr lang="en-US" sz="1000" dirty="0" smtClean="0"/>
+                        <a:t>Size of image in</a:t>
+                      </a:r>
+                      <a:r>
+                        <a:rPr lang="en-US" sz="1000" baseline="0" dirty="0" smtClean="0"/>
+                        <a:t> bytes</a:t>
+                      </a:r>
+                      <a:endParaRPr lang="en-US" sz="1000" dirty="0"/>
+                    </a:p>
+                  </a:txBody>
+                  <a:tcPr/>
+                </a:tc>
+              </a:tr>
+            </a:tbl>
+          </a:graphicData>
+        </a:graphic>
+      </p:graphicFrame>
+      <p:sp>
+        <p:nvSpPr>
+          <p:cNvPr id="3" name="TextBox 2"/>
+          <p:cNvSpPr txBox="1"/>
+          <p:nvPr/>
+        </p:nvSpPr>
+        <p:spPr>
+          <a:xfrm>
+            <a:off x="535474" y="4587460"/>
+            <a:ext cx="2109295" cy="369332"/>
+          </a:xfrm>
+          <a:prstGeom prst="rect">
+            <a:avLst/>
+          </a:prstGeom>
+          <a:noFill/>
+        </p:spPr>
+        <p:txBody>
+          <a:bodyPr wrap="none" rtlCol="0">
+            <a:spAutoFit/>
+          </a:bodyPr>
+          <a:lstStyle/>
+          <a:p>
             <a:r>
               <a:rPr lang="en-US" dirty="0" smtClean="0"/>
-              <a:t>REST Call to read APIs from Image Table by timestamp</a:t>
-            </a:r>
-          </a:p>
-          <a:p>
-            <a:pPr marL="285750" indent="-285750">
-              <a:buFont typeface="Arial" panose="020B0604020202020204" pitchFamily="34" charset="0"/>
-              <a:buChar char="•"/>
-            </a:pPr>
-            <a:r>
-              <a:rPr lang="en-US" dirty="0" smtClean="0"/>
-              <a:t>Implement paging</a:t>
-            </a:r>
-          </a:p>
-          <a:p>
-            <a:pPr marL="285750" indent="-285750">
-              <a:buFont typeface="Arial" panose="020B0604020202020204" pitchFamily="34" charset="0"/>
-              <a:buChar char="•"/>
-            </a:pPr>
-            <a:endParaRPr lang="en-US" dirty="0"/>
-          </a:p>
-          <a:p>
-            <a:r>
-              <a:rPr lang="en-US" dirty="0" smtClean="0"/>
-              <a:t>Recalling previously discovered images?</a:t>
-            </a:r>
-          </a:p>
-          <a:p>
-            <a:r>
-              <a:rPr lang="en-US" dirty="0" smtClean="0"/>
-              <a:t>Recalling downloaded images?</a:t>
-            </a:r>
-          </a:p>
-          <a:p>
-            <a:pPr lvl="1"/>
+              <a:t>DOWNLOAD_IMAGE</a:t>
+            </a:r>
             <a:endParaRPr lang="en-US" dirty="0"/>
           </a:p>
         </p:txBody>
@@ -3559,7 +4723,7 @@
     </p:spTree>
     <p:extLst>
       <p:ext uri="{BB962C8B-B14F-4D97-AF65-F5344CB8AC3E}">
-        <p14:creationId xmlns:p14="http://schemas.microsoft.com/office/powerpoint/2010/main" val="2598165664"/>
+        <p14:creationId xmlns:p14="http://schemas.microsoft.com/office/powerpoint/2010/main" val="3636907444"/>
       </p:ext>
     </p:extLst>
   </p:cSld>
@@ -3601,8 +4765,8 @@
         </p:nvSpPr>
         <p:spPr>
           <a:xfrm>
-            <a:off x="951722" y="1026367"/>
-            <a:ext cx="10608906" cy="6340197"/>
+            <a:off x="535474" y="192372"/>
+            <a:ext cx="10608906" cy="2339102"/>
           </a:xfrm>
           <a:prstGeom prst="rect">
             <a:avLst/>
@@ -3617,205 +4781,370 @@
           <a:p>
             <a:r>
               <a:rPr lang="en-US" sz="2800" dirty="0" smtClean="0"/>
-              <a:t>Database</a:t>
-            </a:r>
-          </a:p>
-          <a:p>
+              <a:t>Database Tables</a:t>
+            </a:r>
+          </a:p>
+          <a:p>
+            <a:r>
+              <a:rPr lang="en-US" dirty="0" smtClean="0"/>
+              <a:t>USER_METADATA</a:t>
+            </a:r>
             <a:endParaRPr lang="en-US" dirty="0"/>
           </a:p>
           <a:p>
-            <a:r>
-              <a:rPr lang="en-US" dirty="0" smtClean="0"/>
-              <a:t>Table Images</a:t>
-            </a:r>
-          </a:p>
-          <a:p>
-            <a:pPr marL="285750" indent="-285750">
-              <a:buFont typeface="Arial" panose="020B0604020202020204" pitchFamily="34" charset="0"/>
-              <a:buChar char="•"/>
-            </a:pPr>
-            <a:r>
-              <a:rPr lang="en-US" dirty="0" smtClean="0"/>
-              <a:t>ID Primary Key</a:t>
-            </a:r>
-          </a:p>
-          <a:p>
-            <a:pPr marL="285750" indent="-285750">
-              <a:buFont typeface="Arial" panose="020B0604020202020204" pitchFamily="34" charset="0"/>
-              <a:buChar char="•"/>
-            </a:pPr>
-            <a:r>
-              <a:rPr lang="en-US" dirty="0" smtClean="0"/>
-              <a:t>Timestamp Key</a:t>
-            </a:r>
-          </a:p>
-          <a:p>
-            <a:pPr marL="285750" indent="-285750">
-              <a:buFont typeface="Arial" panose="020B0604020202020204" pitchFamily="34" charset="0"/>
-              <a:buChar char="•"/>
-            </a:pPr>
-            <a:r>
-              <a:rPr lang="en-US" dirty="0" smtClean="0"/>
-              <a:t>Name</a:t>
-            </a:r>
-          </a:p>
-          <a:p>
-            <a:pPr marL="285750" indent="-285750">
-              <a:buFont typeface="Arial" panose="020B0604020202020204" pitchFamily="34" charset="0"/>
-              <a:buChar char="•"/>
-            </a:pPr>
-            <a:r>
-              <a:rPr lang="en-US" dirty="0" smtClean="0"/>
-              <a:t>Source URL</a:t>
-            </a:r>
-          </a:p>
-          <a:p>
-            <a:pPr marL="285750" indent="-285750">
-              <a:buFont typeface="Arial" panose="020B0604020202020204" pitchFamily="34" charset="0"/>
-              <a:buChar char="•"/>
-            </a:pPr>
-            <a:r>
-              <a:rPr lang="en-US" dirty="0" smtClean="0"/>
-              <a:t>Image URL</a:t>
-            </a:r>
-          </a:p>
-          <a:p>
-            <a:pPr marL="285750" indent="-285750">
-              <a:buFont typeface="Arial" panose="020B0604020202020204" pitchFamily="34" charset="0"/>
-              <a:buChar char="•"/>
-            </a:pPr>
-            <a:r>
-              <a:rPr lang="en-US" dirty="0" smtClean="0"/>
-              <a:t>Width</a:t>
-            </a:r>
-          </a:p>
-          <a:p>
-            <a:pPr marL="285750" indent="-285750">
-              <a:buFont typeface="Arial" panose="020B0604020202020204" pitchFamily="34" charset="0"/>
-              <a:buChar char="•"/>
-            </a:pPr>
-            <a:r>
-              <a:rPr lang="en-US" dirty="0" err="1" smtClean="0"/>
-              <a:t>Heigth</a:t>
-            </a:r>
+            <a:endParaRPr lang="en-US" sz="2800" dirty="0" smtClean="0"/>
+          </a:p>
+          <a:p>
+            <a:endParaRPr lang="en-US" dirty="0"/>
+          </a:p>
+          <a:p>
             <a:endParaRPr lang="en-US" dirty="0" smtClean="0"/>
           </a:p>
           <a:p>
-            <a:pPr marL="285750" indent="-285750">
-              <a:buFont typeface="Arial" panose="020B0604020202020204" pitchFamily="34" charset="0"/>
-              <a:buChar char="•"/>
-            </a:pPr>
-            <a:r>
-              <a:rPr lang="en-US" dirty="0" err="1" smtClean="0"/>
-              <a:t>etag</a:t>
-            </a:r>
+            <a:endParaRPr lang="en-US" dirty="0"/>
+          </a:p>
+          <a:p>
             <a:endParaRPr lang="en-US" dirty="0" smtClean="0"/>
           </a:p>
-          <a:p>
-            <a:pPr marL="285750" indent="-285750">
-              <a:buFont typeface="Arial" panose="020B0604020202020204" pitchFamily="34" charset="0"/>
-              <a:buChar char="•"/>
-            </a:pPr>
-            <a:r>
-              <a:rPr lang="en-US" dirty="0" smtClean="0"/>
-              <a:t>Base URL</a:t>
-            </a:r>
-          </a:p>
-          <a:p>
-            <a:pPr marL="285750" indent="-285750">
-              <a:buFont typeface="Arial" panose="020B0604020202020204" pitchFamily="34" charset="0"/>
-              <a:buChar char="•"/>
-            </a:pPr>
-            <a:endParaRPr lang="en-US" dirty="0"/>
-          </a:p>
-          <a:p>
-            <a:r>
-              <a:rPr lang="en-US" dirty="0" smtClean="0"/>
-              <a:t>Table </a:t>
-            </a:r>
-            <a:r>
-              <a:rPr lang="en-US" dirty="0" err="1" smtClean="0"/>
-              <a:t>DownloadedImages</a:t>
-            </a:r>
-            <a:endParaRPr lang="en-US" dirty="0" smtClean="0"/>
-          </a:p>
-          <a:p>
-            <a:pPr marL="285750" indent="-285750">
-              <a:buFont typeface="Arial" panose="020B0604020202020204" pitchFamily="34" charset="0"/>
-              <a:buChar char="•"/>
-            </a:pPr>
-            <a:r>
-              <a:rPr lang="en-US" dirty="0" smtClean="0"/>
-              <a:t>ID Primary Key</a:t>
-            </a:r>
-          </a:p>
-          <a:p>
-            <a:pPr marL="285750" indent="-285750">
-              <a:buFont typeface="Arial" panose="020B0604020202020204" pitchFamily="34" charset="0"/>
-              <a:buChar char="•"/>
-            </a:pPr>
-            <a:r>
-              <a:rPr lang="en-US" dirty="0" smtClean="0"/>
-              <a:t>Foreign Key To Images Primary Key</a:t>
-            </a:r>
-          </a:p>
-          <a:p>
-            <a:pPr marL="285750" indent="-285750">
-              <a:buFont typeface="Arial" panose="020B0604020202020204" pitchFamily="34" charset="0"/>
-              <a:buChar char="•"/>
-            </a:pPr>
-            <a:r>
-              <a:rPr lang="en-US" dirty="0" smtClean="0"/>
-              <a:t>Download Path On Disk</a:t>
-            </a:r>
-          </a:p>
-          <a:p>
-            <a:pPr marL="285750" indent="-285750">
-              <a:buFont typeface="Arial" panose="020B0604020202020204" pitchFamily="34" charset="0"/>
-              <a:buChar char="•"/>
-            </a:pPr>
-            <a:r>
-              <a:rPr lang="en-US" dirty="0" err="1" smtClean="0"/>
-              <a:t>HashSet</a:t>
-            </a:r>
-            <a:endParaRPr lang="en-US" dirty="0" smtClean="0"/>
-          </a:p>
-          <a:p>
-            <a:pPr marL="285750" indent="-285750">
-              <a:buFont typeface="Arial" panose="020B0604020202020204" pitchFamily="34" charset="0"/>
-              <a:buChar char="•"/>
-            </a:pPr>
-            <a:r>
-              <a:rPr lang="en-US" dirty="0" smtClean="0"/>
-              <a:t>Size</a:t>
-            </a:r>
-          </a:p>
-          <a:p>
-            <a:pPr marL="285750" indent="-285750">
-              <a:buFont typeface="Arial" panose="020B0604020202020204" pitchFamily="34" charset="0"/>
-              <a:buChar char="•"/>
-            </a:pPr>
-            <a:r>
-              <a:rPr lang="en-US" dirty="0" smtClean="0"/>
-              <a:t>Type ??</a:t>
-            </a:r>
-          </a:p>
-          <a:p>
-            <a:pPr marL="285750" indent="-285750">
-              <a:buFont typeface="Arial" panose="020B0604020202020204" pitchFamily="34" charset="0"/>
-              <a:buChar char="•"/>
-            </a:pPr>
-            <a:endParaRPr lang="en-US" dirty="0"/>
-          </a:p>
-          <a:p>
-            <a:endParaRPr lang="en-US" dirty="0" smtClean="0"/>
-          </a:p>
-        </p:txBody>
-      </p:sp>
+        </p:txBody>
+      </p:sp>
+      <p:graphicFrame>
+        <p:nvGraphicFramePr>
+          <p:cNvPr id="2" name="Table 1"/>
+          <p:cNvGraphicFramePr>
+            <a:graphicFrameLocks noGrp="1"/>
+          </p:cNvGraphicFramePr>
+          <p:nvPr>
+            <p:extLst>
+              <p:ext uri="{D42A27DB-BD31-4B8C-83A1-F6EECF244321}">
+                <p14:modId xmlns:p14="http://schemas.microsoft.com/office/powerpoint/2010/main" val="686058918"/>
+              </p:ext>
+            </p:extLst>
+          </p:nvPr>
+        </p:nvGraphicFramePr>
+        <p:xfrm>
+          <a:off x="1409957" y="1109650"/>
+          <a:ext cx="6586376" cy="1464585"/>
+        </p:xfrm>
+        <a:graphic>
+          <a:graphicData uri="http://schemas.openxmlformats.org/drawingml/2006/table">
+            <a:tbl>
+              <a:tblPr firstRow="1" bandRow="1">
+                <a:tableStyleId>{5C22544A-7EE6-4342-B048-85BDC9FD1C3A}</a:tableStyleId>
+              </a:tblPr>
+              <a:tblGrid>
+                <a:gridCol w="1651425"/>
+                <a:gridCol w="1641763"/>
+                <a:gridCol w="1646594"/>
+                <a:gridCol w="1646594"/>
+              </a:tblGrid>
+              <a:tr h="0">
+                <a:tc>
+                  <a:txBody>
+                    <a:bodyPr/>
+                    <a:lstStyle/>
+                    <a:p>
+                      <a:r>
+                        <a:rPr lang="en-US" sz="1000" dirty="0" smtClean="0"/>
+                        <a:t>Name</a:t>
+                      </a:r>
+                      <a:endParaRPr lang="en-US" sz="1000" dirty="0"/>
+                    </a:p>
+                  </a:txBody>
+                  <a:tcPr/>
+                </a:tc>
+                <a:tc>
+                  <a:txBody>
+                    <a:bodyPr/>
+                    <a:lstStyle/>
+                    <a:p>
+                      <a:r>
+                        <a:rPr lang="en-US" sz="1000" dirty="0" smtClean="0"/>
+                        <a:t>Type</a:t>
+                      </a:r>
+                      <a:endParaRPr lang="en-US" sz="1000" dirty="0"/>
+                    </a:p>
+                  </a:txBody>
+                  <a:tcPr/>
+                </a:tc>
+                <a:tc>
+                  <a:txBody>
+                    <a:bodyPr/>
+                    <a:lstStyle/>
+                    <a:p>
+                      <a:r>
+                        <a:rPr lang="en-US" sz="1000" dirty="0" smtClean="0"/>
+                        <a:t>Constraint</a:t>
+                      </a:r>
+                      <a:endParaRPr lang="en-US" sz="1000" dirty="0"/>
+                    </a:p>
+                  </a:txBody>
+                  <a:tcPr/>
+                </a:tc>
+                <a:tc>
+                  <a:txBody>
+                    <a:bodyPr/>
+                    <a:lstStyle/>
+                    <a:p>
+                      <a:r>
+                        <a:rPr lang="en-US" sz="1000" dirty="0" smtClean="0"/>
+                        <a:t>Description</a:t>
+                      </a:r>
+                      <a:endParaRPr lang="en-US" sz="1000" dirty="0"/>
+                    </a:p>
+                  </a:txBody>
+                  <a:tcPr/>
+                </a:tc>
+              </a:tr>
+              <a:tr h="274835">
+                <a:tc>
+                  <a:txBody>
+                    <a:bodyPr/>
+                    <a:lstStyle/>
+                    <a:p>
+                      <a:r>
+                        <a:rPr lang="en-US" sz="1000" dirty="0" smtClean="0"/>
+                        <a:t>id</a:t>
+                      </a:r>
+                      <a:endParaRPr lang="en-US" sz="1000" dirty="0"/>
+                    </a:p>
+                  </a:txBody>
+                  <a:tcPr/>
+                </a:tc>
+                <a:tc>
+                  <a:txBody>
+                    <a:bodyPr/>
+                    <a:lstStyle/>
+                    <a:p>
+                      <a:r>
+                        <a:rPr lang="en-US" sz="1000" dirty="0" smtClean="0"/>
+                        <a:t>INT</a:t>
+                      </a:r>
+                      <a:endParaRPr lang="en-US" sz="1000" dirty="0"/>
+                    </a:p>
+                  </a:txBody>
+                  <a:tcPr/>
+                </a:tc>
+                <a:tc>
+                  <a:txBody>
+                    <a:bodyPr/>
+                    <a:lstStyle/>
+                    <a:p>
+                      <a:r>
+                        <a:rPr lang="en-US" sz="1000" dirty="0" smtClean="0"/>
+                        <a:t>Primary Key, auto increment</a:t>
+                      </a:r>
+                      <a:endParaRPr lang="en-US" sz="1000" dirty="0"/>
+                    </a:p>
+                  </a:txBody>
+                  <a:tcPr/>
+                </a:tc>
+                <a:tc>
+                  <a:txBody>
+                    <a:bodyPr/>
+                    <a:lstStyle/>
+                    <a:p>
+                      <a:r>
+                        <a:rPr lang="en-US" sz="1000" dirty="0" smtClean="0"/>
+                        <a:t>ID</a:t>
+                      </a:r>
+                      <a:endParaRPr lang="en-US" sz="1000" dirty="0"/>
+                    </a:p>
+                  </a:txBody>
+                  <a:tcPr/>
+                </a:tc>
+              </a:tr>
+              <a:tr h="274835">
+                <a:tc>
+                  <a:txBody>
+                    <a:bodyPr/>
+                    <a:lstStyle/>
+                    <a:p>
+                      <a:r>
+                        <a:rPr lang="en-US" sz="1000" dirty="0" err="1" smtClean="0"/>
+                        <a:t>max_urls</a:t>
+                      </a:r>
+                      <a:endParaRPr lang="en-US" sz="1000" dirty="0"/>
+                    </a:p>
+                  </a:txBody>
+                  <a:tcPr/>
+                </a:tc>
+                <a:tc>
+                  <a:txBody>
+                    <a:bodyPr/>
+                    <a:lstStyle/>
+                    <a:p>
+                      <a:r>
+                        <a:rPr lang="en-US" sz="1000" dirty="0" smtClean="0"/>
+                        <a:t>INT</a:t>
+                      </a:r>
+                      <a:endParaRPr lang="en-US" sz="1000" dirty="0"/>
+                    </a:p>
+                  </a:txBody>
+                  <a:tcPr/>
+                </a:tc>
+                <a:tc>
+                  <a:txBody>
+                    <a:bodyPr/>
+                    <a:lstStyle/>
+                    <a:p>
+                      <a:endParaRPr lang="en-US" sz="1000" dirty="0"/>
+                    </a:p>
+                  </a:txBody>
+                  <a:tcPr/>
+                </a:tc>
+                <a:tc>
+                  <a:txBody>
+                    <a:bodyPr/>
+                    <a:lstStyle/>
+                    <a:p>
+                      <a:r>
+                        <a:rPr lang="en-US" sz="1000" dirty="0" smtClean="0"/>
+                        <a:t>Max URLS to search</a:t>
+                      </a:r>
+                      <a:endParaRPr lang="en-US" sz="1000" dirty="0"/>
+                    </a:p>
+                  </a:txBody>
+                  <a:tcPr/>
+                </a:tc>
+              </a:tr>
+              <a:tr h="274835">
+                <a:tc>
+                  <a:txBody>
+                    <a:bodyPr/>
+                    <a:lstStyle/>
+                    <a:p>
+                      <a:r>
+                        <a:rPr lang="en-US" sz="1000" dirty="0" err="1" smtClean="0"/>
+                        <a:t>max_imgs</a:t>
+                      </a:r>
+                      <a:endParaRPr lang="en-US" sz="1000" dirty="0"/>
+                    </a:p>
+                  </a:txBody>
+                  <a:tcPr/>
+                </a:tc>
+                <a:tc>
+                  <a:txBody>
+                    <a:bodyPr/>
+                    <a:lstStyle/>
+                    <a:p>
+                      <a:r>
+                        <a:rPr lang="en-US" sz="1000" dirty="0" smtClean="0"/>
+                        <a:t>INT</a:t>
+                      </a:r>
+                      <a:endParaRPr lang="en-US" sz="1000" dirty="0"/>
+                    </a:p>
+                  </a:txBody>
+                  <a:tcPr/>
+                </a:tc>
+                <a:tc>
+                  <a:txBody>
+                    <a:bodyPr/>
+                    <a:lstStyle/>
+                    <a:p>
+                      <a:endParaRPr lang="en-US" sz="1000" dirty="0"/>
+                    </a:p>
+                  </a:txBody>
+                  <a:tcPr/>
+                </a:tc>
+                <a:tc>
+                  <a:txBody>
+                    <a:bodyPr/>
+                    <a:lstStyle/>
+                    <a:p>
+                      <a:r>
+                        <a:rPr lang="en-US" sz="1000" dirty="0" smtClean="0"/>
+                        <a:t>Maximum images to search</a:t>
+                      </a:r>
+                      <a:endParaRPr lang="en-US" sz="1000" dirty="0"/>
+                    </a:p>
+                  </a:txBody>
+                  <a:tcPr/>
+                </a:tc>
+              </a:tr>
+              <a:tr h="274835">
+                <a:tc>
+                  <a:txBody>
+                    <a:bodyPr/>
+                    <a:lstStyle/>
+                    <a:p>
+                      <a:r>
+                        <a:rPr lang="en-US" sz="1000" dirty="0" err="1" smtClean="0"/>
+                        <a:t>img_save_path</a:t>
+                      </a:r>
+                      <a:endParaRPr lang="en-US" sz="1000" dirty="0"/>
+                    </a:p>
+                  </a:txBody>
+                  <a:tcPr/>
+                </a:tc>
+                <a:tc>
+                  <a:txBody>
+                    <a:bodyPr/>
+                    <a:lstStyle/>
+                    <a:p>
+                      <a:r>
+                        <a:rPr lang="en-US" sz="1000" dirty="0" smtClean="0"/>
+                        <a:t>VARCHAR 255</a:t>
+                      </a:r>
+                      <a:endParaRPr lang="en-US" sz="1000" dirty="0"/>
+                    </a:p>
+                  </a:txBody>
+                  <a:tcPr/>
+                </a:tc>
+                <a:tc>
+                  <a:txBody>
+                    <a:bodyPr/>
+                    <a:lstStyle/>
+                    <a:p>
+                      <a:endParaRPr lang="en-US" sz="1000" dirty="0"/>
+                    </a:p>
+                  </a:txBody>
+                  <a:tcPr/>
+                </a:tc>
+                <a:tc>
+                  <a:txBody>
+                    <a:bodyPr/>
+                    <a:lstStyle/>
+                    <a:p>
+                      <a:pPr marL="0" marR="0" lvl="0" indent="0" algn="l" defTabSz="914400" rtl="0" eaLnBrk="1" fontAlgn="auto" latinLnBrk="0" hangingPunct="1">
+                        <a:lnSpc>
+                          <a:spcPct val="100000"/>
+                        </a:lnSpc>
+                        <a:spcBef>
+                          <a:spcPts val="0"/>
+                        </a:spcBef>
+                        <a:spcAft>
+                          <a:spcPts val="0"/>
+                        </a:spcAft>
+                        <a:buClrTx/>
+                        <a:buSzTx/>
+                        <a:buFontTx/>
+                        <a:buNone/>
+                        <a:tabLst/>
+                        <a:defRPr/>
+                      </a:pPr>
+                      <a:r>
+                        <a:rPr lang="en-US" sz="1000" dirty="0" smtClean="0"/>
+                        <a:t>Directory</a:t>
+                      </a:r>
+                      <a:r>
+                        <a:rPr lang="en-US" sz="1000" baseline="0" dirty="0" smtClean="0"/>
+                        <a:t> to save images</a:t>
+                      </a:r>
+                      <a:endParaRPr lang="en-US" sz="1000" dirty="0" smtClean="0"/>
+                    </a:p>
+                  </a:txBody>
+                  <a:tcPr/>
+                </a:tc>
+              </a:tr>
+            </a:tbl>
+          </a:graphicData>
+        </a:graphic>
+      </p:graphicFrame>
     </p:spTree>
     <p:extLst>
       <p:ext uri="{BB962C8B-B14F-4D97-AF65-F5344CB8AC3E}">
-        <p14:creationId xmlns:p14="http://schemas.microsoft.com/office/powerpoint/2010/main" val="3636907444"/>
+        <p14:creationId xmlns:p14="http://schemas.microsoft.com/office/powerpoint/2010/main" val="2980869019"/>
       </p:ext>
     </p:extLst>
   </p:cSld>
@@ -3857,8 +5186,8 @@
         </p:nvSpPr>
         <p:spPr>
           <a:xfrm>
-            <a:off x="503852" y="625151"/>
-            <a:ext cx="10608906" cy="1477328"/>
+            <a:off x="951722" y="1045029"/>
+            <a:ext cx="10608906" cy="2462213"/>
           </a:xfrm>
           <a:prstGeom prst="rect">
             <a:avLst/>
@@ -3872,9 +5201,12 @@
           <a:lstStyle/>
           <a:p>
             <a:r>
-              <a:rPr lang="en-US" dirty="0" smtClean="0"/>
-              <a:t>References</a:t>
-            </a:r>
+              <a:rPr lang="en-US" sz="2800" dirty="0" smtClean="0"/>
+              <a:t>Display</a:t>
+            </a:r>
+          </a:p>
+          <a:p>
+            <a:endParaRPr lang="en-US" dirty="0" smtClean="0"/>
           </a:p>
           <a:p>
             <a:pPr marL="285750" indent="-285750">
@@ -3882,20 +5214,8 @@
               <a:buChar char="•"/>
             </a:pPr>
             <a:r>
-              <a:rPr lang="en-US" dirty="0" err="1" smtClean="0">
-                <a:hlinkClick r:id="rId2"/>
-              </a:rPr>
-              <a:t>JSoup</a:t>
-            </a:r>
-            <a:r>
-              <a:rPr lang="en-US" dirty="0" smtClean="0">
-                <a:hlinkClick r:id="rId2"/>
-              </a:rPr>
-              <a:t> </a:t>
-            </a:r>
-            <a:r>
               <a:rPr lang="en-US" dirty="0" smtClean="0"/>
-              <a:t>HTML DOM Parser with Images</a:t>
+              <a:t>REST Call to read APIs from Image Table by timestamp</a:t>
             </a:r>
           </a:p>
           <a:p>
@@ -3905,19 +5225,7 @@
             </a:pPr>
             <a:r>
               <a:rPr lang="en-US" dirty="0" smtClean="0"/>
-              <a:t>Use Apache </a:t>
-            </a:r>
-            <a:r>
-              <a:rPr lang="en-US" dirty="0" err="1" smtClean="0"/>
-              <a:t>FileUtilities</a:t>
-            </a:r>
-            <a:r>
-              <a:rPr lang="en-US" dirty="0" smtClean="0"/>
-              <a:t> for parsing </a:t>
-            </a:r>
-            <a:r>
-              <a:rPr lang="en-US" dirty="0" smtClean="0"/>
-              <a:t>Files</a:t>
+              <a:t>Implement paging</a:t>
             </a:r>
           </a:p>
           <a:p>
@@ -3925,33 +5233,30 @@
               <a:buFont typeface="Arial" panose="020B0604020202020204" pitchFamily="34" charset="0"/>
               <a:buChar char="•"/>
             </a:pPr>
-            <a:r>
-              <a:rPr lang="en-US" dirty="0" smtClean="0">
-                <a:hlinkClick r:id="rId3"/>
-              </a:rPr>
-              <a:t>RAML</a:t>
-            </a:r>
-            <a:endParaRPr lang="en-US" dirty="0" smtClean="0"/>
-          </a:p>
-          <a:p>
-            <a:pPr marL="285750" indent="-285750">
-              <a:buFont typeface="Arial" panose="020B0604020202020204" pitchFamily="34" charset="0"/>
-              <a:buChar char="•"/>
-            </a:pPr>
-            <a:r>
-              <a:rPr lang="en-US" dirty="0" err="1" smtClean="0">
-                <a:hlinkClick r:id="rId4"/>
-              </a:rPr>
-              <a:t>Mapstruct</a:t>
-            </a:r>
-            <a:endParaRPr lang="en-US" dirty="0" smtClean="0"/>
+            <a:endParaRPr lang="en-US" dirty="0"/>
+          </a:p>
+          <a:p>
+            <a:r>
+              <a:rPr lang="en-US" dirty="0" smtClean="0"/>
+              <a:t>Recalling previously discovered images?</a:t>
+            </a:r>
+          </a:p>
+          <a:p>
+            <a:r>
+              <a:rPr lang="en-US" dirty="0" smtClean="0"/>
+              <a:t>Recalling downloaded images?</a:t>
+            </a:r>
+          </a:p>
+          <a:p>
+            <a:pPr lvl="1"/>
+            <a:endParaRPr lang="en-US" dirty="0"/>
           </a:p>
         </p:txBody>
       </p:sp>
     </p:spTree>
     <p:extLst>
       <p:ext uri="{BB962C8B-B14F-4D97-AF65-F5344CB8AC3E}">
-        <p14:creationId xmlns:p14="http://schemas.microsoft.com/office/powerpoint/2010/main" val="41853612"/>
+        <p14:creationId xmlns:p14="http://schemas.microsoft.com/office/powerpoint/2010/main" val="2598165664"/>
       </p:ext>
     </p:extLst>
   </p:cSld>
@@ -3993,6 +5298,138 @@
         </p:nvSpPr>
         <p:spPr>
           <a:xfrm>
+            <a:off x="503852" y="625151"/>
+            <a:ext cx="10608906" cy="1477328"/>
+          </a:xfrm>
+          <a:prstGeom prst="rect">
+            <a:avLst/>
+          </a:prstGeom>
+          <a:noFill/>
+        </p:spPr>
+        <p:txBody>
+          <a:bodyPr wrap="square" rtlCol="0">
+            <a:spAutoFit/>
+          </a:bodyPr>
+          <a:lstStyle/>
+          <a:p>
+            <a:r>
+              <a:rPr lang="en-US" dirty="0" smtClean="0"/>
+              <a:t>References</a:t>
+            </a:r>
+          </a:p>
+          <a:p>
+            <a:pPr marL="285750" indent="-285750">
+              <a:buFont typeface="Arial" panose="020B0604020202020204" pitchFamily="34" charset="0"/>
+              <a:buChar char="•"/>
+            </a:pPr>
+            <a:r>
+              <a:rPr lang="en-US" dirty="0" err="1" smtClean="0">
+                <a:hlinkClick r:id="rId2"/>
+              </a:rPr>
+              <a:t>JSoup</a:t>
+            </a:r>
+            <a:r>
+              <a:rPr lang="en-US" dirty="0" smtClean="0">
+                <a:hlinkClick r:id="rId2"/>
+              </a:rPr>
+              <a:t> </a:t>
+            </a:r>
+            <a:r>
+              <a:rPr lang="en-US" dirty="0" smtClean="0"/>
+              <a:t>HTML DOM Parser with Images</a:t>
+            </a:r>
+          </a:p>
+          <a:p>
+            <a:pPr marL="285750" indent="-285750">
+              <a:buFont typeface="Arial" panose="020B0604020202020204" pitchFamily="34" charset="0"/>
+              <a:buChar char="•"/>
+            </a:pPr>
+            <a:r>
+              <a:rPr lang="en-US" dirty="0" smtClean="0"/>
+              <a:t>Use Apache </a:t>
+            </a:r>
+            <a:r>
+              <a:rPr lang="en-US" dirty="0" err="1" smtClean="0"/>
+              <a:t>FileUtilities</a:t>
+            </a:r>
+            <a:r>
+              <a:rPr lang="en-US" dirty="0" smtClean="0"/>
+              <a:t> for parsing Files</a:t>
+            </a:r>
+          </a:p>
+          <a:p>
+            <a:pPr marL="285750" indent="-285750">
+              <a:buFont typeface="Arial" panose="020B0604020202020204" pitchFamily="34" charset="0"/>
+              <a:buChar char="•"/>
+            </a:pPr>
+            <a:r>
+              <a:rPr lang="en-US" dirty="0" smtClean="0">
+                <a:hlinkClick r:id="rId3"/>
+              </a:rPr>
+              <a:t>RAML</a:t>
+            </a:r>
+            <a:endParaRPr lang="en-US" dirty="0" smtClean="0"/>
+          </a:p>
+          <a:p>
+            <a:pPr marL="285750" indent="-285750">
+              <a:buFont typeface="Arial" panose="020B0604020202020204" pitchFamily="34" charset="0"/>
+              <a:buChar char="•"/>
+            </a:pPr>
+            <a:r>
+              <a:rPr lang="en-US" dirty="0" err="1" smtClean="0">
+                <a:hlinkClick r:id="rId4"/>
+              </a:rPr>
+              <a:t>Mapstruct</a:t>
+            </a:r>
+            <a:endParaRPr lang="en-US" dirty="0" smtClean="0"/>
+          </a:p>
+        </p:txBody>
+      </p:sp>
+    </p:spTree>
+    <p:extLst>
+      <p:ext uri="{BB962C8B-B14F-4D97-AF65-F5344CB8AC3E}">
+        <p14:creationId xmlns:p14="http://schemas.microsoft.com/office/powerpoint/2010/main" val="41853612"/>
+      </p:ext>
+    </p:extLst>
+  </p:cSld>
+  <p:clrMapOvr>
+    <a:masterClrMapping/>
+  </p:clrMapOvr>
+  <p:timing>
+    <p:tnLst>
+      <p:par>
+        <p:cTn id="1" dur="indefinite" restart="never" nodeType="tmRoot"/>
+      </p:par>
+    </p:tnLst>
+  </p:timing>
+</p:sld>
+</file>
+
+<file path=ppt/slides/slide8.xml><?xml version="1.0" encoding="utf-8"?>
+<p:sld xmlns:a="http://schemas.openxmlformats.org/drawingml/2006/main" xmlns:r="http://schemas.openxmlformats.org/officeDocument/2006/relationships" xmlns:p="http://schemas.openxmlformats.org/presentationml/2006/main">
+  <p:cSld>
+    <p:spTree>
+      <p:nvGrpSpPr>
+        <p:cNvPr id="1" name=""/>
+        <p:cNvGrpSpPr/>
+        <p:nvPr/>
+      </p:nvGrpSpPr>
+      <p:grpSpPr>
+        <a:xfrm>
+          <a:off x="0" y="0"/>
+          <a:ext cx="0" cy="0"/>
+          <a:chOff x="0" y="0"/>
+          <a:chExt cx="0" cy="0"/>
+        </a:xfrm>
+      </p:grpSpPr>
+      <p:sp>
+        <p:nvSpPr>
+          <p:cNvPr id="6" name="TextBox 5"/>
+          <p:cNvSpPr txBox="1"/>
+          <p:nvPr/>
+        </p:nvSpPr>
+        <p:spPr>
+          <a:xfrm>
             <a:off x="317362" y="402567"/>
             <a:ext cx="10608906" cy="1200329"/>
           </a:xfrm>
@@ -4011,7 +5448,6 @@
               <a:rPr lang="en-US" dirty="0" smtClean="0"/>
               <a:t>Ideas</a:t>
             </a:r>
-            <a:endParaRPr lang="en-US" dirty="0" smtClean="0"/>
           </a:p>
           <a:p>
             <a:pPr marL="285750" indent="-285750">
@@ -4054,7 +5490,6 @@
               <a:rPr lang="en-US" dirty="0" smtClean="0"/>
               <a:t>)</a:t>
             </a:r>
-            <a:endParaRPr lang="en-US" dirty="0" smtClean="0"/>
           </a:p>
         </p:txBody>
       </p:sp>

</xml_diff>

<commit_message>
update reactjs version, add thread pool design notes
</commit_message>
<xml_diff>
--- a/docs/design.pptx
+++ b/docs/design.pptx
@@ -7,12 +7,13 @@
   <p:sldIdLst>
     <p:sldId id="256" r:id="rId2"/>
     <p:sldId id="259" r:id="rId3"/>
-    <p:sldId id="261" r:id="rId4"/>
-    <p:sldId id="260" r:id="rId5"/>
-    <p:sldId id="263" r:id="rId6"/>
-    <p:sldId id="257" r:id="rId7"/>
-    <p:sldId id="258" r:id="rId8"/>
-    <p:sldId id="262" r:id="rId9"/>
+    <p:sldId id="264" r:id="rId4"/>
+    <p:sldId id="261" r:id="rId5"/>
+    <p:sldId id="260" r:id="rId6"/>
+    <p:sldId id="263" r:id="rId7"/>
+    <p:sldId id="257" r:id="rId8"/>
+    <p:sldId id="258" r:id="rId9"/>
+    <p:sldId id="262" r:id="rId10"/>
   </p:sldIdLst>
   <p:sldSz cx="12192000" cy="6858000"/>
   <p:notesSz cx="6858000" cy="9144000"/>
@@ -3112,13 +3113,8 @@
             </a:r>
             <a:r>
               <a:rPr lang="en-US" dirty="0" smtClean="0"/>
-              <a:t> </a:t>
-            </a:r>
-            <a:r>
-              <a:rPr lang="en-US" dirty="0" err="1" smtClean="0"/>
-              <a:t>URLQueue</a:t>
-            </a:r>
-            <a:endParaRPr lang="en-US" dirty="0" smtClean="0"/>
+              <a:t> URLQueue</a:t>
+            </a:r>
           </a:p>
           <a:p>
             <a:pPr marL="285750" indent="-285750">
@@ -3153,10 +3149,9 @@
               <a:buChar char="•"/>
             </a:pPr>
             <a:r>
-              <a:rPr lang="en-US" dirty="0" err="1" smtClean="0"/>
+              <a:rPr lang="en-US" dirty="0" smtClean="0"/>
               <a:t>URLThreadPool</a:t>
             </a:r>
-            <a:endParaRPr lang="en-US" dirty="0" smtClean="0"/>
           </a:p>
           <a:p>
             <a:pPr marL="285750" indent="-285750">
@@ -3193,18 +3188,9 @@
               <a:buChar char="•"/>
             </a:pPr>
             <a:r>
-              <a:rPr lang="en-US" dirty="0" err="1" smtClean="0"/>
-              <a:t>URLThreadPool</a:t>
-            </a:r>
-            <a:r>
               <a:rPr lang="en-US" dirty="0" smtClean="0"/>
-              <a:t> reads new entries from </a:t>
-            </a:r>
-            <a:r>
-              <a:rPr lang="en-US" dirty="0" err="1" smtClean="0"/>
-              <a:t>URLQueue</a:t>
-            </a:r>
-            <a:endParaRPr lang="en-US" dirty="0" smtClean="0"/>
+              <a:t>URLThreadPool reads new entries from URLQueue</a:t>
+            </a:r>
           </a:p>
           <a:p>
             <a:pPr marL="285750" indent="-285750">
@@ -3213,13 +3199,8 @@
             </a:pPr>
             <a:r>
               <a:rPr lang="en-US" dirty="0" smtClean="0"/>
-              <a:t>For each thread in </a:t>
-            </a:r>
-            <a:r>
-              <a:rPr lang="en-US" dirty="0" err="1" smtClean="0"/>
-              <a:t>URLThreadPool</a:t>
-            </a:r>
-            <a:endParaRPr lang="en-US" dirty="0" smtClean="0"/>
+              <a:t>For each thread in URLThreadPool</a:t>
+            </a:r>
           </a:p>
           <a:p>
             <a:pPr marL="742950" lvl="1" indent="-285750">
@@ -3228,13 +3209,8 @@
             </a:pPr>
             <a:r>
               <a:rPr lang="en-US" dirty="0" smtClean="0"/>
-              <a:t>Read URL from </a:t>
-            </a:r>
-            <a:r>
-              <a:rPr lang="en-US" dirty="0" err="1" smtClean="0"/>
-              <a:t>URLQueue</a:t>
-            </a:r>
-            <a:endParaRPr lang="en-US" dirty="0" smtClean="0"/>
+              <a:t>Read URL from URLQueue</a:t>
+            </a:r>
           </a:p>
           <a:p>
             <a:pPr marL="742950" lvl="1" indent="-285750">
@@ -3281,21 +3257,8 @@
             </a:pPr>
             <a:r>
               <a:rPr lang="en-US" dirty="0" smtClean="0"/>
-              <a:t>Insert </a:t>
-            </a:r>
-            <a:r>
-              <a:rPr lang="en-US" dirty="0" err="1" smtClean="0"/>
-              <a:t>url</a:t>
-            </a:r>
-            <a:r>
-              <a:rPr lang="en-US" dirty="0" smtClean="0"/>
-              <a:t> into </a:t>
-            </a:r>
-            <a:r>
-              <a:rPr lang="en-US" dirty="0" err="1" smtClean="0"/>
-              <a:t>URLQueue</a:t>
-            </a:r>
-            <a:endParaRPr lang="en-US" dirty="0" smtClean="0"/>
+              <a:t>Insert url into URLQueue</a:t>
+            </a:r>
           </a:p>
           <a:p>
             <a:pPr marL="742950" lvl="1" indent="-285750">
@@ -3381,14 +3344,404 @@
       </p:grpSpPr>
       <p:sp>
         <p:nvSpPr>
-          <p:cNvPr id="6" name="TextBox 5"/>
+          <p:cNvPr id="2" name="Oval 1"/>
+          <p:cNvSpPr/>
+          <p:nvPr/>
+        </p:nvSpPr>
+        <p:spPr>
+          <a:xfrm>
+            <a:off x="4870580" y="1082352"/>
+            <a:ext cx="1222310" cy="1222310"/>
+          </a:xfrm>
+          <a:prstGeom prst="ellipse">
+            <a:avLst/>
+          </a:prstGeom>
+        </p:spPr>
+        <p:style>
+          <a:lnRef idx="1">
+            <a:schemeClr val="accent1"/>
+          </a:lnRef>
+          <a:fillRef idx="2">
+            <a:schemeClr val="accent1"/>
+          </a:fillRef>
+          <a:effectRef idx="1">
+            <a:schemeClr val="accent1"/>
+          </a:effectRef>
+          <a:fontRef idx="minor">
+            <a:schemeClr val="dk1"/>
+          </a:fontRef>
+        </p:style>
+        <p:txBody>
+          <a:bodyPr rtlCol="0" anchor="ctr"/>
+          <a:lstStyle/>
+          <a:p>
+            <a:pPr algn="ctr"/>
+            <a:endParaRPr lang="en-US"/>
+          </a:p>
+        </p:txBody>
+      </p:sp>
+      <p:sp>
+        <p:nvSpPr>
+          <p:cNvPr id="4" name="Oval 3"/>
+          <p:cNvSpPr/>
+          <p:nvPr/>
+        </p:nvSpPr>
+        <p:spPr>
+          <a:xfrm>
+            <a:off x="5310673" y="1522445"/>
+            <a:ext cx="342123" cy="342123"/>
+          </a:xfrm>
+          <a:prstGeom prst="ellipse">
+            <a:avLst/>
+          </a:prstGeom>
+        </p:spPr>
+        <p:style>
+          <a:lnRef idx="2">
+            <a:schemeClr val="accent1"/>
+          </a:lnRef>
+          <a:fillRef idx="1">
+            <a:schemeClr val="lt1"/>
+          </a:fillRef>
+          <a:effectRef idx="0">
+            <a:schemeClr val="accent1"/>
+          </a:effectRef>
+          <a:fontRef idx="minor">
+            <a:schemeClr val="dk1"/>
+          </a:fontRef>
+        </p:style>
+        <p:txBody>
+          <a:bodyPr rtlCol="0" anchor="ctr"/>
+          <a:lstStyle/>
+          <a:p>
+            <a:pPr algn="ctr"/>
+            <a:endParaRPr lang="en-US"/>
+          </a:p>
+        </p:txBody>
+      </p:sp>
+      <p:cxnSp>
+        <p:nvCxnSpPr>
+          <p:cNvPr id="5" name="Straight Arrow Connector 4"/>
+          <p:cNvCxnSpPr/>
+          <p:nvPr/>
+        </p:nvCxnSpPr>
+        <p:spPr>
+          <a:xfrm>
+            <a:off x="5481734" y="589385"/>
+            <a:ext cx="9334" cy="492967"/>
+          </a:xfrm>
+          <a:prstGeom prst="straightConnector1">
+            <a:avLst/>
+          </a:prstGeom>
+          <a:ln>
+            <a:tailEnd type="triangle"/>
+          </a:ln>
+        </p:spPr>
+        <p:style>
+          <a:lnRef idx="1">
+            <a:schemeClr val="dk1"/>
+          </a:lnRef>
+          <a:fillRef idx="0">
+            <a:schemeClr val="dk1"/>
+          </a:fillRef>
+          <a:effectRef idx="0">
+            <a:schemeClr val="dk1"/>
+          </a:effectRef>
+          <a:fontRef idx="minor">
+            <a:schemeClr val="tx1"/>
+          </a:fontRef>
+        </p:style>
+      </p:cxnSp>
+      <p:cxnSp>
+        <p:nvCxnSpPr>
+          <p:cNvPr id="12" name="Straight Arrow Connector 11"/>
+          <p:cNvCxnSpPr>
+            <a:stCxn id="2" idx="4"/>
+          </p:cNvCxnSpPr>
+          <p:nvPr/>
+        </p:nvCxnSpPr>
+        <p:spPr>
+          <a:xfrm flipH="1">
+            <a:off x="5481734" y="2304662"/>
+            <a:ext cx="1" cy="898848"/>
+          </a:xfrm>
+          <a:prstGeom prst="straightConnector1">
+            <a:avLst/>
+          </a:prstGeom>
+          <a:ln>
+            <a:tailEnd type="triangle"/>
+          </a:ln>
+        </p:spPr>
+        <p:style>
+          <a:lnRef idx="1">
+            <a:schemeClr val="dk1"/>
+          </a:lnRef>
+          <a:fillRef idx="0">
+            <a:schemeClr val="dk1"/>
+          </a:fillRef>
+          <a:effectRef idx="0">
+            <a:schemeClr val="dk1"/>
+          </a:effectRef>
+          <a:fontRef idx="minor">
+            <a:schemeClr val="tx1"/>
+          </a:fontRef>
+        </p:style>
+      </p:cxnSp>
+      <p:sp>
+        <p:nvSpPr>
+          <p:cNvPr id="13" name="Oval 12"/>
+          <p:cNvSpPr/>
+          <p:nvPr/>
+        </p:nvSpPr>
+        <p:spPr>
+          <a:xfrm>
+            <a:off x="4693301" y="3237722"/>
+            <a:ext cx="522514" cy="522514"/>
+          </a:xfrm>
+          <a:prstGeom prst="ellipse">
+            <a:avLst/>
+          </a:prstGeom>
+        </p:spPr>
+        <p:style>
+          <a:lnRef idx="1">
+            <a:schemeClr val="accent2"/>
+          </a:lnRef>
+          <a:fillRef idx="2">
+            <a:schemeClr val="accent2"/>
+          </a:fillRef>
+          <a:effectRef idx="1">
+            <a:schemeClr val="accent2"/>
+          </a:effectRef>
+          <a:fontRef idx="minor">
+            <a:schemeClr val="dk1"/>
+          </a:fontRef>
+        </p:style>
+        <p:txBody>
+          <a:bodyPr rtlCol="0" anchor="ctr"/>
+          <a:lstStyle/>
+          <a:p>
+            <a:pPr algn="ctr"/>
+            <a:endParaRPr lang="en-US"/>
+          </a:p>
+        </p:txBody>
+      </p:sp>
+      <p:sp>
+        <p:nvSpPr>
+          <p:cNvPr id="14" name="Oval 13"/>
+          <p:cNvSpPr/>
+          <p:nvPr/>
+        </p:nvSpPr>
+        <p:spPr>
+          <a:xfrm>
+            <a:off x="4977884" y="3237722"/>
+            <a:ext cx="522514" cy="522514"/>
+          </a:xfrm>
+          <a:prstGeom prst="ellipse">
+            <a:avLst/>
+          </a:prstGeom>
+        </p:spPr>
+        <p:style>
+          <a:lnRef idx="1">
+            <a:schemeClr val="accent2"/>
+          </a:lnRef>
+          <a:fillRef idx="2">
+            <a:schemeClr val="accent2"/>
+          </a:fillRef>
+          <a:effectRef idx="1">
+            <a:schemeClr val="accent2"/>
+          </a:effectRef>
+          <a:fontRef idx="minor">
+            <a:schemeClr val="dk1"/>
+          </a:fontRef>
+        </p:style>
+        <p:txBody>
+          <a:bodyPr rtlCol="0" anchor="ctr"/>
+          <a:lstStyle/>
+          <a:p>
+            <a:pPr algn="ctr"/>
+            <a:endParaRPr lang="en-US"/>
+          </a:p>
+        </p:txBody>
+      </p:sp>
+      <p:sp>
+        <p:nvSpPr>
+          <p:cNvPr id="15" name="Oval 14"/>
+          <p:cNvSpPr/>
+          <p:nvPr/>
+        </p:nvSpPr>
+        <p:spPr>
+          <a:xfrm>
+            <a:off x="5262467" y="3237722"/>
+            <a:ext cx="522514" cy="522514"/>
+          </a:xfrm>
+          <a:prstGeom prst="ellipse">
+            <a:avLst/>
+          </a:prstGeom>
+        </p:spPr>
+        <p:style>
+          <a:lnRef idx="1">
+            <a:schemeClr val="accent2"/>
+          </a:lnRef>
+          <a:fillRef idx="2">
+            <a:schemeClr val="accent2"/>
+          </a:fillRef>
+          <a:effectRef idx="1">
+            <a:schemeClr val="accent2"/>
+          </a:effectRef>
+          <a:fontRef idx="minor">
+            <a:schemeClr val="dk1"/>
+          </a:fontRef>
+        </p:style>
+        <p:txBody>
+          <a:bodyPr rtlCol="0" anchor="ctr"/>
+          <a:lstStyle/>
+          <a:p>
+            <a:pPr algn="ctr"/>
+            <a:endParaRPr lang="en-US"/>
+          </a:p>
+        </p:txBody>
+      </p:sp>
+      <p:sp>
+        <p:nvSpPr>
+          <p:cNvPr id="16" name="Oval 15"/>
+          <p:cNvSpPr/>
+          <p:nvPr/>
+        </p:nvSpPr>
+        <p:spPr>
+          <a:xfrm>
+            <a:off x="5547050" y="3237722"/>
+            <a:ext cx="522514" cy="522514"/>
+          </a:xfrm>
+          <a:prstGeom prst="ellipse">
+            <a:avLst/>
+          </a:prstGeom>
+        </p:spPr>
+        <p:style>
+          <a:lnRef idx="1">
+            <a:schemeClr val="accent2"/>
+          </a:lnRef>
+          <a:fillRef idx="2">
+            <a:schemeClr val="accent2"/>
+          </a:fillRef>
+          <a:effectRef idx="1">
+            <a:schemeClr val="accent2"/>
+          </a:effectRef>
+          <a:fontRef idx="minor">
+            <a:schemeClr val="dk1"/>
+          </a:fontRef>
+        </p:style>
+        <p:txBody>
+          <a:bodyPr rtlCol="0" anchor="ctr"/>
+          <a:lstStyle/>
+          <a:p>
+            <a:pPr algn="ctr"/>
+            <a:endParaRPr lang="en-US"/>
+          </a:p>
+        </p:txBody>
+      </p:sp>
+      <p:sp>
+        <p:nvSpPr>
+          <p:cNvPr id="17" name="Oval 16"/>
+          <p:cNvSpPr/>
+          <p:nvPr/>
+        </p:nvSpPr>
+        <p:spPr>
+          <a:xfrm>
+            <a:off x="5831633" y="3237722"/>
+            <a:ext cx="522514" cy="522514"/>
+          </a:xfrm>
+          <a:prstGeom prst="ellipse">
+            <a:avLst/>
+          </a:prstGeom>
+        </p:spPr>
+        <p:style>
+          <a:lnRef idx="1">
+            <a:schemeClr val="accent2"/>
+          </a:lnRef>
+          <a:fillRef idx="2">
+            <a:schemeClr val="accent2"/>
+          </a:fillRef>
+          <a:effectRef idx="1">
+            <a:schemeClr val="accent2"/>
+          </a:effectRef>
+          <a:fontRef idx="minor">
+            <a:schemeClr val="dk1"/>
+          </a:fontRef>
+        </p:style>
+        <p:txBody>
+          <a:bodyPr rtlCol="0" anchor="ctr"/>
+          <a:lstStyle/>
+          <a:p>
+            <a:pPr algn="ctr"/>
+            <a:endParaRPr lang="en-US"/>
+          </a:p>
+        </p:txBody>
+      </p:sp>
+      <p:sp>
+        <p:nvSpPr>
+          <p:cNvPr id="19" name="Rectangle 18"/>
+          <p:cNvSpPr/>
+          <p:nvPr/>
+        </p:nvSpPr>
+        <p:spPr>
+          <a:xfrm>
+            <a:off x="6092889" y="1522445"/>
+            <a:ext cx="1179875" cy="369332"/>
+          </a:xfrm>
+          <a:prstGeom prst="rect">
+            <a:avLst/>
+          </a:prstGeom>
+        </p:spPr>
+        <p:txBody>
+          <a:bodyPr wrap="none">
+            <a:spAutoFit/>
+          </a:bodyPr>
+          <a:lstStyle/>
+          <a:p>
+            <a:r>
+              <a:rPr lang="en-US" dirty="0"/>
+              <a:t>URLQueue</a:t>
+            </a:r>
+          </a:p>
+        </p:txBody>
+      </p:sp>
+      <p:sp>
+        <p:nvSpPr>
+          <p:cNvPr id="20" name="Rectangle 19"/>
+          <p:cNvSpPr/>
+          <p:nvPr/>
+        </p:nvSpPr>
+        <p:spPr>
+          <a:xfrm>
+            <a:off x="6031665" y="2834178"/>
+            <a:ext cx="1607620" cy="369332"/>
+          </a:xfrm>
+          <a:prstGeom prst="rect">
+            <a:avLst/>
+          </a:prstGeom>
+        </p:spPr>
+        <p:txBody>
+          <a:bodyPr wrap="none">
+            <a:spAutoFit/>
+          </a:bodyPr>
+          <a:lstStyle/>
+          <a:p>
+            <a:r>
+              <a:rPr lang="en-US" dirty="0"/>
+              <a:t>URLThreadPool</a:t>
+            </a:r>
+          </a:p>
+        </p:txBody>
+      </p:sp>
+      <p:sp>
+        <p:nvSpPr>
+          <p:cNvPr id="21" name="TextBox 20"/>
           <p:cNvSpPr txBox="1"/>
           <p:nvPr/>
         </p:nvSpPr>
         <p:spPr>
           <a:xfrm>
-            <a:off x="951722" y="1045029"/>
-            <a:ext cx="10608906" cy="1354217"/>
+            <a:off x="2614262" y="2313219"/>
+            <a:ext cx="1124475" cy="369332"/>
           </a:xfrm>
           <a:prstGeom prst="rect">
             <a:avLst/>
@@ -3396,54 +3749,650 @@
           <a:noFill/>
         </p:spPr>
         <p:txBody>
-          <a:bodyPr wrap="square" rtlCol="0">
+          <a:bodyPr wrap="none" rtlCol="0">
             <a:spAutoFit/>
           </a:bodyPr>
           <a:lstStyle/>
           <a:p>
             <a:r>
-              <a:rPr lang="en-US" sz="2800" dirty="0" smtClean="0"/>
-              <a:t>Parse IMG Logic</a:t>
-            </a:r>
-          </a:p>
-          <a:p>
-            <a:endParaRPr lang="en-US" dirty="0" smtClean="0"/>
-          </a:p>
-          <a:p>
-            <a:pPr marL="285750" indent="-285750">
-              <a:buFont typeface="Arial" panose="020B0604020202020204" pitchFamily="34" charset="0"/>
-              <a:buChar char="•"/>
-            </a:pPr>
+              <a:rPr lang="en-US" dirty="0" smtClean="0"/>
+              <a:t>[new </a:t>
+            </a:r>
             <a:r>
               <a:rPr lang="en-US" dirty="0" err="1" smtClean="0"/>
-              <a:t>ImgURLSaveThread</a:t>
+              <a:t>urls</a:t>
             </a:r>
             <a:r>
               <a:rPr lang="en-US" dirty="0" smtClean="0"/>
-              <a:t> reads all available images from </a:t>
-            </a:r>
+              <a:t>]</a:t>
+            </a:r>
+            <a:endParaRPr lang="en-US" dirty="0"/>
+          </a:p>
+        </p:txBody>
+      </p:sp>
+      <p:sp>
+        <p:nvSpPr>
+          <p:cNvPr id="22" name="Flowchart: Magnetic Disk 21"/>
+          <p:cNvSpPr/>
+          <p:nvPr/>
+        </p:nvSpPr>
+        <p:spPr>
+          <a:xfrm>
+            <a:off x="9680938" y="5153608"/>
+            <a:ext cx="1940767" cy="1510004"/>
+          </a:xfrm>
+          <a:prstGeom prst="flowChartMagneticDisk">
+            <a:avLst/>
+          </a:prstGeom>
+        </p:spPr>
+        <p:style>
+          <a:lnRef idx="1">
+            <a:schemeClr val="accent6"/>
+          </a:lnRef>
+          <a:fillRef idx="2">
+            <a:schemeClr val="accent6"/>
+          </a:fillRef>
+          <a:effectRef idx="1">
+            <a:schemeClr val="accent6"/>
+          </a:effectRef>
+          <a:fontRef idx="minor">
+            <a:schemeClr val="dk1"/>
+          </a:fontRef>
+        </p:style>
+        <p:txBody>
+          <a:bodyPr rtlCol="0" anchor="ctr"/>
+          <a:lstStyle/>
+          <a:p>
+            <a:pPr algn="ctr"/>
+            <a:r>
+              <a:rPr lang="en-US" dirty="0" smtClean="0"/>
+              <a:t>IMG Table</a:t>
+            </a:r>
+            <a:endParaRPr lang="en-US" dirty="0"/>
+          </a:p>
+        </p:txBody>
+      </p:sp>
+      <p:sp>
+        <p:nvSpPr>
+          <p:cNvPr id="24" name="Rectangle 23"/>
+          <p:cNvSpPr/>
+          <p:nvPr/>
+        </p:nvSpPr>
+        <p:spPr>
+          <a:xfrm>
+            <a:off x="9811566" y="2407298"/>
+            <a:ext cx="1679510" cy="1408923"/>
+          </a:xfrm>
+          <a:prstGeom prst="rect">
+            <a:avLst/>
+          </a:prstGeom>
+        </p:spPr>
+        <p:style>
+          <a:lnRef idx="1">
+            <a:schemeClr val="accent3"/>
+          </a:lnRef>
+          <a:fillRef idx="2">
+            <a:schemeClr val="accent3"/>
+          </a:fillRef>
+          <a:effectRef idx="1">
+            <a:schemeClr val="accent3"/>
+          </a:effectRef>
+          <a:fontRef idx="minor">
+            <a:schemeClr val="dk1"/>
+          </a:fontRef>
+        </p:style>
+        <p:txBody>
+          <a:bodyPr rtlCol="0" anchor="ctr"/>
+          <a:lstStyle/>
+          <a:p>
+            <a:pPr algn="ctr"/>
+            <a:r>
+              <a:rPr lang="en-US" dirty="0" smtClean="0"/>
+              <a:t>Visited URL SET</a:t>
+            </a:r>
+            <a:endParaRPr lang="en-US" dirty="0"/>
+          </a:p>
+        </p:txBody>
+      </p:sp>
+      <p:cxnSp>
+        <p:nvCxnSpPr>
+          <p:cNvPr id="31" name="Elbow Connector 30"/>
+          <p:cNvCxnSpPr>
+            <a:stCxn id="13" idx="2"/>
+            <a:endCxn id="2" idx="2"/>
+          </p:cNvCxnSpPr>
+          <p:nvPr/>
+        </p:nvCxnSpPr>
+        <p:spPr>
+          <a:xfrm rot="10800000" flipH="1">
+            <a:off x="4693300" y="1693507"/>
+            <a:ext cx="177279" cy="1805472"/>
+          </a:xfrm>
+          <a:prstGeom prst="bentConnector3">
+            <a:avLst>
+              <a:gd name="adj1" fmla="val -502638"/>
+            </a:avLst>
+          </a:prstGeom>
+          <a:ln>
+            <a:tailEnd type="triangle"/>
+          </a:ln>
+        </p:spPr>
+        <p:style>
+          <a:lnRef idx="1">
+            <a:schemeClr val="dk1"/>
+          </a:lnRef>
+          <a:fillRef idx="0">
+            <a:schemeClr val="dk1"/>
+          </a:fillRef>
+          <a:effectRef idx="0">
+            <a:schemeClr val="dk1"/>
+          </a:effectRef>
+          <a:fontRef idx="minor">
+            <a:schemeClr val="tx1"/>
+          </a:fontRef>
+        </p:style>
+      </p:cxnSp>
+      <p:sp>
+        <p:nvSpPr>
+          <p:cNvPr id="36" name="TextBox 35"/>
+          <p:cNvSpPr txBox="1"/>
+          <p:nvPr/>
+        </p:nvSpPr>
+        <p:spPr>
+          <a:xfrm>
+            <a:off x="4969130" y="196340"/>
+            <a:ext cx="1062535" cy="369332"/>
+          </a:xfrm>
+          <a:prstGeom prst="rect">
+            <a:avLst/>
+          </a:prstGeom>
+          <a:noFill/>
+        </p:spPr>
+        <p:txBody>
+          <a:bodyPr wrap="none" rtlCol="0">
+            <a:spAutoFit/>
+          </a:bodyPr>
+          <a:lstStyle/>
+          <a:p>
+            <a:r>
+              <a:rPr lang="en-US" dirty="0" smtClean="0"/>
+              <a:t>[start url]</a:t>
+            </a:r>
+            <a:endParaRPr lang="en-US" dirty="0"/>
+          </a:p>
+        </p:txBody>
+      </p:sp>
+      <p:sp>
+        <p:nvSpPr>
+          <p:cNvPr id="40" name="Oval 39"/>
+          <p:cNvSpPr/>
+          <p:nvPr/>
+        </p:nvSpPr>
+        <p:spPr>
+          <a:xfrm>
+            <a:off x="4912569" y="4449147"/>
+            <a:ext cx="1222310" cy="1222310"/>
+          </a:xfrm>
+          <a:prstGeom prst="ellipse">
+            <a:avLst/>
+          </a:prstGeom>
+        </p:spPr>
+        <p:style>
+          <a:lnRef idx="1">
+            <a:schemeClr val="accent1"/>
+          </a:lnRef>
+          <a:fillRef idx="2">
+            <a:schemeClr val="accent1"/>
+          </a:fillRef>
+          <a:effectRef idx="1">
+            <a:schemeClr val="accent1"/>
+          </a:effectRef>
+          <a:fontRef idx="minor">
+            <a:schemeClr val="dk1"/>
+          </a:fontRef>
+        </p:style>
+        <p:txBody>
+          <a:bodyPr rtlCol="0" anchor="ctr"/>
+          <a:lstStyle/>
+          <a:p>
+            <a:pPr algn="ctr"/>
+            <a:endParaRPr lang="en-US"/>
+          </a:p>
+        </p:txBody>
+      </p:sp>
+      <p:sp>
+        <p:nvSpPr>
+          <p:cNvPr id="41" name="Oval 40"/>
+          <p:cNvSpPr/>
+          <p:nvPr/>
+        </p:nvSpPr>
+        <p:spPr>
+          <a:xfrm>
+            <a:off x="5375988" y="4889240"/>
+            <a:ext cx="342123" cy="342123"/>
+          </a:xfrm>
+          <a:prstGeom prst="ellipse">
+            <a:avLst/>
+          </a:prstGeom>
+        </p:spPr>
+        <p:style>
+          <a:lnRef idx="2">
+            <a:schemeClr val="accent1"/>
+          </a:lnRef>
+          <a:fillRef idx="1">
+            <a:schemeClr val="lt1"/>
+          </a:fillRef>
+          <a:effectRef idx="0">
+            <a:schemeClr val="accent1"/>
+          </a:effectRef>
+          <a:fontRef idx="minor">
+            <a:schemeClr val="dk1"/>
+          </a:fontRef>
+        </p:style>
+        <p:txBody>
+          <a:bodyPr rtlCol="0" anchor="ctr"/>
+          <a:lstStyle/>
+          <a:p>
+            <a:pPr algn="ctr"/>
+            <a:endParaRPr lang="en-US"/>
+          </a:p>
+        </p:txBody>
+      </p:sp>
+      <p:cxnSp>
+        <p:nvCxnSpPr>
+          <p:cNvPr id="46" name="Straight Arrow Connector 45"/>
+          <p:cNvCxnSpPr>
+            <a:stCxn id="15" idx="4"/>
+            <a:endCxn id="40" idx="0"/>
+          </p:cNvCxnSpPr>
+          <p:nvPr/>
+        </p:nvCxnSpPr>
+        <p:spPr>
+          <a:xfrm>
+            <a:off x="5523724" y="3760236"/>
+            <a:ext cx="0" cy="688911"/>
+          </a:xfrm>
+          <a:prstGeom prst="straightConnector1">
+            <a:avLst/>
+          </a:prstGeom>
+          <a:ln>
+            <a:tailEnd type="triangle"/>
+          </a:ln>
+        </p:spPr>
+        <p:style>
+          <a:lnRef idx="1">
+            <a:schemeClr val="dk1"/>
+          </a:lnRef>
+          <a:fillRef idx="0">
+            <a:schemeClr val="dk1"/>
+          </a:fillRef>
+          <a:effectRef idx="0">
+            <a:schemeClr val="dk1"/>
+          </a:effectRef>
+          <a:fontRef idx="minor">
+            <a:schemeClr val="tx1"/>
+          </a:fontRef>
+        </p:style>
+      </p:cxnSp>
+      <p:sp>
+        <p:nvSpPr>
+          <p:cNvPr id="47" name="Rectangle 46"/>
+          <p:cNvSpPr/>
+          <p:nvPr/>
+        </p:nvSpPr>
+        <p:spPr>
+          <a:xfrm>
+            <a:off x="6245537" y="4784276"/>
+            <a:ext cx="1215397" cy="369332"/>
+          </a:xfrm>
+          <a:prstGeom prst="rect">
+            <a:avLst/>
+          </a:prstGeom>
+        </p:spPr>
+        <p:txBody>
+          <a:bodyPr wrap="none">
+            <a:spAutoFit/>
+          </a:bodyPr>
+          <a:lstStyle/>
+          <a:p>
+            <a:r>
+              <a:rPr lang="en-US" dirty="0" smtClean="0"/>
+              <a:t>IMGQueue</a:t>
+            </a:r>
+            <a:endParaRPr lang="en-US" dirty="0"/>
+          </a:p>
+        </p:txBody>
+      </p:sp>
+      <p:sp>
+        <p:nvSpPr>
+          <p:cNvPr id="51" name="Oval 50"/>
+          <p:cNvSpPr/>
+          <p:nvPr/>
+        </p:nvSpPr>
+        <p:spPr>
+          <a:xfrm>
+            <a:off x="4758616" y="6099111"/>
+            <a:ext cx="522514" cy="522514"/>
+          </a:xfrm>
+          <a:prstGeom prst="ellipse">
+            <a:avLst/>
+          </a:prstGeom>
+        </p:spPr>
+        <p:style>
+          <a:lnRef idx="1">
+            <a:schemeClr val="accent2"/>
+          </a:lnRef>
+          <a:fillRef idx="2">
+            <a:schemeClr val="accent2"/>
+          </a:fillRef>
+          <a:effectRef idx="1">
+            <a:schemeClr val="accent2"/>
+          </a:effectRef>
+          <a:fontRef idx="minor">
+            <a:schemeClr val="dk1"/>
+          </a:fontRef>
+        </p:style>
+        <p:txBody>
+          <a:bodyPr rtlCol="0" anchor="ctr"/>
+          <a:lstStyle/>
+          <a:p>
+            <a:pPr algn="ctr"/>
+            <a:endParaRPr lang="en-US"/>
+          </a:p>
+        </p:txBody>
+      </p:sp>
+      <p:sp>
+        <p:nvSpPr>
+          <p:cNvPr id="52" name="Oval 51"/>
+          <p:cNvSpPr/>
+          <p:nvPr/>
+        </p:nvSpPr>
+        <p:spPr>
+          <a:xfrm>
+            <a:off x="5043199" y="6099111"/>
+            <a:ext cx="522514" cy="522514"/>
+          </a:xfrm>
+          <a:prstGeom prst="ellipse">
+            <a:avLst/>
+          </a:prstGeom>
+        </p:spPr>
+        <p:style>
+          <a:lnRef idx="1">
+            <a:schemeClr val="accent2"/>
+          </a:lnRef>
+          <a:fillRef idx="2">
+            <a:schemeClr val="accent2"/>
+          </a:fillRef>
+          <a:effectRef idx="1">
+            <a:schemeClr val="accent2"/>
+          </a:effectRef>
+          <a:fontRef idx="minor">
+            <a:schemeClr val="dk1"/>
+          </a:fontRef>
+        </p:style>
+        <p:txBody>
+          <a:bodyPr rtlCol="0" anchor="ctr"/>
+          <a:lstStyle/>
+          <a:p>
+            <a:pPr algn="ctr"/>
+            <a:endParaRPr lang="en-US"/>
+          </a:p>
+        </p:txBody>
+      </p:sp>
+      <p:sp>
+        <p:nvSpPr>
+          <p:cNvPr id="53" name="Oval 52"/>
+          <p:cNvSpPr/>
+          <p:nvPr/>
+        </p:nvSpPr>
+        <p:spPr>
+          <a:xfrm>
+            <a:off x="5327782" y="6099111"/>
+            <a:ext cx="522514" cy="522514"/>
+          </a:xfrm>
+          <a:prstGeom prst="ellipse">
+            <a:avLst/>
+          </a:prstGeom>
+        </p:spPr>
+        <p:style>
+          <a:lnRef idx="1">
+            <a:schemeClr val="accent2"/>
+          </a:lnRef>
+          <a:fillRef idx="2">
+            <a:schemeClr val="accent2"/>
+          </a:fillRef>
+          <a:effectRef idx="1">
+            <a:schemeClr val="accent2"/>
+          </a:effectRef>
+          <a:fontRef idx="minor">
+            <a:schemeClr val="dk1"/>
+          </a:fontRef>
+        </p:style>
+        <p:txBody>
+          <a:bodyPr rtlCol="0" anchor="ctr"/>
+          <a:lstStyle/>
+          <a:p>
+            <a:pPr algn="ctr"/>
+            <a:endParaRPr lang="en-US"/>
+          </a:p>
+        </p:txBody>
+      </p:sp>
+      <p:sp>
+        <p:nvSpPr>
+          <p:cNvPr id="54" name="Oval 53"/>
+          <p:cNvSpPr/>
+          <p:nvPr/>
+        </p:nvSpPr>
+        <p:spPr>
+          <a:xfrm>
+            <a:off x="5612365" y="6099111"/>
+            <a:ext cx="522514" cy="522514"/>
+          </a:xfrm>
+          <a:prstGeom prst="ellipse">
+            <a:avLst/>
+          </a:prstGeom>
+        </p:spPr>
+        <p:style>
+          <a:lnRef idx="1">
+            <a:schemeClr val="accent2"/>
+          </a:lnRef>
+          <a:fillRef idx="2">
+            <a:schemeClr val="accent2"/>
+          </a:fillRef>
+          <a:effectRef idx="1">
+            <a:schemeClr val="accent2"/>
+          </a:effectRef>
+          <a:fontRef idx="minor">
+            <a:schemeClr val="dk1"/>
+          </a:fontRef>
+        </p:style>
+        <p:txBody>
+          <a:bodyPr rtlCol="0" anchor="ctr"/>
+          <a:lstStyle/>
+          <a:p>
+            <a:pPr algn="ctr"/>
+            <a:endParaRPr lang="en-US"/>
+          </a:p>
+        </p:txBody>
+      </p:sp>
+      <p:sp>
+        <p:nvSpPr>
+          <p:cNvPr id="55" name="Oval 54"/>
+          <p:cNvSpPr/>
+          <p:nvPr/>
+        </p:nvSpPr>
+        <p:spPr>
+          <a:xfrm>
+            <a:off x="5896948" y="6099111"/>
+            <a:ext cx="522514" cy="522514"/>
+          </a:xfrm>
+          <a:prstGeom prst="ellipse">
+            <a:avLst/>
+          </a:prstGeom>
+        </p:spPr>
+        <p:style>
+          <a:lnRef idx="1">
+            <a:schemeClr val="accent2"/>
+          </a:lnRef>
+          <a:fillRef idx="2">
+            <a:schemeClr val="accent2"/>
+          </a:fillRef>
+          <a:effectRef idx="1">
+            <a:schemeClr val="accent2"/>
+          </a:effectRef>
+          <a:fontRef idx="minor">
+            <a:schemeClr val="dk1"/>
+          </a:fontRef>
+        </p:style>
+        <p:txBody>
+          <a:bodyPr rtlCol="0" anchor="ctr"/>
+          <a:lstStyle/>
+          <a:p>
+            <a:pPr algn="ctr"/>
+            <a:endParaRPr lang="en-US"/>
+          </a:p>
+        </p:txBody>
+      </p:sp>
+      <p:cxnSp>
+        <p:nvCxnSpPr>
+          <p:cNvPr id="57" name="Straight Arrow Connector 56"/>
+          <p:cNvCxnSpPr>
+            <a:stCxn id="40" idx="4"/>
+          </p:cNvCxnSpPr>
+          <p:nvPr/>
+        </p:nvCxnSpPr>
+        <p:spPr>
+          <a:xfrm>
+            <a:off x="5523724" y="5671457"/>
+            <a:ext cx="0" cy="464977"/>
+          </a:xfrm>
+          <a:prstGeom prst="straightConnector1">
+            <a:avLst/>
+          </a:prstGeom>
+          <a:ln>
+            <a:tailEnd type="triangle"/>
+          </a:ln>
+        </p:spPr>
+        <p:style>
+          <a:lnRef idx="1">
+            <a:schemeClr val="dk1"/>
+          </a:lnRef>
+          <a:fillRef idx="0">
+            <a:schemeClr val="dk1"/>
+          </a:fillRef>
+          <a:effectRef idx="0">
+            <a:schemeClr val="dk1"/>
+          </a:effectRef>
+          <a:fontRef idx="minor">
+            <a:schemeClr val="tx1"/>
+          </a:fontRef>
+        </p:style>
+      </p:cxnSp>
+      <p:cxnSp>
+        <p:nvCxnSpPr>
+          <p:cNvPr id="64" name="Elbow Connector 63"/>
+          <p:cNvCxnSpPr>
+            <a:stCxn id="55" idx="6"/>
+            <a:endCxn id="22" idx="2"/>
+          </p:cNvCxnSpPr>
+          <p:nvPr/>
+        </p:nvCxnSpPr>
+        <p:spPr>
+          <a:xfrm flipV="1">
+            <a:off x="6419462" y="5908610"/>
+            <a:ext cx="3261476" cy="451758"/>
+          </a:xfrm>
+          <a:prstGeom prst="bentConnector3">
+            <a:avLst/>
+          </a:prstGeom>
+          <a:ln>
+            <a:tailEnd type="triangle"/>
+          </a:ln>
+        </p:spPr>
+        <p:style>
+          <a:lnRef idx="1">
+            <a:schemeClr val="dk1"/>
+          </a:lnRef>
+          <a:fillRef idx="0">
+            <a:schemeClr val="dk1"/>
+          </a:fillRef>
+          <a:effectRef idx="0">
+            <a:schemeClr val="dk1"/>
+          </a:effectRef>
+          <a:fontRef idx="minor">
+            <a:schemeClr val="tx1"/>
+          </a:fontRef>
+        </p:style>
+      </p:cxnSp>
+      <p:cxnSp>
+        <p:nvCxnSpPr>
+          <p:cNvPr id="66" name="Elbow Connector 65"/>
+          <p:cNvCxnSpPr>
+            <a:stCxn id="17" idx="6"/>
+            <a:endCxn id="24" idx="1"/>
+          </p:cNvCxnSpPr>
+          <p:nvPr/>
+        </p:nvCxnSpPr>
+        <p:spPr>
+          <a:xfrm flipV="1">
+            <a:off x="6354147" y="3111760"/>
+            <a:ext cx="3457419" cy="387219"/>
+          </a:xfrm>
+          <a:prstGeom prst="bentConnector3">
+            <a:avLst/>
+          </a:prstGeom>
+          <a:ln>
+            <a:tailEnd type="triangle"/>
+          </a:ln>
+        </p:spPr>
+        <p:style>
+          <a:lnRef idx="1">
+            <a:schemeClr val="dk1"/>
+          </a:lnRef>
+          <a:fillRef idx="0">
+            <a:schemeClr val="dk1"/>
+          </a:fillRef>
+          <a:effectRef idx="0">
+            <a:schemeClr val="dk1"/>
+          </a:effectRef>
+          <a:fontRef idx="minor">
+            <a:schemeClr val="tx1"/>
+          </a:fontRef>
+        </p:style>
+      </p:cxnSp>
+      <p:sp>
+        <p:nvSpPr>
+          <p:cNvPr id="68" name="Rectangle 67"/>
+          <p:cNvSpPr/>
+          <p:nvPr/>
+        </p:nvSpPr>
+        <p:spPr>
+          <a:xfrm>
+            <a:off x="6159506" y="5719279"/>
+            <a:ext cx="1653851" cy="369332"/>
+          </a:xfrm>
+          <a:prstGeom prst="rect">
+            <a:avLst/>
+          </a:prstGeom>
+        </p:spPr>
+        <p:txBody>
+          <a:bodyPr wrap="none">
+            <a:spAutoFit/>
+          </a:bodyPr>
+          <a:lstStyle/>
+          <a:p>
             <a:r>
               <a:rPr lang="en-US" dirty="0" err="1" smtClean="0"/>
-              <a:t>ImgQueue</a:t>
-            </a:r>
-            <a:endParaRPr lang="en-US" dirty="0" smtClean="0"/>
-          </a:p>
-          <a:p>
-            <a:pPr marL="742950" lvl="1" indent="-285750">
-              <a:buFont typeface="Arial" panose="020B0604020202020204" pitchFamily="34" charset="0"/>
-              <a:buChar char="•"/>
-            </a:pPr>
-            <a:r>
-              <a:rPr lang="en-US" dirty="0" smtClean="0"/>
-              <a:t>Bulk Insert into database Image Table</a:t>
-            </a:r>
+              <a:t>IMGThreadPool</a:t>
+            </a:r>
+            <a:endParaRPr lang="en-US" dirty="0"/>
           </a:p>
         </p:txBody>
       </p:sp>
     </p:spTree>
     <p:extLst>
       <p:ext uri="{BB962C8B-B14F-4D97-AF65-F5344CB8AC3E}">
-        <p14:creationId xmlns:p14="http://schemas.microsoft.com/office/powerpoint/2010/main" val="1855793974"/>
+        <p14:creationId xmlns:p14="http://schemas.microsoft.com/office/powerpoint/2010/main" val="620945417"/>
       </p:ext>
     </p:extLst>
   </p:cSld>
@@ -3485,6 +4434,104 @@
         </p:nvSpPr>
         <p:spPr>
           <a:xfrm>
+            <a:off x="951722" y="1045029"/>
+            <a:ext cx="10608906" cy="1354217"/>
+          </a:xfrm>
+          <a:prstGeom prst="rect">
+            <a:avLst/>
+          </a:prstGeom>
+          <a:noFill/>
+        </p:spPr>
+        <p:txBody>
+          <a:bodyPr wrap="square" rtlCol="0">
+            <a:spAutoFit/>
+          </a:bodyPr>
+          <a:lstStyle/>
+          <a:p>
+            <a:r>
+              <a:rPr lang="en-US" sz="2800" dirty="0" smtClean="0"/>
+              <a:t>Parse IMG Logic</a:t>
+            </a:r>
+          </a:p>
+          <a:p>
+            <a:endParaRPr lang="en-US" dirty="0" smtClean="0"/>
+          </a:p>
+          <a:p>
+            <a:pPr marL="285750" indent="-285750">
+              <a:buFont typeface="Arial" panose="020B0604020202020204" pitchFamily="34" charset="0"/>
+              <a:buChar char="•"/>
+            </a:pPr>
+            <a:r>
+              <a:rPr lang="en-US" dirty="0" err="1" smtClean="0"/>
+              <a:t>ImgURLSaveThread</a:t>
+            </a:r>
+            <a:r>
+              <a:rPr lang="en-US" dirty="0" smtClean="0"/>
+              <a:t> reads all available images from </a:t>
+            </a:r>
+            <a:r>
+              <a:rPr lang="en-US" dirty="0" err="1" smtClean="0"/>
+              <a:t>ImgQueue</a:t>
+            </a:r>
+            <a:endParaRPr lang="en-US" dirty="0" smtClean="0"/>
+          </a:p>
+          <a:p>
+            <a:pPr marL="742950" lvl="1" indent="-285750">
+              <a:buFont typeface="Arial" panose="020B0604020202020204" pitchFamily="34" charset="0"/>
+              <a:buChar char="•"/>
+            </a:pPr>
+            <a:r>
+              <a:rPr lang="en-US" dirty="0" smtClean="0"/>
+              <a:t>Bulk Insert into database Image Table</a:t>
+            </a:r>
+          </a:p>
+        </p:txBody>
+      </p:sp>
+    </p:spTree>
+    <p:extLst>
+      <p:ext uri="{BB962C8B-B14F-4D97-AF65-F5344CB8AC3E}">
+        <p14:creationId xmlns:p14="http://schemas.microsoft.com/office/powerpoint/2010/main" val="1855793974"/>
+      </p:ext>
+    </p:extLst>
+  </p:cSld>
+  <p:clrMapOvr>
+    <a:masterClrMapping/>
+  </p:clrMapOvr>
+  <p:timing>
+    <p:tnLst>
+      <p:par>
+        <p:cTn id="1" dur="indefinite" restart="never" nodeType="tmRoot"/>
+      </p:par>
+    </p:tnLst>
+  </p:timing>
+</p:sld>
+</file>
+
+<file path=ppt/slides/slide5.xml><?xml version="1.0" encoding="utf-8"?>
+<p:sld xmlns:a="http://schemas.openxmlformats.org/drawingml/2006/main" xmlns:r="http://schemas.openxmlformats.org/officeDocument/2006/relationships" xmlns:p="http://schemas.openxmlformats.org/presentationml/2006/main">
+  <p:cSld>
+    <p:spTree>
+      <p:nvGrpSpPr>
+        <p:cNvPr id="1" name=""/>
+        <p:cNvGrpSpPr/>
+        <p:nvPr/>
+      </p:nvGrpSpPr>
+      <p:grpSpPr>
+        <a:xfrm>
+          <a:off x="0" y="0"/>
+          <a:ext cx="0" cy="0"/>
+          <a:chOff x="0" y="0"/>
+          <a:chExt cx="0" cy="0"/>
+        </a:xfrm>
+      </p:grpSpPr>
+      <p:sp>
+        <p:nvSpPr>
+          <p:cNvPr id="6" name="TextBox 5"/>
+          <p:cNvSpPr txBox="1"/>
+          <p:nvPr/>
+        </p:nvSpPr>
+        <p:spPr>
+          <a:xfrm>
             <a:off x="535474" y="192372"/>
             <a:ext cx="10608906" cy="2339102"/>
           </a:xfrm>
@@ -3898,11 +4945,7 @@
                     <a:p>
                       <a:r>
                         <a:rPr lang="en-US" sz="1000" dirty="0" smtClean="0"/>
-                        <a:t>VARCHAR </a:t>
-                      </a:r>
-                      <a:r>
-                        <a:rPr lang="en-US" sz="1000" dirty="0" smtClean="0"/>
-                        <a:t>2045</a:t>
+                        <a:t>VARCHAR 2045</a:t>
                       </a:r>
                       <a:endParaRPr lang="en-US" sz="1000" dirty="0"/>
                     </a:p>
@@ -3972,11 +5015,7 @@
                     <a:p>
                       <a:r>
                         <a:rPr lang="en-US" sz="1000" dirty="0" smtClean="0"/>
-                        <a:t>VARCHAR </a:t>
-                      </a:r>
-                      <a:r>
-                        <a:rPr lang="en-US" sz="1000" dirty="0" smtClean="0"/>
-                        <a:t>2045</a:t>
+                        <a:t>VARCHAR 2045</a:t>
                       </a:r>
                       <a:endParaRPr lang="en-US" sz="1000" dirty="0"/>
                     </a:p>
@@ -4482,11 +5521,7 @@
                     <a:p>
                       <a:r>
                         <a:rPr lang="en-US" sz="1000" dirty="0" smtClean="0"/>
-                        <a:t>VARCHAR </a:t>
-                      </a:r>
-                      <a:r>
-                        <a:rPr lang="en-US" sz="1000" dirty="0" smtClean="0"/>
-                        <a:t>255</a:t>
+                        <a:t>VARCHAR 255</a:t>
                       </a:r>
                       <a:endParaRPr lang="en-US" sz="1000" dirty="0"/>
                     </a:p>
@@ -4517,11 +5552,7 @@
                       </a:pPr>
                       <a:r>
                         <a:rPr lang="en-US" sz="1000" dirty="0" smtClean="0"/>
-                        <a:t>Unique, </a:t>
-                      </a:r>
-                      <a:r>
-                        <a:rPr lang="en-US" sz="1000" dirty="0" smtClean="0"/>
-                        <a:t>Not null</a:t>
+                        <a:t>Unique, Not null</a:t>
                       </a:r>
                     </a:p>
                   </a:txBody>
@@ -4564,11 +5595,7 @@
                     <a:p>
                       <a:r>
                         <a:rPr lang="en-US" sz="1000" dirty="0" smtClean="0"/>
-                        <a:t>VARCHAR </a:t>
-                      </a:r>
-                      <a:r>
-                        <a:rPr lang="en-US" sz="1000" dirty="0" smtClean="0"/>
-                        <a:t>255</a:t>
+                        <a:t>VARCHAR 255</a:t>
                       </a:r>
                       <a:endParaRPr lang="en-US" sz="1000" dirty="0"/>
                     </a:p>
@@ -4724,427 +5751,6 @@
     <p:extLst>
       <p:ext uri="{BB962C8B-B14F-4D97-AF65-F5344CB8AC3E}">
         <p14:creationId xmlns:p14="http://schemas.microsoft.com/office/powerpoint/2010/main" val="3636907444"/>
-      </p:ext>
-    </p:extLst>
-  </p:cSld>
-  <p:clrMapOvr>
-    <a:masterClrMapping/>
-  </p:clrMapOvr>
-  <p:timing>
-    <p:tnLst>
-      <p:par>
-        <p:cTn id="1" dur="indefinite" restart="never" nodeType="tmRoot"/>
-      </p:par>
-    </p:tnLst>
-  </p:timing>
-</p:sld>
-</file>
-
-<file path=ppt/slides/slide5.xml><?xml version="1.0" encoding="utf-8"?>
-<p:sld xmlns:a="http://schemas.openxmlformats.org/drawingml/2006/main" xmlns:r="http://schemas.openxmlformats.org/officeDocument/2006/relationships" xmlns:p="http://schemas.openxmlformats.org/presentationml/2006/main">
-  <p:cSld>
-    <p:spTree>
-      <p:nvGrpSpPr>
-        <p:cNvPr id="1" name=""/>
-        <p:cNvGrpSpPr/>
-        <p:nvPr/>
-      </p:nvGrpSpPr>
-      <p:grpSpPr>
-        <a:xfrm>
-          <a:off x="0" y="0"/>
-          <a:ext cx="0" cy="0"/>
-          <a:chOff x="0" y="0"/>
-          <a:chExt cx="0" cy="0"/>
-        </a:xfrm>
-      </p:grpSpPr>
-      <p:sp>
-        <p:nvSpPr>
-          <p:cNvPr id="6" name="TextBox 5"/>
-          <p:cNvSpPr txBox="1"/>
-          <p:nvPr/>
-        </p:nvSpPr>
-        <p:spPr>
-          <a:xfrm>
-            <a:off x="535474" y="192372"/>
-            <a:ext cx="10608906" cy="2339102"/>
-          </a:xfrm>
-          <a:prstGeom prst="rect">
-            <a:avLst/>
-          </a:prstGeom>
-          <a:noFill/>
-        </p:spPr>
-        <p:txBody>
-          <a:bodyPr wrap="square" rtlCol="0">
-            <a:spAutoFit/>
-          </a:bodyPr>
-          <a:lstStyle/>
-          <a:p>
-            <a:r>
-              <a:rPr lang="en-US" sz="2800" dirty="0" smtClean="0"/>
-              <a:t>Database Tables</a:t>
-            </a:r>
-          </a:p>
-          <a:p>
-            <a:r>
-              <a:rPr lang="en-US" dirty="0" smtClean="0"/>
-              <a:t>USER_METADATA</a:t>
-            </a:r>
-            <a:endParaRPr lang="en-US" dirty="0"/>
-          </a:p>
-          <a:p>
-            <a:endParaRPr lang="en-US" sz="2800" dirty="0" smtClean="0"/>
-          </a:p>
-          <a:p>
-            <a:endParaRPr lang="en-US" dirty="0"/>
-          </a:p>
-          <a:p>
-            <a:endParaRPr lang="en-US" dirty="0" smtClean="0"/>
-          </a:p>
-          <a:p>
-            <a:endParaRPr lang="en-US" dirty="0"/>
-          </a:p>
-          <a:p>
-            <a:endParaRPr lang="en-US" dirty="0" smtClean="0"/>
-          </a:p>
-        </p:txBody>
-      </p:sp>
-      <p:graphicFrame>
-        <p:nvGraphicFramePr>
-          <p:cNvPr id="2" name="Table 1"/>
-          <p:cNvGraphicFramePr>
-            <a:graphicFrameLocks noGrp="1"/>
-          </p:cNvGraphicFramePr>
-          <p:nvPr>
-            <p:extLst>
-              <p:ext uri="{D42A27DB-BD31-4B8C-83A1-F6EECF244321}">
-                <p14:modId xmlns:p14="http://schemas.microsoft.com/office/powerpoint/2010/main" val="686058918"/>
-              </p:ext>
-            </p:extLst>
-          </p:nvPr>
-        </p:nvGraphicFramePr>
-        <p:xfrm>
-          <a:off x="1409957" y="1109650"/>
-          <a:ext cx="6586376" cy="1464585"/>
-        </p:xfrm>
-        <a:graphic>
-          <a:graphicData uri="http://schemas.openxmlformats.org/drawingml/2006/table">
-            <a:tbl>
-              <a:tblPr firstRow="1" bandRow="1">
-                <a:tableStyleId>{5C22544A-7EE6-4342-B048-85BDC9FD1C3A}</a:tableStyleId>
-              </a:tblPr>
-              <a:tblGrid>
-                <a:gridCol w="1651425"/>
-                <a:gridCol w="1641763"/>
-                <a:gridCol w="1646594"/>
-                <a:gridCol w="1646594"/>
-              </a:tblGrid>
-              <a:tr h="0">
-                <a:tc>
-                  <a:txBody>
-                    <a:bodyPr/>
-                    <a:lstStyle/>
-                    <a:p>
-                      <a:r>
-                        <a:rPr lang="en-US" sz="1000" dirty="0" smtClean="0"/>
-                        <a:t>Name</a:t>
-                      </a:r>
-                      <a:endParaRPr lang="en-US" sz="1000" dirty="0"/>
-                    </a:p>
-                  </a:txBody>
-                  <a:tcPr/>
-                </a:tc>
-                <a:tc>
-                  <a:txBody>
-                    <a:bodyPr/>
-                    <a:lstStyle/>
-                    <a:p>
-                      <a:r>
-                        <a:rPr lang="en-US" sz="1000" dirty="0" smtClean="0"/>
-                        <a:t>Type</a:t>
-                      </a:r>
-                      <a:endParaRPr lang="en-US" sz="1000" dirty="0"/>
-                    </a:p>
-                  </a:txBody>
-                  <a:tcPr/>
-                </a:tc>
-                <a:tc>
-                  <a:txBody>
-                    <a:bodyPr/>
-                    <a:lstStyle/>
-                    <a:p>
-                      <a:r>
-                        <a:rPr lang="en-US" sz="1000" dirty="0" smtClean="0"/>
-                        <a:t>Constraint</a:t>
-                      </a:r>
-                      <a:endParaRPr lang="en-US" sz="1000" dirty="0"/>
-                    </a:p>
-                  </a:txBody>
-                  <a:tcPr/>
-                </a:tc>
-                <a:tc>
-                  <a:txBody>
-                    <a:bodyPr/>
-                    <a:lstStyle/>
-                    <a:p>
-                      <a:r>
-                        <a:rPr lang="en-US" sz="1000" dirty="0" smtClean="0"/>
-                        <a:t>Description</a:t>
-                      </a:r>
-                      <a:endParaRPr lang="en-US" sz="1000" dirty="0"/>
-                    </a:p>
-                  </a:txBody>
-                  <a:tcPr/>
-                </a:tc>
-              </a:tr>
-              <a:tr h="274835">
-                <a:tc>
-                  <a:txBody>
-                    <a:bodyPr/>
-                    <a:lstStyle/>
-                    <a:p>
-                      <a:r>
-                        <a:rPr lang="en-US" sz="1000" dirty="0" smtClean="0"/>
-                        <a:t>id</a:t>
-                      </a:r>
-                      <a:endParaRPr lang="en-US" sz="1000" dirty="0"/>
-                    </a:p>
-                  </a:txBody>
-                  <a:tcPr/>
-                </a:tc>
-                <a:tc>
-                  <a:txBody>
-                    <a:bodyPr/>
-                    <a:lstStyle/>
-                    <a:p>
-                      <a:r>
-                        <a:rPr lang="en-US" sz="1000" dirty="0" smtClean="0"/>
-                        <a:t>INT</a:t>
-                      </a:r>
-                      <a:endParaRPr lang="en-US" sz="1000" dirty="0"/>
-                    </a:p>
-                  </a:txBody>
-                  <a:tcPr/>
-                </a:tc>
-                <a:tc>
-                  <a:txBody>
-                    <a:bodyPr/>
-                    <a:lstStyle/>
-                    <a:p>
-                      <a:r>
-                        <a:rPr lang="en-US" sz="1000" dirty="0" smtClean="0"/>
-                        <a:t>Primary Key, auto increment</a:t>
-                      </a:r>
-                      <a:endParaRPr lang="en-US" sz="1000" dirty="0"/>
-                    </a:p>
-                  </a:txBody>
-                  <a:tcPr/>
-                </a:tc>
-                <a:tc>
-                  <a:txBody>
-                    <a:bodyPr/>
-                    <a:lstStyle/>
-                    <a:p>
-                      <a:r>
-                        <a:rPr lang="en-US" sz="1000" dirty="0" smtClean="0"/>
-                        <a:t>ID</a:t>
-                      </a:r>
-                      <a:endParaRPr lang="en-US" sz="1000" dirty="0"/>
-                    </a:p>
-                  </a:txBody>
-                  <a:tcPr/>
-                </a:tc>
-              </a:tr>
-              <a:tr h="274835">
-                <a:tc>
-                  <a:txBody>
-                    <a:bodyPr/>
-                    <a:lstStyle/>
-                    <a:p>
-                      <a:r>
-                        <a:rPr lang="en-US" sz="1000" dirty="0" err="1" smtClean="0"/>
-                        <a:t>max_urls</a:t>
-                      </a:r>
-                      <a:endParaRPr lang="en-US" sz="1000" dirty="0"/>
-                    </a:p>
-                  </a:txBody>
-                  <a:tcPr/>
-                </a:tc>
-                <a:tc>
-                  <a:txBody>
-                    <a:bodyPr/>
-                    <a:lstStyle/>
-                    <a:p>
-                      <a:r>
-                        <a:rPr lang="en-US" sz="1000" dirty="0" smtClean="0"/>
-                        <a:t>INT</a:t>
-                      </a:r>
-                      <a:endParaRPr lang="en-US" sz="1000" dirty="0"/>
-                    </a:p>
-                  </a:txBody>
-                  <a:tcPr/>
-                </a:tc>
-                <a:tc>
-                  <a:txBody>
-                    <a:bodyPr/>
-                    <a:lstStyle/>
-                    <a:p>
-                      <a:endParaRPr lang="en-US" sz="1000" dirty="0"/>
-                    </a:p>
-                  </a:txBody>
-                  <a:tcPr/>
-                </a:tc>
-                <a:tc>
-                  <a:txBody>
-                    <a:bodyPr/>
-                    <a:lstStyle/>
-                    <a:p>
-                      <a:r>
-                        <a:rPr lang="en-US" sz="1000" dirty="0" smtClean="0"/>
-                        <a:t>Max URLS to search</a:t>
-                      </a:r>
-                      <a:endParaRPr lang="en-US" sz="1000" dirty="0"/>
-                    </a:p>
-                  </a:txBody>
-                  <a:tcPr/>
-                </a:tc>
-              </a:tr>
-              <a:tr h="274835">
-                <a:tc>
-                  <a:txBody>
-                    <a:bodyPr/>
-                    <a:lstStyle/>
-                    <a:p>
-                      <a:r>
-                        <a:rPr lang="en-US" sz="1000" dirty="0" err="1" smtClean="0"/>
-                        <a:t>max_imgs</a:t>
-                      </a:r>
-                      <a:endParaRPr lang="en-US" sz="1000" dirty="0"/>
-                    </a:p>
-                  </a:txBody>
-                  <a:tcPr/>
-                </a:tc>
-                <a:tc>
-                  <a:txBody>
-                    <a:bodyPr/>
-                    <a:lstStyle/>
-                    <a:p>
-                      <a:r>
-                        <a:rPr lang="en-US" sz="1000" dirty="0" smtClean="0"/>
-                        <a:t>INT</a:t>
-                      </a:r>
-                      <a:endParaRPr lang="en-US" sz="1000" dirty="0"/>
-                    </a:p>
-                  </a:txBody>
-                  <a:tcPr/>
-                </a:tc>
-                <a:tc>
-                  <a:txBody>
-                    <a:bodyPr/>
-                    <a:lstStyle/>
-                    <a:p>
-                      <a:endParaRPr lang="en-US" sz="1000" dirty="0"/>
-                    </a:p>
-                  </a:txBody>
-                  <a:tcPr/>
-                </a:tc>
-                <a:tc>
-                  <a:txBody>
-                    <a:bodyPr/>
-                    <a:lstStyle/>
-                    <a:p>
-                      <a:r>
-                        <a:rPr lang="en-US" sz="1000" dirty="0" smtClean="0"/>
-                        <a:t>Maximum images to search</a:t>
-                      </a:r>
-                      <a:endParaRPr lang="en-US" sz="1000" dirty="0"/>
-                    </a:p>
-                  </a:txBody>
-                  <a:tcPr/>
-                </a:tc>
-              </a:tr>
-              <a:tr h="274835">
-                <a:tc>
-                  <a:txBody>
-                    <a:bodyPr/>
-                    <a:lstStyle/>
-                    <a:p>
-                      <a:r>
-                        <a:rPr lang="en-US" sz="1000" dirty="0" err="1" smtClean="0"/>
-                        <a:t>img_save_path</a:t>
-                      </a:r>
-                      <a:endParaRPr lang="en-US" sz="1000" dirty="0"/>
-                    </a:p>
-                  </a:txBody>
-                  <a:tcPr/>
-                </a:tc>
-                <a:tc>
-                  <a:txBody>
-                    <a:bodyPr/>
-                    <a:lstStyle/>
-                    <a:p>
-                      <a:r>
-                        <a:rPr lang="en-US" sz="1000" dirty="0" smtClean="0"/>
-                        <a:t>VARCHAR 255</a:t>
-                      </a:r>
-                      <a:endParaRPr lang="en-US" sz="1000" dirty="0"/>
-                    </a:p>
-                  </a:txBody>
-                  <a:tcPr/>
-                </a:tc>
-                <a:tc>
-                  <a:txBody>
-                    <a:bodyPr/>
-                    <a:lstStyle/>
-                    <a:p>
-                      <a:endParaRPr lang="en-US" sz="1000" dirty="0"/>
-                    </a:p>
-                  </a:txBody>
-                  <a:tcPr/>
-                </a:tc>
-                <a:tc>
-                  <a:txBody>
-                    <a:bodyPr/>
-                    <a:lstStyle/>
-                    <a:p>
-                      <a:pPr marL="0" marR="0" lvl="0" indent="0" algn="l" defTabSz="914400" rtl="0" eaLnBrk="1" fontAlgn="auto" latinLnBrk="0" hangingPunct="1">
-                        <a:lnSpc>
-                          <a:spcPct val="100000"/>
-                        </a:lnSpc>
-                        <a:spcBef>
-                          <a:spcPts val="0"/>
-                        </a:spcBef>
-                        <a:spcAft>
-                          <a:spcPts val="0"/>
-                        </a:spcAft>
-                        <a:buClrTx/>
-                        <a:buSzTx/>
-                        <a:buFontTx/>
-                        <a:buNone/>
-                        <a:tabLst/>
-                        <a:defRPr/>
-                      </a:pPr>
-                      <a:r>
-                        <a:rPr lang="en-US" sz="1000" dirty="0" smtClean="0"/>
-                        <a:t>Directory</a:t>
-                      </a:r>
-                      <a:r>
-                        <a:rPr lang="en-US" sz="1000" baseline="0" dirty="0" smtClean="0"/>
-                        <a:t> to save images</a:t>
-                      </a:r>
-                      <a:endParaRPr lang="en-US" sz="1000" dirty="0" smtClean="0"/>
-                    </a:p>
-                  </a:txBody>
-                  <a:tcPr/>
-                </a:tc>
-              </a:tr>
-            </a:tbl>
-          </a:graphicData>
-        </a:graphic>
-      </p:graphicFrame>
-    </p:spTree>
-    <p:extLst>
-      <p:ext uri="{BB962C8B-B14F-4D97-AF65-F5344CB8AC3E}">
-        <p14:creationId xmlns:p14="http://schemas.microsoft.com/office/powerpoint/2010/main" val="2980869019"/>
       </p:ext>
     </p:extLst>
   </p:cSld>
@@ -5186,8 +5792,8 @@
         </p:nvSpPr>
         <p:spPr>
           <a:xfrm>
-            <a:off x="951722" y="1045029"/>
-            <a:ext cx="10608906" cy="2462213"/>
+            <a:off x="535474" y="192372"/>
+            <a:ext cx="10608906" cy="2062103"/>
           </a:xfrm>
           <a:prstGeom prst="rect">
             <a:avLst/>
@@ -5202,53 +5808,916 @@
           <a:p>
             <a:r>
               <a:rPr lang="en-US" sz="2800" dirty="0" smtClean="0"/>
-              <a:t>Display</a:t>
-            </a:r>
+              <a:t>Database Tables</a:t>
+            </a:r>
+          </a:p>
+          <a:p>
+            <a:endParaRPr lang="en-US" sz="2800" dirty="0" smtClean="0"/>
+          </a:p>
+          <a:p>
+            <a:endParaRPr lang="en-US" dirty="0"/>
           </a:p>
           <a:p>
             <a:endParaRPr lang="en-US" dirty="0" smtClean="0"/>
           </a:p>
           <a:p>
-            <a:pPr marL="285750" indent="-285750">
-              <a:buFont typeface="Arial" panose="020B0604020202020204" pitchFamily="34" charset="0"/>
-              <a:buChar char="•"/>
-            </a:pPr>
+            <a:endParaRPr lang="en-US" dirty="0"/>
+          </a:p>
+          <a:p>
+            <a:endParaRPr lang="en-US" dirty="0" smtClean="0"/>
+          </a:p>
+        </p:txBody>
+      </p:sp>
+      <p:graphicFrame>
+        <p:nvGraphicFramePr>
+          <p:cNvPr id="2" name="Table 1"/>
+          <p:cNvGraphicFramePr>
+            <a:graphicFrameLocks noGrp="1"/>
+          </p:cNvGraphicFramePr>
+          <p:nvPr>
+            <p:extLst>
+              <p:ext uri="{D42A27DB-BD31-4B8C-83A1-F6EECF244321}">
+                <p14:modId xmlns:p14="http://schemas.microsoft.com/office/powerpoint/2010/main" val="2793174452"/>
+              </p:ext>
+            </p:extLst>
+          </p:nvPr>
+        </p:nvGraphicFramePr>
+        <p:xfrm>
+          <a:off x="2940178" y="789890"/>
+          <a:ext cx="6586376" cy="1464585"/>
+        </p:xfrm>
+        <a:graphic>
+          <a:graphicData uri="http://schemas.openxmlformats.org/drawingml/2006/table">
+            <a:tbl>
+              <a:tblPr firstRow="1" bandRow="1">
+                <a:tableStyleId>{5C22544A-7EE6-4342-B048-85BDC9FD1C3A}</a:tableStyleId>
+              </a:tblPr>
+              <a:tblGrid>
+                <a:gridCol w="1651425"/>
+                <a:gridCol w="1641763"/>
+                <a:gridCol w="1646594"/>
+                <a:gridCol w="1646594"/>
+              </a:tblGrid>
+              <a:tr h="0">
+                <a:tc>
+                  <a:txBody>
+                    <a:bodyPr/>
+                    <a:lstStyle/>
+                    <a:p>
+                      <a:r>
+                        <a:rPr lang="en-US" sz="1000" dirty="0" smtClean="0"/>
+                        <a:t>Name</a:t>
+                      </a:r>
+                      <a:endParaRPr lang="en-US" sz="1000" dirty="0"/>
+                    </a:p>
+                  </a:txBody>
+                  <a:tcPr/>
+                </a:tc>
+                <a:tc>
+                  <a:txBody>
+                    <a:bodyPr/>
+                    <a:lstStyle/>
+                    <a:p>
+                      <a:r>
+                        <a:rPr lang="en-US" sz="1000" dirty="0" smtClean="0"/>
+                        <a:t>Type</a:t>
+                      </a:r>
+                      <a:endParaRPr lang="en-US" sz="1000" dirty="0"/>
+                    </a:p>
+                  </a:txBody>
+                  <a:tcPr/>
+                </a:tc>
+                <a:tc>
+                  <a:txBody>
+                    <a:bodyPr/>
+                    <a:lstStyle/>
+                    <a:p>
+                      <a:r>
+                        <a:rPr lang="en-US" sz="1000" dirty="0" smtClean="0"/>
+                        <a:t>Constraint</a:t>
+                      </a:r>
+                      <a:endParaRPr lang="en-US" sz="1000" dirty="0"/>
+                    </a:p>
+                  </a:txBody>
+                  <a:tcPr/>
+                </a:tc>
+                <a:tc>
+                  <a:txBody>
+                    <a:bodyPr/>
+                    <a:lstStyle/>
+                    <a:p>
+                      <a:r>
+                        <a:rPr lang="en-US" sz="1000" dirty="0" smtClean="0"/>
+                        <a:t>Description</a:t>
+                      </a:r>
+                      <a:endParaRPr lang="en-US" sz="1000" dirty="0"/>
+                    </a:p>
+                  </a:txBody>
+                  <a:tcPr/>
+                </a:tc>
+              </a:tr>
+              <a:tr h="274835">
+                <a:tc>
+                  <a:txBody>
+                    <a:bodyPr/>
+                    <a:lstStyle/>
+                    <a:p>
+                      <a:r>
+                        <a:rPr lang="en-US" sz="1000" dirty="0" smtClean="0"/>
+                        <a:t>id</a:t>
+                      </a:r>
+                      <a:endParaRPr lang="en-US" sz="1000" dirty="0"/>
+                    </a:p>
+                  </a:txBody>
+                  <a:tcPr/>
+                </a:tc>
+                <a:tc>
+                  <a:txBody>
+                    <a:bodyPr/>
+                    <a:lstStyle/>
+                    <a:p>
+                      <a:r>
+                        <a:rPr lang="en-US" sz="1000" dirty="0" smtClean="0"/>
+                        <a:t>INT</a:t>
+                      </a:r>
+                      <a:endParaRPr lang="en-US" sz="1000" dirty="0"/>
+                    </a:p>
+                  </a:txBody>
+                  <a:tcPr/>
+                </a:tc>
+                <a:tc>
+                  <a:txBody>
+                    <a:bodyPr/>
+                    <a:lstStyle/>
+                    <a:p>
+                      <a:r>
+                        <a:rPr lang="en-US" sz="1000" dirty="0" smtClean="0"/>
+                        <a:t>Primary Key, auto increment</a:t>
+                      </a:r>
+                      <a:endParaRPr lang="en-US" sz="1000" dirty="0"/>
+                    </a:p>
+                  </a:txBody>
+                  <a:tcPr/>
+                </a:tc>
+                <a:tc>
+                  <a:txBody>
+                    <a:bodyPr/>
+                    <a:lstStyle/>
+                    <a:p>
+                      <a:r>
+                        <a:rPr lang="en-US" sz="1000" dirty="0" smtClean="0"/>
+                        <a:t>ID</a:t>
+                      </a:r>
+                      <a:endParaRPr lang="en-US" sz="1000" dirty="0"/>
+                    </a:p>
+                  </a:txBody>
+                  <a:tcPr/>
+                </a:tc>
+              </a:tr>
+              <a:tr h="274835">
+                <a:tc>
+                  <a:txBody>
+                    <a:bodyPr/>
+                    <a:lstStyle/>
+                    <a:p>
+                      <a:r>
+                        <a:rPr lang="en-US" sz="1000" dirty="0" err="1" smtClean="0"/>
+                        <a:t>max_urls</a:t>
+                      </a:r>
+                      <a:endParaRPr lang="en-US" sz="1000" dirty="0"/>
+                    </a:p>
+                  </a:txBody>
+                  <a:tcPr/>
+                </a:tc>
+                <a:tc>
+                  <a:txBody>
+                    <a:bodyPr/>
+                    <a:lstStyle/>
+                    <a:p>
+                      <a:r>
+                        <a:rPr lang="en-US" sz="1000" dirty="0" smtClean="0"/>
+                        <a:t>INT</a:t>
+                      </a:r>
+                      <a:endParaRPr lang="en-US" sz="1000" dirty="0"/>
+                    </a:p>
+                  </a:txBody>
+                  <a:tcPr/>
+                </a:tc>
+                <a:tc>
+                  <a:txBody>
+                    <a:bodyPr/>
+                    <a:lstStyle/>
+                    <a:p>
+                      <a:endParaRPr lang="en-US" sz="1000" dirty="0"/>
+                    </a:p>
+                  </a:txBody>
+                  <a:tcPr/>
+                </a:tc>
+                <a:tc>
+                  <a:txBody>
+                    <a:bodyPr/>
+                    <a:lstStyle/>
+                    <a:p>
+                      <a:r>
+                        <a:rPr lang="en-US" sz="1000" dirty="0" smtClean="0"/>
+                        <a:t>Max URLS to search</a:t>
+                      </a:r>
+                      <a:endParaRPr lang="en-US" sz="1000" dirty="0"/>
+                    </a:p>
+                  </a:txBody>
+                  <a:tcPr/>
+                </a:tc>
+              </a:tr>
+              <a:tr h="274835">
+                <a:tc>
+                  <a:txBody>
+                    <a:bodyPr/>
+                    <a:lstStyle/>
+                    <a:p>
+                      <a:r>
+                        <a:rPr lang="en-US" sz="1000" dirty="0" err="1" smtClean="0"/>
+                        <a:t>max_imgs</a:t>
+                      </a:r>
+                      <a:endParaRPr lang="en-US" sz="1000" dirty="0"/>
+                    </a:p>
+                  </a:txBody>
+                  <a:tcPr/>
+                </a:tc>
+                <a:tc>
+                  <a:txBody>
+                    <a:bodyPr/>
+                    <a:lstStyle/>
+                    <a:p>
+                      <a:r>
+                        <a:rPr lang="en-US" sz="1000" dirty="0" smtClean="0"/>
+                        <a:t>INT</a:t>
+                      </a:r>
+                      <a:endParaRPr lang="en-US" sz="1000" dirty="0"/>
+                    </a:p>
+                  </a:txBody>
+                  <a:tcPr/>
+                </a:tc>
+                <a:tc>
+                  <a:txBody>
+                    <a:bodyPr/>
+                    <a:lstStyle/>
+                    <a:p>
+                      <a:endParaRPr lang="en-US" sz="1000" dirty="0"/>
+                    </a:p>
+                  </a:txBody>
+                  <a:tcPr/>
+                </a:tc>
+                <a:tc>
+                  <a:txBody>
+                    <a:bodyPr/>
+                    <a:lstStyle/>
+                    <a:p>
+                      <a:r>
+                        <a:rPr lang="en-US" sz="1000" dirty="0" smtClean="0"/>
+                        <a:t>Maximum images to search</a:t>
+                      </a:r>
+                      <a:endParaRPr lang="en-US" sz="1000" dirty="0"/>
+                    </a:p>
+                  </a:txBody>
+                  <a:tcPr/>
+                </a:tc>
+              </a:tr>
+              <a:tr h="274835">
+                <a:tc>
+                  <a:txBody>
+                    <a:bodyPr/>
+                    <a:lstStyle/>
+                    <a:p>
+                      <a:r>
+                        <a:rPr lang="en-US" sz="1000" dirty="0" err="1" smtClean="0"/>
+                        <a:t>img_save_path</a:t>
+                      </a:r>
+                      <a:endParaRPr lang="en-US" sz="1000" dirty="0"/>
+                    </a:p>
+                  </a:txBody>
+                  <a:tcPr/>
+                </a:tc>
+                <a:tc>
+                  <a:txBody>
+                    <a:bodyPr/>
+                    <a:lstStyle/>
+                    <a:p>
+                      <a:r>
+                        <a:rPr lang="en-US" sz="1000" dirty="0" smtClean="0"/>
+                        <a:t>VARCHAR 255</a:t>
+                      </a:r>
+                      <a:endParaRPr lang="en-US" sz="1000" dirty="0"/>
+                    </a:p>
+                  </a:txBody>
+                  <a:tcPr/>
+                </a:tc>
+                <a:tc>
+                  <a:txBody>
+                    <a:bodyPr/>
+                    <a:lstStyle/>
+                    <a:p>
+                      <a:endParaRPr lang="en-US" sz="1000" dirty="0"/>
+                    </a:p>
+                  </a:txBody>
+                  <a:tcPr/>
+                </a:tc>
+                <a:tc>
+                  <a:txBody>
+                    <a:bodyPr/>
+                    <a:lstStyle/>
+                    <a:p>
+                      <a:pPr marL="0" marR="0" lvl="0" indent="0" algn="l" defTabSz="914400" rtl="0" eaLnBrk="1" fontAlgn="auto" latinLnBrk="0" hangingPunct="1">
+                        <a:lnSpc>
+                          <a:spcPct val="100000"/>
+                        </a:lnSpc>
+                        <a:spcBef>
+                          <a:spcPts val="0"/>
+                        </a:spcBef>
+                        <a:spcAft>
+                          <a:spcPts val="0"/>
+                        </a:spcAft>
+                        <a:buClrTx/>
+                        <a:buSzTx/>
+                        <a:buFontTx/>
+                        <a:buNone/>
+                        <a:tabLst/>
+                        <a:defRPr/>
+                      </a:pPr>
+                      <a:r>
+                        <a:rPr lang="en-US" sz="1000" dirty="0" smtClean="0"/>
+                        <a:t>Directory</a:t>
+                      </a:r>
+                      <a:r>
+                        <a:rPr lang="en-US" sz="1000" baseline="0" dirty="0" smtClean="0"/>
+                        <a:t> to save images</a:t>
+                      </a:r>
+                      <a:endParaRPr lang="en-US" sz="1000" dirty="0" smtClean="0"/>
+                    </a:p>
+                  </a:txBody>
+                  <a:tcPr/>
+                </a:tc>
+              </a:tr>
+            </a:tbl>
+          </a:graphicData>
+        </a:graphic>
+      </p:graphicFrame>
+      <p:graphicFrame>
+        <p:nvGraphicFramePr>
+          <p:cNvPr id="4" name="Table 3"/>
+          <p:cNvGraphicFramePr>
+            <a:graphicFrameLocks noGrp="1"/>
+          </p:cNvGraphicFramePr>
+          <p:nvPr>
+            <p:extLst>
+              <p:ext uri="{D42A27DB-BD31-4B8C-83A1-F6EECF244321}">
+                <p14:modId xmlns:p14="http://schemas.microsoft.com/office/powerpoint/2010/main" val="2461366424"/>
+              </p:ext>
+            </p:extLst>
+          </p:nvPr>
+        </p:nvGraphicFramePr>
+        <p:xfrm>
+          <a:off x="2940178" y="3072800"/>
+          <a:ext cx="6586376" cy="914915"/>
+        </p:xfrm>
+        <a:graphic>
+          <a:graphicData uri="http://schemas.openxmlformats.org/drawingml/2006/table">
+            <a:tbl>
+              <a:tblPr firstRow="1" bandRow="1">
+                <a:tableStyleId>{5C22544A-7EE6-4342-B048-85BDC9FD1C3A}</a:tableStyleId>
+              </a:tblPr>
+              <a:tblGrid>
+                <a:gridCol w="1651425"/>
+                <a:gridCol w="1641763"/>
+                <a:gridCol w="1646594"/>
+                <a:gridCol w="1646594"/>
+              </a:tblGrid>
+              <a:tr h="0">
+                <a:tc>
+                  <a:txBody>
+                    <a:bodyPr/>
+                    <a:lstStyle/>
+                    <a:p>
+                      <a:r>
+                        <a:rPr lang="en-US" sz="1000" dirty="0" smtClean="0"/>
+                        <a:t>Name</a:t>
+                      </a:r>
+                      <a:endParaRPr lang="en-US" sz="1000" dirty="0"/>
+                    </a:p>
+                  </a:txBody>
+                  <a:tcPr/>
+                </a:tc>
+                <a:tc>
+                  <a:txBody>
+                    <a:bodyPr/>
+                    <a:lstStyle/>
+                    <a:p>
+                      <a:r>
+                        <a:rPr lang="en-US" sz="1000" dirty="0" smtClean="0"/>
+                        <a:t>Type</a:t>
+                      </a:r>
+                      <a:endParaRPr lang="en-US" sz="1000" dirty="0"/>
+                    </a:p>
+                  </a:txBody>
+                  <a:tcPr/>
+                </a:tc>
+                <a:tc>
+                  <a:txBody>
+                    <a:bodyPr/>
+                    <a:lstStyle/>
+                    <a:p>
+                      <a:r>
+                        <a:rPr lang="en-US" sz="1000" dirty="0" smtClean="0"/>
+                        <a:t>Constraint</a:t>
+                      </a:r>
+                      <a:endParaRPr lang="en-US" sz="1000" dirty="0"/>
+                    </a:p>
+                  </a:txBody>
+                  <a:tcPr/>
+                </a:tc>
+                <a:tc>
+                  <a:txBody>
+                    <a:bodyPr/>
+                    <a:lstStyle/>
+                    <a:p>
+                      <a:r>
+                        <a:rPr lang="en-US" sz="1000" dirty="0" smtClean="0"/>
+                        <a:t>Description</a:t>
+                      </a:r>
+                      <a:endParaRPr lang="en-US" sz="1000" dirty="0"/>
+                    </a:p>
+                  </a:txBody>
+                  <a:tcPr/>
+                </a:tc>
+              </a:tr>
+              <a:tr h="274835">
+                <a:tc>
+                  <a:txBody>
+                    <a:bodyPr/>
+                    <a:lstStyle/>
+                    <a:p>
+                      <a:r>
+                        <a:rPr lang="en-US" sz="1000" dirty="0" smtClean="0"/>
+                        <a:t>id</a:t>
+                      </a:r>
+                      <a:endParaRPr lang="en-US" sz="1000" dirty="0"/>
+                    </a:p>
+                  </a:txBody>
+                  <a:tcPr/>
+                </a:tc>
+                <a:tc>
+                  <a:txBody>
+                    <a:bodyPr/>
+                    <a:lstStyle/>
+                    <a:p>
+                      <a:r>
+                        <a:rPr lang="en-US" sz="1000" dirty="0" smtClean="0"/>
+                        <a:t>INT</a:t>
+                      </a:r>
+                      <a:endParaRPr lang="en-US" sz="1000" dirty="0"/>
+                    </a:p>
+                  </a:txBody>
+                  <a:tcPr/>
+                </a:tc>
+                <a:tc>
+                  <a:txBody>
+                    <a:bodyPr/>
+                    <a:lstStyle/>
+                    <a:p>
+                      <a:r>
+                        <a:rPr lang="en-US" sz="1000" dirty="0" smtClean="0"/>
+                        <a:t>Primary Key, auto increment</a:t>
+                      </a:r>
+                      <a:endParaRPr lang="en-US" sz="1000" dirty="0"/>
+                    </a:p>
+                  </a:txBody>
+                  <a:tcPr/>
+                </a:tc>
+                <a:tc>
+                  <a:txBody>
+                    <a:bodyPr/>
+                    <a:lstStyle/>
+                    <a:p>
+                      <a:r>
+                        <a:rPr lang="en-US" sz="1000" dirty="0" smtClean="0"/>
+                        <a:t>TYPE</a:t>
+                      </a:r>
+                      <a:endParaRPr lang="en-US" sz="1000" dirty="0"/>
+                    </a:p>
+                  </a:txBody>
+                  <a:tcPr/>
+                </a:tc>
+              </a:tr>
+              <a:tr h="274835">
+                <a:tc>
+                  <a:txBody>
+                    <a:bodyPr/>
+                    <a:lstStyle/>
+                    <a:p>
+                      <a:r>
+                        <a:rPr lang="en-US" sz="1000" dirty="0" smtClean="0"/>
+                        <a:t>type</a:t>
+                      </a:r>
+                      <a:endParaRPr lang="en-US" sz="1000" dirty="0"/>
+                    </a:p>
+                  </a:txBody>
+                  <a:tcPr/>
+                </a:tc>
+                <a:tc>
+                  <a:txBody>
+                    <a:bodyPr/>
+                    <a:lstStyle/>
+                    <a:p>
+                      <a:r>
+                        <a:rPr lang="en-US" sz="1000" dirty="0" smtClean="0"/>
+                        <a:t>VARCHAR 255</a:t>
+                      </a:r>
+                      <a:endParaRPr lang="en-US" sz="1000" dirty="0"/>
+                    </a:p>
+                  </a:txBody>
+                  <a:tcPr/>
+                </a:tc>
+                <a:tc>
+                  <a:txBody>
+                    <a:bodyPr/>
+                    <a:lstStyle/>
+                    <a:p>
+                      <a:r>
+                        <a:rPr lang="en-US" sz="1000" dirty="0" smtClean="0"/>
+                        <a:t>Unique</a:t>
+                      </a:r>
+                      <a:endParaRPr lang="en-US" sz="1000" dirty="0"/>
+                    </a:p>
+                  </a:txBody>
+                  <a:tcPr/>
+                </a:tc>
+                <a:tc>
+                  <a:txBody>
+                    <a:bodyPr/>
+                    <a:lstStyle/>
+                    <a:p>
+                      <a:r>
+                        <a:rPr lang="en-US" sz="1000" dirty="0" smtClean="0"/>
+                        <a:t>Extension type</a:t>
+                      </a:r>
+                      <a:endParaRPr lang="en-US" sz="1000" dirty="0"/>
+                    </a:p>
+                  </a:txBody>
+                  <a:tcPr/>
+                </a:tc>
+              </a:tr>
+            </a:tbl>
+          </a:graphicData>
+        </a:graphic>
+      </p:graphicFrame>
+      <p:sp>
+        <p:nvSpPr>
+          <p:cNvPr id="3" name="Rectangle 2"/>
+          <p:cNvSpPr/>
+          <p:nvPr/>
+        </p:nvSpPr>
+        <p:spPr>
+          <a:xfrm>
+            <a:off x="687874" y="4689589"/>
+            <a:ext cx="881267" cy="369332"/>
+          </a:xfrm>
+          <a:prstGeom prst="rect">
+            <a:avLst/>
+          </a:prstGeom>
+        </p:spPr>
+        <p:txBody>
+          <a:bodyPr wrap="none">
+            <a:spAutoFit/>
+          </a:bodyPr>
+          <a:lstStyle/>
+          <a:p>
             <a:r>
               <a:rPr lang="en-US" dirty="0" smtClean="0"/>
-              <a:t>REST Call to read APIs from Image Table by timestamp</a:t>
-            </a:r>
-          </a:p>
-          <a:p>
-            <a:pPr marL="285750" indent="-285750">
-              <a:buFont typeface="Arial" panose="020B0604020202020204" pitchFamily="34" charset="0"/>
-              <a:buChar char="•"/>
-            </a:pPr>
+              <a:t>FILTERS</a:t>
+            </a:r>
+            <a:endParaRPr lang="en-US" dirty="0"/>
+          </a:p>
+        </p:txBody>
+      </p:sp>
+      <p:graphicFrame>
+        <p:nvGraphicFramePr>
+          <p:cNvPr id="7" name="Table 6"/>
+          <p:cNvGraphicFramePr>
+            <a:graphicFrameLocks noGrp="1"/>
+          </p:cNvGraphicFramePr>
+          <p:nvPr>
+            <p:extLst>
+              <p:ext uri="{D42A27DB-BD31-4B8C-83A1-F6EECF244321}">
+                <p14:modId xmlns:p14="http://schemas.microsoft.com/office/powerpoint/2010/main" val="442560548"/>
+              </p:ext>
+            </p:extLst>
+          </p:nvPr>
+        </p:nvGraphicFramePr>
+        <p:xfrm>
+          <a:off x="2940178" y="4689589"/>
+          <a:ext cx="6586376" cy="1311155"/>
+        </p:xfrm>
+        <a:graphic>
+          <a:graphicData uri="http://schemas.openxmlformats.org/drawingml/2006/table">
+            <a:tbl>
+              <a:tblPr firstRow="1" bandRow="1">
+                <a:tableStyleId>{5C22544A-7EE6-4342-B048-85BDC9FD1C3A}</a:tableStyleId>
+              </a:tblPr>
+              <a:tblGrid>
+                <a:gridCol w="1651425"/>
+                <a:gridCol w="1641763"/>
+                <a:gridCol w="1646594"/>
+                <a:gridCol w="1646594"/>
+              </a:tblGrid>
+              <a:tr h="0">
+                <a:tc>
+                  <a:txBody>
+                    <a:bodyPr/>
+                    <a:lstStyle/>
+                    <a:p>
+                      <a:r>
+                        <a:rPr lang="en-US" sz="1000" dirty="0" smtClean="0"/>
+                        <a:t>Name</a:t>
+                      </a:r>
+                      <a:endParaRPr lang="en-US" sz="1000" dirty="0"/>
+                    </a:p>
+                  </a:txBody>
+                  <a:tcPr/>
+                </a:tc>
+                <a:tc>
+                  <a:txBody>
+                    <a:bodyPr/>
+                    <a:lstStyle/>
+                    <a:p>
+                      <a:r>
+                        <a:rPr lang="en-US" sz="1000" dirty="0" smtClean="0"/>
+                        <a:t>Type</a:t>
+                      </a:r>
+                      <a:endParaRPr lang="en-US" sz="1000" dirty="0"/>
+                    </a:p>
+                  </a:txBody>
+                  <a:tcPr/>
+                </a:tc>
+                <a:tc>
+                  <a:txBody>
+                    <a:bodyPr/>
+                    <a:lstStyle/>
+                    <a:p>
+                      <a:r>
+                        <a:rPr lang="en-US" sz="1000" dirty="0" smtClean="0"/>
+                        <a:t>Constraint</a:t>
+                      </a:r>
+                      <a:endParaRPr lang="en-US" sz="1000" dirty="0"/>
+                    </a:p>
+                  </a:txBody>
+                  <a:tcPr/>
+                </a:tc>
+                <a:tc>
+                  <a:txBody>
+                    <a:bodyPr/>
+                    <a:lstStyle/>
+                    <a:p>
+                      <a:r>
+                        <a:rPr lang="en-US" sz="1000" dirty="0" smtClean="0"/>
+                        <a:t>Description</a:t>
+                      </a:r>
+                      <a:endParaRPr lang="en-US" sz="1000" dirty="0"/>
+                    </a:p>
+                  </a:txBody>
+                  <a:tcPr/>
+                </a:tc>
+              </a:tr>
+              <a:tr h="274835">
+                <a:tc>
+                  <a:txBody>
+                    <a:bodyPr/>
+                    <a:lstStyle/>
+                    <a:p>
+                      <a:r>
+                        <a:rPr lang="en-US" sz="1000" dirty="0" smtClean="0"/>
+                        <a:t>id</a:t>
+                      </a:r>
+                      <a:endParaRPr lang="en-US" sz="1000" dirty="0"/>
+                    </a:p>
+                  </a:txBody>
+                  <a:tcPr/>
+                </a:tc>
+                <a:tc>
+                  <a:txBody>
+                    <a:bodyPr/>
+                    <a:lstStyle/>
+                    <a:p>
+                      <a:r>
+                        <a:rPr lang="en-US" sz="1000" dirty="0" smtClean="0"/>
+                        <a:t>INT</a:t>
+                      </a:r>
+                      <a:endParaRPr lang="en-US" sz="1000" dirty="0"/>
+                    </a:p>
+                  </a:txBody>
+                  <a:tcPr/>
+                </a:tc>
+                <a:tc>
+                  <a:txBody>
+                    <a:bodyPr/>
+                    <a:lstStyle/>
+                    <a:p>
+                      <a:r>
+                        <a:rPr lang="en-US" sz="1000" dirty="0" smtClean="0"/>
+                        <a:t>Primary Key, auto increment</a:t>
+                      </a:r>
+                      <a:endParaRPr lang="en-US" sz="1000" dirty="0"/>
+                    </a:p>
+                  </a:txBody>
+                  <a:tcPr/>
+                </a:tc>
+                <a:tc>
+                  <a:txBody>
+                    <a:bodyPr/>
+                    <a:lstStyle/>
+                    <a:p>
+                      <a:r>
+                        <a:rPr lang="en-US" sz="1000" dirty="0" smtClean="0"/>
+                        <a:t>TYPE</a:t>
+                      </a:r>
+                      <a:endParaRPr lang="en-US" sz="1000" dirty="0"/>
+                    </a:p>
+                  </a:txBody>
+                  <a:tcPr/>
+                </a:tc>
+              </a:tr>
+              <a:tr h="274835">
+                <a:tc>
+                  <a:txBody>
+                    <a:bodyPr/>
+                    <a:lstStyle/>
+                    <a:p>
+                      <a:r>
+                        <a:rPr lang="en-US" sz="1000" dirty="0" err="1" smtClean="0"/>
+                        <a:t>metadata_id</a:t>
+                      </a:r>
+                      <a:endParaRPr lang="en-US" sz="1000" dirty="0"/>
+                    </a:p>
+                  </a:txBody>
+                  <a:tcPr/>
+                </a:tc>
+                <a:tc>
+                  <a:txBody>
+                    <a:bodyPr/>
+                    <a:lstStyle/>
+                    <a:p>
+                      <a:r>
+                        <a:rPr lang="en-US" sz="1000" dirty="0" smtClean="0"/>
+                        <a:t>INT</a:t>
+                      </a:r>
+                      <a:endParaRPr lang="en-US" sz="1000" dirty="0"/>
+                    </a:p>
+                  </a:txBody>
+                  <a:tcPr/>
+                </a:tc>
+                <a:tc>
+                  <a:txBody>
+                    <a:bodyPr/>
+                    <a:lstStyle/>
+                    <a:p>
+                      <a:r>
+                        <a:rPr lang="en-US" sz="1000" dirty="0" smtClean="0"/>
+                        <a:t>Foreign key to FILTERS_METADATA</a:t>
+                      </a:r>
+                      <a:endParaRPr lang="en-US" sz="1000" dirty="0"/>
+                    </a:p>
+                  </a:txBody>
+                  <a:tcPr/>
+                </a:tc>
+                <a:tc>
+                  <a:txBody>
+                    <a:bodyPr/>
+                    <a:lstStyle/>
+                    <a:p>
+                      <a:r>
+                        <a:rPr lang="en-US" sz="1000" dirty="0" smtClean="0"/>
+                        <a:t>Foreign key</a:t>
+                      </a:r>
+                      <a:endParaRPr lang="en-US" sz="1000" dirty="0"/>
+                    </a:p>
+                  </a:txBody>
+                  <a:tcPr/>
+                </a:tc>
+              </a:tr>
+              <a:tr h="274835">
+                <a:tc>
+                  <a:txBody>
+                    <a:bodyPr/>
+                    <a:lstStyle/>
+                    <a:p>
+                      <a:r>
+                        <a:rPr lang="en-US" sz="1000" dirty="0" smtClean="0"/>
+                        <a:t>value</a:t>
+                      </a:r>
+                      <a:endParaRPr lang="en-US" sz="1000" dirty="0"/>
+                    </a:p>
+                  </a:txBody>
+                  <a:tcPr/>
+                </a:tc>
+                <a:tc>
+                  <a:txBody>
+                    <a:bodyPr/>
+                    <a:lstStyle/>
+                    <a:p>
+                      <a:r>
+                        <a:rPr lang="en-US" sz="1000" dirty="0" smtClean="0"/>
+                        <a:t>VARCHAR 255</a:t>
+                      </a:r>
+                      <a:endParaRPr lang="en-US" sz="1000" dirty="0"/>
+                    </a:p>
+                  </a:txBody>
+                  <a:tcPr/>
+                </a:tc>
+                <a:tc>
+                  <a:txBody>
+                    <a:bodyPr/>
+                    <a:lstStyle/>
+                    <a:p>
+                      <a:endParaRPr lang="en-US" sz="1000" dirty="0"/>
+                    </a:p>
+                  </a:txBody>
+                  <a:tcPr/>
+                </a:tc>
+                <a:tc>
+                  <a:txBody>
+                    <a:bodyPr/>
+                    <a:lstStyle/>
+                    <a:p>
+                      <a:r>
+                        <a:rPr lang="en-US" sz="1000" dirty="0" smtClean="0"/>
+                        <a:t>The value</a:t>
+                      </a:r>
+                      <a:r>
+                        <a:rPr lang="en-US" sz="1000" baseline="0" dirty="0" smtClean="0"/>
+                        <a:t> of the filter</a:t>
+                      </a:r>
+                      <a:endParaRPr lang="en-US" sz="1000" dirty="0"/>
+                    </a:p>
+                  </a:txBody>
+                  <a:tcPr/>
+                </a:tc>
+              </a:tr>
+            </a:tbl>
+          </a:graphicData>
+        </a:graphic>
+      </p:graphicFrame>
+      <p:sp>
+        <p:nvSpPr>
+          <p:cNvPr id="8" name="Rectangle 7"/>
+          <p:cNvSpPr/>
+          <p:nvPr/>
+        </p:nvSpPr>
+        <p:spPr>
+          <a:xfrm>
+            <a:off x="687874" y="2979227"/>
+            <a:ext cx="2014847" cy="369332"/>
+          </a:xfrm>
+          <a:prstGeom prst="rect">
+            <a:avLst/>
+          </a:prstGeom>
+        </p:spPr>
+        <p:txBody>
+          <a:bodyPr wrap="none">
+            <a:spAutoFit/>
+          </a:bodyPr>
+          <a:lstStyle/>
+          <a:p>
             <a:r>
               <a:rPr lang="en-US" dirty="0" smtClean="0"/>
-              <a:t>Implement paging</a:t>
-            </a:r>
-          </a:p>
-          <a:p>
-            <a:pPr marL="285750" indent="-285750">
-              <a:buFont typeface="Arial" panose="020B0604020202020204" pitchFamily="34" charset="0"/>
-              <a:buChar char="•"/>
-            </a:pPr>
+              <a:t>FILTERS_METADATA</a:t>
+            </a:r>
             <a:endParaRPr lang="en-US" dirty="0"/>
           </a:p>
+        </p:txBody>
+      </p:sp>
+      <p:sp>
+        <p:nvSpPr>
+          <p:cNvPr id="9" name="Rectangle 8"/>
+          <p:cNvSpPr/>
+          <p:nvPr/>
+        </p:nvSpPr>
+        <p:spPr>
+          <a:xfrm>
+            <a:off x="687874" y="743139"/>
+            <a:ext cx="1088696" cy="369332"/>
+          </a:xfrm>
+          <a:prstGeom prst="rect">
+            <a:avLst/>
+          </a:prstGeom>
+        </p:spPr>
+        <p:txBody>
+          <a:bodyPr wrap="none">
+            <a:spAutoFit/>
+          </a:bodyPr>
+          <a:lstStyle/>
           <a:p>
             <a:r>
               <a:rPr lang="en-US" dirty="0" smtClean="0"/>
-              <a:t>Recalling previously discovered images?</a:t>
-            </a:r>
-          </a:p>
-          <a:p>
-            <a:r>
-              <a:rPr lang="en-US" dirty="0" smtClean="0"/>
-              <a:t>Recalling downloaded images?</a:t>
-            </a:r>
-          </a:p>
-          <a:p>
-            <a:pPr lvl="1"/>
+              <a:t>SETTINGS</a:t>
+            </a:r>
             <a:endParaRPr lang="en-US" dirty="0"/>
           </a:p>
         </p:txBody>
@@ -5256,7 +6725,7 @@
     </p:spTree>
     <p:extLst>
       <p:ext uri="{BB962C8B-B14F-4D97-AF65-F5344CB8AC3E}">
-        <p14:creationId xmlns:p14="http://schemas.microsoft.com/office/powerpoint/2010/main" val="2598165664"/>
+        <p14:creationId xmlns:p14="http://schemas.microsoft.com/office/powerpoint/2010/main" val="2980869019"/>
       </p:ext>
     </p:extLst>
   </p:cSld>
@@ -5298,6 +6767,118 @@
         </p:nvSpPr>
         <p:spPr>
           <a:xfrm>
+            <a:off x="951722" y="1045029"/>
+            <a:ext cx="10608906" cy="2462213"/>
+          </a:xfrm>
+          <a:prstGeom prst="rect">
+            <a:avLst/>
+          </a:prstGeom>
+          <a:noFill/>
+        </p:spPr>
+        <p:txBody>
+          <a:bodyPr wrap="square" rtlCol="0">
+            <a:spAutoFit/>
+          </a:bodyPr>
+          <a:lstStyle/>
+          <a:p>
+            <a:r>
+              <a:rPr lang="en-US" sz="2800" dirty="0" smtClean="0"/>
+              <a:t>Display</a:t>
+            </a:r>
+          </a:p>
+          <a:p>
+            <a:endParaRPr lang="en-US" dirty="0" smtClean="0"/>
+          </a:p>
+          <a:p>
+            <a:pPr marL="285750" indent="-285750">
+              <a:buFont typeface="Arial" panose="020B0604020202020204" pitchFamily="34" charset="0"/>
+              <a:buChar char="•"/>
+            </a:pPr>
+            <a:r>
+              <a:rPr lang="en-US" dirty="0" smtClean="0"/>
+              <a:t>REST Call to read APIs from Image Table by timestamp</a:t>
+            </a:r>
+          </a:p>
+          <a:p>
+            <a:pPr marL="285750" indent="-285750">
+              <a:buFont typeface="Arial" panose="020B0604020202020204" pitchFamily="34" charset="0"/>
+              <a:buChar char="•"/>
+            </a:pPr>
+            <a:r>
+              <a:rPr lang="en-US" dirty="0" smtClean="0"/>
+              <a:t>Implement paging</a:t>
+            </a:r>
+          </a:p>
+          <a:p>
+            <a:pPr marL="285750" indent="-285750">
+              <a:buFont typeface="Arial" panose="020B0604020202020204" pitchFamily="34" charset="0"/>
+              <a:buChar char="•"/>
+            </a:pPr>
+            <a:endParaRPr lang="en-US" dirty="0"/>
+          </a:p>
+          <a:p>
+            <a:r>
+              <a:rPr lang="en-US" dirty="0" smtClean="0"/>
+              <a:t>Recalling previously discovered images?</a:t>
+            </a:r>
+          </a:p>
+          <a:p>
+            <a:r>
+              <a:rPr lang="en-US" dirty="0" smtClean="0"/>
+              <a:t>Recalling downloaded images?</a:t>
+            </a:r>
+          </a:p>
+          <a:p>
+            <a:pPr lvl="1"/>
+            <a:endParaRPr lang="en-US" dirty="0"/>
+          </a:p>
+        </p:txBody>
+      </p:sp>
+    </p:spTree>
+    <p:extLst>
+      <p:ext uri="{BB962C8B-B14F-4D97-AF65-F5344CB8AC3E}">
+        <p14:creationId xmlns:p14="http://schemas.microsoft.com/office/powerpoint/2010/main" val="2598165664"/>
+      </p:ext>
+    </p:extLst>
+  </p:cSld>
+  <p:clrMapOvr>
+    <a:masterClrMapping/>
+  </p:clrMapOvr>
+  <p:timing>
+    <p:tnLst>
+      <p:par>
+        <p:cTn id="1" dur="indefinite" restart="never" nodeType="tmRoot"/>
+      </p:par>
+    </p:tnLst>
+  </p:timing>
+</p:sld>
+</file>
+
+<file path=ppt/slides/slide8.xml><?xml version="1.0" encoding="utf-8"?>
+<p:sld xmlns:a="http://schemas.openxmlformats.org/drawingml/2006/main" xmlns:r="http://schemas.openxmlformats.org/officeDocument/2006/relationships" xmlns:p="http://schemas.openxmlformats.org/presentationml/2006/main">
+  <p:cSld>
+    <p:spTree>
+      <p:nvGrpSpPr>
+        <p:cNvPr id="1" name=""/>
+        <p:cNvGrpSpPr/>
+        <p:nvPr/>
+      </p:nvGrpSpPr>
+      <p:grpSpPr>
+        <a:xfrm>
+          <a:off x="0" y="0"/>
+          <a:ext cx="0" cy="0"/>
+          <a:chOff x="0" y="0"/>
+          <a:chExt cx="0" cy="0"/>
+        </a:xfrm>
+      </p:grpSpPr>
+      <p:sp>
+        <p:nvSpPr>
+          <p:cNvPr id="6" name="TextBox 5"/>
+          <p:cNvSpPr txBox="1"/>
+          <p:nvPr/>
+        </p:nvSpPr>
+        <p:spPr>
+          <a:xfrm>
             <a:off x="503852" y="625151"/>
             <a:ext cx="10608906" cy="1477328"/>
           </a:xfrm>
@@ -5405,7 +6986,7 @@
 </p:sld>
 </file>
 
-<file path=ppt/slides/slide8.xml><?xml version="1.0" encoding="utf-8"?>
+<file path=ppt/slides/slide9.xml><?xml version="1.0" encoding="utf-8"?>
 <p:sld xmlns:a="http://schemas.openxmlformats.org/drawingml/2006/main" xmlns:r="http://schemas.openxmlformats.org/officeDocument/2006/relationships" xmlns:p="http://schemas.openxmlformats.org/presentationml/2006/main">
   <p:cSld>
     <p:spTree>

</xml_diff>

<commit_message>
Enhance parsing logic design
</commit_message>
<xml_diff>
--- a/docs/design.pptx
+++ b/docs/design.pptx
@@ -7,8 +7,8 @@
   <p:sldIdLst>
     <p:sldId id="256" r:id="rId2"/>
     <p:sldId id="259" r:id="rId3"/>
-    <p:sldId id="264" r:id="rId4"/>
-    <p:sldId id="261" r:id="rId5"/>
+    <p:sldId id="261" r:id="rId4"/>
+    <p:sldId id="264" r:id="rId5"/>
     <p:sldId id="260" r:id="rId6"/>
     <p:sldId id="263" r:id="rId7"/>
     <p:sldId id="257" r:id="rId8"/>
@@ -251,7 +251,7 @@
           <a:p>
             <a:fld id="{30DA0606-474F-417C-8DB0-81402E3BEFB0}" type="datetimeFigureOut">
               <a:rPr lang="en-US" smtClean="0"/>
-              <a:t>4/13/2017</a:t>
+              <a:t>4/14/2017</a:t>
             </a:fld>
             <a:endParaRPr lang="en-US"/>
           </a:p>
@@ -421,7 +421,7 @@
           <a:p>
             <a:fld id="{30DA0606-474F-417C-8DB0-81402E3BEFB0}" type="datetimeFigureOut">
               <a:rPr lang="en-US" smtClean="0"/>
-              <a:t>4/13/2017</a:t>
+              <a:t>4/14/2017</a:t>
             </a:fld>
             <a:endParaRPr lang="en-US"/>
           </a:p>
@@ -601,7 +601,7 @@
           <a:p>
             <a:fld id="{30DA0606-474F-417C-8DB0-81402E3BEFB0}" type="datetimeFigureOut">
               <a:rPr lang="en-US" smtClean="0"/>
-              <a:t>4/13/2017</a:t>
+              <a:t>4/14/2017</a:t>
             </a:fld>
             <a:endParaRPr lang="en-US"/>
           </a:p>
@@ -771,7 +771,7 @@
           <a:p>
             <a:fld id="{30DA0606-474F-417C-8DB0-81402E3BEFB0}" type="datetimeFigureOut">
               <a:rPr lang="en-US" smtClean="0"/>
-              <a:t>4/13/2017</a:t>
+              <a:t>4/14/2017</a:t>
             </a:fld>
             <a:endParaRPr lang="en-US"/>
           </a:p>
@@ -1017,7 +1017,7 @@
           <a:p>
             <a:fld id="{30DA0606-474F-417C-8DB0-81402E3BEFB0}" type="datetimeFigureOut">
               <a:rPr lang="en-US" smtClean="0"/>
-              <a:t>4/13/2017</a:t>
+              <a:t>4/14/2017</a:t>
             </a:fld>
             <a:endParaRPr lang="en-US"/>
           </a:p>
@@ -1249,7 +1249,7 @@
           <a:p>
             <a:fld id="{30DA0606-474F-417C-8DB0-81402E3BEFB0}" type="datetimeFigureOut">
               <a:rPr lang="en-US" smtClean="0"/>
-              <a:t>4/13/2017</a:t>
+              <a:t>4/14/2017</a:t>
             </a:fld>
             <a:endParaRPr lang="en-US"/>
           </a:p>
@@ -1616,7 +1616,7 @@
           <a:p>
             <a:fld id="{30DA0606-474F-417C-8DB0-81402E3BEFB0}" type="datetimeFigureOut">
               <a:rPr lang="en-US" smtClean="0"/>
-              <a:t>4/13/2017</a:t>
+              <a:t>4/14/2017</a:t>
             </a:fld>
             <a:endParaRPr lang="en-US"/>
           </a:p>
@@ -1734,7 +1734,7 @@
           <a:p>
             <a:fld id="{30DA0606-474F-417C-8DB0-81402E3BEFB0}" type="datetimeFigureOut">
               <a:rPr lang="en-US" smtClean="0"/>
-              <a:t>4/13/2017</a:t>
+              <a:t>4/14/2017</a:t>
             </a:fld>
             <a:endParaRPr lang="en-US"/>
           </a:p>
@@ -1829,7 +1829,7 @@
           <a:p>
             <a:fld id="{30DA0606-474F-417C-8DB0-81402E3BEFB0}" type="datetimeFigureOut">
               <a:rPr lang="en-US" smtClean="0"/>
-              <a:t>4/13/2017</a:t>
+              <a:t>4/14/2017</a:t>
             </a:fld>
             <a:endParaRPr lang="en-US"/>
           </a:p>
@@ -2106,7 +2106,7 @@
           <a:p>
             <a:fld id="{30DA0606-474F-417C-8DB0-81402E3BEFB0}" type="datetimeFigureOut">
               <a:rPr lang="en-US" smtClean="0"/>
-              <a:t>4/13/2017</a:t>
+              <a:t>4/14/2017</a:t>
             </a:fld>
             <a:endParaRPr lang="en-US"/>
           </a:p>
@@ -2359,7 +2359,7 @@
           <a:p>
             <a:fld id="{30DA0606-474F-417C-8DB0-81402E3BEFB0}" type="datetimeFigureOut">
               <a:rPr lang="en-US" smtClean="0"/>
-              <a:t>4/13/2017</a:t>
+              <a:t>4/14/2017</a:t>
             </a:fld>
             <a:endParaRPr lang="en-US"/>
           </a:p>
@@ -2572,7 +2572,7 @@
           <a:p>
             <a:fld id="{30DA0606-474F-417C-8DB0-81402E3BEFB0}" type="datetimeFigureOut">
               <a:rPr lang="en-US" smtClean="0"/>
-              <a:t>4/13/2017</a:t>
+              <a:t>4/14/2017</a:t>
             </a:fld>
             <a:endParaRPr lang="en-US"/>
           </a:p>
@@ -3159,8 +3159,8 @@
               <a:buChar char="•"/>
             </a:pPr>
             <a:r>
-              <a:rPr lang="en-US" dirty="0" err="1" smtClean="0"/>
-              <a:t>ImgURLSaveThread</a:t>
+              <a:rPr lang="en-US" dirty="0" smtClean="0"/>
+              <a:t>IMGThreadPool</a:t>
             </a:r>
             <a:endParaRPr lang="en-US" dirty="0"/>
           </a:p>
@@ -3326,6 +3326,102 @@
 </file>
 
 <file path=ppt/slides/slide3.xml><?xml version="1.0" encoding="utf-8"?>
+<p:sld xmlns:a="http://schemas.openxmlformats.org/drawingml/2006/main" xmlns:r="http://schemas.openxmlformats.org/officeDocument/2006/relationships" xmlns:p="http://schemas.openxmlformats.org/presentationml/2006/main">
+  <p:cSld>
+    <p:spTree>
+      <p:nvGrpSpPr>
+        <p:cNvPr id="1" name=""/>
+        <p:cNvGrpSpPr/>
+        <p:nvPr/>
+      </p:nvGrpSpPr>
+      <p:grpSpPr>
+        <a:xfrm>
+          <a:off x="0" y="0"/>
+          <a:ext cx="0" cy="0"/>
+          <a:chOff x="0" y="0"/>
+          <a:chExt cx="0" cy="0"/>
+        </a:xfrm>
+      </p:grpSpPr>
+      <p:sp>
+        <p:nvSpPr>
+          <p:cNvPr id="6" name="TextBox 5"/>
+          <p:cNvSpPr txBox="1"/>
+          <p:nvPr/>
+        </p:nvSpPr>
+        <p:spPr>
+          <a:xfrm>
+            <a:off x="951722" y="1045029"/>
+            <a:ext cx="10608906" cy="1077218"/>
+          </a:xfrm>
+          <a:prstGeom prst="rect">
+            <a:avLst/>
+          </a:prstGeom>
+          <a:noFill/>
+        </p:spPr>
+        <p:txBody>
+          <a:bodyPr wrap="square" rtlCol="0">
+            <a:spAutoFit/>
+          </a:bodyPr>
+          <a:lstStyle/>
+          <a:p>
+            <a:r>
+              <a:rPr lang="en-US" sz="2800" dirty="0" smtClean="0"/>
+              <a:t>Parse IMG Logic</a:t>
+            </a:r>
+          </a:p>
+          <a:p>
+            <a:endParaRPr lang="en-US" dirty="0" smtClean="0"/>
+          </a:p>
+          <a:p>
+            <a:pPr marL="285750" indent="-285750">
+              <a:buFont typeface="Arial" panose="020B0604020202020204" pitchFamily="34" charset="0"/>
+              <a:buChar char="•"/>
+            </a:pPr>
+            <a:r>
+              <a:rPr lang="en-US" dirty="0"/>
+              <a:t>IMGThreadPool reads </a:t>
+            </a:r>
+            <a:r>
+              <a:rPr lang="en-US" dirty="0" smtClean="0"/>
+              <a:t>image </a:t>
+            </a:r>
+            <a:r>
+              <a:rPr lang="en-US" dirty="0" smtClean="0"/>
+              <a:t>from </a:t>
+            </a:r>
+            <a:r>
+              <a:rPr lang="en-US" dirty="0" err="1" smtClean="0"/>
+              <a:t>ImgQueue</a:t>
+            </a:r>
+            <a:r>
+              <a:rPr lang="en-US" dirty="0" smtClean="0"/>
+              <a:t>, downloads image to get dimensions, and pushes to IMG table</a:t>
+            </a:r>
+            <a:endParaRPr lang="en-US" dirty="0" smtClean="0"/>
+          </a:p>
+        </p:txBody>
+      </p:sp>
+    </p:spTree>
+    <p:extLst>
+      <p:ext uri="{BB962C8B-B14F-4D97-AF65-F5344CB8AC3E}">
+        <p14:creationId xmlns:p14="http://schemas.microsoft.com/office/powerpoint/2010/main" val="1855793974"/>
+      </p:ext>
+    </p:extLst>
+  </p:cSld>
+  <p:clrMapOvr>
+    <a:masterClrMapping/>
+  </p:clrMapOvr>
+  <p:timing>
+    <p:tnLst>
+      <p:par>
+        <p:cTn id="1" dur="indefinite" restart="never" nodeType="tmRoot"/>
+      </p:par>
+    </p:tnLst>
+  </p:timing>
+</p:sld>
+</file>
+
+<file path=ppt/slides/slide4.xml><?xml version="1.0" encoding="utf-8"?>
 <p:sld xmlns:a="http://schemas.openxmlformats.org/drawingml/2006/main" xmlns:r="http://schemas.openxmlformats.org/officeDocument/2006/relationships" xmlns:p="http://schemas.openxmlformats.org/presentationml/2006/main">
   <p:cSld>
     <p:spTree>
@@ -3712,7 +3808,7 @@
         </p:nvSpPr>
         <p:spPr>
           <a:xfrm>
-            <a:off x="6031665" y="2834178"/>
+            <a:off x="6039030" y="2874998"/>
             <a:ext cx="1607620" cy="369332"/>
           </a:xfrm>
           <a:prstGeom prst="rect">
@@ -3740,8 +3836,8 @@
         </p:nvSpPr>
         <p:spPr>
           <a:xfrm>
-            <a:off x="2614262" y="2313219"/>
-            <a:ext cx="1124475" cy="369332"/>
+            <a:off x="1823903" y="2563266"/>
+            <a:ext cx="1908343" cy="338554"/>
           </a:xfrm>
           <a:prstGeom prst="rect">
             <a:avLst/>
@@ -3755,18 +3851,18 @@
           <a:lstStyle/>
           <a:p>
             <a:r>
-              <a:rPr lang="en-US" dirty="0" smtClean="0"/>
-              <a:t>[new </a:t>
-            </a:r>
-            <a:r>
-              <a:rPr lang="en-US" dirty="0" err="1" smtClean="0"/>
-              <a:t>urls</a:t>
-            </a:r>
-            <a:r>
-              <a:rPr lang="en-US" dirty="0" smtClean="0"/>
+              <a:rPr lang="en-US" sz="1600" dirty="0" smtClean="0"/>
+              <a:t>[</a:t>
+            </a:r>
+            <a:r>
+              <a:rPr lang="en-US" sz="1600" dirty="0" smtClean="0"/>
+              <a:t>new child page urls</a:t>
+            </a:r>
+            <a:r>
+              <a:rPr lang="en-US" sz="1600" dirty="0" smtClean="0"/>
               <a:t>]</a:t>
             </a:r>
-            <a:endParaRPr lang="en-US" dirty="0"/>
+            <a:endParaRPr lang="en-US" sz="1600" dirty="0"/>
           </a:p>
         </p:txBody>
       </p:sp>
@@ -3806,7 +3902,11 @@
             <a:pPr algn="ctr"/>
             <a:r>
               <a:rPr lang="en-US" dirty="0" smtClean="0"/>
-              <a:t>IMG Table</a:t>
+              <a:t>IMG </a:t>
+            </a:r>
+            <a:r>
+              <a:rPr lang="en-US" dirty="0" smtClean="0"/>
+              <a:t>Table</a:t>
             </a:r>
             <a:endParaRPr lang="en-US" dirty="0"/>
           </a:p>
@@ -3848,7 +3948,11 @@
             <a:pPr algn="ctr"/>
             <a:r>
               <a:rPr lang="en-US" dirty="0" smtClean="0"/>
-              <a:t>Visited URL SET</a:t>
+              <a:t>In Memory Visited Page URL </a:t>
+            </a:r>
+            <a:r>
+              <a:rPr lang="en-US" dirty="0" smtClean="0"/>
+              <a:t>SET</a:t>
             </a:r>
             <a:endParaRPr lang="en-US" dirty="0"/>
           </a:p>
@@ -3900,8 +4004,8 @@
         </p:nvSpPr>
         <p:spPr>
           <a:xfrm>
-            <a:off x="4969130" y="196340"/>
-            <a:ext cx="1062535" cy="369332"/>
+            <a:off x="4665842" y="173979"/>
+            <a:ext cx="1414041" cy="338554"/>
           </a:xfrm>
           <a:prstGeom prst="rect">
             <a:avLst/>
@@ -3912,11 +4016,26 @@
           <a:bodyPr wrap="none" rtlCol="0">
             <a:spAutoFit/>
           </a:bodyPr>
-          <a:lstStyle/>
-          <a:p>
-            <a:r>
-              <a:rPr lang="en-US" dirty="0" smtClean="0"/>
-              <a:t>[start url]</a:t>
+          <a:lstStyle>
+            <a:defPPr>
+              <a:defRPr lang="en-US"/>
+            </a:defPPr>
+            <a:lvl1pPr>
+              <a:defRPr sz="1600"/>
+            </a:lvl1pPr>
+          </a:lstStyle>
+          <a:p>
+            <a:r>
+              <a:rPr lang="en-US" dirty="0"/>
+              <a:t>[start page </a:t>
+            </a:r>
+            <a:r>
+              <a:rPr lang="en-US" dirty="0" err="1"/>
+              <a:t>url</a:t>
+            </a:r>
+            <a:r>
+              <a:rPr lang="en-US" dirty="0"/>
+              <a:t>]</a:t>
             </a:r>
             <a:endParaRPr lang="en-US" dirty="0"/>
           </a:p>
@@ -4042,7 +4161,7 @@
         </p:nvSpPr>
         <p:spPr>
           <a:xfrm>
-            <a:off x="6245537" y="4784276"/>
+            <a:off x="6134879" y="4851615"/>
             <a:ext cx="1215397" cy="369332"/>
           </a:xfrm>
           <a:prstGeom prst="rect">
@@ -4368,7 +4487,7 @@
         </p:nvSpPr>
         <p:spPr>
           <a:xfrm>
-            <a:off x="6159506" y="5719279"/>
+            <a:off x="5896948" y="5691125"/>
             <a:ext cx="1653851" cy="369332"/>
           </a:xfrm>
           <a:prstGeom prst="rect">
@@ -4382,60 +4501,113 @@
           <a:lstStyle/>
           <a:p>
             <a:r>
-              <a:rPr lang="en-US" dirty="0" err="1" smtClean="0"/>
+              <a:rPr lang="en-US" dirty="0" smtClean="0"/>
               <a:t>IMGThreadPool</a:t>
             </a:r>
             <a:endParaRPr lang="en-US" dirty="0"/>
           </a:p>
         </p:txBody>
       </p:sp>
-    </p:spTree>
-    <p:extLst>
-      <p:ext uri="{BB962C8B-B14F-4D97-AF65-F5344CB8AC3E}">
-        <p14:creationId xmlns:p14="http://schemas.microsoft.com/office/powerpoint/2010/main" val="620945417"/>
-      </p:ext>
-    </p:extLst>
-  </p:cSld>
-  <p:clrMapOvr>
-    <a:masterClrMapping/>
-  </p:clrMapOvr>
-  <p:timing>
-    <p:tnLst>
-      <p:par>
-        <p:cTn id="1" dur="indefinite" restart="never" nodeType="tmRoot"/>
-      </p:par>
-    </p:tnLst>
-  </p:timing>
-</p:sld>
-</file>
-
-<file path=ppt/slides/slide4.xml><?xml version="1.0" encoding="utf-8"?>
-<p:sld xmlns:a="http://schemas.openxmlformats.org/drawingml/2006/main" xmlns:r="http://schemas.openxmlformats.org/officeDocument/2006/relationships" xmlns:p="http://schemas.openxmlformats.org/presentationml/2006/main">
-  <p:cSld>
-    <p:spTree>
-      <p:nvGrpSpPr>
-        <p:cNvPr id="1" name=""/>
-        <p:cNvGrpSpPr/>
-        <p:nvPr/>
-      </p:nvGrpSpPr>
-      <p:grpSpPr>
-        <a:xfrm>
-          <a:off x="0" y="0"/>
-          <a:ext cx="0" cy="0"/>
-          <a:chOff x="0" y="0"/>
-          <a:chExt cx="0" cy="0"/>
-        </a:xfrm>
-      </p:grpSpPr>
-      <p:sp>
-        <p:nvSpPr>
-          <p:cNvPr id="6" name="TextBox 5"/>
+      <p:sp>
+        <p:nvSpPr>
+          <p:cNvPr id="6" name="Rectangular Callout 5"/>
+          <p:cNvSpPr/>
+          <p:nvPr/>
+        </p:nvSpPr>
+        <p:spPr>
+          <a:xfrm>
+            <a:off x="2407298" y="4180114"/>
+            <a:ext cx="1744824" cy="531845"/>
+          </a:xfrm>
+          <a:prstGeom prst="wedgeRectCallout">
+            <a:avLst>
+              <a:gd name="adj1" fmla="val 82376"/>
+              <a:gd name="adj2" fmla="val -139254"/>
+            </a:avLst>
+          </a:prstGeom>
+        </p:spPr>
+        <p:style>
+          <a:lnRef idx="2">
+            <a:schemeClr val="accent1"/>
+          </a:lnRef>
+          <a:fillRef idx="1">
+            <a:schemeClr val="lt1"/>
+          </a:fillRef>
+          <a:effectRef idx="0">
+            <a:schemeClr val="accent1"/>
+          </a:effectRef>
+          <a:fontRef idx="minor">
+            <a:schemeClr val="dk1"/>
+          </a:fontRef>
+        </p:style>
+        <p:txBody>
+          <a:bodyPr rtlCol="0" anchor="ctr"/>
+          <a:lstStyle/>
+          <a:p>
+            <a:pPr algn="ctr"/>
+            <a:r>
+              <a:rPr lang="en-US" sz="1200" dirty="0" smtClean="0"/>
+              <a:t>Parse unvisted urls, extract images, extract child urls</a:t>
+            </a:r>
+            <a:endParaRPr lang="en-US" sz="1200" dirty="0"/>
+          </a:p>
+        </p:txBody>
+      </p:sp>
+      <p:sp>
+        <p:nvSpPr>
+          <p:cNvPr id="7" name="Rectangular Callout 6"/>
+          <p:cNvSpPr/>
+          <p:nvPr/>
+        </p:nvSpPr>
+        <p:spPr>
+          <a:xfrm>
+            <a:off x="2407298" y="5990253"/>
+            <a:ext cx="1744824" cy="631372"/>
+          </a:xfrm>
+          <a:prstGeom prst="wedgeRectCallout">
+            <a:avLst>
+              <a:gd name="adj1" fmla="val 83980"/>
+              <a:gd name="adj2" fmla="val 20833"/>
+            </a:avLst>
+          </a:prstGeom>
+        </p:spPr>
+        <p:style>
+          <a:lnRef idx="2">
+            <a:schemeClr val="accent1"/>
+          </a:lnRef>
+          <a:fillRef idx="1">
+            <a:schemeClr val="lt1"/>
+          </a:fillRef>
+          <a:effectRef idx="0">
+            <a:schemeClr val="accent1"/>
+          </a:effectRef>
+          <a:fontRef idx="minor">
+            <a:schemeClr val="dk1"/>
+          </a:fontRef>
+        </p:style>
+        <p:txBody>
+          <a:bodyPr rtlCol="0" anchor="ctr"/>
+          <a:lstStyle/>
+          <a:p>
+            <a:pPr algn="ctr"/>
+            <a:r>
+              <a:rPr lang="en-US" sz="1200" dirty="0" smtClean="0"/>
+              <a:t>Check image size and dimensions, push image data to DB</a:t>
+            </a:r>
+            <a:endParaRPr lang="en-US" sz="1200" dirty="0"/>
+          </a:p>
+        </p:txBody>
+      </p:sp>
+      <p:sp>
+        <p:nvSpPr>
+          <p:cNvPr id="34" name="TextBox 33"/>
           <p:cNvSpPr txBox="1"/>
           <p:nvPr/>
         </p:nvSpPr>
         <p:spPr>
           <a:xfrm>
-            <a:off x="951722" y="1045029"/>
-            <a:ext cx="10608906" cy="1354217"/>
+            <a:off x="5500398" y="3902367"/>
+            <a:ext cx="968535" cy="338554"/>
           </a:xfrm>
           <a:prstGeom prst="rect">
             <a:avLst/>
@@ -4443,54 +4615,108 @@
           <a:noFill/>
         </p:spPr>
         <p:txBody>
-          <a:bodyPr wrap="square" rtlCol="0">
+          <a:bodyPr wrap="none" rtlCol="0">
             <a:spAutoFit/>
           </a:bodyPr>
-          <a:lstStyle/>
-          <a:p>
-            <a:r>
-              <a:rPr lang="en-US" sz="2800" dirty="0" smtClean="0"/>
-              <a:t>Parse IMG Logic</a:t>
-            </a:r>
-          </a:p>
-          <a:p>
-            <a:endParaRPr lang="en-US" dirty="0" smtClean="0"/>
-          </a:p>
-          <a:p>
-            <a:pPr marL="285750" indent="-285750">
-              <a:buFont typeface="Arial" panose="020B0604020202020204" pitchFamily="34" charset="0"/>
-              <a:buChar char="•"/>
-            </a:pPr>
-            <a:r>
-              <a:rPr lang="en-US" dirty="0" err="1" smtClean="0"/>
-              <a:t>ImgURLSaveThread</a:t>
+          <a:lstStyle>
+            <a:defPPr>
+              <a:defRPr lang="en-US"/>
+            </a:defPPr>
+            <a:lvl1pPr>
+              <a:defRPr sz="1600"/>
+            </a:lvl1pPr>
+          </a:lstStyle>
+          <a:p>
+            <a:r>
+              <a:rPr lang="en-US" dirty="0"/>
+              <a:t>[img urls]</a:t>
+            </a:r>
+            <a:endParaRPr lang="en-US" dirty="0"/>
+          </a:p>
+        </p:txBody>
+      </p:sp>
+      <p:sp>
+        <p:nvSpPr>
+          <p:cNvPr id="35" name="TextBox 34"/>
+          <p:cNvSpPr txBox="1"/>
+          <p:nvPr/>
+        </p:nvSpPr>
+        <p:spPr>
+          <a:xfrm>
+            <a:off x="6729646" y="6380422"/>
+            <a:ext cx="1459054" cy="338554"/>
+          </a:xfrm>
+          <a:prstGeom prst="rect">
+            <a:avLst/>
+          </a:prstGeom>
+          <a:noFill/>
+        </p:spPr>
+        <p:txBody>
+          <a:bodyPr wrap="none" rtlCol="0">
+            <a:spAutoFit/>
+          </a:bodyPr>
+          <a:lstStyle>
+            <a:defPPr>
+              <a:defRPr lang="en-US"/>
+            </a:defPPr>
+            <a:lvl1pPr>
+              <a:defRPr sz="1600"/>
+            </a:lvl1pPr>
+          </a:lstStyle>
+          <a:p>
+            <a:r>
+              <a:rPr lang="en-US" dirty="0"/>
+              <a:t>[img </a:t>
             </a:r>
             <a:r>
               <a:rPr lang="en-US" dirty="0" smtClean="0"/>
-              <a:t> reads all available images from </a:t>
-            </a:r>
-            <a:r>
-              <a:rPr lang="en-US" dirty="0" err="1" smtClean="0"/>
-              <a:t>ImgQueue</a:t>
-            </a:r>
-            <a:endParaRPr lang="en-US" dirty="0" smtClean="0"/>
-          </a:p>
-          <a:p>
-            <a:pPr marL="742950" lvl="1" indent="-285750">
-              <a:buFont typeface="Arial" panose="020B0604020202020204" pitchFamily="34" charset="0"/>
-              <a:buChar char="•"/>
-            </a:pPr>
+              <a:t>metadata]</a:t>
+            </a:r>
+            <a:endParaRPr lang="en-US" dirty="0"/>
+          </a:p>
+        </p:txBody>
+      </p:sp>
+      <p:sp>
+        <p:nvSpPr>
+          <p:cNvPr id="37" name="TextBox 36"/>
+          <p:cNvSpPr txBox="1"/>
+          <p:nvPr/>
+        </p:nvSpPr>
+        <p:spPr>
+          <a:xfrm>
+            <a:off x="7083830" y="3531005"/>
+            <a:ext cx="1505412" cy="338554"/>
+          </a:xfrm>
+          <a:prstGeom prst="rect">
+            <a:avLst/>
+          </a:prstGeom>
+          <a:noFill/>
+        </p:spPr>
+        <p:txBody>
+          <a:bodyPr wrap="none" rtlCol="0">
+            <a:spAutoFit/>
+          </a:bodyPr>
+          <a:lstStyle>
+            <a:defPPr>
+              <a:defRPr lang="en-US"/>
+            </a:defPPr>
+            <a:lvl1pPr>
+              <a:defRPr sz="1600"/>
+            </a:lvl1pPr>
+          </a:lstStyle>
+          <a:p>
             <a:r>
               <a:rPr lang="en-US" dirty="0" smtClean="0"/>
-              <a:t>Bulk Insert into database Image Table</a:t>
-            </a:r>
+              <a:t>[child page urls]</a:t>
+            </a:r>
+            <a:endParaRPr lang="en-US" dirty="0"/>
           </a:p>
         </p:txBody>
       </p:sp>
     </p:spTree>
     <p:extLst>
       <p:ext uri="{BB962C8B-B14F-4D97-AF65-F5344CB8AC3E}">
-        <p14:creationId xmlns:p14="http://schemas.microsoft.com/office/powerpoint/2010/main" val="1855793974"/>
+        <p14:creationId xmlns:p14="http://schemas.microsoft.com/office/powerpoint/2010/main" val="620945417"/>
       </p:ext>
     </p:extLst>
   </p:cSld>
@@ -5837,14 +6063,14 @@
           <p:nvPr>
             <p:extLst>
               <p:ext uri="{D42A27DB-BD31-4B8C-83A1-F6EECF244321}">
-                <p14:modId xmlns:p14="http://schemas.microsoft.com/office/powerpoint/2010/main" val="2793174452"/>
+                <p14:modId xmlns:p14="http://schemas.microsoft.com/office/powerpoint/2010/main" val="3882577503"/>
               </p:ext>
             </p:extLst>
           </p:nvPr>
         </p:nvGraphicFramePr>
         <p:xfrm>
           <a:off x="2940178" y="789890"/>
-          <a:ext cx="6586376" cy="1464585"/>
+          <a:ext cx="6586376" cy="1860825"/>
         </p:xfrm>
         <a:graphic>
           <a:graphicData uri="http://schemas.openxmlformats.org/drawingml/2006/table">
@@ -6149,7 +6375,86 @@
                       </a:r>
                       <a:r>
                         <a:rPr lang="en-US" sz="1000" baseline="0" dirty="0" smtClean="0"/>
-                        <a:t> to save images</a:t>
+                        <a:t> to save </a:t>
+                      </a:r>
+                      <a:r>
+                        <a:rPr lang="en-US" sz="1000" baseline="0" dirty="0" smtClean="0"/>
+                        <a:t>images</a:t>
+                      </a:r>
+                      <a:endParaRPr lang="en-US" sz="1000" dirty="0" smtClean="0"/>
+                    </a:p>
+                  </a:txBody>
+                  <a:tcPr/>
+                </a:tc>
+              </a:tr>
+              <a:tr h="274835">
+                <a:tc>
+                  <a:txBody>
+                    <a:bodyPr/>
+                    <a:lstStyle/>
+                    <a:p>
+                      <a:r>
+                        <a:rPr lang="en-US" sz="1000" dirty="0" smtClean="0"/>
+                        <a:t>Sort</a:t>
+                      </a:r>
+                      <a:endParaRPr lang="en-US" sz="1000" dirty="0"/>
+                    </a:p>
+                  </a:txBody>
+                  <a:tcPr/>
+                </a:tc>
+                <a:tc>
+                  <a:txBody>
+                    <a:bodyPr/>
+                    <a:lstStyle/>
+                    <a:p>
+                      <a:r>
+                        <a:rPr lang="en-US" sz="1000" dirty="0" smtClean="0"/>
+                        <a:t>VARCHAR 255</a:t>
+                      </a:r>
+                      <a:endParaRPr lang="en-US" sz="1000" dirty="0"/>
+                    </a:p>
+                  </a:txBody>
+                  <a:tcPr/>
+                </a:tc>
+                <a:tc>
+                  <a:txBody>
+                    <a:bodyPr/>
+                    <a:lstStyle/>
+                    <a:p>
+                      <a:endParaRPr lang="en-US" sz="1000" dirty="0"/>
+                    </a:p>
+                  </a:txBody>
+                  <a:tcPr/>
+                </a:tc>
+                <a:tc>
+                  <a:txBody>
+                    <a:bodyPr/>
+                    <a:lstStyle/>
+                    <a:p>
+                      <a:pPr marL="0" marR="0" lvl="0" indent="0" algn="l" defTabSz="914400" rtl="0" eaLnBrk="1" fontAlgn="auto" latinLnBrk="0" hangingPunct="1">
+                        <a:lnSpc>
+                          <a:spcPct val="100000"/>
+                        </a:lnSpc>
+                        <a:spcBef>
+                          <a:spcPts val="0"/>
+                        </a:spcBef>
+                        <a:spcAft>
+                          <a:spcPts val="0"/>
+                        </a:spcAft>
+                        <a:buClrTx/>
+                        <a:buSzTx/>
+                        <a:buFontTx/>
+                        <a:buNone/>
+                        <a:tabLst/>
+                        <a:defRPr/>
+                      </a:pPr>
+                      <a:r>
+                        <a:rPr lang="en-US" sz="1000" dirty="0" smtClean="0"/>
+                        <a:t>Sort preferences,</a:t>
+                      </a:r>
+                      <a:r>
+                        <a:rPr lang="en-US" sz="1000" baseline="0" dirty="0" smtClean="0"/>
+                        <a:t> delimited by comma</a:t>
                       </a:r>
                       <a:endParaRPr lang="en-US" sz="1000" dirty="0" smtClean="0"/>
                     </a:p>

</xml_diff>

<commit_message>
Add new page and image tables
</commit_message>
<xml_diff>
--- a/docs/design.pptx
+++ b/docs/design.pptx
@@ -3240,14 +3240,14 @@
           <p:nvPr>
             <p:extLst>
               <p:ext uri="{D42A27DB-BD31-4B8C-83A1-F6EECF244321}">
-                <p14:modId xmlns:p14="http://schemas.microsoft.com/office/powerpoint/2010/main" val="2826721521"/>
+                <p14:modId xmlns:p14="http://schemas.microsoft.com/office/powerpoint/2010/main" val="2130030807"/>
               </p:ext>
             </p:extLst>
           </p:nvPr>
         </p:nvGraphicFramePr>
         <p:xfrm>
           <a:off x="2818879" y="709125"/>
-          <a:ext cx="6586376" cy="2685330"/>
+          <a:ext cx="6586376" cy="2838760"/>
         </p:xfrm>
         <a:graphic>
           <a:graphicData uri="http://schemas.openxmlformats.org/drawingml/2006/table">
@@ -3385,39 +3385,43 @@
                     <a:p>
                       <a:r>
                         <a:rPr lang="en-US" sz="1000" dirty="0" smtClean="0"/>
-                        <a:t>time</a:t>
-                      </a:r>
-                      <a:endParaRPr lang="en-US" sz="1000" dirty="0"/>
-                    </a:p>
-                  </a:txBody>
-                  <a:tcPr/>
-                </a:tc>
-                <a:tc>
-                  <a:txBody>
-                    <a:bodyPr/>
-                    <a:lstStyle/>
-                    <a:p>
-                      <a:r>
-                        <a:rPr lang="en-US" sz="1000" dirty="0" smtClean="0"/>
-                        <a:t>Timestamp</a:t>
-                      </a:r>
-                      <a:endParaRPr lang="en-US" sz="1000" dirty="0"/>
-                    </a:p>
-                  </a:txBody>
-                  <a:tcPr/>
-                </a:tc>
-                <a:tc>
-                  <a:txBody>
-                    <a:bodyPr/>
-                    <a:lstStyle/>
-                    <a:p>
-                      <a:r>
-                        <a:rPr lang="en-US" sz="1000" dirty="0" smtClean="0"/>
-                        <a:t>Aut</a:t>
+                        <a:t>discovered</a:t>
+                      </a:r>
+                      <a:endParaRPr lang="en-US" sz="1000" dirty="0"/>
+                    </a:p>
+                  </a:txBody>
+                  <a:tcPr/>
+                </a:tc>
+                <a:tc>
+                  <a:txBody>
+                    <a:bodyPr/>
+                    <a:lstStyle/>
+                    <a:p>
+                      <a:r>
+                        <a:rPr lang="en-US" sz="1000" dirty="0" smtClean="0"/>
+                        <a:t>TIMESTAMP</a:t>
+                      </a:r>
+                      <a:endParaRPr lang="en-US" sz="1000" dirty="0"/>
+                    </a:p>
+                  </a:txBody>
+                  <a:tcPr/>
+                </a:tc>
+                <a:tc>
+                  <a:txBody>
+                    <a:bodyPr/>
+                    <a:lstStyle/>
+                    <a:p>
+                      <a:r>
+                        <a:rPr lang="en-US" sz="1000" dirty="0" smtClean="0"/>
+                        <a:t>default</a:t>
                       </a:r>
                       <a:r>
                         <a:rPr lang="en-US" sz="1000" baseline="0" dirty="0" smtClean="0"/>
-                        <a:t>o generate</a:t>
+                        <a:t> </a:t>
+                      </a:r>
+                      <a:r>
+                        <a:rPr lang="en-US" sz="1000" baseline="0" dirty="0" err="1" smtClean="0"/>
+                        <a:t>current_timstamp</a:t>
                       </a:r>
                       <a:endParaRPr lang="en-US" sz="1000" dirty="0"/>
                     </a:p>
@@ -3513,43 +3517,39 @@
                     <a:p>
                       <a:r>
                         <a:rPr lang="en-US" sz="1000" dirty="0" err="1" smtClean="0"/>
-                        <a:t>image_url</a:t>
-                      </a:r>
-                      <a:endParaRPr lang="en-US" sz="1000" dirty="0"/>
-                    </a:p>
-                  </a:txBody>
-                  <a:tcPr/>
-                </a:tc>
-                <a:tc>
-                  <a:txBody>
-                    <a:bodyPr/>
-                    <a:lstStyle/>
-                    <a:p>
-                      <a:r>
-                        <a:rPr lang="en-US" sz="1000" dirty="0" smtClean="0"/>
-                        <a:t>VARCHAR 2045</a:t>
-                      </a:r>
-                      <a:endParaRPr lang="en-US" sz="1000" dirty="0"/>
-                    </a:p>
-                  </a:txBody>
-                  <a:tcPr/>
-                </a:tc>
-                <a:tc>
-                  <a:txBody>
-                    <a:bodyPr/>
-                    <a:lstStyle/>
-                    <a:p>
-                      <a:r>
-                        <a:rPr lang="en-US" sz="1000" dirty="0" smtClean="0"/>
-                        <a:t>unique + </a:t>
-                      </a:r>
-                      <a:r>
-                        <a:rPr lang="en-US" sz="1000" dirty="0" err="1" smtClean="0"/>
-                        <a:t>page_url_id</a:t>
-                      </a:r>
-                      <a:r>
-                        <a:rPr lang="en-US" sz="1000" dirty="0" smtClean="0"/>
-                        <a:t>, not null</a:t>
+                        <a:t>url</a:t>
+                      </a:r>
+                      <a:endParaRPr lang="en-US" sz="1000" dirty="0"/>
+                    </a:p>
+                  </a:txBody>
+                  <a:tcPr/>
+                </a:tc>
+                <a:tc>
+                  <a:txBody>
+                    <a:bodyPr/>
+                    <a:lstStyle/>
+                    <a:p>
+                      <a:r>
+                        <a:rPr lang="en-US" sz="1000" dirty="0" smtClean="0"/>
+                        <a:t>VARCHAR 2048</a:t>
+                      </a:r>
+                      <a:endParaRPr lang="en-US" sz="1000" dirty="0"/>
+                    </a:p>
+                  </a:txBody>
+                  <a:tcPr/>
+                </a:tc>
+                <a:tc>
+                  <a:txBody>
+                    <a:bodyPr/>
+                    <a:lstStyle/>
+                    <a:p>
+                      <a:r>
+                        <a:rPr lang="en-US" sz="1000" dirty="0" smtClean="0"/>
+                        <a:t>Not</a:t>
+                      </a:r>
+                      <a:r>
+                        <a:rPr lang="en-US" sz="1000" baseline="0" dirty="0" smtClean="0"/>
+                        <a:t> null, unique</a:t>
                       </a:r>
                       <a:endParaRPr lang="en-US" sz="1000" dirty="0"/>
                     </a:p>
@@ -3796,6 +3796,60 @@
                       <a:r>
                         <a:rPr lang="en-US" sz="1000" dirty="0" smtClean="0"/>
                         <a:t>Small, Medium, or Large</a:t>
+                      </a:r>
+                      <a:endParaRPr lang="en-US" sz="1000" dirty="0"/>
+                    </a:p>
+                  </a:txBody>
+                  <a:tcPr/>
+                </a:tc>
+              </a:tr>
+              <a:tr h="274835">
+                <a:tc>
+                  <a:txBody>
+                    <a:bodyPr/>
+                    <a:lstStyle/>
+                    <a:p>
+                      <a:r>
+                        <a:rPr lang="en-US" sz="1000" dirty="0" err="1" smtClean="0"/>
+                        <a:t>b_size</a:t>
+                      </a:r>
+                      <a:endParaRPr lang="en-US" sz="1000" dirty="0"/>
+                    </a:p>
+                  </a:txBody>
+                  <a:tcPr/>
+                </a:tc>
+                <a:tc>
+                  <a:txBody>
+                    <a:bodyPr/>
+                    <a:lstStyle/>
+                    <a:p>
+                      <a:r>
+                        <a:rPr lang="en-US" sz="1000" dirty="0" smtClean="0"/>
+                        <a:t>INT</a:t>
+                      </a:r>
+                      <a:endParaRPr lang="en-US" sz="1000" dirty="0"/>
+                    </a:p>
+                  </a:txBody>
+                  <a:tcPr/>
+                </a:tc>
+                <a:tc>
+                  <a:txBody>
+                    <a:bodyPr/>
+                    <a:lstStyle/>
+                    <a:p>
+                      <a:endParaRPr lang="en-US" sz="1000" dirty="0"/>
+                    </a:p>
+                  </a:txBody>
+                  <a:tcPr/>
+                </a:tc>
+                <a:tc>
+                  <a:txBody>
+                    <a:bodyPr/>
+                    <a:lstStyle/>
+                    <a:p>
+                      <a:r>
+                        <a:rPr lang="en-US" sz="1000" dirty="0" smtClean="0"/>
+                        <a:t>Size in bytes</a:t>
                       </a:r>
                       <a:endParaRPr lang="en-US" sz="1000" dirty="0"/>
                     </a:p>
@@ -5148,7 +5202,7 @@
           <p:nvPr>
             <p:extLst>
               <p:ext uri="{D42A27DB-BD31-4B8C-83A1-F6EECF244321}">
-                <p14:modId xmlns:p14="http://schemas.microsoft.com/office/powerpoint/2010/main" val="3282551023"/>
+                <p14:modId xmlns:p14="http://schemas.microsoft.com/office/powerpoint/2010/main" val="58729460"/>
               </p:ext>
             </p:extLst>
           </p:nvPr>
@@ -5529,7 +5583,15 @@
                     <a:p>
                       <a:r>
                         <a:rPr lang="en-US" sz="1000" dirty="0" smtClean="0"/>
-                        <a:t>Not null, auto generated</a:t>
+                        <a:t>default</a:t>
+                      </a:r>
+                      <a:r>
+                        <a:rPr lang="en-US" sz="1000" baseline="0" dirty="0" smtClean="0"/>
+                        <a:t> </a:t>
+                      </a:r>
+                      <a:r>
+                        <a:rPr lang="en-US" sz="1000" baseline="0" dirty="0" err="1" smtClean="0"/>
+                        <a:t>current_timstamp</a:t>
                       </a:r>
                       <a:endParaRPr lang="en-US" sz="1000" dirty="0"/>
                     </a:p>
@@ -5681,7 +5743,7 @@
           <p:nvPr>
             <p:extLst>
               <p:ext uri="{D42A27DB-BD31-4B8C-83A1-F6EECF244321}">
-                <p14:modId xmlns:p14="http://schemas.microsoft.com/office/powerpoint/2010/main" val="2773144171"/>
+                <p14:modId xmlns:p14="http://schemas.microsoft.com/office/powerpoint/2010/main" val="3094707769"/>
               </p:ext>
             </p:extLst>
           </p:nvPr>
@@ -5844,7 +5906,11 @@
                     <a:p>
                       <a:r>
                         <a:rPr lang="en-US" sz="1000" dirty="0" smtClean="0"/>
-                        <a:t>VARCHAR 255</a:t>
+                        <a:t>VARCHAR </a:t>
+                      </a:r>
+                      <a:r>
+                        <a:rPr lang="en-US" sz="1000" dirty="0" smtClean="0"/>
+                        <a:t>2048</a:t>
                       </a:r>
                       <a:endParaRPr lang="en-US" sz="1000" dirty="0"/>
                     </a:p>
@@ -8828,11 +8894,7 @@
             <a:pPr algn="ctr"/>
             <a:r>
               <a:rPr lang="en-US" sz="1200" dirty="0" smtClean="0"/>
-              <a:t>Parse unvisted urls, extract images, extract child </a:t>
-            </a:r>
-            <a:r>
-              <a:rPr lang="en-US" sz="1200" dirty="0" smtClean="0"/>
-              <a:t>URLs</a:t>
+              <a:t>Parse unvisted urls, extract images, extract child URLs</a:t>
             </a:r>
             <a:endParaRPr lang="en-US" sz="1200" dirty="0"/>
           </a:p>
@@ -9038,11 +9100,7 @@
             <a:pPr algn="ctr"/>
             <a:r>
               <a:rPr lang="en-US" dirty="0" smtClean="0"/>
-              <a:t>page </a:t>
-            </a:r>
-            <a:r>
-              <a:rPr lang="en-US" dirty="0" smtClean="0"/>
-              <a:t>table</a:t>
+              <a:t>page table</a:t>
             </a:r>
             <a:br>
               <a:rPr lang="en-US" dirty="0" smtClean="0"/>
@@ -9149,11 +9207,7 @@
             </a:pPr>
             <a:r>
               <a:rPr lang="en-US" dirty="0" smtClean="0"/>
-              <a:t>Push </a:t>
-            </a:r>
-            <a:r>
-              <a:rPr lang="en-US" dirty="0" smtClean="0"/>
-              <a:t>page to URL Queue</a:t>
+              <a:t>Push page to URL Queue</a:t>
             </a:r>
           </a:p>
         </p:txBody>
@@ -9242,11 +9296,7 @@
             </a:pPr>
             <a:r>
               <a:rPr lang="en-US" dirty="0" smtClean="0"/>
-              <a:t>Check count in page_toplogy table for this ID. If count exceeds page query limit stop </a:t>
-            </a:r>
-            <a:r>
-              <a:rPr lang="en-US" dirty="0" smtClean="0"/>
-              <a:t>parsing</a:t>
+              <a:t>Check count in page_toplogy table for this ID. If count exceeds page query limit stop parsing</a:t>
             </a:r>
           </a:p>
           <a:p>
@@ -9258,7 +9308,6 @@
               <a:rPr lang="en-US" dirty="0" smtClean="0"/>
               <a:t>If state is stop, stop parsing</a:t>
             </a:r>
-            <a:endParaRPr lang="en-US" dirty="0" smtClean="0"/>
           </a:p>
           <a:p>
             <a:pPr marL="800100" lvl="1" indent="-342900">
@@ -9922,7 +9971,6 @@
               <a:rPr lang="en-US" dirty="0" smtClean="0"/>
               <a:t>Once every page has been discovered, or the page topology size for the query has been reached, stop parsing pages. </a:t>
             </a:r>
-            <a:endParaRPr lang="en-US" dirty="0" smtClean="0"/>
           </a:p>
           <a:p>
             <a:pPr marL="342900" indent="-342900">

</xml_diff>

<commit_message>
Add query object, update design, rename packages
</commit_message>
<xml_diff>
--- a/docs/design.pptx
+++ b/docs/design.pptx
@@ -258,7 +258,7 @@
           <a:p>
             <a:fld id="{30DA0606-474F-417C-8DB0-81402E3BEFB0}" type="datetimeFigureOut">
               <a:rPr lang="en-US" smtClean="0"/>
-              <a:t>4/21/2017</a:t>
+              <a:t>4/25/2017</a:t>
             </a:fld>
             <a:endParaRPr lang="en-US"/>
           </a:p>
@@ -428,7 +428,7 @@
           <a:p>
             <a:fld id="{30DA0606-474F-417C-8DB0-81402E3BEFB0}" type="datetimeFigureOut">
               <a:rPr lang="en-US" smtClean="0"/>
-              <a:t>4/21/2017</a:t>
+              <a:t>4/25/2017</a:t>
             </a:fld>
             <a:endParaRPr lang="en-US"/>
           </a:p>
@@ -608,7 +608,7 @@
           <a:p>
             <a:fld id="{30DA0606-474F-417C-8DB0-81402E3BEFB0}" type="datetimeFigureOut">
               <a:rPr lang="en-US" smtClean="0"/>
-              <a:t>4/21/2017</a:t>
+              <a:t>4/25/2017</a:t>
             </a:fld>
             <a:endParaRPr lang="en-US"/>
           </a:p>
@@ -778,7 +778,7 @@
           <a:p>
             <a:fld id="{30DA0606-474F-417C-8DB0-81402E3BEFB0}" type="datetimeFigureOut">
               <a:rPr lang="en-US" smtClean="0"/>
-              <a:t>4/21/2017</a:t>
+              <a:t>4/25/2017</a:t>
             </a:fld>
             <a:endParaRPr lang="en-US"/>
           </a:p>
@@ -1024,7 +1024,7 @@
           <a:p>
             <a:fld id="{30DA0606-474F-417C-8DB0-81402E3BEFB0}" type="datetimeFigureOut">
               <a:rPr lang="en-US" smtClean="0"/>
-              <a:t>4/21/2017</a:t>
+              <a:t>4/25/2017</a:t>
             </a:fld>
             <a:endParaRPr lang="en-US"/>
           </a:p>
@@ -1256,7 +1256,7 @@
           <a:p>
             <a:fld id="{30DA0606-474F-417C-8DB0-81402E3BEFB0}" type="datetimeFigureOut">
               <a:rPr lang="en-US" smtClean="0"/>
-              <a:t>4/21/2017</a:t>
+              <a:t>4/25/2017</a:t>
             </a:fld>
             <a:endParaRPr lang="en-US"/>
           </a:p>
@@ -1623,7 +1623,7 @@
           <a:p>
             <a:fld id="{30DA0606-474F-417C-8DB0-81402E3BEFB0}" type="datetimeFigureOut">
               <a:rPr lang="en-US" smtClean="0"/>
-              <a:t>4/21/2017</a:t>
+              <a:t>4/25/2017</a:t>
             </a:fld>
             <a:endParaRPr lang="en-US"/>
           </a:p>
@@ -1741,7 +1741,7 @@
           <a:p>
             <a:fld id="{30DA0606-474F-417C-8DB0-81402E3BEFB0}" type="datetimeFigureOut">
               <a:rPr lang="en-US" smtClean="0"/>
-              <a:t>4/21/2017</a:t>
+              <a:t>4/25/2017</a:t>
             </a:fld>
             <a:endParaRPr lang="en-US"/>
           </a:p>
@@ -1836,7 +1836,7 @@
           <a:p>
             <a:fld id="{30DA0606-474F-417C-8DB0-81402E3BEFB0}" type="datetimeFigureOut">
               <a:rPr lang="en-US" smtClean="0"/>
-              <a:t>4/21/2017</a:t>
+              <a:t>4/25/2017</a:t>
             </a:fld>
             <a:endParaRPr lang="en-US"/>
           </a:p>
@@ -2113,7 +2113,7 @@
           <a:p>
             <a:fld id="{30DA0606-474F-417C-8DB0-81402E3BEFB0}" type="datetimeFigureOut">
               <a:rPr lang="en-US" smtClean="0"/>
-              <a:t>4/21/2017</a:t>
+              <a:t>4/25/2017</a:t>
             </a:fld>
             <a:endParaRPr lang="en-US"/>
           </a:p>
@@ -2366,7 +2366,7 @@
           <a:p>
             <a:fld id="{30DA0606-474F-417C-8DB0-81402E3BEFB0}" type="datetimeFigureOut">
               <a:rPr lang="en-US" smtClean="0"/>
-              <a:t>4/21/2017</a:t>
+              <a:t>4/25/2017</a:t>
             </a:fld>
             <a:endParaRPr lang="en-US"/>
           </a:p>
@@ -2579,7 +2579,7 @@
           <a:p>
             <a:fld id="{30DA0606-474F-417C-8DB0-81402E3BEFB0}" type="datetimeFigureOut">
               <a:rPr lang="en-US" smtClean="0"/>
-              <a:t>4/21/2017</a:t>
+              <a:t>4/25/2017</a:t>
             </a:fld>
             <a:endParaRPr lang="en-US"/>
           </a:p>
@@ -4475,14 +4475,14 @@
           <p:nvPr>
             <p:extLst>
               <p:ext uri="{D42A27DB-BD31-4B8C-83A1-F6EECF244321}">
-                <p14:modId xmlns:p14="http://schemas.microsoft.com/office/powerpoint/2010/main" val="354500699"/>
+                <p14:modId xmlns:p14="http://schemas.microsoft.com/office/powerpoint/2010/main" val="4233675757"/>
               </p:ext>
             </p:extLst>
           </p:nvPr>
         </p:nvGraphicFramePr>
         <p:xfrm>
           <a:off x="2940178" y="789890"/>
-          <a:ext cx="6586376" cy="1311155"/>
+          <a:ext cx="6586376" cy="2560835"/>
         </p:xfrm>
         <a:graphic>
           <a:graphicData uri="http://schemas.openxmlformats.org/drawingml/2006/table">
@@ -4638,7 +4638,11 @@
                     <a:p>
                       <a:r>
                         <a:rPr lang="en-US" sz="1000" dirty="0" smtClean="0"/>
-                        <a:t>VARCHAR 255</a:t>
+                        <a:t>VARCHAR </a:t>
+                      </a:r>
+                      <a:r>
+                        <a:rPr lang="en-US" sz="1000" dirty="0" smtClean="0"/>
+                        <a:t>2048</a:t>
                       </a:r>
                       <a:endParaRPr lang="en-US" sz="1000" dirty="0"/>
                     </a:p>
@@ -4686,7 +4690,7 @@
                     <a:p>
                       <a:r>
                         <a:rPr lang="en-US" sz="1000" dirty="0" smtClean="0"/>
-                        <a:t>NAME</a:t>
+                        <a:t>name</a:t>
                       </a:r>
                       <a:endParaRPr lang="en-US" sz="1000" dirty="0"/>
                     </a:p>
@@ -4729,6 +4733,154 @@
                       <a:r>
                         <a:rPr lang="en-US" sz="1000" baseline="0" dirty="0" smtClean="0"/>
                         <a:t> identify a search by a name</a:t>
+                      </a:r>
+                      <a:endParaRPr lang="en-US" sz="1000" dirty="0"/>
+                    </a:p>
+                  </a:txBody>
+                  <a:tcPr/>
+                </a:tc>
+              </a:tr>
+              <a:tr h="274835">
+                <a:tc>
+                  <a:txBody>
+                    <a:bodyPr/>
+                    <a:lstStyle/>
+                    <a:p>
+                      <a:r>
+                        <a:rPr lang="en-US" sz="1000" dirty="0" err="1" smtClean="0"/>
+                        <a:t>max_pages</a:t>
+                      </a:r>
+                      <a:endParaRPr lang="en-US" sz="1000" dirty="0"/>
+                    </a:p>
+                  </a:txBody>
+                  <a:tcPr/>
+                </a:tc>
+                <a:tc>
+                  <a:txBody>
+                    <a:bodyPr/>
+                    <a:lstStyle/>
+                    <a:p>
+                      <a:r>
+                        <a:rPr lang="en-US" sz="1000" dirty="0" smtClean="0"/>
+                        <a:t>INT</a:t>
+                      </a:r>
+                      <a:endParaRPr lang="en-US" sz="1000" dirty="0"/>
+                    </a:p>
+                  </a:txBody>
+                  <a:tcPr/>
+                </a:tc>
+                <a:tc>
+                  <a:txBody>
+                    <a:bodyPr/>
+                    <a:lstStyle/>
+                    <a:p>
+                      <a:r>
+                        <a:rPr lang="en-US" sz="1000" dirty="0" smtClean="0"/>
+                        <a:t>not</a:t>
+                      </a:r>
+                      <a:r>
+                        <a:rPr lang="en-US" sz="1000" baseline="0" dirty="0" smtClean="0"/>
+                        <a:t> null</a:t>
+                      </a:r>
+                      <a:endParaRPr lang="en-US" sz="1000" dirty="0"/>
+                    </a:p>
+                  </a:txBody>
+                  <a:tcPr/>
+                </a:tc>
+                <a:tc>
+                  <a:txBody>
+                    <a:bodyPr/>
+                    <a:lstStyle/>
+                    <a:p>
+                      <a:r>
+                        <a:rPr lang="en-US" sz="1000" dirty="0" smtClean="0"/>
+                        <a:t>Maximum pages </a:t>
+                      </a:r>
+                      <a:r>
+                        <a:rPr lang="en-US" sz="1000" baseline="0" dirty="0" smtClean="0"/>
+                        <a:t>allowed to crawl for this search. Default to global </a:t>
+                      </a:r>
+                      <a:r>
+                        <a:rPr lang="en-US" sz="1000" baseline="0" dirty="0" err="1" smtClean="0"/>
+                        <a:t>config</a:t>
+                      </a:r>
+                      <a:r>
+                        <a:rPr lang="en-US" sz="1000" baseline="0" dirty="0" smtClean="0"/>
+                        <a:t> if not set</a:t>
+                      </a:r>
+                      <a:endParaRPr lang="en-US" sz="1000" dirty="0"/>
+                    </a:p>
+                  </a:txBody>
+                  <a:tcPr/>
+                </a:tc>
+              </a:tr>
+              <a:tr h="274835">
+                <a:tc>
+                  <a:txBody>
+                    <a:bodyPr/>
+                    <a:lstStyle/>
+                    <a:p>
+                      <a:r>
+                        <a:rPr lang="en-US" sz="1000" dirty="0" err="1" smtClean="0"/>
+                        <a:t>max_images</a:t>
+                      </a:r>
+                      <a:endParaRPr lang="en-US" sz="1000" dirty="0"/>
+                    </a:p>
+                  </a:txBody>
+                  <a:tcPr/>
+                </a:tc>
+                <a:tc>
+                  <a:txBody>
+                    <a:bodyPr/>
+                    <a:lstStyle/>
+                    <a:p>
+                      <a:r>
+                        <a:rPr lang="en-US" sz="1000" dirty="0" smtClean="0"/>
+                        <a:t>INT</a:t>
+                      </a:r>
+                      <a:endParaRPr lang="en-US" sz="1000" dirty="0"/>
+                    </a:p>
+                  </a:txBody>
+                  <a:tcPr/>
+                </a:tc>
+                <a:tc>
+                  <a:txBody>
+                    <a:bodyPr/>
+                    <a:lstStyle/>
+                    <a:p>
+                      <a:r>
+                        <a:rPr lang="en-US" sz="1000" dirty="0" smtClean="0"/>
+                        <a:t>not</a:t>
+                      </a:r>
+                      <a:r>
+                        <a:rPr lang="en-US" sz="1000" baseline="0" dirty="0" smtClean="0"/>
+                        <a:t> null</a:t>
+                      </a:r>
+                      <a:endParaRPr lang="en-US" sz="1000" dirty="0"/>
+                    </a:p>
+                  </a:txBody>
+                  <a:tcPr/>
+                </a:tc>
+                <a:tc>
+                  <a:txBody>
+                    <a:bodyPr/>
+                    <a:lstStyle/>
+                    <a:p>
+                      <a:r>
+                        <a:rPr lang="en-US" sz="1000" dirty="0" smtClean="0"/>
+                        <a:t>Maximum images</a:t>
+                      </a:r>
+                      <a:r>
+                        <a:rPr lang="en-US" sz="1000" baseline="0" dirty="0" smtClean="0"/>
+                        <a:t> to crawl for this search. Default to global </a:t>
+                      </a:r>
+                      <a:r>
+                        <a:rPr lang="en-US" sz="1000" baseline="0" dirty="0" err="1" smtClean="0"/>
+                        <a:t>config</a:t>
+                      </a:r>
+                      <a:r>
+                        <a:rPr lang="en-US" sz="1000" baseline="0" dirty="0" smtClean="0"/>
+                        <a:t> if not set</a:t>
                       </a:r>
                       <a:endParaRPr lang="en-US" sz="1000" dirty="0"/>
                     </a:p>
@@ -4778,7 +4930,7 @@
         <p:spPr>
           <a:xfrm>
             <a:off x="569582" y="1247347"/>
-            <a:ext cx="1390261" cy="553998"/>
+            <a:ext cx="1390261" cy="1015663"/>
           </a:xfrm>
           <a:prstGeom prst="rect">
             <a:avLst/>
@@ -4793,7 +4945,11 @@
           <a:p>
             <a:r>
               <a:rPr lang="en-US" sz="1000" dirty="0" smtClean="0"/>
-              <a:t>A query performed by a user. Query objects are saved</a:t>
+              <a:t>A query performed by a user. Query objects are </a:t>
+            </a:r>
+            <a:r>
+              <a:rPr lang="en-US" sz="1000" dirty="0" smtClean="0"/>
+              <a:t>saved. Also contains the parameters for this query</a:t>
             </a:r>
             <a:endParaRPr lang="en-US" sz="1000" dirty="0"/>
           </a:p>
@@ -4808,13 +4964,13 @@
           <p:nvPr>
             <p:extLst>
               <p:ext uri="{D42A27DB-BD31-4B8C-83A1-F6EECF244321}">
-                <p14:modId xmlns:p14="http://schemas.microsoft.com/office/powerpoint/2010/main" val="3687414839"/>
+                <p14:modId xmlns:p14="http://schemas.microsoft.com/office/powerpoint/2010/main" val="772418568"/>
               </p:ext>
             </p:extLst>
           </p:nvPr>
         </p:nvGraphicFramePr>
         <p:xfrm>
-          <a:off x="2940178" y="2698563"/>
+          <a:off x="2940178" y="3808905"/>
           <a:ext cx="6586376" cy="1341120"/>
         </p:xfrm>
         <a:graphic>
@@ -5057,7 +5213,7 @@
         </p:nvSpPr>
         <p:spPr>
           <a:xfrm>
-            <a:off x="569582" y="2586384"/>
+            <a:off x="569582" y="3696726"/>
             <a:ext cx="1633460" cy="369332"/>
           </a:xfrm>
           <a:prstGeom prst="rect">
@@ -5086,7 +5242,7 @@
         </p:nvSpPr>
         <p:spPr>
           <a:xfrm>
-            <a:off x="691181" y="3077141"/>
+            <a:off x="691181" y="4187483"/>
             <a:ext cx="1390261" cy="707886"/>
           </a:xfrm>
           <a:prstGeom prst="rect">
@@ -5906,11 +6062,7 @@
                     <a:p>
                       <a:r>
                         <a:rPr lang="en-US" sz="1000" dirty="0" smtClean="0"/>
-                        <a:t>VARCHAR </a:t>
-                      </a:r>
-                      <a:r>
-                        <a:rPr lang="en-US" sz="1000" dirty="0" smtClean="0"/>
-                        <a:t>2048</a:t>
+                        <a:t>VARCHAR 2048</a:t>
                       </a:r>
                       <a:endParaRPr lang="en-US" sz="1000" dirty="0"/>
                     </a:p>

</xml_diff>

<commit_message>
update design, add request messages
</commit_message>
<xml_diff>
--- a/docs/design.pptx
+++ b/docs/design.pptx
@@ -258,7 +258,7 @@
           <a:p>
             <a:fld id="{30DA0606-474F-417C-8DB0-81402E3BEFB0}" type="datetimeFigureOut">
               <a:rPr lang="en-US" smtClean="0"/>
-              <a:t>4/27/2017</a:t>
+              <a:t>5/3/2017</a:t>
             </a:fld>
             <a:endParaRPr lang="en-US"/>
           </a:p>
@@ -428,7 +428,7 @@
           <a:p>
             <a:fld id="{30DA0606-474F-417C-8DB0-81402E3BEFB0}" type="datetimeFigureOut">
               <a:rPr lang="en-US" smtClean="0"/>
-              <a:t>4/27/2017</a:t>
+              <a:t>5/3/2017</a:t>
             </a:fld>
             <a:endParaRPr lang="en-US"/>
           </a:p>
@@ -608,7 +608,7 @@
           <a:p>
             <a:fld id="{30DA0606-474F-417C-8DB0-81402E3BEFB0}" type="datetimeFigureOut">
               <a:rPr lang="en-US" smtClean="0"/>
-              <a:t>4/27/2017</a:t>
+              <a:t>5/3/2017</a:t>
             </a:fld>
             <a:endParaRPr lang="en-US"/>
           </a:p>
@@ -778,7 +778,7 @@
           <a:p>
             <a:fld id="{30DA0606-474F-417C-8DB0-81402E3BEFB0}" type="datetimeFigureOut">
               <a:rPr lang="en-US" smtClean="0"/>
-              <a:t>4/27/2017</a:t>
+              <a:t>5/3/2017</a:t>
             </a:fld>
             <a:endParaRPr lang="en-US"/>
           </a:p>
@@ -1024,7 +1024,7 @@
           <a:p>
             <a:fld id="{30DA0606-474F-417C-8DB0-81402E3BEFB0}" type="datetimeFigureOut">
               <a:rPr lang="en-US" smtClean="0"/>
-              <a:t>4/27/2017</a:t>
+              <a:t>5/3/2017</a:t>
             </a:fld>
             <a:endParaRPr lang="en-US"/>
           </a:p>
@@ -1256,7 +1256,7 @@
           <a:p>
             <a:fld id="{30DA0606-474F-417C-8DB0-81402E3BEFB0}" type="datetimeFigureOut">
               <a:rPr lang="en-US" smtClean="0"/>
-              <a:t>4/27/2017</a:t>
+              <a:t>5/3/2017</a:t>
             </a:fld>
             <a:endParaRPr lang="en-US"/>
           </a:p>
@@ -1623,7 +1623,7 @@
           <a:p>
             <a:fld id="{30DA0606-474F-417C-8DB0-81402E3BEFB0}" type="datetimeFigureOut">
               <a:rPr lang="en-US" smtClean="0"/>
-              <a:t>4/27/2017</a:t>
+              <a:t>5/3/2017</a:t>
             </a:fld>
             <a:endParaRPr lang="en-US"/>
           </a:p>
@@ -1741,7 +1741,7 @@
           <a:p>
             <a:fld id="{30DA0606-474F-417C-8DB0-81402E3BEFB0}" type="datetimeFigureOut">
               <a:rPr lang="en-US" smtClean="0"/>
-              <a:t>4/27/2017</a:t>
+              <a:t>5/3/2017</a:t>
             </a:fld>
             <a:endParaRPr lang="en-US"/>
           </a:p>
@@ -1836,7 +1836,7 @@
           <a:p>
             <a:fld id="{30DA0606-474F-417C-8DB0-81402E3BEFB0}" type="datetimeFigureOut">
               <a:rPr lang="en-US" smtClean="0"/>
-              <a:t>4/27/2017</a:t>
+              <a:t>5/3/2017</a:t>
             </a:fld>
             <a:endParaRPr lang="en-US"/>
           </a:p>
@@ -2113,7 +2113,7 @@
           <a:p>
             <a:fld id="{30DA0606-474F-417C-8DB0-81402E3BEFB0}" type="datetimeFigureOut">
               <a:rPr lang="en-US" smtClean="0"/>
-              <a:t>4/27/2017</a:t>
+              <a:t>5/3/2017</a:t>
             </a:fld>
             <a:endParaRPr lang="en-US"/>
           </a:p>
@@ -2366,7 +2366,7 @@
           <a:p>
             <a:fld id="{30DA0606-474F-417C-8DB0-81402E3BEFB0}" type="datetimeFigureOut">
               <a:rPr lang="en-US" smtClean="0"/>
-              <a:t>4/27/2017</a:t>
+              <a:t>5/3/2017</a:t>
             </a:fld>
             <a:endParaRPr lang="en-US"/>
           </a:p>
@@ -2579,7 +2579,7 @@
           <a:p>
             <a:fld id="{30DA0606-474F-417C-8DB0-81402E3BEFB0}" type="datetimeFigureOut">
               <a:rPr lang="en-US" smtClean="0"/>
-              <a:t>4/27/2017</a:t>
+              <a:t>5/3/2017</a:t>
             </a:fld>
             <a:endParaRPr lang="en-US"/>
           </a:p>
@@ -7419,7 +7419,7 @@
         <p:spPr>
           <a:xfrm>
             <a:off x="503852" y="625151"/>
-            <a:ext cx="10608906" cy="4001095"/>
+            <a:ext cx="10608906" cy="4278094"/>
           </a:xfrm>
           <a:prstGeom prst="rect">
             <a:avLst/>
@@ -7492,8 +7492,35 @@
           </a:p>
           <a:p>
             <a:r>
+              <a:rPr lang="en-US"/>
+              <a:t>    </a:t>
+            </a:r>
+            <a:r>
+              <a:rPr lang="en-US" smtClean="0"/>
+              <a:t>QUERY </a:t>
+            </a:r>
+            <a:r>
+              <a:rPr lang="en-US"/>
+              <a:t>ID,</a:t>
+            </a:r>
+            <a:endParaRPr lang="en-US" dirty="0" smtClean="0"/>
+          </a:p>
+          <a:p>
+            <a:r>
               <a:rPr lang="en-US" dirty="0"/>
-              <a:t>    IMG URL,</a:t>
+              <a:t> </a:t>
+            </a:r>
+            <a:r>
+              <a:rPr lang="en-US" dirty="0" smtClean="0"/>
+              <a:t>   </a:t>
+            </a:r>
+            <a:r>
+              <a:rPr lang="en-US" dirty="0" smtClean="0"/>
+              <a:t>IMG </a:t>
+            </a:r>
+            <a:r>
+              <a:rPr lang="en-US" dirty="0"/>
+              <a:t>URL,</a:t>
             </a:r>
           </a:p>
           <a:p>

</xml_diff>

<commit_message>
More refacting, work on the engine
</commit_message>
<xml_diff>
--- a/docs/design.pptx
+++ b/docs/design.pptx
@@ -258,7 +258,7 @@
           <a:p>
             <a:fld id="{30DA0606-474F-417C-8DB0-81402E3BEFB0}" type="datetimeFigureOut">
               <a:rPr lang="en-US" smtClean="0"/>
-              <a:t>5/3/2017</a:t>
+              <a:t>5/4/2017</a:t>
             </a:fld>
             <a:endParaRPr lang="en-US"/>
           </a:p>
@@ -428,7 +428,7 @@
           <a:p>
             <a:fld id="{30DA0606-474F-417C-8DB0-81402E3BEFB0}" type="datetimeFigureOut">
               <a:rPr lang="en-US" smtClean="0"/>
-              <a:t>5/3/2017</a:t>
+              <a:t>5/4/2017</a:t>
             </a:fld>
             <a:endParaRPr lang="en-US"/>
           </a:p>
@@ -608,7 +608,7 @@
           <a:p>
             <a:fld id="{30DA0606-474F-417C-8DB0-81402E3BEFB0}" type="datetimeFigureOut">
               <a:rPr lang="en-US" smtClean="0"/>
-              <a:t>5/3/2017</a:t>
+              <a:t>5/4/2017</a:t>
             </a:fld>
             <a:endParaRPr lang="en-US"/>
           </a:p>
@@ -778,7 +778,7 @@
           <a:p>
             <a:fld id="{30DA0606-474F-417C-8DB0-81402E3BEFB0}" type="datetimeFigureOut">
               <a:rPr lang="en-US" smtClean="0"/>
-              <a:t>5/3/2017</a:t>
+              <a:t>5/4/2017</a:t>
             </a:fld>
             <a:endParaRPr lang="en-US"/>
           </a:p>
@@ -1024,7 +1024,7 @@
           <a:p>
             <a:fld id="{30DA0606-474F-417C-8DB0-81402E3BEFB0}" type="datetimeFigureOut">
               <a:rPr lang="en-US" smtClean="0"/>
-              <a:t>5/3/2017</a:t>
+              <a:t>5/4/2017</a:t>
             </a:fld>
             <a:endParaRPr lang="en-US"/>
           </a:p>
@@ -1256,7 +1256,7 @@
           <a:p>
             <a:fld id="{30DA0606-474F-417C-8DB0-81402E3BEFB0}" type="datetimeFigureOut">
               <a:rPr lang="en-US" smtClean="0"/>
-              <a:t>5/3/2017</a:t>
+              <a:t>5/4/2017</a:t>
             </a:fld>
             <a:endParaRPr lang="en-US"/>
           </a:p>
@@ -1623,7 +1623,7 @@
           <a:p>
             <a:fld id="{30DA0606-474F-417C-8DB0-81402E3BEFB0}" type="datetimeFigureOut">
               <a:rPr lang="en-US" smtClean="0"/>
-              <a:t>5/3/2017</a:t>
+              <a:t>5/4/2017</a:t>
             </a:fld>
             <a:endParaRPr lang="en-US"/>
           </a:p>
@@ -1741,7 +1741,7 @@
           <a:p>
             <a:fld id="{30DA0606-474F-417C-8DB0-81402E3BEFB0}" type="datetimeFigureOut">
               <a:rPr lang="en-US" smtClean="0"/>
-              <a:t>5/3/2017</a:t>
+              <a:t>5/4/2017</a:t>
             </a:fld>
             <a:endParaRPr lang="en-US"/>
           </a:p>
@@ -1836,7 +1836,7 @@
           <a:p>
             <a:fld id="{30DA0606-474F-417C-8DB0-81402E3BEFB0}" type="datetimeFigureOut">
               <a:rPr lang="en-US" smtClean="0"/>
-              <a:t>5/3/2017</a:t>
+              <a:t>5/4/2017</a:t>
             </a:fld>
             <a:endParaRPr lang="en-US"/>
           </a:p>
@@ -2113,7 +2113,7 @@
           <a:p>
             <a:fld id="{30DA0606-474F-417C-8DB0-81402E3BEFB0}" type="datetimeFigureOut">
               <a:rPr lang="en-US" smtClean="0"/>
-              <a:t>5/3/2017</a:t>
+              <a:t>5/4/2017</a:t>
             </a:fld>
             <a:endParaRPr lang="en-US"/>
           </a:p>
@@ -2366,7 +2366,7 @@
           <a:p>
             <a:fld id="{30DA0606-474F-417C-8DB0-81402E3BEFB0}" type="datetimeFigureOut">
               <a:rPr lang="en-US" smtClean="0"/>
-              <a:t>5/3/2017</a:t>
+              <a:t>5/4/2017</a:t>
             </a:fld>
             <a:endParaRPr lang="en-US"/>
           </a:p>
@@ -2579,7 +2579,7 @@
           <a:p>
             <a:fld id="{30DA0606-474F-417C-8DB0-81402E3BEFB0}" type="datetimeFigureOut">
               <a:rPr lang="en-US" smtClean="0"/>
-              <a:t>5/3/2017</a:t>
+              <a:t>5/4/2017</a:t>
             </a:fld>
             <a:endParaRPr lang="en-US"/>
           </a:p>
@@ -6252,14 +6252,14 @@
           <p:nvPr>
             <p:extLst>
               <p:ext uri="{D42A27DB-BD31-4B8C-83A1-F6EECF244321}">
-                <p14:modId xmlns:p14="http://schemas.microsoft.com/office/powerpoint/2010/main" val="3618205143"/>
+                <p14:modId xmlns:p14="http://schemas.microsoft.com/office/powerpoint/2010/main" val="1505845733"/>
               </p:ext>
             </p:extLst>
           </p:nvPr>
         </p:nvGraphicFramePr>
         <p:xfrm>
           <a:off x="2940178" y="789890"/>
-          <a:ext cx="6586376" cy="2135660"/>
+          <a:ext cx="6586376" cy="2410495"/>
         </p:xfrm>
         <a:graphic>
           <a:graphicData uri="http://schemas.openxmlformats.org/drawingml/2006/table">
@@ -6423,6 +6423,14 @@
                     <a:bodyPr/>
                     <a:lstStyle/>
                     <a:p>
+                      <a:r>
+                        <a:rPr lang="en-US" sz="1000" dirty="0" smtClean="0"/>
+                        <a:t>Default</a:t>
+                      </a:r>
+                      <a:r>
+                        <a:rPr lang="en-US" sz="1000" baseline="0" dirty="0" smtClean="0"/>
+                        <a:t> = 50</a:t>
+                      </a:r>
                       <a:endParaRPr lang="en-US" sz="1000" dirty="0"/>
                     </a:p>
                   </a:txBody>
@@ -6477,6 +6485,14 @@
                     <a:bodyPr/>
                     <a:lstStyle/>
                     <a:p>
+                      <a:r>
+                        <a:rPr lang="en-US" sz="1000" dirty="0" smtClean="0"/>
+                        <a:t>Default</a:t>
+                      </a:r>
+                      <a:r>
+                        <a:rPr lang="en-US" sz="1000" baseline="0" dirty="0" smtClean="0"/>
+                        <a:t> = 1000</a:t>
+                      </a:r>
                       <a:endParaRPr lang="en-US" sz="1000" dirty="0"/>
                     </a:p>
                   </a:txBody>
@@ -6531,6 +6547,14 @@
                     <a:bodyPr/>
                     <a:lstStyle/>
                     <a:p>
+                      <a:r>
+                        <a:rPr lang="en-US" sz="1000" dirty="0" smtClean="0"/>
+                        <a:t>not</a:t>
+                      </a:r>
+                      <a:r>
+                        <a:rPr lang="en-US" sz="1000" baseline="0" dirty="0" smtClean="0"/>
+                        <a:t> null</a:t>
+                      </a:r>
                       <a:endParaRPr lang="en-US" sz="1000" dirty="0"/>
                     </a:p>
                   </a:txBody>
@@ -6606,16 +6630,6 @@
                     <a:bodyPr/>
                     <a:lstStyle/>
                     <a:p>
-                      <a:endParaRPr lang="en-US" sz="1000" dirty="0"/>
-                    </a:p>
-                  </a:txBody>
-                  <a:tcPr/>
-                </a:tc>
-                <a:tc>
-                  <a:txBody>
-                    <a:bodyPr/>
-                    <a:lstStyle/>
-                    <a:p>
                       <a:pPr marL="0" marR="0" lvl="0" indent="0" algn="l" defTabSz="914400" rtl="0" eaLnBrk="1" fontAlgn="auto" latinLnBrk="0" hangingPunct="1">
                         <a:lnSpc>
                           <a:spcPct val="100000"/>
@@ -6635,51 +6649,14 @@
                       </a:pPr>
                       <a:r>
                         <a:rPr lang="en-US" sz="1000" dirty="0" smtClean="0"/>
-                        <a:t>Sort preferences,</a:t>
+                        <a:t>not</a:t>
                       </a:r>
                       <a:r>
                         <a:rPr lang="en-US" sz="1000" baseline="0" dirty="0" smtClean="0"/>
-                        <a:t> delimited by comma</a:t>
+                        <a:t> null</a:t>
                       </a:r>
                       <a:endParaRPr lang="en-US" sz="1000" dirty="0" smtClean="0"/>
                     </a:p>
-                  </a:txBody>
-                  <a:tcPr/>
-                </a:tc>
-              </a:tr>
-              <a:tr h="274835">
-                <a:tc>
-                  <a:txBody>
-                    <a:bodyPr/>
-                    <a:lstStyle/>
-                    <a:p>
-                      <a:r>
-                        <a:rPr lang="en-US" sz="1000" dirty="0" err="1" smtClean="0"/>
-                        <a:t>log_level</a:t>
-                      </a:r>
-                      <a:endParaRPr lang="en-US" sz="1000" dirty="0"/>
-                    </a:p>
-                  </a:txBody>
-                  <a:tcPr/>
-                </a:tc>
-                <a:tc>
-                  <a:txBody>
-                    <a:bodyPr/>
-                    <a:lstStyle/>
-                    <a:p>
-                      <a:r>
-                        <a:rPr lang="en-US" sz="1000" dirty="0" smtClean="0"/>
-                        <a:t>VARCHAR 10</a:t>
-                      </a:r>
-                      <a:endParaRPr lang="en-US" sz="1000" dirty="0"/>
-                    </a:p>
-                  </a:txBody>
-                  <a:tcPr/>
-                </a:tc>
-                <a:tc>
-                  <a:txBody>
-                    <a:bodyPr/>
-                    <a:lstStyle/>
                     <a:p>
                       <a:endParaRPr lang="en-US" sz="1000" dirty="0"/>
                     </a:p>
@@ -6710,11 +6687,165 @@
                       </a:pPr>
                       <a:r>
                         <a:rPr lang="en-US" sz="1000" dirty="0" smtClean="0"/>
+                        <a:t>Sort preferences,</a:t>
+                      </a:r>
+                      <a:r>
+                        <a:rPr lang="en-US" sz="1000" baseline="0" dirty="0" smtClean="0"/>
+                        <a:t> delimited by comma</a:t>
+                      </a:r>
+                      <a:endParaRPr lang="en-US" sz="1000" dirty="0" smtClean="0"/>
+                    </a:p>
+                  </a:txBody>
+                  <a:tcPr/>
+                </a:tc>
+              </a:tr>
+              <a:tr h="274835">
+                <a:tc>
+                  <a:txBody>
+                    <a:bodyPr/>
+                    <a:lstStyle/>
+                    <a:p>
+                      <a:r>
+                        <a:rPr lang="en-US" sz="1000" dirty="0" err="1" smtClean="0"/>
+                        <a:t>log_level</a:t>
+                      </a:r>
+                      <a:endParaRPr lang="en-US" sz="1000" dirty="0"/>
+                    </a:p>
+                  </a:txBody>
+                  <a:tcPr/>
+                </a:tc>
+                <a:tc>
+                  <a:txBody>
+                    <a:bodyPr/>
+                    <a:lstStyle/>
+                    <a:p>
+                      <a:r>
+                        <a:rPr lang="en-US" sz="1000" dirty="0" smtClean="0"/>
+                        <a:t>VARCHAR 10</a:t>
+                      </a:r>
+                      <a:endParaRPr lang="en-US" sz="1000" dirty="0"/>
+                    </a:p>
+                  </a:txBody>
+                  <a:tcPr/>
+                </a:tc>
+                <a:tc>
+                  <a:txBody>
+                    <a:bodyPr/>
+                    <a:lstStyle/>
+                    <a:p>
+                      <a:r>
+                        <a:rPr lang="en-US" sz="1000" smtClean="0"/>
+                        <a:t>Default=info</a:t>
+                      </a:r>
+                      <a:endParaRPr lang="en-US" sz="1000" dirty="0"/>
+                    </a:p>
+                  </a:txBody>
+                  <a:tcPr/>
+                </a:tc>
+                <a:tc>
+                  <a:txBody>
+                    <a:bodyPr/>
+                    <a:lstStyle/>
+                    <a:p>
+                      <a:pPr marL="0" marR="0" lvl="0" indent="0" algn="l" defTabSz="914400" rtl="0" eaLnBrk="1" fontAlgn="auto" latinLnBrk="0" hangingPunct="1">
+                        <a:lnSpc>
+                          <a:spcPct val="100000"/>
+                        </a:lnSpc>
+                        <a:spcBef>
+                          <a:spcPts val="0"/>
+                        </a:spcBef>
+                        <a:spcAft>
+                          <a:spcPts val="0"/>
+                        </a:spcAft>
+                        <a:buClrTx/>
+                        <a:buSzTx/>
+                        <a:buFontTx/>
+                        <a:buNone/>
+                        <a:tabLst/>
+                        <a:defRPr/>
+                      </a:pPr>
+                      <a:r>
+                        <a:rPr lang="en-US" sz="1000" dirty="0" smtClean="0"/>
                         <a:t>Desired</a:t>
                       </a:r>
                       <a:r>
                         <a:rPr lang="en-US" sz="1000" baseline="0" dirty="0" smtClean="0"/>
                         <a:t> log level</a:t>
+                      </a:r>
+                      <a:endParaRPr lang="en-US" sz="1000" dirty="0" smtClean="0"/>
+                    </a:p>
+                  </a:txBody>
+                  <a:tcPr/>
+                </a:tc>
+              </a:tr>
+              <a:tr h="274835">
+                <a:tc>
+                  <a:txBody>
+                    <a:bodyPr/>
+                    <a:lstStyle/>
+                    <a:p>
+                      <a:r>
+                        <a:rPr lang="en-US" sz="1000" dirty="0" smtClean="0"/>
+                        <a:t>Threads</a:t>
+                      </a:r>
+                      <a:endParaRPr lang="en-US" sz="1000" dirty="0"/>
+                    </a:p>
+                  </a:txBody>
+                  <a:tcPr/>
+                </a:tc>
+                <a:tc>
+                  <a:txBody>
+                    <a:bodyPr/>
+                    <a:lstStyle/>
+                    <a:p>
+                      <a:r>
+                        <a:rPr lang="en-US" sz="1000" dirty="0" smtClean="0"/>
+                        <a:t>INT</a:t>
+                      </a:r>
+                      <a:endParaRPr lang="en-US" sz="1000" dirty="0"/>
+                    </a:p>
+                  </a:txBody>
+                  <a:tcPr/>
+                </a:tc>
+                <a:tc>
+                  <a:txBody>
+                    <a:bodyPr/>
+                    <a:lstStyle/>
+                    <a:p>
+                      <a:r>
+                        <a:rPr lang="en-US" sz="1000" dirty="0" smtClean="0"/>
+                        <a:t>Not null</a:t>
+                      </a:r>
+                      <a:endParaRPr lang="en-US" sz="1000" dirty="0"/>
+                    </a:p>
+                  </a:txBody>
+                  <a:tcPr/>
+                </a:tc>
+                <a:tc>
+                  <a:txBody>
+                    <a:bodyPr/>
+                    <a:lstStyle/>
+                    <a:p>
+                      <a:pPr marL="0" marR="0" lvl="0" indent="0" algn="l" defTabSz="914400" rtl="0" eaLnBrk="1" fontAlgn="auto" latinLnBrk="0" hangingPunct="1">
+                        <a:lnSpc>
+                          <a:spcPct val="100000"/>
+                        </a:lnSpc>
+                        <a:spcBef>
+                          <a:spcPts val="0"/>
+                        </a:spcBef>
+                        <a:spcAft>
+                          <a:spcPts val="0"/>
+                        </a:spcAft>
+                        <a:buClrTx/>
+                        <a:buSzTx/>
+                        <a:buFontTx/>
+                        <a:buNone/>
+                        <a:tabLst/>
+                        <a:defRPr/>
+                      </a:pPr>
+                      <a:r>
+                        <a:rPr lang="en-US" sz="1000" dirty="0" smtClean="0"/>
+                        <a:t>Maximum</a:t>
                       </a:r>
                       <a:endParaRPr lang="en-US" sz="1000" dirty="0" smtClean="0"/>
                     </a:p>
@@ -7492,15 +7623,15 @@
           </a:p>
           <a:p>
             <a:r>
-              <a:rPr lang="en-US"/>
+              <a:rPr lang="en-US" dirty="0"/>
               <a:t>    </a:t>
             </a:r>
             <a:r>
-              <a:rPr lang="en-US" smtClean="0"/>
+              <a:rPr lang="en-US" dirty="0" smtClean="0"/>
               <a:t>QUERY </a:t>
             </a:r>
             <a:r>
-              <a:rPr lang="en-US"/>
+              <a:rPr lang="en-US" dirty="0"/>
               <a:t>ID,</a:t>
             </a:r>
             <a:endParaRPr lang="en-US" dirty="0" smtClean="0"/>
@@ -7512,11 +7643,7 @@
             </a:r>
             <a:r>
               <a:rPr lang="en-US" dirty="0" smtClean="0"/>
-              <a:t>   </a:t>
-            </a:r>
-            <a:r>
-              <a:rPr lang="en-US" dirty="0" smtClean="0"/>
-              <a:t>IMG </a:t>
+              <a:t>   IMG </a:t>
             </a:r>
             <a:r>
               <a:rPr lang="en-US" dirty="0"/>

</xml_diff>

<commit_message>
Add to refactored page parsing
</commit_message>
<xml_diff>
--- a/docs/design.pptx
+++ b/docs/design.pptx
@@ -258,7 +258,7 @@
           <a:p>
             <a:fld id="{30DA0606-474F-417C-8DB0-81402E3BEFB0}" type="datetimeFigureOut">
               <a:rPr lang="en-US" smtClean="0"/>
-              <a:t>5/4/2017</a:t>
+              <a:t>5/6/2017</a:t>
             </a:fld>
             <a:endParaRPr lang="en-US"/>
           </a:p>
@@ -428,7 +428,7 @@
           <a:p>
             <a:fld id="{30DA0606-474F-417C-8DB0-81402E3BEFB0}" type="datetimeFigureOut">
               <a:rPr lang="en-US" smtClean="0"/>
-              <a:t>5/4/2017</a:t>
+              <a:t>5/6/2017</a:t>
             </a:fld>
             <a:endParaRPr lang="en-US"/>
           </a:p>
@@ -608,7 +608,7 @@
           <a:p>
             <a:fld id="{30DA0606-474F-417C-8DB0-81402E3BEFB0}" type="datetimeFigureOut">
               <a:rPr lang="en-US" smtClean="0"/>
-              <a:t>5/4/2017</a:t>
+              <a:t>5/6/2017</a:t>
             </a:fld>
             <a:endParaRPr lang="en-US"/>
           </a:p>
@@ -778,7 +778,7 @@
           <a:p>
             <a:fld id="{30DA0606-474F-417C-8DB0-81402E3BEFB0}" type="datetimeFigureOut">
               <a:rPr lang="en-US" smtClean="0"/>
-              <a:t>5/4/2017</a:t>
+              <a:t>5/6/2017</a:t>
             </a:fld>
             <a:endParaRPr lang="en-US"/>
           </a:p>
@@ -1024,7 +1024,7 @@
           <a:p>
             <a:fld id="{30DA0606-474F-417C-8DB0-81402E3BEFB0}" type="datetimeFigureOut">
               <a:rPr lang="en-US" smtClean="0"/>
-              <a:t>5/4/2017</a:t>
+              <a:t>5/6/2017</a:t>
             </a:fld>
             <a:endParaRPr lang="en-US"/>
           </a:p>
@@ -1256,7 +1256,7 @@
           <a:p>
             <a:fld id="{30DA0606-474F-417C-8DB0-81402E3BEFB0}" type="datetimeFigureOut">
               <a:rPr lang="en-US" smtClean="0"/>
-              <a:t>5/4/2017</a:t>
+              <a:t>5/6/2017</a:t>
             </a:fld>
             <a:endParaRPr lang="en-US"/>
           </a:p>
@@ -1623,7 +1623,7 @@
           <a:p>
             <a:fld id="{30DA0606-474F-417C-8DB0-81402E3BEFB0}" type="datetimeFigureOut">
               <a:rPr lang="en-US" smtClean="0"/>
-              <a:t>5/4/2017</a:t>
+              <a:t>5/6/2017</a:t>
             </a:fld>
             <a:endParaRPr lang="en-US"/>
           </a:p>
@@ -1741,7 +1741,7 @@
           <a:p>
             <a:fld id="{30DA0606-474F-417C-8DB0-81402E3BEFB0}" type="datetimeFigureOut">
               <a:rPr lang="en-US" smtClean="0"/>
-              <a:t>5/4/2017</a:t>
+              <a:t>5/6/2017</a:t>
             </a:fld>
             <a:endParaRPr lang="en-US"/>
           </a:p>
@@ -1836,7 +1836,7 @@
           <a:p>
             <a:fld id="{30DA0606-474F-417C-8DB0-81402E3BEFB0}" type="datetimeFigureOut">
               <a:rPr lang="en-US" smtClean="0"/>
-              <a:t>5/4/2017</a:t>
+              <a:t>5/6/2017</a:t>
             </a:fld>
             <a:endParaRPr lang="en-US"/>
           </a:p>
@@ -2113,7 +2113,7 @@
           <a:p>
             <a:fld id="{30DA0606-474F-417C-8DB0-81402E3BEFB0}" type="datetimeFigureOut">
               <a:rPr lang="en-US" smtClean="0"/>
-              <a:t>5/4/2017</a:t>
+              <a:t>5/6/2017</a:t>
             </a:fld>
             <a:endParaRPr lang="en-US"/>
           </a:p>
@@ -2366,7 +2366,7 @@
           <a:p>
             <a:fld id="{30DA0606-474F-417C-8DB0-81402E3BEFB0}" type="datetimeFigureOut">
               <a:rPr lang="en-US" smtClean="0"/>
-              <a:t>5/4/2017</a:t>
+              <a:t>5/6/2017</a:t>
             </a:fld>
             <a:endParaRPr lang="en-US"/>
           </a:p>
@@ -2579,7 +2579,7 @@
           <a:p>
             <a:fld id="{30DA0606-474F-417C-8DB0-81402E3BEFB0}" type="datetimeFigureOut">
               <a:rPr lang="en-US" smtClean="0"/>
-              <a:t>5/4/2017</a:t>
+              <a:t>5/6/2017</a:t>
             </a:fld>
             <a:endParaRPr lang="en-US"/>
           </a:p>
@@ -3240,7 +3240,7 @@
           <p:nvPr>
             <p:extLst>
               <p:ext uri="{D42A27DB-BD31-4B8C-83A1-F6EECF244321}">
-                <p14:modId xmlns:p14="http://schemas.microsoft.com/office/powerpoint/2010/main" val="2130030807"/>
+                <p14:modId xmlns:p14="http://schemas.microsoft.com/office/powerpoint/2010/main" val="601432222"/>
               </p:ext>
             </p:extLst>
           </p:nvPr>
@@ -3717,31 +3717,23 @@
                     <a:bodyPr/>
                     <a:lstStyle/>
                     <a:p>
-                      <a:r>
-                        <a:rPr lang="en-US" sz="1000" dirty="0" smtClean="0"/>
-                        <a:t>Not null</a:t>
-                      </a:r>
-                      <a:endParaRPr lang="en-US" sz="1000" dirty="0"/>
-                    </a:p>
-                  </a:txBody>
-                  <a:tcPr/>
-                </a:tc>
-                <a:tc>
-                  <a:txBody>
-                    <a:bodyPr/>
-                    <a:lstStyle/>
-                    <a:p>
-                      <a:r>
-                        <a:rPr lang="en-US" sz="1000" dirty="0" smtClean="0"/>
-                        <a:t>Last </a:t>
-                      </a:r>
+                      <a:endParaRPr lang="en-US" sz="1000" dirty="0"/>
+                    </a:p>
+                  </a:txBody>
+                  <a:tcPr/>
+                </a:tc>
+                <a:tc>
+                  <a:txBody>
+                    <a:bodyPr/>
+                    <a:lstStyle/>
+                    <a:p>
                       <a:r>
                         <a:rPr lang="en-US" sz="1000" dirty="0" err="1" smtClean="0"/>
-                        <a:t>etag</a:t>
-                      </a:r>
-                      <a:r>
-                        <a:rPr lang="en-US" sz="1000" dirty="0" smtClean="0"/>
-                        <a:t> of URL</a:t>
+                        <a:t>Etag</a:t>
+                      </a:r>
+                      <a:r>
+                        <a:rPr lang="en-US" sz="1000" dirty="0" smtClean="0"/>
+                        <a:t> of image</a:t>
                       </a:r>
                       <a:endParaRPr lang="en-US" sz="1000" dirty="0"/>
                     </a:p>
@@ -5578,7 +5570,7 @@
           <p:nvPr>
             <p:extLst>
               <p:ext uri="{D42A27DB-BD31-4B8C-83A1-F6EECF244321}">
-                <p14:modId xmlns:p14="http://schemas.microsoft.com/office/powerpoint/2010/main" val="1461561285"/>
+                <p14:modId xmlns:p14="http://schemas.microsoft.com/office/powerpoint/2010/main" val="2599620714"/>
               </p:ext>
             </p:extLst>
           </p:nvPr>
@@ -5787,8 +5779,8 @@
                     <a:lstStyle/>
                     <a:p>
                       <a:r>
-                        <a:rPr lang="en-US" sz="1000" dirty="0" err="1" smtClean="0"/>
-                        <a:t>etag</a:t>
+                        <a:rPr lang="en-US" sz="1000" dirty="0" smtClean="0"/>
+                        <a:t>md5</a:t>
                       </a:r>
                       <a:endParaRPr lang="en-US" sz="1000" dirty="0"/>
                     </a:p>
@@ -5814,32 +5806,21 @@
                     <a:bodyPr/>
                     <a:lstStyle/>
                     <a:p>
-                      <a:r>
-                        <a:rPr lang="en-US" sz="1000" dirty="0" smtClean="0"/>
-                        <a:t>Not null</a:t>
-                      </a:r>
-                      <a:endParaRPr lang="en-US" sz="1000" dirty="0"/>
-                    </a:p>
-                  </a:txBody>
-                  <a:tcPr/>
-                </a:tc>
-                <a:tc>
-                  <a:txBody>
-                    <a:bodyPr/>
-                    <a:lstStyle/>
-                    <a:p>
-                      <a:r>
-                        <a:rPr lang="en-US" sz="1000" dirty="0" smtClean="0"/>
-                        <a:t>Last read </a:t>
-                      </a:r>
-                      <a:r>
-                        <a:rPr lang="en-US" sz="1000" dirty="0" err="1" smtClean="0"/>
-                        <a:t>etag</a:t>
-                      </a:r>
-                      <a:r>
-                        <a:rPr lang="en-US" sz="1000" dirty="0" smtClean="0"/>
-                        <a:t> of page</a:t>
-                      </a:r>
+                      <a:endParaRPr lang="en-US" sz="1000" dirty="0"/>
+                    </a:p>
+                  </a:txBody>
+                  <a:tcPr/>
+                </a:tc>
+                <a:tc>
+                  <a:txBody>
+                    <a:bodyPr/>
+                    <a:lstStyle/>
+                    <a:p>
+                      <a:r>
+                        <a:rPr lang="en-US" sz="1000" dirty="0" smtClean="0"/>
+                        <a:t>Md5sum of page</a:t>
+                      </a:r>
+                      <a:endParaRPr lang="en-US" sz="1000" dirty="0" smtClean="0"/>
                     </a:p>
                   </a:txBody>
                   <a:tcPr/>
@@ -6847,7 +6828,6 @@
                         <a:rPr lang="en-US" sz="1000" dirty="0" smtClean="0"/>
                         <a:t>Maximum</a:t>
                       </a:r>
-                      <a:endParaRPr lang="en-US" sz="1000" dirty="0" smtClean="0"/>
                     </a:p>
                   </a:txBody>
                   <a:tcPr/>

</xml_diff>

<commit_message>
Add page topology. Continue refactoring
</commit_message>
<xml_diff>
--- a/docs/design.pptx
+++ b/docs/design.pptx
@@ -5029,7 +5029,7 @@
           <p:nvPr>
             <p:extLst>
               <p:ext uri="{D42A27DB-BD31-4B8C-83A1-F6EECF244321}">
-                <p14:modId xmlns:p14="http://schemas.microsoft.com/office/powerpoint/2010/main" val="1455743224"/>
+                <p14:modId xmlns:p14="http://schemas.microsoft.com/office/powerpoint/2010/main" val="1315503054"/>
               </p:ext>
             </p:extLst>
           </p:nvPr>
@@ -5313,7 +5313,7 @@
                     <a:p>
                       <a:r>
                         <a:rPr lang="en-US" sz="1000" dirty="0" err="1" smtClean="0"/>
-                        <a:t>parent_id</a:t>
+                        <a:t>parent_page_id</a:t>
                       </a:r>
                       <a:endParaRPr lang="en-US" sz="1000" dirty="0"/>
                     </a:p>
@@ -5820,7 +5820,6 @@
                         <a:rPr lang="en-US" sz="1000" dirty="0" smtClean="0"/>
                         <a:t>Md5sum of page</a:t>
                       </a:r>
-                      <a:endParaRPr lang="en-US" sz="1000" dirty="0" smtClean="0"/>
                     </a:p>
                   </a:txBody>
                   <a:tcPr/>
@@ -5839,7 +5838,7 @@
           <p:nvPr>
             <p:extLst>
               <p:ext uri="{D42A27DB-BD31-4B8C-83A1-F6EECF244321}">
-                <p14:modId xmlns:p14="http://schemas.microsoft.com/office/powerpoint/2010/main" val="436264297"/>
+                <p14:modId xmlns:p14="http://schemas.microsoft.com/office/powerpoint/2010/main" val="3393759905"/>
               </p:ext>
             </p:extLst>
           </p:nvPr>
@@ -5926,7 +5925,7 @@
                     <a:p>
                       <a:r>
                         <a:rPr lang="en-US" sz="1000" dirty="0" err="1" smtClean="0"/>
-                        <a:t>Img_id</a:t>
+                        <a:t>image_id</a:t>
                       </a:r>
                       <a:endParaRPr lang="en-US" sz="1000" dirty="0"/>
                     </a:p>
@@ -6089,7 +6088,7 @@
         <p:spPr>
           <a:xfrm>
             <a:off x="485140" y="5106899"/>
-            <a:ext cx="1633460" cy="369332"/>
+            <a:ext cx="1330172" cy="369332"/>
           </a:xfrm>
           <a:prstGeom prst="rect">
             <a:avLst/>
@@ -6103,7 +6102,7 @@
           <a:p>
             <a:r>
               <a:rPr lang="en-US" dirty="0" err="1" smtClean="0"/>
-              <a:t>img_page_map</a:t>
+              <a:t>Image_page</a:t>
             </a:r>
             <a:endParaRPr lang="en-US" dirty="0"/>
           </a:p>
@@ -8153,11 +8152,19 @@
           </a:fontRef>
         </p:style>
         <p:txBody>
-          <a:bodyPr rtlCol="0" anchor="ctr"/>
+          <a:bodyPr rtlCol="0" anchor="t"/>
           <a:lstStyle/>
           <a:p>
             <a:pPr algn="ctr"/>
-            <a:endParaRPr lang="en-US"/>
+            <a:r>
+              <a:rPr lang="en-US" sz="1000" dirty="0" err="1" smtClean="0"/>
+              <a:t>Msg</a:t>
+            </a:r>
+            <a:r>
+              <a:rPr lang="en-US" sz="1000" dirty="0" smtClean="0"/>
+              <a:t> Queue</a:t>
+            </a:r>
+            <a:endParaRPr lang="en-US" sz="1000" dirty="0"/>
           </a:p>
         </p:txBody>
       </p:sp>
@@ -8207,8 +8214,8 @@
         </p:nvCxnSpPr>
         <p:spPr>
           <a:xfrm>
-            <a:off x="5481734" y="589385"/>
-            <a:ext cx="9334" cy="492967"/>
+            <a:off x="5481734" y="486097"/>
+            <a:ext cx="9334" cy="596255"/>
           </a:xfrm>
           <a:prstGeom prst="straightConnector1">
             <a:avLst/>
@@ -8218,13 +8225,13 @@
           </a:ln>
         </p:spPr>
         <p:style>
-          <a:lnRef idx="1">
+          <a:lnRef idx="3">
             <a:schemeClr val="dk1"/>
           </a:lnRef>
           <a:fillRef idx="0">
             <a:schemeClr val="dk1"/>
           </a:fillRef>
-          <a:effectRef idx="0">
+          <a:effectRef idx="2">
             <a:schemeClr val="dk1"/>
           </a:effectRef>
           <a:fontRef idx="minor">
@@ -8253,13 +8260,13 @@
           </a:ln>
         </p:spPr>
         <p:style>
-          <a:lnRef idx="1">
+          <a:lnRef idx="3">
             <a:schemeClr val="dk1"/>
           </a:lnRef>
           <a:fillRef idx="0">
             <a:schemeClr val="dk1"/>
           </a:fillRef>
-          <a:effectRef idx="0">
+          <a:effectRef idx="2">
             <a:schemeClr val="dk1"/>
           </a:effectRef>
           <a:fontRef idx="minor">
@@ -8459,70 +8466,14 @@
       </p:sp>
       <p:sp>
         <p:nvSpPr>
-          <p:cNvPr id="19" name="Rectangle 18"/>
-          <p:cNvSpPr/>
-          <p:nvPr/>
-        </p:nvSpPr>
-        <p:spPr>
-          <a:xfrm>
-            <a:off x="6092889" y="1522445"/>
-            <a:ext cx="1179875" cy="369332"/>
-          </a:xfrm>
-          <a:prstGeom prst="rect">
-            <a:avLst/>
-          </a:prstGeom>
-        </p:spPr>
-        <p:txBody>
-          <a:bodyPr wrap="none">
-            <a:spAutoFit/>
-          </a:bodyPr>
-          <a:lstStyle/>
-          <a:p>
-            <a:r>
-              <a:rPr lang="en-US" dirty="0"/>
-              <a:t>URLQueue</a:t>
-            </a:r>
-          </a:p>
-        </p:txBody>
-      </p:sp>
-      <p:sp>
-        <p:nvSpPr>
           <p:cNvPr id="20" name="Rectangle 19"/>
           <p:cNvSpPr/>
           <p:nvPr/>
         </p:nvSpPr>
         <p:spPr>
           <a:xfrm>
-            <a:off x="6039030" y="2874998"/>
-            <a:ext cx="1607620" cy="369332"/>
-          </a:xfrm>
-          <a:prstGeom prst="rect">
-            <a:avLst/>
-          </a:prstGeom>
-        </p:spPr>
-        <p:txBody>
-          <a:bodyPr wrap="none">
-            <a:spAutoFit/>
-          </a:bodyPr>
-          <a:lstStyle/>
-          <a:p>
-            <a:r>
-              <a:rPr lang="en-US" dirty="0"/>
-              <a:t>URLThreadPool</a:t>
-            </a:r>
-          </a:p>
-        </p:txBody>
-      </p:sp>
-      <p:sp>
-        <p:nvSpPr>
-          <p:cNvPr id="21" name="TextBox 20"/>
-          <p:cNvSpPr txBox="1"/>
-          <p:nvPr/>
-        </p:nvSpPr>
-        <p:spPr>
-          <a:xfrm>
-            <a:off x="1340399" y="2563266"/>
-            <a:ext cx="2375971" cy="338554"/>
+            <a:off x="5048621" y="3348571"/>
+            <a:ext cx="1018677" cy="307777"/>
           </a:xfrm>
           <a:prstGeom prst="rect">
             <a:avLst/>
@@ -8536,10 +8487,71 @@
           <a:lstStyle/>
           <a:p>
             <a:r>
-              <a:rPr lang="en-US" sz="1600" dirty="0" smtClean="0"/>
-              <a:t>[unvisted child page URLS]</a:t>
-            </a:r>
-            <a:endParaRPr lang="en-US" sz="1600" dirty="0"/>
+              <a:rPr lang="en-US" sz="1400" dirty="0" err="1">
+                <a:solidFill>
+                  <a:schemeClr val="dk1"/>
+                </a:solidFill>
+              </a:rPr>
+              <a:t>ThreadPool</a:t>
+            </a:r>
+            <a:endParaRPr lang="en-US" sz="1400" dirty="0">
+              <a:solidFill>
+                <a:schemeClr val="dk1"/>
+              </a:solidFill>
+            </a:endParaRPr>
+          </a:p>
+        </p:txBody>
+      </p:sp>
+      <p:sp>
+        <p:nvSpPr>
+          <p:cNvPr id="21" name="TextBox 20"/>
+          <p:cNvSpPr txBox="1"/>
+          <p:nvPr/>
+        </p:nvSpPr>
+        <p:spPr>
+          <a:xfrm>
+            <a:off x="7557110" y="2326835"/>
+            <a:ext cx="3518848" cy="276999"/>
+          </a:xfrm>
+          <a:prstGeom prst="rect">
+            <a:avLst/>
+          </a:prstGeom>
+          <a:noFill/>
+        </p:spPr>
+        <p:txBody>
+          <a:bodyPr wrap="none" rtlCol="0">
+            <a:spAutoFit/>
+          </a:bodyPr>
+          <a:lstStyle>
+            <a:defPPr>
+              <a:defRPr lang="en-US"/>
+            </a:defPPr>
+            <a:lvl1pPr>
+              <a:defRPr sz="1200"/>
+            </a:lvl1pPr>
+          </a:lstStyle>
+          <a:p>
+            <a:r>
+              <a:rPr lang="en-US" dirty="0"/>
+              <a:t>[unvisted</a:t>
+            </a:r>
+            <a:r>
+              <a:rPr lang="en-US" dirty="0"/>
+              <a:t> child page </a:t>
+            </a:r>
+            <a:r>
+              <a:rPr lang="en-US" dirty="0" smtClean="0"/>
+              <a:t>URLS, </a:t>
+            </a:r>
+            <a:r>
+              <a:rPr lang="en-US" dirty="0" err="1" smtClean="0"/>
+              <a:t>unvisted</a:t>
+            </a:r>
+            <a:r>
+              <a:rPr lang="en-US" dirty="0" smtClean="0"/>
+              <a:t> child image URLs]</a:t>
+            </a:r>
+            <a:endParaRPr lang="en-US" dirty="0"/>
           </a:p>
         </p:txBody>
       </p:sp>
@@ -8551,8 +8563,8 @@
         </p:nvSpPr>
         <p:spPr>
           <a:xfrm>
-            <a:off x="9811566" y="5120789"/>
-            <a:ext cx="2159610" cy="1510004"/>
+            <a:off x="2681692" y="5483027"/>
+            <a:ext cx="1364842" cy="954300"/>
           </a:xfrm>
           <a:prstGeom prst="flowChartMagneticDisk">
             <a:avLst/>
@@ -8578,51 +8590,13 @@
           <a:p>
             <a:pPr algn="ctr"/>
             <a:r>
-              <a:rPr lang="en-US" dirty="0" smtClean="0"/>
+              <a:rPr lang="en-US" sz="1400" dirty="0" smtClean="0"/>
               <a:t>img table</a:t>
             </a:r>
-            <a:endParaRPr lang="en-US" dirty="0"/>
-          </a:p>
-        </p:txBody>
-      </p:sp>
-      <p:cxnSp>
-        <p:nvCxnSpPr>
-          <p:cNvPr id="31" name="Elbow Connector 30"/>
-          <p:cNvCxnSpPr>
-            <a:stCxn id="13" idx="2"/>
-            <a:endCxn id="2" idx="2"/>
-          </p:cNvCxnSpPr>
-          <p:nvPr/>
-        </p:nvCxnSpPr>
-        <p:spPr>
-          <a:xfrm rot="10800000" flipH="1">
-            <a:off x="4693300" y="1693507"/>
-            <a:ext cx="177279" cy="1805472"/>
-          </a:xfrm>
-          <a:prstGeom prst="bentConnector3">
-            <a:avLst>
-              <a:gd name="adj1" fmla="val -502638"/>
-            </a:avLst>
-          </a:prstGeom>
-          <a:ln>
-            <a:tailEnd type="triangle"/>
-          </a:ln>
-        </p:spPr>
-        <p:style>
-          <a:lnRef idx="1">
-            <a:schemeClr val="dk1"/>
-          </a:lnRef>
-          <a:fillRef idx="0">
-            <a:schemeClr val="dk1"/>
-          </a:fillRef>
-          <a:effectRef idx="0">
-            <a:schemeClr val="dk1"/>
-          </a:effectRef>
-          <a:fontRef idx="minor">
-            <a:schemeClr val="tx1"/>
-          </a:fontRef>
-        </p:style>
-      </p:cxnSp>
+            <a:endParaRPr lang="en-US" sz="1400" dirty="0"/>
+          </a:p>
+        </p:txBody>
+      </p:sp>
       <p:sp>
         <p:nvSpPr>
           <p:cNvPr id="36" name="TextBox 35"/>
@@ -8667,95 +8641,18 @@
           </a:p>
         </p:txBody>
       </p:sp>
-      <p:sp>
-        <p:nvSpPr>
-          <p:cNvPr id="40" name="Oval 39"/>
-          <p:cNvSpPr/>
-          <p:nvPr/>
-        </p:nvSpPr>
-        <p:spPr>
-          <a:xfrm>
-            <a:off x="4912569" y="4449147"/>
-            <a:ext cx="1222310" cy="1222310"/>
-          </a:xfrm>
-          <a:prstGeom prst="ellipse">
-            <a:avLst/>
-          </a:prstGeom>
-        </p:spPr>
-        <p:style>
-          <a:lnRef idx="1">
-            <a:schemeClr val="accent1"/>
-          </a:lnRef>
-          <a:fillRef idx="2">
-            <a:schemeClr val="accent1"/>
-          </a:fillRef>
-          <a:effectRef idx="1">
-            <a:schemeClr val="accent1"/>
-          </a:effectRef>
-          <a:fontRef idx="minor">
-            <a:schemeClr val="dk1"/>
-          </a:fontRef>
-        </p:style>
-        <p:txBody>
-          <a:bodyPr rtlCol="0" anchor="ctr"/>
-          <a:lstStyle/>
-          <a:p>
-            <a:pPr algn="ctr"/>
-            <a:endParaRPr lang="en-US"/>
-          </a:p>
-        </p:txBody>
-      </p:sp>
-      <p:sp>
-        <p:nvSpPr>
-          <p:cNvPr id="41" name="Oval 40"/>
-          <p:cNvSpPr/>
-          <p:nvPr/>
-        </p:nvSpPr>
-        <p:spPr>
-          <a:xfrm>
-            <a:off x="5375988" y="4889240"/>
-            <a:ext cx="342123" cy="342123"/>
-          </a:xfrm>
-          <a:prstGeom prst="ellipse">
-            <a:avLst/>
-          </a:prstGeom>
-        </p:spPr>
-        <p:style>
-          <a:lnRef idx="2">
-            <a:schemeClr val="accent1"/>
-          </a:lnRef>
-          <a:fillRef idx="1">
-            <a:schemeClr val="lt1"/>
-          </a:fillRef>
-          <a:effectRef idx="0">
-            <a:schemeClr val="accent1"/>
-          </a:effectRef>
-          <a:fontRef idx="minor">
-            <a:schemeClr val="dk1"/>
-          </a:fontRef>
-        </p:style>
-        <p:txBody>
-          <a:bodyPr rtlCol="0" anchor="ctr"/>
-          <a:lstStyle/>
-          <a:p>
-            <a:pPr algn="ctr"/>
-            <a:endParaRPr lang="en-US"/>
-          </a:p>
-        </p:txBody>
-      </p:sp>
       <p:cxnSp>
         <p:nvCxnSpPr>
           <p:cNvPr id="46" name="Straight Arrow Connector 45"/>
           <p:cNvCxnSpPr>
             <a:stCxn id="15" idx="4"/>
-            <a:endCxn id="40" idx="0"/>
           </p:cNvCxnSpPr>
           <p:nvPr/>
         </p:nvCxnSpPr>
         <p:spPr>
           <a:xfrm>
             <a:off x="5523724" y="3760236"/>
-            <a:ext cx="0" cy="688911"/>
+            <a:ext cx="0" cy="335903"/>
           </a:xfrm>
           <a:prstGeom prst="straightConnector1">
             <a:avLst/>
@@ -8765,13 +8662,13 @@
           </a:ln>
         </p:spPr>
         <p:style>
-          <a:lnRef idx="1">
+          <a:lnRef idx="3">
             <a:schemeClr val="dk1"/>
           </a:lnRef>
           <a:fillRef idx="0">
             <a:schemeClr val="dk1"/>
           </a:fillRef>
-          <a:effectRef idx="0">
+          <a:effectRef idx="2">
             <a:schemeClr val="dk1"/>
           </a:effectRef>
           <a:fontRef idx="minor">
@@ -8781,373 +8678,19 @@
       </p:cxnSp>
       <p:sp>
         <p:nvSpPr>
-          <p:cNvPr id="47" name="Rectangle 46"/>
-          <p:cNvSpPr/>
-          <p:nvPr/>
-        </p:nvSpPr>
-        <p:spPr>
-          <a:xfrm>
-            <a:off x="6134879" y="4851615"/>
-            <a:ext cx="1215397" cy="369332"/>
-          </a:xfrm>
-          <a:prstGeom prst="rect">
-            <a:avLst/>
-          </a:prstGeom>
-        </p:spPr>
-        <p:txBody>
-          <a:bodyPr wrap="none">
-            <a:spAutoFit/>
-          </a:bodyPr>
-          <a:lstStyle/>
-          <a:p>
-            <a:r>
-              <a:rPr lang="en-US" dirty="0" smtClean="0"/>
-              <a:t>IMGQueue</a:t>
-            </a:r>
-            <a:endParaRPr lang="en-US" dirty="0"/>
-          </a:p>
-        </p:txBody>
-      </p:sp>
-      <p:sp>
-        <p:nvSpPr>
-          <p:cNvPr id="51" name="Oval 50"/>
-          <p:cNvSpPr/>
-          <p:nvPr/>
-        </p:nvSpPr>
-        <p:spPr>
-          <a:xfrm>
-            <a:off x="4758616" y="6099111"/>
-            <a:ext cx="522514" cy="522514"/>
-          </a:xfrm>
-          <a:prstGeom prst="ellipse">
-            <a:avLst/>
-          </a:prstGeom>
-        </p:spPr>
-        <p:style>
-          <a:lnRef idx="1">
-            <a:schemeClr val="accent2"/>
-          </a:lnRef>
-          <a:fillRef idx="2">
-            <a:schemeClr val="accent2"/>
-          </a:fillRef>
-          <a:effectRef idx="1">
-            <a:schemeClr val="accent2"/>
-          </a:effectRef>
-          <a:fontRef idx="minor">
-            <a:schemeClr val="dk1"/>
-          </a:fontRef>
-        </p:style>
-        <p:txBody>
-          <a:bodyPr rtlCol="0" anchor="ctr"/>
-          <a:lstStyle/>
-          <a:p>
-            <a:pPr algn="ctr"/>
-            <a:endParaRPr lang="en-US"/>
-          </a:p>
-        </p:txBody>
-      </p:sp>
-      <p:sp>
-        <p:nvSpPr>
-          <p:cNvPr id="52" name="Oval 51"/>
-          <p:cNvSpPr/>
-          <p:nvPr/>
-        </p:nvSpPr>
-        <p:spPr>
-          <a:xfrm>
-            <a:off x="5043199" y="6099111"/>
-            <a:ext cx="522514" cy="522514"/>
-          </a:xfrm>
-          <a:prstGeom prst="ellipse">
-            <a:avLst/>
-          </a:prstGeom>
-        </p:spPr>
-        <p:style>
-          <a:lnRef idx="1">
-            <a:schemeClr val="accent2"/>
-          </a:lnRef>
-          <a:fillRef idx="2">
-            <a:schemeClr val="accent2"/>
-          </a:fillRef>
-          <a:effectRef idx="1">
-            <a:schemeClr val="accent2"/>
-          </a:effectRef>
-          <a:fontRef idx="minor">
-            <a:schemeClr val="dk1"/>
-          </a:fontRef>
-        </p:style>
-        <p:txBody>
-          <a:bodyPr rtlCol="0" anchor="ctr"/>
-          <a:lstStyle/>
-          <a:p>
-            <a:pPr algn="ctr"/>
-            <a:endParaRPr lang="en-US"/>
-          </a:p>
-        </p:txBody>
-      </p:sp>
-      <p:sp>
-        <p:nvSpPr>
-          <p:cNvPr id="53" name="Oval 52"/>
-          <p:cNvSpPr/>
-          <p:nvPr/>
-        </p:nvSpPr>
-        <p:spPr>
-          <a:xfrm>
-            <a:off x="5327782" y="6099111"/>
-            <a:ext cx="522514" cy="522514"/>
-          </a:xfrm>
-          <a:prstGeom prst="ellipse">
-            <a:avLst/>
-          </a:prstGeom>
-        </p:spPr>
-        <p:style>
-          <a:lnRef idx="1">
-            <a:schemeClr val="accent2"/>
-          </a:lnRef>
-          <a:fillRef idx="2">
-            <a:schemeClr val="accent2"/>
-          </a:fillRef>
-          <a:effectRef idx="1">
-            <a:schemeClr val="accent2"/>
-          </a:effectRef>
-          <a:fontRef idx="minor">
-            <a:schemeClr val="dk1"/>
-          </a:fontRef>
-        </p:style>
-        <p:txBody>
-          <a:bodyPr rtlCol="0" anchor="ctr"/>
-          <a:lstStyle/>
-          <a:p>
-            <a:pPr algn="ctr"/>
-            <a:endParaRPr lang="en-US"/>
-          </a:p>
-        </p:txBody>
-      </p:sp>
-      <p:sp>
-        <p:nvSpPr>
-          <p:cNvPr id="54" name="Oval 53"/>
-          <p:cNvSpPr/>
-          <p:nvPr/>
-        </p:nvSpPr>
-        <p:spPr>
-          <a:xfrm>
-            <a:off x="5612365" y="6099111"/>
-            <a:ext cx="522514" cy="522514"/>
-          </a:xfrm>
-          <a:prstGeom prst="ellipse">
-            <a:avLst/>
-          </a:prstGeom>
-        </p:spPr>
-        <p:style>
-          <a:lnRef idx="1">
-            <a:schemeClr val="accent2"/>
-          </a:lnRef>
-          <a:fillRef idx="2">
-            <a:schemeClr val="accent2"/>
-          </a:fillRef>
-          <a:effectRef idx="1">
-            <a:schemeClr val="accent2"/>
-          </a:effectRef>
-          <a:fontRef idx="minor">
-            <a:schemeClr val="dk1"/>
-          </a:fontRef>
-        </p:style>
-        <p:txBody>
-          <a:bodyPr rtlCol="0" anchor="ctr"/>
-          <a:lstStyle/>
-          <a:p>
-            <a:pPr algn="ctr"/>
-            <a:endParaRPr lang="en-US"/>
-          </a:p>
-        </p:txBody>
-      </p:sp>
-      <p:sp>
-        <p:nvSpPr>
-          <p:cNvPr id="55" name="Oval 54"/>
-          <p:cNvSpPr/>
-          <p:nvPr/>
-        </p:nvSpPr>
-        <p:spPr>
-          <a:xfrm>
-            <a:off x="5896948" y="6099111"/>
-            <a:ext cx="522514" cy="522514"/>
-          </a:xfrm>
-          <a:prstGeom prst="ellipse">
-            <a:avLst/>
-          </a:prstGeom>
-        </p:spPr>
-        <p:style>
-          <a:lnRef idx="1">
-            <a:schemeClr val="accent2"/>
-          </a:lnRef>
-          <a:fillRef idx="2">
-            <a:schemeClr val="accent2"/>
-          </a:fillRef>
-          <a:effectRef idx="1">
-            <a:schemeClr val="accent2"/>
-          </a:effectRef>
-          <a:fontRef idx="minor">
-            <a:schemeClr val="dk1"/>
-          </a:fontRef>
-        </p:style>
-        <p:txBody>
-          <a:bodyPr rtlCol="0" anchor="ctr"/>
-          <a:lstStyle/>
-          <a:p>
-            <a:pPr algn="ctr"/>
-            <a:endParaRPr lang="en-US"/>
-          </a:p>
-        </p:txBody>
-      </p:sp>
-      <p:cxnSp>
-        <p:nvCxnSpPr>
-          <p:cNvPr id="57" name="Straight Arrow Connector 56"/>
-          <p:cNvCxnSpPr>
-            <a:stCxn id="40" idx="4"/>
-          </p:cNvCxnSpPr>
-          <p:nvPr/>
-        </p:nvCxnSpPr>
-        <p:spPr>
-          <a:xfrm>
-            <a:off x="5523724" y="5671457"/>
-            <a:ext cx="0" cy="464977"/>
-          </a:xfrm>
-          <a:prstGeom prst="straightConnector1">
-            <a:avLst/>
-          </a:prstGeom>
-          <a:ln>
-            <a:tailEnd type="triangle"/>
-          </a:ln>
-        </p:spPr>
-        <p:style>
-          <a:lnRef idx="1">
-            <a:schemeClr val="dk1"/>
-          </a:lnRef>
-          <a:fillRef idx="0">
-            <a:schemeClr val="dk1"/>
-          </a:fillRef>
-          <a:effectRef idx="0">
-            <a:schemeClr val="dk1"/>
-          </a:effectRef>
-          <a:fontRef idx="minor">
-            <a:schemeClr val="tx1"/>
-          </a:fontRef>
-        </p:style>
-      </p:cxnSp>
-      <p:cxnSp>
-        <p:nvCxnSpPr>
-          <p:cNvPr id="64" name="Elbow Connector 63"/>
-          <p:cNvCxnSpPr>
-            <a:stCxn id="55" idx="6"/>
-            <a:endCxn id="22" idx="2"/>
-          </p:cNvCxnSpPr>
-          <p:nvPr/>
-        </p:nvCxnSpPr>
-        <p:spPr>
-          <a:xfrm flipV="1">
-            <a:off x="6419462" y="5875791"/>
-            <a:ext cx="3392104" cy="484577"/>
-          </a:xfrm>
-          <a:prstGeom prst="bentConnector3">
-            <a:avLst/>
-          </a:prstGeom>
-          <a:ln>
-            <a:tailEnd type="triangle"/>
-          </a:ln>
-        </p:spPr>
-        <p:style>
-          <a:lnRef idx="1">
-            <a:schemeClr val="dk1"/>
-          </a:lnRef>
-          <a:fillRef idx="0">
-            <a:schemeClr val="dk1"/>
-          </a:fillRef>
-          <a:effectRef idx="0">
-            <a:schemeClr val="dk1"/>
-          </a:effectRef>
-          <a:fontRef idx="minor">
-            <a:schemeClr val="tx1"/>
-          </a:fontRef>
-        </p:style>
-      </p:cxnSp>
-      <p:cxnSp>
-        <p:nvCxnSpPr>
-          <p:cNvPr id="66" name="Elbow Connector 65"/>
-          <p:cNvCxnSpPr>
-            <a:stCxn id="17" idx="6"/>
-          </p:cNvCxnSpPr>
-          <p:nvPr/>
-        </p:nvCxnSpPr>
-        <p:spPr>
-          <a:xfrm flipV="1">
-            <a:off x="6354147" y="3111760"/>
-            <a:ext cx="3457419" cy="387219"/>
-          </a:xfrm>
-          <a:prstGeom prst="bentConnector3">
-            <a:avLst/>
-          </a:prstGeom>
-          <a:ln>
-            <a:tailEnd type="triangle"/>
-          </a:ln>
-        </p:spPr>
-        <p:style>
-          <a:lnRef idx="1">
-            <a:schemeClr val="dk1"/>
-          </a:lnRef>
-          <a:fillRef idx="0">
-            <a:schemeClr val="dk1"/>
-          </a:fillRef>
-          <a:effectRef idx="0">
-            <a:schemeClr val="dk1"/>
-          </a:effectRef>
-          <a:fontRef idx="minor">
-            <a:schemeClr val="tx1"/>
-          </a:fontRef>
-        </p:style>
-      </p:cxnSp>
-      <p:sp>
-        <p:nvSpPr>
-          <p:cNvPr id="68" name="Rectangle 67"/>
-          <p:cNvSpPr/>
-          <p:nvPr/>
-        </p:nvSpPr>
-        <p:spPr>
-          <a:xfrm>
-            <a:off x="5896948" y="5691125"/>
-            <a:ext cx="1653851" cy="369332"/>
-          </a:xfrm>
-          <a:prstGeom prst="rect">
-            <a:avLst/>
-          </a:prstGeom>
-        </p:spPr>
-        <p:txBody>
-          <a:bodyPr wrap="none">
-            <a:spAutoFit/>
-          </a:bodyPr>
-          <a:lstStyle/>
-          <a:p>
-            <a:r>
-              <a:rPr lang="en-US" dirty="0" smtClean="0"/>
-              <a:t>IMGThreadPool</a:t>
-            </a:r>
-            <a:endParaRPr lang="en-US" dirty="0"/>
-          </a:p>
-        </p:txBody>
-      </p:sp>
-      <p:sp>
-        <p:nvSpPr>
           <p:cNvPr id="6" name="Rectangular Callout 5"/>
           <p:cNvSpPr/>
           <p:nvPr/>
         </p:nvSpPr>
         <p:spPr>
           <a:xfrm>
-            <a:off x="2407298" y="4180114"/>
+            <a:off x="8692395" y="3124503"/>
             <a:ext cx="1744824" cy="531845"/>
           </a:xfrm>
           <a:prstGeom prst="wedgeRectCallout">
             <a:avLst>
-              <a:gd name="adj1" fmla="val 82376"/>
-              <a:gd name="adj2" fmla="val -139254"/>
+              <a:gd name="adj1" fmla="val -86074"/>
+              <a:gd name="adj2" fmla="val 136184"/>
             </a:avLst>
           </a:prstGeom>
         </p:spPr>
@@ -9172,7 +8715,11 @@
             <a:pPr algn="ctr"/>
             <a:r>
               <a:rPr lang="en-US" sz="1200" dirty="0" smtClean="0"/>
-              <a:t>Parse unvisted urls, extract images, extract child URLs</a:t>
+              <a:t>Parse unvisted urls, extract images, extract child </a:t>
+            </a:r>
+            <a:r>
+              <a:rPr lang="en-US" sz="1200" dirty="0" smtClean="0"/>
+              <a:t>URLs and Images</a:t>
             </a:r>
             <a:endParaRPr lang="en-US" sz="1200" dirty="0"/>
           </a:p>
@@ -9186,13 +8733,13 @@
         </p:nvSpPr>
         <p:spPr>
           <a:xfrm>
-            <a:off x="2407298" y="5990253"/>
+            <a:off x="950802" y="3198464"/>
             <a:ext cx="1744824" cy="631372"/>
           </a:xfrm>
           <a:prstGeom prst="wedgeRectCallout">
             <a:avLst>
-              <a:gd name="adj1" fmla="val 83980"/>
-              <a:gd name="adj2" fmla="val 20833"/>
+              <a:gd name="adj1" fmla="val 55103"/>
+              <a:gd name="adj2" fmla="val 103591"/>
             </a:avLst>
           </a:prstGeom>
         </p:spPr>
@@ -9231,8 +8778,8 @@
         </p:nvSpPr>
         <p:spPr>
           <a:xfrm>
-            <a:off x="5500398" y="3902367"/>
-            <a:ext cx="1087157" cy="338554"/>
+            <a:off x="4189542" y="4413317"/>
+            <a:ext cx="960840" cy="276999"/>
           </a:xfrm>
           <a:prstGeom prst="rect">
             <a:avLst/>
@@ -9253,14 +8800,22 @@
           </a:lstStyle>
           <a:p>
             <a:r>
-              <a:rPr lang="en-US" dirty="0"/>
-              <a:t>[img </a:t>
-            </a:r>
-            <a:r>
-              <a:rPr lang="en-US" dirty="0" smtClean="0"/>
-              <a:t>URLS]</a:t>
-            </a:r>
-            <a:endParaRPr lang="en-US" dirty="0"/>
+              <a:rPr lang="en-US" sz="1200" dirty="0"/>
+              <a:t>[</a:t>
+            </a:r>
+            <a:r>
+              <a:rPr lang="en-US" sz="1200" dirty="0"/>
+              <a:t>Image </a:t>
+            </a:r>
+            <a:r>
+              <a:rPr lang="en-US" sz="1200" dirty="0" err="1"/>
+              <a:t>Msg</a:t>
+            </a:r>
+            <a:r>
+              <a:rPr lang="en-US" sz="1200" dirty="0"/>
+              <a:t>]</a:t>
+            </a:r>
+            <a:endParaRPr lang="en-US" sz="1200" dirty="0"/>
           </a:p>
         </p:txBody>
       </p:sp>
@@ -9272,8 +8827,333 @@
         </p:nvSpPr>
         <p:spPr>
           <a:xfrm>
-            <a:off x="6729646" y="6380422"/>
-            <a:ext cx="1459054" cy="338554"/>
+            <a:off x="3339592" y="5011374"/>
+            <a:ext cx="1142108" cy="276999"/>
+          </a:xfrm>
+          <a:prstGeom prst="rect">
+            <a:avLst/>
+          </a:prstGeom>
+          <a:noFill/>
+        </p:spPr>
+        <p:txBody>
+          <a:bodyPr wrap="none" rtlCol="0">
+            <a:spAutoFit/>
+          </a:bodyPr>
+          <a:lstStyle>
+            <a:defPPr>
+              <a:defRPr lang="en-US"/>
+            </a:defPPr>
+            <a:lvl1pPr>
+              <a:defRPr sz="1200"/>
+            </a:lvl1pPr>
+          </a:lstStyle>
+          <a:p>
+            <a:r>
+              <a:rPr lang="en-US" dirty="0"/>
+              <a:t>[img </a:t>
+            </a:r>
+            <a:r>
+              <a:rPr lang="en-US" dirty="0"/>
+              <a:t>metadata]</a:t>
+            </a:r>
+            <a:endParaRPr lang="en-US" dirty="0"/>
+          </a:p>
+        </p:txBody>
+      </p:sp>
+      <p:sp>
+        <p:nvSpPr>
+          <p:cNvPr id="37" name="TextBox 36"/>
+          <p:cNvSpPr txBox="1"/>
+          <p:nvPr/>
+        </p:nvSpPr>
+        <p:spPr>
+          <a:xfrm>
+            <a:off x="7557458" y="4978286"/>
+            <a:ext cx="1212961" cy="276999"/>
+          </a:xfrm>
+          <a:prstGeom prst="rect">
+            <a:avLst/>
+          </a:prstGeom>
+          <a:noFill/>
+        </p:spPr>
+        <p:txBody>
+          <a:bodyPr wrap="none" rtlCol="0">
+            <a:spAutoFit/>
+          </a:bodyPr>
+          <a:lstStyle>
+            <a:defPPr>
+              <a:defRPr lang="en-US"/>
+            </a:defPPr>
+            <a:lvl1pPr>
+              <a:defRPr sz="1200"/>
+            </a:lvl1pPr>
+          </a:lstStyle>
+          <a:p>
+            <a:r>
+              <a:rPr lang="en-US" dirty="0" smtClean="0"/>
+              <a:t>[page metadata]</a:t>
+            </a:r>
+            <a:endParaRPr lang="en-US" dirty="0"/>
+          </a:p>
+        </p:txBody>
+      </p:sp>
+      <p:sp>
+        <p:nvSpPr>
+          <p:cNvPr id="9" name="Flowchart: Decision 8"/>
+          <p:cNvSpPr/>
+          <p:nvPr/>
+        </p:nvSpPr>
+        <p:spPr>
+          <a:xfrm>
+            <a:off x="5080926" y="4092259"/>
+            <a:ext cx="885596" cy="593349"/>
+          </a:xfrm>
+          <a:prstGeom prst="flowChartDecision">
+            <a:avLst/>
+          </a:prstGeom>
+        </p:spPr>
+        <p:style>
+          <a:lnRef idx="2">
+            <a:schemeClr val="accent1">
+              <a:shade val="50000"/>
+            </a:schemeClr>
+          </a:lnRef>
+          <a:fillRef idx="1">
+            <a:schemeClr val="accent1"/>
+          </a:fillRef>
+          <a:effectRef idx="0">
+            <a:schemeClr val="accent1"/>
+          </a:effectRef>
+          <a:fontRef idx="minor">
+            <a:schemeClr val="lt1"/>
+          </a:fontRef>
+        </p:style>
+        <p:txBody>
+          <a:bodyPr rtlCol="0" anchor="ctr"/>
+          <a:lstStyle/>
+          <a:p>
+            <a:pPr algn="ctr"/>
+            <a:r>
+              <a:rPr lang="en-US" dirty="0" smtClean="0">
+                <a:solidFill>
+                  <a:schemeClr val="tx1"/>
+                </a:solidFill>
+              </a:rPr>
+              <a:t>?</a:t>
+            </a:r>
+            <a:endParaRPr lang="en-US" dirty="0">
+              <a:solidFill>
+                <a:schemeClr val="tx1"/>
+              </a:solidFill>
+            </a:endParaRPr>
+          </a:p>
+        </p:txBody>
+      </p:sp>
+      <p:sp>
+        <p:nvSpPr>
+          <p:cNvPr id="11" name="Oval 10"/>
+          <p:cNvSpPr/>
+          <p:nvPr/>
+        </p:nvSpPr>
+        <p:spPr>
+          <a:xfrm>
+            <a:off x="2594338" y="3928187"/>
+            <a:ext cx="1539551" cy="933060"/>
+          </a:xfrm>
+          <a:prstGeom prst="ellipse">
+            <a:avLst/>
+          </a:prstGeom>
+        </p:spPr>
+        <p:style>
+          <a:lnRef idx="1">
+            <a:schemeClr val="accent3"/>
+          </a:lnRef>
+          <a:fillRef idx="2">
+            <a:schemeClr val="accent3"/>
+          </a:fillRef>
+          <a:effectRef idx="1">
+            <a:schemeClr val="accent3"/>
+          </a:effectRef>
+          <a:fontRef idx="minor">
+            <a:schemeClr val="dk1"/>
+          </a:fontRef>
+        </p:style>
+        <p:txBody>
+          <a:bodyPr rtlCol="0" anchor="ctr"/>
+          <a:lstStyle/>
+          <a:p>
+            <a:pPr algn="ctr"/>
+            <a:r>
+              <a:rPr lang="en-US" sz="1400" dirty="0">
+                <a:solidFill>
+                  <a:schemeClr val="dk1"/>
+                </a:solidFill>
+              </a:rPr>
+              <a:t>Image Processing</a:t>
+            </a:r>
+          </a:p>
+        </p:txBody>
+      </p:sp>
+      <p:sp>
+        <p:nvSpPr>
+          <p:cNvPr id="42" name="Oval 41"/>
+          <p:cNvSpPr/>
+          <p:nvPr/>
+        </p:nvSpPr>
+        <p:spPr>
+          <a:xfrm>
+            <a:off x="6700307" y="3917304"/>
+            <a:ext cx="1539551" cy="933060"/>
+          </a:xfrm>
+          <a:prstGeom prst="ellipse">
+            <a:avLst/>
+          </a:prstGeom>
+        </p:spPr>
+        <p:style>
+          <a:lnRef idx="1">
+            <a:schemeClr val="accent3"/>
+          </a:lnRef>
+          <a:fillRef idx="2">
+            <a:schemeClr val="accent3"/>
+          </a:fillRef>
+          <a:effectRef idx="1">
+            <a:schemeClr val="accent3"/>
+          </a:effectRef>
+          <a:fontRef idx="minor">
+            <a:schemeClr val="dk1"/>
+          </a:fontRef>
+        </p:style>
+        <p:txBody>
+          <a:bodyPr rtlCol="0" anchor="ctr"/>
+          <a:lstStyle/>
+          <a:p>
+            <a:pPr algn="ctr"/>
+            <a:r>
+              <a:rPr lang="en-US" sz="1400" dirty="0" smtClean="0"/>
+              <a:t>Page Processing</a:t>
+            </a:r>
+            <a:endParaRPr lang="en-US" sz="1400" dirty="0"/>
+          </a:p>
+        </p:txBody>
+      </p:sp>
+      <p:cxnSp>
+        <p:nvCxnSpPr>
+          <p:cNvPr id="26" name="Straight Arrow Connector 25"/>
+          <p:cNvCxnSpPr>
+            <a:stCxn id="9" idx="3"/>
+            <a:endCxn id="42" idx="2"/>
+          </p:cNvCxnSpPr>
+          <p:nvPr/>
+        </p:nvCxnSpPr>
+        <p:spPr>
+          <a:xfrm flipV="1">
+            <a:off x="5966522" y="4383834"/>
+            <a:ext cx="733785" cy="5100"/>
+          </a:xfrm>
+          <a:prstGeom prst="straightConnector1">
+            <a:avLst/>
+          </a:prstGeom>
+          <a:ln>
+            <a:tailEnd type="triangle"/>
+          </a:ln>
+        </p:spPr>
+        <p:style>
+          <a:lnRef idx="3">
+            <a:schemeClr val="dk1"/>
+          </a:lnRef>
+          <a:fillRef idx="0">
+            <a:schemeClr val="dk1"/>
+          </a:fillRef>
+          <a:effectRef idx="2">
+            <a:schemeClr val="dk1"/>
+          </a:effectRef>
+          <a:fontRef idx="minor">
+            <a:schemeClr val="tx1"/>
+          </a:fontRef>
+        </p:style>
+      </p:cxnSp>
+      <p:cxnSp>
+        <p:nvCxnSpPr>
+          <p:cNvPr id="59" name="Elbow Connector 58"/>
+          <p:cNvCxnSpPr>
+            <a:stCxn id="42" idx="0"/>
+            <a:endCxn id="2" idx="6"/>
+          </p:cNvCxnSpPr>
+          <p:nvPr/>
+        </p:nvCxnSpPr>
+        <p:spPr>
+          <a:xfrm rot="16200000" flipV="1">
+            <a:off x="5669589" y="2116809"/>
+            <a:ext cx="2223797" cy="1377193"/>
+          </a:xfrm>
+          <a:prstGeom prst="bentConnector2">
+            <a:avLst/>
+          </a:prstGeom>
+          <a:ln>
+            <a:tailEnd type="triangle"/>
+          </a:ln>
+        </p:spPr>
+        <p:style>
+          <a:lnRef idx="3">
+            <a:schemeClr val="dk1"/>
+          </a:lnRef>
+          <a:fillRef idx="0">
+            <a:schemeClr val="dk1"/>
+          </a:fillRef>
+          <a:effectRef idx="2">
+            <a:schemeClr val="dk1"/>
+          </a:effectRef>
+          <a:fontRef idx="minor">
+            <a:schemeClr val="tx1"/>
+          </a:fontRef>
+        </p:style>
+      </p:cxnSp>
+      <p:cxnSp>
+        <p:nvCxnSpPr>
+          <p:cNvPr id="65" name="Straight Arrow Connector 64"/>
+          <p:cNvCxnSpPr>
+            <a:stCxn id="9" idx="1"/>
+            <a:endCxn id="11" idx="6"/>
+          </p:cNvCxnSpPr>
+          <p:nvPr/>
+        </p:nvCxnSpPr>
+        <p:spPr>
+          <a:xfrm flipH="1">
+            <a:off x="4133889" y="4388934"/>
+            <a:ext cx="947037" cy="5783"/>
+          </a:xfrm>
+          <a:prstGeom prst="straightConnector1">
+            <a:avLst/>
+          </a:prstGeom>
+          <a:ln>
+            <a:tailEnd type="triangle"/>
+          </a:ln>
+        </p:spPr>
+        <p:style>
+          <a:lnRef idx="3">
+            <a:schemeClr val="dk1"/>
+          </a:lnRef>
+          <a:fillRef idx="0">
+            <a:schemeClr val="dk1"/>
+          </a:fillRef>
+          <a:effectRef idx="2">
+            <a:schemeClr val="dk1"/>
+          </a:effectRef>
+          <a:fontRef idx="minor">
+            <a:schemeClr val="tx1"/>
+          </a:fontRef>
+        </p:style>
+      </p:cxnSp>
+      <p:sp>
+        <p:nvSpPr>
+          <p:cNvPr id="72" name="TextBox 71"/>
+          <p:cNvSpPr txBox="1"/>
+          <p:nvPr/>
+        </p:nvSpPr>
+        <p:spPr>
+          <a:xfrm>
+            <a:off x="5768901" y="4436401"/>
+            <a:ext cx="875753" cy="276999"/>
           </a:xfrm>
           <a:prstGeom prst="rect">
             <a:avLst/>
@@ -9294,64 +9174,67 @@
           </a:lstStyle>
           <a:p>
             <a:r>
-              <a:rPr lang="en-US" dirty="0"/>
-              <a:t>[img </a:t>
-            </a:r>
-            <a:r>
-              <a:rPr lang="en-US" dirty="0" smtClean="0"/>
-              <a:t>metadata]</a:t>
-            </a:r>
-            <a:endParaRPr lang="en-US" dirty="0"/>
-          </a:p>
-        </p:txBody>
-      </p:sp>
-      <p:sp>
-        <p:nvSpPr>
-          <p:cNvPr id="37" name="TextBox 36"/>
-          <p:cNvSpPr txBox="1"/>
+              <a:rPr lang="en-US" sz="1200" dirty="0"/>
+              <a:t>[Page </a:t>
+            </a:r>
+            <a:r>
+              <a:rPr lang="en-US" sz="1200" dirty="0" err="1"/>
+              <a:t>Msg</a:t>
+            </a:r>
+            <a:r>
+              <a:rPr lang="en-US" sz="1200" dirty="0"/>
+              <a:t>]</a:t>
+            </a:r>
+            <a:endParaRPr lang="en-US" sz="1200" dirty="0"/>
+          </a:p>
+        </p:txBody>
+      </p:sp>
+      <p:cxnSp>
+        <p:nvCxnSpPr>
+          <p:cNvPr id="86" name="Straight Arrow Connector 85"/>
+          <p:cNvCxnSpPr>
+            <a:stCxn id="11" idx="4"/>
+            <a:endCxn id="22" idx="1"/>
+          </p:cNvCxnSpPr>
+          <p:nvPr/>
+        </p:nvCxnSpPr>
+        <p:spPr>
+          <a:xfrm flipH="1">
+            <a:off x="3364113" y="4861247"/>
+            <a:ext cx="1" cy="621780"/>
+          </a:xfrm>
+          <a:prstGeom prst="straightConnector1">
+            <a:avLst/>
+          </a:prstGeom>
+          <a:ln>
+            <a:tailEnd type="triangle"/>
+          </a:ln>
+        </p:spPr>
+        <p:style>
+          <a:lnRef idx="3">
+            <a:schemeClr val="dk1"/>
+          </a:lnRef>
+          <a:fillRef idx="0">
+            <a:schemeClr val="dk1"/>
+          </a:fillRef>
+          <a:effectRef idx="2">
+            <a:schemeClr val="dk1"/>
+          </a:effectRef>
+          <a:fontRef idx="minor">
+            <a:schemeClr val="tx1"/>
+          </a:fontRef>
+        </p:style>
+      </p:cxnSp>
+      <p:sp>
+        <p:nvSpPr>
+          <p:cNvPr id="89" name="Flowchart: Magnetic Disk 88"/>
+          <p:cNvSpPr/>
           <p:nvPr/>
         </p:nvSpPr>
         <p:spPr>
           <a:xfrm>
-            <a:off x="7083830" y="3531005"/>
-            <a:ext cx="1624034" cy="338554"/>
-          </a:xfrm>
-          <a:prstGeom prst="rect">
-            <a:avLst/>
-          </a:prstGeom>
-          <a:noFill/>
-        </p:spPr>
-        <p:txBody>
-          <a:bodyPr wrap="none" rtlCol="0">
-            <a:spAutoFit/>
-          </a:bodyPr>
-          <a:lstStyle>
-            <a:defPPr>
-              <a:defRPr lang="en-US"/>
-            </a:defPPr>
-            <a:lvl1pPr>
-              <a:defRPr sz="1600"/>
-            </a:lvl1pPr>
-          </a:lstStyle>
-          <a:p>
-            <a:r>
-              <a:rPr lang="en-US" dirty="0" smtClean="0"/>
-              <a:t>[child page URLS]</a:t>
-            </a:r>
-            <a:endParaRPr lang="en-US" dirty="0"/>
-          </a:p>
-        </p:txBody>
-      </p:sp>
-      <p:sp>
-        <p:nvSpPr>
-          <p:cNvPr id="38" name="Flowchart: Magnetic Disk 37"/>
-          <p:cNvSpPr/>
-          <p:nvPr/>
-        </p:nvSpPr>
-        <p:spPr>
-          <a:xfrm>
-            <a:off x="9811566" y="2304662"/>
-            <a:ext cx="2159610" cy="1510004"/>
+            <a:off x="6750802" y="5457255"/>
+            <a:ext cx="1438560" cy="1005844"/>
           </a:xfrm>
           <a:prstGeom prst="flowChartMagneticDisk">
             <a:avLst/>
@@ -9377,20 +9260,49 @@
           <a:p>
             <a:pPr algn="ctr"/>
             <a:r>
-              <a:rPr lang="en-US" dirty="0" smtClean="0"/>
-              <a:t>page table</a:t>
-            </a:r>
-            <a:br>
-              <a:rPr lang="en-US" dirty="0" smtClean="0"/>
-            </a:br>
-            <a:r>
-              <a:rPr lang="en-US" dirty="0" smtClean="0"/>
-              <a:t>page_topology table</a:t>
-            </a:r>
-            <a:endParaRPr lang="en-US" dirty="0"/>
-          </a:p>
-        </p:txBody>
-      </p:sp>
+              <a:rPr lang="en-US" sz="1400" dirty="0" smtClean="0"/>
+              <a:t>Page table / Topology Table</a:t>
+            </a:r>
+            <a:endParaRPr lang="en-US" sz="1400" dirty="0"/>
+          </a:p>
+        </p:txBody>
+      </p:sp>
+      <p:cxnSp>
+        <p:nvCxnSpPr>
+          <p:cNvPr id="92" name="Straight Arrow Connector 91"/>
+          <p:cNvCxnSpPr>
+            <a:stCxn id="42" idx="4"/>
+            <a:endCxn id="89" idx="1"/>
+          </p:cNvCxnSpPr>
+          <p:nvPr/>
+        </p:nvCxnSpPr>
+        <p:spPr>
+          <a:xfrm flipH="1">
+            <a:off x="7470082" y="4850364"/>
+            <a:ext cx="1" cy="606891"/>
+          </a:xfrm>
+          <a:prstGeom prst="straightConnector1">
+            <a:avLst/>
+          </a:prstGeom>
+          <a:ln>
+            <a:tailEnd type="triangle"/>
+          </a:ln>
+        </p:spPr>
+        <p:style>
+          <a:lnRef idx="3">
+            <a:schemeClr val="dk1"/>
+          </a:lnRef>
+          <a:fillRef idx="0">
+            <a:schemeClr val="dk1"/>
+          </a:fillRef>
+          <a:effectRef idx="2">
+            <a:schemeClr val="dk1"/>
+          </a:effectRef>
+          <a:fontRef idx="minor">
+            <a:schemeClr val="tx1"/>
+          </a:fontRef>
+        </p:style>
+      </p:cxnSp>
     </p:spTree>
     <p:extLst>
       <p:ext uri="{BB962C8B-B14F-4D97-AF65-F5344CB8AC3E}">
@@ -9564,7 +9476,19 @@
             </a:pPr>
             <a:r>
               <a:rPr lang="en-US" dirty="0" smtClean="0"/>
-              <a:t>For each page in the URL Queue:</a:t>
+              <a:t>For each page in the </a:t>
+            </a:r>
+            <a:r>
+              <a:rPr lang="en-US" dirty="0" err="1" smtClean="0"/>
+              <a:t>Msg</a:t>
+            </a:r>
+            <a:r>
+              <a:rPr lang="en-US" dirty="0" smtClean="0"/>
+              <a:t> Queue</a:t>
+            </a:r>
+            <a:r>
+              <a:rPr lang="en-US" dirty="0" smtClean="0"/>
+              <a:t>:</a:t>
             </a:r>
           </a:p>
           <a:p>
@@ -9698,8 +9622,17 @@
             </a:pPr>
             <a:r>
               <a:rPr lang="en-US" dirty="0" smtClean="0"/>
-              <a:t>Parse page for Images and push images to Image Queue</a:t>
-            </a:r>
+              <a:t>Parse page for Images and push images to </a:t>
+            </a:r>
+            <a:r>
+              <a:rPr lang="en-US" dirty="0" err="1" smtClean="0"/>
+              <a:t>Msg</a:t>
+            </a:r>
+            <a:r>
+              <a:rPr lang="en-US" dirty="0" smtClean="0"/>
+              <a:t> Queue</a:t>
+            </a:r>
+            <a:endParaRPr lang="en-US" dirty="0" smtClean="0"/>
           </a:p>
           <a:p>
             <a:pPr marL="1257300" lvl="2" indent="-342900">
@@ -9710,6 +9643,7 @@
               <a:rPr lang="en-US" dirty="0" smtClean="0"/>
               <a:t>Parse page for page URLs and push to URL queue</a:t>
             </a:r>
+            <a:endParaRPr lang="en-US" dirty="0" smtClean="0"/>
           </a:p>
         </p:txBody>
       </p:sp>
@@ -9787,7 +9721,19 @@
             </a:pPr>
             <a:r>
               <a:rPr lang="en-US" dirty="0" smtClean="0"/>
-              <a:t>For each image in the IMG Queue:</a:t>
+              <a:t>For each image in the </a:t>
+            </a:r>
+            <a:r>
+              <a:rPr lang="en-US" dirty="0" err="1" smtClean="0"/>
+              <a:t>Msg</a:t>
+            </a:r>
+            <a:r>
+              <a:rPr lang="en-US" dirty="0" smtClean="0"/>
+              <a:t> Queue</a:t>
+            </a:r>
+            <a:r>
+              <a:rPr lang="en-US" dirty="0" smtClean="0"/>
+              <a:t>:</a:t>
             </a:r>
           </a:p>
           <a:p>

</xml_diff>

<commit_message>
Add MD5 checksum to pages to tell if they need to be revisited
</commit_message>
<xml_diff>
--- a/docs/design.pptx
+++ b/docs/design.pptx
@@ -19,8 +19,9 @@
     <p:sldId id="265" r:id="rId13"/>
     <p:sldId id="266" r:id="rId14"/>
     <p:sldId id="263" r:id="rId15"/>
-    <p:sldId id="258" r:id="rId16"/>
-    <p:sldId id="271" r:id="rId17"/>
+    <p:sldId id="275" r:id="rId16"/>
+    <p:sldId id="258" r:id="rId17"/>
+    <p:sldId id="271" r:id="rId18"/>
   </p:sldIdLst>
   <p:sldSz cx="12192000" cy="6858000"/>
   <p:notesSz cx="6858000" cy="9144000"/>
@@ -258,7 +259,7 @@
           <a:p>
             <a:fld id="{30DA0606-474F-417C-8DB0-81402E3BEFB0}" type="datetimeFigureOut">
               <a:rPr lang="en-US" smtClean="0"/>
-              <a:t>5/6/2017</a:t>
+              <a:t>5/8/2017</a:t>
             </a:fld>
             <a:endParaRPr lang="en-US"/>
           </a:p>
@@ -428,7 +429,7 @@
           <a:p>
             <a:fld id="{30DA0606-474F-417C-8DB0-81402E3BEFB0}" type="datetimeFigureOut">
               <a:rPr lang="en-US" smtClean="0"/>
-              <a:t>5/6/2017</a:t>
+              <a:t>5/8/2017</a:t>
             </a:fld>
             <a:endParaRPr lang="en-US"/>
           </a:p>
@@ -608,7 +609,7 @@
           <a:p>
             <a:fld id="{30DA0606-474F-417C-8DB0-81402E3BEFB0}" type="datetimeFigureOut">
               <a:rPr lang="en-US" smtClean="0"/>
-              <a:t>5/6/2017</a:t>
+              <a:t>5/8/2017</a:t>
             </a:fld>
             <a:endParaRPr lang="en-US"/>
           </a:p>
@@ -778,7 +779,7 @@
           <a:p>
             <a:fld id="{30DA0606-474F-417C-8DB0-81402E3BEFB0}" type="datetimeFigureOut">
               <a:rPr lang="en-US" smtClean="0"/>
-              <a:t>5/6/2017</a:t>
+              <a:t>5/8/2017</a:t>
             </a:fld>
             <a:endParaRPr lang="en-US"/>
           </a:p>
@@ -1024,7 +1025,7 @@
           <a:p>
             <a:fld id="{30DA0606-474F-417C-8DB0-81402E3BEFB0}" type="datetimeFigureOut">
               <a:rPr lang="en-US" smtClean="0"/>
-              <a:t>5/6/2017</a:t>
+              <a:t>5/8/2017</a:t>
             </a:fld>
             <a:endParaRPr lang="en-US"/>
           </a:p>
@@ -1256,7 +1257,7 @@
           <a:p>
             <a:fld id="{30DA0606-474F-417C-8DB0-81402E3BEFB0}" type="datetimeFigureOut">
               <a:rPr lang="en-US" smtClean="0"/>
-              <a:t>5/6/2017</a:t>
+              <a:t>5/8/2017</a:t>
             </a:fld>
             <a:endParaRPr lang="en-US"/>
           </a:p>
@@ -1623,7 +1624,7 @@
           <a:p>
             <a:fld id="{30DA0606-474F-417C-8DB0-81402E3BEFB0}" type="datetimeFigureOut">
               <a:rPr lang="en-US" smtClean="0"/>
-              <a:t>5/6/2017</a:t>
+              <a:t>5/8/2017</a:t>
             </a:fld>
             <a:endParaRPr lang="en-US"/>
           </a:p>
@@ -1741,7 +1742,7 @@
           <a:p>
             <a:fld id="{30DA0606-474F-417C-8DB0-81402E3BEFB0}" type="datetimeFigureOut">
               <a:rPr lang="en-US" smtClean="0"/>
-              <a:t>5/6/2017</a:t>
+              <a:t>5/8/2017</a:t>
             </a:fld>
             <a:endParaRPr lang="en-US"/>
           </a:p>
@@ -1836,7 +1837,7 @@
           <a:p>
             <a:fld id="{30DA0606-474F-417C-8DB0-81402E3BEFB0}" type="datetimeFigureOut">
               <a:rPr lang="en-US" smtClean="0"/>
-              <a:t>5/6/2017</a:t>
+              <a:t>5/8/2017</a:t>
             </a:fld>
             <a:endParaRPr lang="en-US"/>
           </a:p>
@@ -2113,7 +2114,7 @@
           <a:p>
             <a:fld id="{30DA0606-474F-417C-8DB0-81402E3BEFB0}" type="datetimeFigureOut">
               <a:rPr lang="en-US" smtClean="0"/>
-              <a:t>5/6/2017</a:t>
+              <a:t>5/8/2017</a:t>
             </a:fld>
             <a:endParaRPr lang="en-US"/>
           </a:p>
@@ -2366,7 +2367,7 @@
           <a:p>
             <a:fld id="{30DA0606-474F-417C-8DB0-81402E3BEFB0}" type="datetimeFigureOut">
               <a:rPr lang="en-US" smtClean="0"/>
-              <a:t>5/6/2017</a:t>
+              <a:t>5/8/2017</a:t>
             </a:fld>
             <a:endParaRPr lang="en-US"/>
           </a:p>
@@ -2579,7 +2580,7 @@
           <a:p>
             <a:fld id="{30DA0606-474F-417C-8DB0-81402E3BEFB0}" type="datetimeFigureOut">
               <a:rPr lang="en-US" smtClean="0"/>
-              <a:t>5/6/2017</a:t>
+              <a:t>5/8/2017</a:t>
             </a:fld>
             <a:endParaRPr lang="en-US"/>
           </a:p>
@@ -5570,7 +5571,7 @@
           <p:nvPr>
             <p:extLst>
               <p:ext uri="{D42A27DB-BD31-4B8C-83A1-F6EECF244321}">
-                <p14:modId xmlns:p14="http://schemas.microsoft.com/office/powerpoint/2010/main" val="2599620714"/>
+                <p14:modId xmlns:p14="http://schemas.microsoft.com/office/powerpoint/2010/main" val="2465717024"/>
               </p:ext>
             </p:extLst>
           </p:nvPr>
@@ -5779,8 +5780,8 @@
                     <a:lstStyle/>
                     <a:p>
                       <a:r>
-                        <a:rPr lang="en-US" sz="1000" dirty="0" smtClean="0"/>
-                        <a:t>md5</a:t>
+                        <a:rPr lang="en-US" sz="1000" smtClean="0"/>
+                        <a:t>checksum</a:t>
                       </a:r>
                       <a:endParaRPr lang="en-US" sz="1000" dirty="0"/>
                     </a:p>
@@ -7528,6 +7529,1011 @@
         </p:nvSpPr>
         <p:spPr>
           <a:xfrm>
+            <a:off x="535474" y="192372"/>
+            <a:ext cx="10608906" cy="2062103"/>
+          </a:xfrm>
+          <a:prstGeom prst="rect">
+            <a:avLst/>
+          </a:prstGeom>
+          <a:noFill/>
+        </p:spPr>
+        <p:txBody>
+          <a:bodyPr wrap="square" rtlCol="0">
+            <a:spAutoFit/>
+          </a:bodyPr>
+          <a:lstStyle/>
+          <a:p>
+            <a:r>
+              <a:rPr lang="en-US" sz="2800" dirty="0" smtClean="0"/>
+              <a:t>Database Tables</a:t>
+            </a:r>
+          </a:p>
+          <a:p>
+            <a:endParaRPr lang="en-US" sz="2800" dirty="0" smtClean="0"/>
+          </a:p>
+          <a:p>
+            <a:endParaRPr lang="en-US" dirty="0"/>
+          </a:p>
+          <a:p>
+            <a:endParaRPr lang="en-US" dirty="0" smtClean="0"/>
+          </a:p>
+          <a:p>
+            <a:endParaRPr lang="en-US" dirty="0"/>
+          </a:p>
+          <a:p>
+            <a:endParaRPr lang="en-US" dirty="0" smtClean="0"/>
+          </a:p>
+        </p:txBody>
+      </p:sp>
+      <p:graphicFrame>
+        <p:nvGraphicFramePr>
+          <p:cNvPr id="2" name="Table 1"/>
+          <p:cNvGraphicFramePr>
+            <a:graphicFrameLocks noGrp="1"/>
+          </p:cNvGraphicFramePr>
+          <p:nvPr>
+            <p:extLst>
+              <p:ext uri="{D42A27DB-BD31-4B8C-83A1-F6EECF244321}">
+                <p14:modId xmlns:p14="http://schemas.microsoft.com/office/powerpoint/2010/main" val="3667751996"/>
+              </p:ext>
+            </p:extLst>
+          </p:nvPr>
+        </p:nvGraphicFramePr>
+        <p:xfrm>
+          <a:off x="2940178" y="789890"/>
+          <a:ext cx="6586376" cy="1311155"/>
+        </p:xfrm>
+        <a:graphic>
+          <a:graphicData uri="http://schemas.openxmlformats.org/drawingml/2006/table">
+            <a:tbl>
+              <a:tblPr firstRow="1" bandRow="1">
+                <a:tableStyleId>{5C22544A-7EE6-4342-B048-85BDC9FD1C3A}</a:tableStyleId>
+              </a:tblPr>
+              <a:tblGrid>
+                <a:gridCol w="1651425"/>
+                <a:gridCol w="1641763"/>
+                <a:gridCol w="1646594"/>
+                <a:gridCol w="1646594"/>
+              </a:tblGrid>
+              <a:tr h="0">
+                <a:tc>
+                  <a:txBody>
+                    <a:bodyPr/>
+                    <a:lstStyle/>
+                    <a:p>
+                      <a:r>
+                        <a:rPr lang="en-US" sz="1000" dirty="0" smtClean="0"/>
+                        <a:t>Name</a:t>
+                      </a:r>
+                      <a:endParaRPr lang="en-US" sz="1000" dirty="0"/>
+                    </a:p>
+                  </a:txBody>
+                  <a:tcPr/>
+                </a:tc>
+                <a:tc>
+                  <a:txBody>
+                    <a:bodyPr/>
+                    <a:lstStyle/>
+                    <a:p>
+                      <a:r>
+                        <a:rPr lang="en-US" sz="1000" dirty="0" smtClean="0"/>
+                        <a:t>Type</a:t>
+                      </a:r>
+                      <a:endParaRPr lang="en-US" sz="1000" dirty="0"/>
+                    </a:p>
+                  </a:txBody>
+                  <a:tcPr/>
+                </a:tc>
+                <a:tc>
+                  <a:txBody>
+                    <a:bodyPr/>
+                    <a:lstStyle/>
+                    <a:p>
+                      <a:r>
+                        <a:rPr lang="en-US" sz="1000" dirty="0" smtClean="0"/>
+                        <a:t>Constraint</a:t>
+                      </a:r>
+                      <a:endParaRPr lang="en-US" sz="1000" dirty="0"/>
+                    </a:p>
+                  </a:txBody>
+                  <a:tcPr/>
+                </a:tc>
+                <a:tc>
+                  <a:txBody>
+                    <a:bodyPr/>
+                    <a:lstStyle/>
+                    <a:p>
+                      <a:r>
+                        <a:rPr lang="en-US" sz="1000" dirty="0" smtClean="0"/>
+                        <a:t>Description</a:t>
+                      </a:r>
+                      <a:endParaRPr lang="en-US" sz="1000" dirty="0"/>
+                    </a:p>
+                  </a:txBody>
+                  <a:tcPr/>
+                </a:tc>
+              </a:tr>
+              <a:tr h="274835">
+                <a:tc>
+                  <a:txBody>
+                    <a:bodyPr/>
+                    <a:lstStyle/>
+                    <a:p>
+                      <a:r>
+                        <a:rPr lang="en-US" sz="1000" dirty="0" smtClean="0"/>
+                        <a:t>id</a:t>
+                      </a:r>
+                      <a:endParaRPr lang="en-US" sz="1000" dirty="0"/>
+                    </a:p>
+                  </a:txBody>
+                  <a:tcPr/>
+                </a:tc>
+                <a:tc>
+                  <a:txBody>
+                    <a:bodyPr/>
+                    <a:lstStyle/>
+                    <a:p>
+                      <a:r>
+                        <a:rPr lang="en-US" sz="1000" dirty="0" smtClean="0"/>
+                        <a:t>INT</a:t>
+                      </a:r>
+                      <a:endParaRPr lang="en-US" sz="1000" dirty="0"/>
+                    </a:p>
+                  </a:txBody>
+                  <a:tcPr/>
+                </a:tc>
+                <a:tc>
+                  <a:txBody>
+                    <a:bodyPr/>
+                    <a:lstStyle/>
+                    <a:p>
+                      <a:r>
+                        <a:rPr lang="en-US" sz="1000" dirty="0" smtClean="0"/>
+                        <a:t>Primary Key, auto increment</a:t>
+                      </a:r>
+                      <a:endParaRPr lang="en-US" sz="1000" dirty="0"/>
+                    </a:p>
+                  </a:txBody>
+                  <a:tcPr/>
+                </a:tc>
+                <a:tc>
+                  <a:txBody>
+                    <a:bodyPr/>
+                    <a:lstStyle/>
+                    <a:p>
+                      <a:r>
+                        <a:rPr lang="en-US" sz="1000" dirty="0" smtClean="0"/>
+                        <a:t>ID</a:t>
+                      </a:r>
+                      <a:endParaRPr lang="en-US" sz="1000" dirty="0"/>
+                    </a:p>
+                  </a:txBody>
+                  <a:tcPr/>
+                </a:tc>
+              </a:tr>
+              <a:tr h="274835">
+                <a:tc>
+                  <a:txBody>
+                    <a:bodyPr/>
+                    <a:lstStyle/>
+                    <a:p>
+                      <a:r>
+                        <a:rPr lang="en-US" sz="1000" dirty="0" err="1" smtClean="0"/>
+                        <a:t>query_id</a:t>
+                      </a:r>
+                      <a:endParaRPr lang="en-US" sz="1000" dirty="0"/>
+                    </a:p>
+                  </a:txBody>
+                  <a:tcPr/>
+                </a:tc>
+                <a:tc>
+                  <a:txBody>
+                    <a:bodyPr/>
+                    <a:lstStyle/>
+                    <a:p>
+                      <a:r>
+                        <a:rPr lang="en-US" sz="1000" dirty="0" smtClean="0"/>
+                        <a:t>INT</a:t>
+                      </a:r>
+                      <a:endParaRPr lang="en-US" sz="1000" dirty="0"/>
+                    </a:p>
+                  </a:txBody>
+                  <a:tcPr/>
+                </a:tc>
+                <a:tc>
+                  <a:txBody>
+                    <a:bodyPr/>
+                    <a:lstStyle/>
+                    <a:p>
+                      <a:r>
+                        <a:rPr lang="en-US" sz="1000" dirty="0" smtClean="0"/>
+                        <a:t>Foreign</a:t>
+                      </a:r>
+                      <a:r>
+                        <a:rPr lang="en-US" sz="1000" baseline="0" dirty="0" smtClean="0"/>
+                        <a:t> key</a:t>
+                      </a:r>
+                      <a:endParaRPr lang="en-US" sz="1000" dirty="0"/>
+                    </a:p>
+                  </a:txBody>
+                  <a:tcPr/>
+                </a:tc>
+                <a:tc>
+                  <a:txBody>
+                    <a:bodyPr/>
+                    <a:lstStyle/>
+                    <a:p>
+                      <a:r>
+                        <a:rPr lang="en-US" sz="1000" dirty="0" smtClean="0"/>
+                        <a:t>Foreign key to query table</a:t>
+                      </a:r>
+                      <a:endParaRPr lang="en-US" sz="1000" dirty="0"/>
+                    </a:p>
+                  </a:txBody>
+                  <a:tcPr/>
+                </a:tc>
+              </a:tr>
+              <a:tr h="274835">
+                <a:tc>
+                  <a:txBody>
+                    <a:bodyPr/>
+                    <a:lstStyle/>
+                    <a:p>
+                      <a:r>
+                        <a:rPr lang="en-US" sz="1000" dirty="0" err="1" smtClean="0"/>
+                        <a:t>Start_time</a:t>
+                      </a:r>
+                      <a:endParaRPr lang="en-US" sz="1000" dirty="0"/>
+                    </a:p>
+                  </a:txBody>
+                  <a:tcPr/>
+                </a:tc>
+                <a:tc>
+                  <a:txBody>
+                    <a:bodyPr/>
+                    <a:lstStyle/>
+                    <a:p>
+                      <a:r>
+                        <a:rPr lang="en-US" sz="1000" dirty="0" smtClean="0"/>
+                        <a:t>TIMESTAMP</a:t>
+                      </a:r>
+                      <a:endParaRPr lang="en-US" sz="1000" dirty="0"/>
+                    </a:p>
+                  </a:txBody>
+                  <a:tcPr/>
+                </a:tc>
+                <a:tc>
+                  <a:txBody>
+                    <a:bodyPr/>
+                    <a:lstStyle/>
+                    <a:p>
+                      <a:r>
+                        <a:rPr lang="en-US" sz="1000" dirty="0" smtClean="0"/>
+                        <a:t>Not null</a:t>
+                      </a:r>
+                      <a:endParaRPr lang="en-US" sz="1000" dirty="0"/>
+                    </a:p>
+                  </a:txBody>
+                  <a:tcPr/>
+                </a:tc>
+                <a:tc>
+                  <a:txBody>
+                    <a:bodyPr/>
+                    <a:lstStyle/>
+                    <a:p>
+                      <a:pPr marL="0" marR="0" lvl="0" indent="0" algn="l" defTabSz="914400" rtl="0" eaLnBrk="1" fontAlgn="auto" latinLnBrk="0" hangingPunct="1">
+                        <a:lnSpc>
+                          <a:spcPct val="100000"/>
+                        </a:lnSpc>
+                        <a:spcBef>
+                          <a:spcPts val="0"/>
+                        </a:spcBef>
+                        <a:spcAft>
+                          <a:spcPts val="0"/>
+                        </a:spcAft>
+                        <a:buClrTx/>
+                        <a:buSzTx/>
+                        <a:buFontTx/>
+                        <a:buNone/>
+                        <a:tabLst/>
+                        <a:defRPr/>
+                      </a:pPr>
+                      <a:r>
+                        <a:rPr lang="en-US" sz="1000" dirty="0" smtClean="0"/>
+                        <a:t>The time when the search was</a:t>
+                      </a:r>
+                      <a:r>
+                        <a:rPr lang="en-US" sz="1000" baseline="0" dirty="0" smtClean="0"/>
+                        <a:t> started</a:t>
+                      </a:r>
+                      <a:endParaRPr lang="en-US" sz="1000" dirty="0" smtClean="0"/>
+                    </a:p>
+                  </a:txBody>
+                  <a:tcPr/>
+                </a:tc>
+              </a:tr>
+            </a:tbl>
+          </a:graphicData>
+        </a:graphic>
+      </p:graphicFrame>
+      <p:sp>
+        <p:nvSpPr>
+          <p:cNvPr id="9" name="Rectangle 8"/>
+          <p:cNvSpPr/>
+          <p:nvPr/>
+        </p:nvSpPr>
+        <p:spPr>
+          <a:xfrm>
+            <a:off x="687874" y="743139"/>
+            <a:ext cx="1470595" cy="369332"/>
+          </a:xfrm>
+          <a:prstGeom prst="rect">
+            <a:avLst/>
+          </a:prstGeom>
+        </p:spPr>
+        <p:txBody>
+          <a:bodyPr wrap="none">
+            <a:spAutoFit/>
+          </a:bodyPr>
+          <a:lstStyle/>
+          <a:p>
+            <a:r>
+              <a:rPr lang="en-US" dirty="0" err="1" smtClean="0"/>
+              <a:t>search_status</a:t>
+            </a:r>
+            <a:endParaRPr lang="en-US" dirty="0"/>
+          </a:p>
+        </p:txBody>
+      </p:sp>
+      <p:sp>
+        <p:nvSpPr>
+          <p:cNvPr id="10" name="TextBox 9"/>
+          <p:cNvSpPr txBox="1"/>
+          <p:nvPr/>
+        </p:nvSpPr>
+        <p:spPr>
+          <a:xfrm>
+            <a:off x="687874" y="1121523"/>
+            <a:ext cx="1390261" cy="400110"/>
+          </a:xfrm>
+          <a:prstGeom prst="rect">
+            <a:avLst/>
+          </a:prstGeom>
+          <a:noFill/>
+        </p:spPr>
+        <p:txBody>
+          <a:bodyPr wrap="square" rtlCol="0">
+            <a:spAutoFit/>
+          </a:bodyPr>
+          <a:lstStyle/>
+          <a:p>
+            <a:r>
+              <a:rPr lang="en-US" sz="1000" dirty="0" smtClean="0"/>
+              <a:t>Status for current searches</a:t>
+            </a:r>
+            <a:endParaRPr lang="en-US" sz="1000" dirty="0"/>
+          </a:p>
+        </p:txBody>
+      </p:sp>
+      <p:graphicFrame>
+        <p:nvGraphicFramePr>
+          <p:cNvPr id="13" name="Table 12"/>
+          <p:cNvGraphicFramePr>
+            <a:graphicFrameLocks noGrp="1"/>
+          </p:cNvGraphicFramePr>
+          <p:nvPr>
+            <p:extLst>
+              <p:ext uri="{D42A27DB-BD31-4B8C-83A1-F6EECF244321}">
+                <p14:modId xmlns:p14="http://schemas.microsoft.com/office/powerpoint/2010/main" val="907696117"/>
+              </p:ext>
+            </p:extLst>
+          </p:nvPr>
+        </p:nvGraphicFramePr>
+        <p:xfrm>
+          <a:off x="2940178" y="2612469"/>
+          <a:ext cx="6586376" cy="914915"/>
+        </p:xfrm>
+        <a:graphic>
+          <a:graphicData uri="http://schemas.openxmlformats.org/drawingml/2006/table">
+            <a:tbl>
+              <a:tblPr firstRow="1" bandRow="1">
+                <a:tableStyleId>{5C22544A-7EE6-4342-B048-85BDC9FD1C3A}</a:tableStyleId>
+              </a:tblPr>
+              <a:tblGrid>
+                <a:gridCol w="1651425"/>
+                <a:gridCol w="1641763"/>
+                <a:gridCol w="1646594"/>
+                <a:gridCol w="1646594"/>
+              </a:tblGrid>
+              <a:tr h="0">
+                <a:tc>
+                  <a:txBody>
+                    <a:bodyPr/>
+                    <a:lstStyle/>
+                    <a:p>
+                      <a:r>
+                        <a:rPr lang="en-US" sz="1000" dirty="0" smtClean="0"/>
+                        <a:t>Name</a:t>
+                      </a:r>
+                      <a:endParaRPr lang="en-US" sz="1000" dirty="0"/>
+                    </a:p>
+                  </a:txBody>
+                  <a:tcPr/>
+                </a:tc>
+                <a:tc>
+                  <a:txBody>
+                    <a:bodyPr/>
+                    <a:lstStyle/>
+                    <a:p>
+                      <a:r>
+                        <a:rPr lang="en-US" sz="1000" dirty="0" smtClean="0"/>
+                        <a:t>Type</a:t>
+                      </a:r>
+                      <a:endParaRPr lang="en-US" sz="1000" dirty="0"/>
+                    </a:p>
+                  </a:txBody>
+                  <a:tcPr/>
+                </a:tc>
+                <a:tc>
+                  <a:txBody>
+                    <a:bodyPr/>
+                    <a:lstStyle/>
+                    <a:p>
+                      <a:r>
+                        <a:rPr lang="en-US" sz="1000" dirty="0" smtClean="0"/>
+                        <a:t>Constraint</a:t>
+                      </a:r>
+                      <a:endParaRPr lang="en-US" sz="1000" dirty="0"/>
+                    </a:p>
+                  </a:txBody>
+                  <a:tcPr/>
+                </a:tc>
+                <a:tc>
+                  <a:txBody>
+                    <a:bodyPr/>
+                    <a:lstStyle/>
+                    <a:p>
+                      <a:r>
+                        <a:rPr lang="en-US" sz="1000" dirty="0" smtClean="0"/>
+                        <a:t>Description</a:t>
+                      </a:r>
+                      <a:endParaRPr lang="en-US" sz="1000" dirty="0"/>
+                    </a:p>
+                  </a:txBody>
+                  <a:tcPr/>
+                </a:tc>
+              </a:tr>
+              <a:tr h="274835">
+                <a:tc>
+                  <a:txBody>
+                    <a:bodyPr/>
+                    <a:lstStyle/>
+                    <a:p>
+                      <a:r>
+                        <a:rPr lang="en-US" sz="1000" dirty="0" err="1" smtClean="0"/>
+                        <a:t>Search_status_id</a:t>
+                      </a:r>
+                      <a:endParaRPr lang="en-US" sz="1000" dirty="0"/>
+                    </a:p>
+                  </a:txBody>
+                  <a:tcPr/>
+                </a:tc>
+                <a:tc>
+                  <a:txBody>
+                    <a:bodyPr/>
+                    <a:lstStyle/>
+                    <a:p>
+                      <a:r>
+                        <a:rPr lang="en-US" sz="1000" dirty="0" smtClean="0"/>
+                        <a:t>INT</a:t>
+                      </a:r>
+                      <a:endParaRPr lang="en-US" sz="1000" dirty="0"/>
+                    </a:p>
+                  </a:txBody>
+                  <a:tcPr/>
+                </a:tc>
+                <a:tc>
+                  <a:txBody>
+                    <a:bodyPr/>
+                    <a:lstStyle/>
+                    <a:p>
+                      <a:r>
+                        <a:rPr lang="en-US" sz="1000" dirty="0" smtClean="0"/>
+                        <a:t>Foreign</a:t>
+                      </a:r>
+                      <a:r>
+                        <a:rPr lang="en-US" sz="1000" baseline="0" dirty="0" smtClean="0"/>
+                        <a:t> key</a:t>
+                      </a:r>
+                      <a:endParaRPr lang="en-US" sz="1000" dirty="0"/>
+                    </a:p>
+                  </a:txBody>
+                  <a:tcPr/>
+                </a:tc>
+                <a:tc>
+                  <a:txBody>
+                    <a:bodyPr/>
+                    <a:lstStyle/>
+                    <a:p>
+                      <a:r>
+                        <a:rPr lang="en-US" sz="1000" dirty="0" smtClean="0"/>
+                        <a:t>Foreign key to </a:t>
+                      </a:r>
+                      <a:r>
+                        <a:rPr lang="en-US" sz="1000" dirty="0" err="1" smtClean="0"/>
+                        <a:t>search_status</a:t>
+                      </a:r>
+                      <a:r>
+                        <a:rPr lang="en-US" sz="1000" baseline="0" dirty="0" smtClean="0"/>
+                        <a:t> table</a:t>
+                      </a:r>
+                      <a:endParaRPr lang="en-US" sz="1000" dirty="0"/>
+                    </a:p>
+                  </a:txBody>
+                  <a:tcPr/>
+                </a:tc>
+              </a:tr>
+              <a:tr h="274835">
+                <a:tc>
+                  <a:txBody>
+                    <a:bodyPr/>
+                    <a:lstStyle/>
+                    <a:p>
+                      <a:r>
+                        <a:rPr lang="en-US" sz="1000" dirty="0" err="1" smtClean="0"/>
+                        <a:t>page_id</a:t>
+                      </a:r>
+                      <a:endParaRPr lang="en-US" sz="1000" dirty="0"/>
+                    </a:p>
+                  </a:txBody>
+                  <a:tcPr/>
+                </a:tc>
+                <a:tc>
+                  <a:txBody>
+                    <a:bodyPr/>
+                    <a:lstStyle/>
+                    <a:p>
+                      <a:r>
+                        <a:rPr lang="en-US" sz="1000" dirty="0" smtClean="0"/>
+                        <a:t>INT</a:t>
+                      </a:r>
+                      <a:endParaRPr lang="en-US" sz="1000" dirty="0"/>
+                    </a:p>
+                  </a:txBody>
+                  <a:tcPr/>
+                </a:tc>
+                <a:tc>
+                  <a:txBody>
+                    <a:bodyPr/>
+                    <a:lstStyle/>
+                    <a:p>
+                      <a:r>
+                        <a:rPr lang="en-US" sz="1000" dirty="0" smtClean="0"/>
+                        <a:t>Foreign</a:t>
+                      </a:r>
+                      <a:r>
+                        <a:rPr lang="en-US" sz="1000" baseline="0" dirty="0" smtClean="0"/>
+                        <a:t> key</a:t>
+                      </a:r>
+                      <a:endParaRPr lang="en-US" sz="1000" dirty="0"/>
+                    </a:p>
+                  </a:txBody>
+                  <a:tcPr/>
+                </a:tc>
+                <a:tc>
+                  <a:txBody>
+                    <a:bodyPr/>
+                    <a:lstStyle/>
+                    <a:p>
+                      <a:r>
+                        <a:rPr lang="en-US" sz="1000" dirty="0" smtClean="0"/>
+                        <a:t>Foreign key to page</a:t>
+                      </a:r>
+                      <a:r>
+                        <a:rPr lang="en-US" sz="1000" baseline="0" dirty="0" smtClean="0"/>
+                        <a:t> table</a:t>
+                      </a:r>
+                      <a:endParaRPr lang="en-US" sz="1000" dirty="0"/>
+                    </a:p>
+                  </a:txBody>
+                  <a:tcPr/>
+                </a:tc>
+              </a:tr>
+            </a:tbl>
+          </a:graphicData>
+        </a:graphic>
+      </p:graphicFrame>
+      <p:sp>
+        <p:nvSpPr>
+          <p:cNvPr id="14" name="Rectangle 13"/>
+          <p:cNvSpPr/>
+          <p:nvPr/>
+        </p:nvSpPr>
+        <p:spPr>
+          <a:xfrm>
+            <a:off x="687874" y="2565718"/>
+            <a:ext cx="2130711" cy="369332"/>
+          </a:xfrm>
+          <a:prstGeom prst="rect">
+            <a:avLst/>
+          </a:prstGeom>
+        </p:spPr>
+        <p:txBody>
+          <a:bodyPr wrap="none">
+            <a:spAutoFit/>
+          </a:bodyPr>
+          <a:lstStyle/>
+          <a:p>
+            <a:r>
+              <a:rPr lang="en-US" dirty="0" err="1" smtClean="0"/>
+              <a:t>search_status_pages</a:t>
+            </a:r>
+            <a:endParaRPr lang="en-US" dirty="0"/>
+          </a:p>
+        </p:txBody>
+      </p:sp>
+      <p:sp>
+        <p:nvSpPr>
+          <p:cNvPr id="15" name="TextBox 14"/>
+          <p:cNvSpPr txBox="1"/>
+          <p:nvPr/>
+        </p:nvSpPr>
+        <p:spPr>
+          <a:xfrm>
+            <a:off x="687874" y="2944102"/>
+            <a:ext cx="1390261" cy="400110"/>
+          </a:xfrm>
+          <a:prstGeom prst="rect">
+            <a:avLst/>
+          </a:prstGeom>
+          <a:noFill/>
+        </p:spPr>
+        <p:txBody>
+          <a:bodyPr wrap="square" rtlCol="0">
+            <a:spAutoFit/>
+          </a:bodyPr>
+          <a:lstStyle/>
+          <a:p>
+            <a:r>
+              <a:rPr lang="en-US" sz="1000" dirty="0" smtClean="0"/>
+              <a:t>The pages found during a search</a:t>
+            </a:r>
+            <a:endParaRPr lang="en-US" sz="1000" dirty="0"/>
+          </a:p>
+        </p:txBody>
+      </p:sp>
+      <p:graphicFrame>
+        <p:nvGraphicFramePr>
+          <p:cNvPr id="16" name="Table 15"/>
+          <p:cNvGraphicFramePr>
+            <a:graphicFrameLocks noGrp="1"/>
+          </p:cNvGraphicFramePr>
+          <p:nvPr>
+            <p:extLst>
+              <p:ext uri="{D42A27DB-BD31-4B8C-83A1-F6EECF244321}">
+                <p14:modId xmlns:p14="http://schemas.microsoft.com/office/powerpoint/2010/main" val="570867377"/>
+              </p:ext>
+            </p:extLst>
+          </p:nvPr>
+        </p:nvGraphicFramePr>
+        <p:xfrm>
+          <a:off x="2940178" y="4033832"/>
+          <a:ext cx="6586376" cy="914915"/>
+        </p:xfrm>
+        <a:graphic>
+          <a:graphicData uri="http://schemas.openxmlformats.org/drawingml/2006/table">
+            <a:tbl>
+              <a:tblPr firstRow="1" bandRow="1">
+                <a:tableStyleId>{5C22544A-7EE6-4342-B048-85BDC9FD1C3A}</a:tableStyleId>
+              </a:tblPr>
+              <a:tblGrid>
+                <a:gridCol w="1651425"/>
+                <a:gridCol w="1641763"/>
+                <a:gridCol w="1646594"/>
+                <a:gridCol w="1646594"/>
+              </a:tblGrid>
+              <a:tr h="0">
+                <a:tc>
+                  <a:txBody>
+                    <a:bodyPr/>
+                    <a:lstStyle/>
+                    <a:p>
+                      <a:r>
+                        <a:rPr lang="en-US" sz="1000" dirty="0" smtClean="0"/>
+                        <a:t>Name</a:t>
+                      </a:r>
+                      <a:endParaRPr lang="en-US" sz="1000" dirty="0"/>
+                    </a:p>
+                  </a:txBody>
+                  <a:tcPr/>
+                </a:tc>
+                <a:tc>
+                  <a:txBody>
+                    <a:bodyPr/>
+                    <a:lstStyle/>
+                    <a:p>
+                      <a:r>
+                        <a:rPr lang="en-US" sz="1000" dirty="0" smtClean="0"/>
+                        <a:t>Type</a:t>
+                      </a:r>
+                      <a:endParaRPr lang="en-US" sz="1000" dirty="0"/>
+                    </a:p>
+                  </a:txBody>
+                  <a:tcPr/>
+                </a:tc>
+                <a:tc>
+                  <a:txBody>
+                    <a:bodyPr/>
+                    <a:lstStyle/>
+                    <a:p>
+                      <a:r>
+                        <a:rPr lang="en-US" sz="1000" dirty="0" smtClean="0"/>
+                        <a:t>Constraint</a:t>
+                      </a:r>
+                      <a:endParaRPr lang="en-US" sz="1000" dirty="0"/>
+                    </a:p>
+                  </a:txBody>
+                  <a:tcPr/>
+                </a:tc>
+                <a:tc>
+                  <a:txBody>
+                    <a:bodyPr/>
+                    <a:lstStyle/>
+                    <a:p>
+                      <a:r>
+                        <a:rPr lang="en-US" sz="1000" dirty="0" smtClean="0"/>
+                        <a:t>Description</a:t>
+                      </a:r>
+                      <a:endParaRPr lang="en-US" sz="1000" dirty="0"/>
+                    </a:p>
+                  </a:txBody>
+                  <a:tcPr/>
+                </a:tc>
+              </a:tr>
+              <a:tr h="274835">
+                <a:tc>
+                  <a:txBody>
+                    <a:bodyPr/>
+                    <a:lstStyle/>
+                    <a:p>
+                      <a:r>
+                        <a:rPr lang="en-US" sz="1000" dirty="0" err="1" smtClean="0"/>
+                        <a:t>Search_status_id</a:t>
+                      </a:r>
+                      <a:endParaRPr lang="en-US" sz="1000" dirty="0"/>
+                    </a:p>
+                  </a:txBody>
+                  <a:tcPr/>
+                </a:tc>
+                <a:tc>
+                  <a:txBody>
+                    <a:bodyPr/>
+                    <a:lstStyle/>
+                    <a:p>
+                      <a:r>
+                        <a:rPr lang="en-US" sz="1000" dirty="0" smtClean="0"/>
+                        <a:t>INT</a:t>
+                      </a:r>
+                      <a:endParaRPr lang="en-US" sz="1000" dirty="0"/>
+                    </a:p>
+                  </a:txBody>
+                  <a:tcPr/>
+                </a:tc>
+                <a:tc>
+                  <a:txBody>
+                    <a:bodyPr/>
+                    <a:lstStyle/>
+                    <a:p>
+                      <a:r>
+                        <a:rPr lang="en-US" sz="1000" dirty="0" smtClean="0"/>
+                        <a:t>Foreign</a:t>
+                      </a:r>
+                      <a:r>
+                        <a:rPr lang="en-US" sz="1000" baseline="0" dirty="0" smtClean="0"/>
+                        <a:t> key</a:t>
+                      </a:r>
+                      <a:endParaRPr lang="en-US" sz="1000" dirty="0"/>
+                    </a:p>
+                  </a:txBody>
+                  <a:tcPr/>
+                </a:tc>
+                <a:tc>
+                  <a:txBody>
+                    <a:bodyPr/>
+                    <a:lstStyle/>
+                    <a:p>
+                      <a:r>
+                        <a:rPr lang="en-US" sz="1000" dirty="0" smtClean="0"/>
+                        <a:t>Foreign key to </a:t>
+                      </a:r>
+                      <a:r>
+                        <a:rPr lang="en-US" sz="1000" dirty="0" err="1" smtClean="0"/>
+                        <a:t>search_status</a:t>
+                      </a:r>
+                      <a:r>
+                        <a:rPr lang="en-US" sz="1000" baseline="0" dirty="0" smtClean="0"/>
+                        <a:t> table</a:t>
+                      </a:r>
+                      <a:endParaRPr lang="en-US" sz="1000" dirty="0"/>
+                    </a:p>
+                  </a:txBody>
+                  <a:tcPr/>
+                </a:tc>
+              </a:tr>
+              <a:tr h="274835">
+                <a:tc>
+                  <a:txBody>
+                    <a:bodyPr/>
+                    <a:lstStyle/>
+                    <a:p>
+                      <a:r>
+                        <a:rPr lang="en-US" sz="1000" dirty="0" err="1" smtClean="0"/>
+                        <a:t>Image_id</a:t>
+                      </a:r>
+                      <a:endParaRPr lang="en-US" sz="1000" dirty="0"/>
+                    </a:p>
+                  </a:txBody>
+                  <a:tcPr/>
+                </a:tc>
+                <a:tc>
+                  <a:txBody>
+                    <a:bodyPr/>
+                    <a:lstStyle/>
+                    <a:p>
+                      <a:r>
+                        <a:rPr lang="en-US" sz="1000" dirty="0" smtClean="0"/>
+                        <a:t>INT</a:t>
+                      </a:r>
+                      <a:endParaRPr lang="en-US" sz="1000" dirty="0"/>
+                    </a:p>
+                  </a:txBody>
+                  <a:tcPr/>
+                </a:tc>
+                <a:tc>
+                  <a:txBody>
+                    <a:bodyPr/>
+                    <a:lstStyle/>
+                    <a:p>
+                      <a:r>
+                        <a:rPr lang="en-US" sz="1000" dirty="0" smtClean="0"/>
+                        <a:t>Foreign</a:t>
+                      </a:r>
+                      <a:r>
+                        <a:rPr lang="en-US" sz="1000" baseline="0" dirty="0" smtClean="0"/>
+                        <a:t> key</a:t>
+                      </a:r>
+                      <a:endParaRPr lang="en-US" sz="1000" dirty="0"/>
+                    </a:p>
+                  </a:txBody>
+                  <a:tcPr/>
+                </a:tc>
+                <a:tc>
+                  <a:txBody>
+                    <a:bodyPr/>
+                    <a:lstStyle/>
+                    <a:p>
+                      <a:r>
+                        <a:rPr lang="en-US" sz="1000" dirty="0" smtClean="0"/>
+                        <a:t>Foreign key to image </a:t>
+                      </a:r>
+                      <a:r>
+                        <a:rPr lang="en-US" sz="1000" baseline="0" dirty="0" smtClean="0"/>
+                        <a:t>table</a:t>
+                      </a:r>
+                      <a:endParaRPr lang="en-US" sz="1000" dirty="0"/>
+                    </a:p>
+                  </a:txBody>
+                  <a:tcPr/>
+                </a:tc>
+              </a:tr>
+            </a:tbl>
+          </a:graphicData>
+        </a:graphic>
+      </p:graphicFrame>
+      <p:sp>
+        <p:nvSpPr>
+          <p:cNvPr id="17" name="Rectangle 16"/>
+          <p:cNvSpPr/>
+          <p:nvPr/>
+        </p:nvSpPr>
+        <p:spPr>
+          <a:xfrm>
+            <a:off x="687874" y="3987081"/>
+            <a:ext cx="2262158" cy="369332"/>
+          </a:xfrm>
+          <a:prstGeom prst="rect">
+            <a:avLst/>
+          </a:prstGeom>
+        </p:spPr>
+        <p:txBody>
+          <a:bodyPr wrap="none">
+            <a:spAutoFit/>
+          </a:bodyPr>
+          <a:lstStyle/>
+          <a:p>
+            <a:r>
+              <a:rPr lang="en-US" dirty="0" err="1" smtClean="0"/>
+              <a:t>Search_status_images</a:t>
+            </a:r>
+            <a:endParaRPr lang="en-US" dirty="0"/>
+          </a:p>
+        </p:txBody>
+      </p:sp>
+      <p:sp>
+        <p:nvSpPr>
+          <p:cNvPr id="18" name="TextBox 17"/>
+          <p:cNvSpPr txBox="1"/>
+          <p:nvPr/>
+        </p:nvSpPr>
+        <p:spPr>
+          <a:xfrm>
+            <a:off x="687874" y="4365465"/>
+            <a:ext cx="1390261" cy="400110"/>
+          </a:xfrm>
+          <a:prstGeom prst="rect">
+            <a:avLst/>
+          </a:prstGeom>
+          <a:noFill/>
+        </p:spPr>
+        <p:txBody>
+          <a:bodyPr wrap="square" rtlCol="0">
+            <a:spAutoFit/>
+          </a:bodyPr>
+          <a:lstStyle/>
+          <a:p>
+            <a:r>
+              <a:rPr lang="en-US" sz="1000" dirty="0" smtClean="0"/>
+              <a:t>The images found during a search</a:t>
+            </a:r>
+            <a:endParaRPr lang="en-US" sz="1000" dirty="0"/>
+          </a:p>
+        </p:txBody>
+      </p:sp>
+    </p:spTree>
+    <p:extLst>
+      <p:ext uri="{BB962C8B-B14F-4D97-AF65-F5344CB8AC3E}">
+        <p14:creationId xmlns:p14="http://schemas.microsoft.com/office/powerpoint/2010/main" val="4031162409"/>
+      </p:ext>
+    </p:extLst>
+  </p:cSld>
+  <p:clrMapOvr>
+    <a:masterClrMapping/>
+  </p:clrMapOvr>
+  <p:timing>
+    <p:tnLst>
+      <p:par>
+        <p:cTn id="1" dur="indefinite" restart="never" nodeType="tmRoot"/>
+      </p:par>
+    </p:tnLst>
+  </p:timing>
+</p:sld>
+</file>
+
+<file path=ppt/slides/slide16.xml><?xml version="1.0" encoding="utf-8"?>
+<p:sld xmlns:a="http://schemas.openxmlformats.org/drawingml/2006/main" xmlns:r="http://schemas.openxmlformats.org/officeDocument/2006/relationships" xmlns:p="http://schemas.openxmlformats.org/presentationml/2006/main">
+  <p:cSld>
+    <p:spTree>
+      <p:nvGrpSpPr>
+        <p:cNvPr id="1" name=""/>
+        <p:cNvGrpSpPr/>
+        <p:nvPr/>
+      </p:nvGrpSpPr>
+      <p:grpSpPr>
+        <a:xfrm>
+          <a:off x="0" y="0"/>
+          <a:ext cx="0" cy="0"/>
+          <a:chOff x="0" y="0"/>
+          <a:chExt cx="0" cy="0"/>
+        </a:xfrm>
+      </p:grpSpPr>
+      <p:sp>
+        <p:nvSpPr>
+          <p:cNvPr id="6" name="TextBox 5"/>
+          <p:cNvSpPr txBox="1"/>
+          <p:nvPr/>
+        </p:nvSpPr>
+        <p:spPr>
+          <a:xfrm>
             <a:off x="503852" y="625151"/>
             <a:ext cx="10608906" cy="4278094"/>
           </a:xfrm>
@@ -7666,7 +8672,7 @@
 </p:sld>
 </file>
 
-<file path=ppt/slides/slide16.xml><?xml version="1.0" encoding="utf-8"?>
+<file path=ppt/slides/slide17.xml><?xml version="1.0" encoding="utf-8"?>
 <p:sld xmlns:a="http://schemas.openxmlformats.org/drawingml/2006/main" xmlns:r="http://schemas.openxmlformats.org/officeDocument/2006/relationships" xmlns:p="http://schemas.openxmlformats.org/presentationml/2006/main">
   <p:cSld>
     <p:spTree>
@@ -8533,11 +9539,7 @@
           <a:p>
             <a:r>
               <a:rPr lang="en-US" dirty="0"/>
-              <a:t>[unvisted</a:t>
-            </a:r>
-            <a:r>
-              <a:rPr lang="en-US" dirty="0"/>
-              <a:t> child page </a:t>
+              <a:t>[unvisted child page </a:t>
             </a:r>
             <a:r>
               <a:rPr lang="en-US" dirty="0" smtClean="0"/>
@@ -8715,11 +9717,7 @@
             <a:pPr algn="ctr"/>
             <a:r>
               <a:rPr lang="en-US" sz="1200" dirty="0" smtClean="0"/>
-              <a:t>Parse unvisted urls, extract images, extract child </a:t>
-            </a:r>
-            <a:r>
-              <a:rPr lang="en-US" sz="1200" dirty="0" smtClean="0"/>
-              <a:t>URLs and Images</a:t>
+              <a:t>Parse unvisted urls, extract images, extract child URLs and Images</a:t>
             </a:r>
             <a:endParaRPr lang="en-US" sz="1200" dirty="0"/>
           </a:p>
@@ -8801,11 +9799,7 @@
           <a:p>
             <a:r>
               <a:rPr lang="en-US" sz="1200" dirty="0"/>
-              <a:t>[</a:t>
-            </a:r>
-            <a:r>
-              <a:rPr lang="en-US" sz="1200" dirty="0"/>
-              <a:t>Image </a:t>
+              <a:t>[Image </a:t>
             </a:r>
             <a:r>
               <a:rPr lang="en-US" sz="1200" dirty="0" err="1"/>
@@ -8815,7 +9809,6 @@
               <a:rPr lang="en-US" sz="1200" dirty="0"/>
               <a:t>]</a:t>
             </a:r>
-            <a:endParaRPr lang="en-US" sz="1200" dirty="0"/>
           </a:p>
         </p:txBody>
       </p:sp>
@@ -8850,13 +9843,8 @@
           <a:p>
             <a:r>
               <a:rPr lang="en-US" dirty="0"/>
-              <a:t>[img </a:t>
-            </a:r>
-            <a:r>
-              <a:rPr lang="en-US" dirty="0"/>
-              <a:t>metadata]</a:t>
-            </a:r>
-            <a:endParaRPr lang="en-US" dirty="0"/>
+              <a:t>[img metadata]</a:t>
+            </a:r>
           </a:p>
         </p:txBody>
       </p:sp>
@@ -9185,7 +10173,6 @@
               <a:rPr lang="en-US" sz="1200" dirty="0"/>
               <a:t>]</a:t>
             </a:r>
-            <a:endParaRPr lang="en-US" sz="1200" dirty="0"/>
           </a:p>
         </p:txBody>
       </p:sp>
@@ -9484,11 +10471,7 @@
             </a:r>
             <a:r>
               <a:rPr lang="en-US" dirty="0" smtClean="0"/>
-              <a:t> Queue</a:t>
-            </a:r>
-            <a:r>
-              <a:rPr lang="en-US" dirty="0" smtClean="0"/>
-              <a:t>:</a:t>
+              <a:t> Queue:</a:t>
             </a:r>
           </a:p>
           <a:p>
@@ -9632,7 +10615,6 @@
               <a:rPr lang="en-US" dirty="0" smtClean="0"/>
               <a:t> Queue</a:t>
             </a:r>
-            <a:endParaRPr lang="en-US" dirty="0" smtClean="0"/>
           </a:p>
           <a:p>
             <a:pPr marL="1257300" lvl="2" indent="-342900">
@@ -9643,7 +10625,6 @@
               <a:rPr lang="en-US" dirty="0" smtClean="0"/>
               <a:t>Parse page for page URLs and push to URL queue</a:t>
             </a:r>
-            <a:endParaRPr lang="en-US" dirty="0" smtClean="0"/>
           </a:p>
         </p:txBody>
       </p:sp>
@@ -9729,11 +10710,7 @@
             </a:r>
             <a:r>
               <a:rPr lang="en-US" dirty="0" smtClean="0"/>
-              <a:t> Queue</a:t>
-            </a:r>
-            <a:r>
-              <a:rPr lang="en-US" dirty="0" smtClean="0"/>
-              <a:t>:</a:t>
+              <a:t> Queue:</a:t>
             </a:r>
           </a:p>
           <a:p>

</xml_diff>

<commit_message>
Clear page topology at start of search. Check status in thread for max page counts
</commit_message>
<xml_diff>
--- a/docs/design.pptx
+++ b/docs/design.pptx
@@ -14,13 +14,13 @@
     <p:sldId id="257" r:id="rId8"/>
     <p:sldId id="270" r:id="rId9"/>
     <p:sldId id="272" r:id="rId10"/>
-    <p:sldId id="274" r:id="rId11"/>
-    <p:sldId id="260" r:id="rId12"/>
-    <p:sldId id="265" r:id="rId13"/>
-    <p:sldId id="266" r:id="rId14"/>
-    <p:sldId id="263" r:id="rId15"/>
+    <p:sldId id="260" r:id="rId11"/>
+    <p:sldId id="265" r:id="rId12"/>
+    <p:sldId id="266" r:id="rId13"/>
+    <p:sldId id="263" r:id="rId14"/>
+    <p:sldId id="258" r:id="rId15"/>
     <p:sldId id="275" r:id="rId16"/>
-    <p:sldId id="258" r:id="rId17"/>
+    <p:sldId id="274" r:id="rId17"/>
     <p:sldId id="271" r:id="rId18"/>
   </p:sldIdLst>
   <p:sldSz cx="12192000" cy="6858000"/>
@@ -3053,142 +3053,6 @@
         </p:nvSpPr>
         <p:spPr>
           <a:xfrm>
-            <a:off x="951722" y="1045029"/>
-            <a:ext cx="10608906" cy="3046988"/>
-          </a:xfrm>
-          <a:prstGeom prst="rect">
-            <a:avLst/>
-          </a:prstGeom>
-          <a:noFill/>
-        </p:spPr>
-        <p:txBody>
-          <a:bodyPr wrap="square" rtlCol="0">
-            <a:spAutoFit/>
-          </a:bodyPr>
-          <a:lstStyle/>
-          <a:p>
-            <a:r>
-              <a:rPr lang="en-US" sz="2800" dirty="0" smtClean="0"/>
-              <a:t>Report Search Status</a:t>
-            </a:r>
-          </a:p>
-          <a:p>
-            <a:endParaRPr lang="en-US" sz="2800" dirty="0"/>
-          </a:p>
-          <a:p>
-            <a:pPr marL="342900" indent="-342900">
-              <a:buFont typeface="+mj-lt"/>
-              <a:buAutoNum type="arabicPeriod"/>
-            </a:pPr>
-            <a:r>
-              <a:rPr lang="en-US" dirty="0" smtClean="0"/>
-              <a:t>During API request, return:</a:t>
-            </a:r>
-          </a:p>
-          <a:p>
-            <a:pPr marL="800100" lvl="1" indent="-342900">
-              <a:buFont typeface="+mj-lt"/>
-              <a:buAutoNum type="arabicPeriod"/>
-            </a:pPr>
-            <a:r>
-              <a:rPr lang="en-US" dirty="0" smtClean="0"/>
-              <a:t>page_topology count for the query id</a:t>
-            </a:r>
-          </a:p>
-          <a:p>
-            <a:pPr marL="800100" lvl="1" indent="-342900">
-              <a:buFont typeface="+mj-lt"/>
-              <a:buAutoNum type="arabicPeriod"/>
-            </a:pPr>
-            <a:r>
-              <a:rPr lang="en-US" dirty="0" smtClean="0"/>
-              <a:t>Associated </a:t>
-            </a:r>
-            <a:r>
-              <a:rPr lang="en-US" dirty="0" err="1" smtClean="0"/>
-              <a:t>image_page</a:t>
-            </a:r>
-            <a:r>
-              <a:rPr lang="en-US" dirty="0" smtClean="0"/>
-              <a:t> count for associated images</a:t>
-            </a:r>
-            <a:endParaRPr lang="en-US" dirty="0"/>
-          </a:p>
-          <a:p>
-            <a:pPr marL="342900" indent="-342900">
-              <a:buFont typeface="+mj-lt"/>
-              <a:buAutoNum type="arabicPeriod"/>
-            </a:pPr>
-            <a:endParaRPr lang="en-US" dirty="0" smtClean="0"/>
-          </a:p>
-          <a:p>
-            <a:pPr marL="342900" indent="-342900">
-              <a:buFont typeface="+mj-lt"/>
-              <a:buAutoNum type="arabicPeriod"/>
-            </a:pPr>
-            <a:endParaRPr lang="en-US" dirty="0"/>
-          </a:p>
-          <a:p>
-            <a:pPr marL="342900" indent="-342900">
-              <a:buFont typeface="+mj-lt"/>
-              <a:buAutoNum type="arabicPeriod"/>
-            </a:pPr>
-            <a:endParaRPr lang="en-US" dirty="0" smtClean="0"/>
-          </a:p>
-          <a:p>
-            <a:pPr marL="342900" indent="-342900">
-              <a:buFont typeface="+mj-lt"/>
-              <a:buAutoNum type="arabicPeriod"/>
-            </a:pPr>
-            <a:endParaRPr lang="en-US" sz="2800" dirty="0"/>
-          </a:p>
-        </p:txBody>
-      </p:sp>
-    </p:spTree>
-    <p:extLst>
-      <p:ext uri="{BB962C8B-B14F-4D97-AF65-F5344CB8AC3E}">
-        <p14:creationId xmlns:p14="http://schemas.microsoft.com/office/powerpoint/2010/main" val="1300643417"/>
-      </p:ext>
-    </p:extLst>
-  </p:cSld>
-  <p:clrMapOvr>
-    <a:masterClrMapping/>
-  </p:clrMapOvr>
-  <p:timing>
-    <p:tnLst>
-      <p:par>
-        <p:cTn id="1" dur="indefinite" restart="never" nodeType="tmRoot"/>
-      </p:par>
-    </p:tnLst>
-  </p:timing>
-</p:sld>
-</file>
-
-<file path=ppt/slides/slide11.xml><?xml version="1.0" encoding="utf-8"?>
-<p:sld xmlns:a="http://schemas.openxmlformats.org/drawingml/2006/main" xmlns:r="http://schemas.openxmlformats.org/officeDocument/2006/relationships" xmlns:p="http://schemas.openxmlformats.org/presentationml/2006/main">
-  <p:cSld>
-    <p:spTree>
-      <p:nvGrpSpPr>
-        <p:cNvPr id="1" name=""/>
-        <p:cNvGrpSpPr/>
-        <p:nvPr/>
-      </p:nvGrpSpPr>
-      <p:grpSpPr>
-        <a:xfrm>
-          <a:off x="0" y="0"/>
-          <a:ext cx="0" cy="0"/>
-          <a:chOff x="0" y="0"/>
-          <a:chExt cx="0" cy="0"/>
-        </a:xfrm>
-      </p:grpSpPr>
-      <p:sp>
-        <p:nvSpPr>
-          <p:cNvPr id="6" name="TextBox 5"/>
-          <p:cNvSpPr txBox="1"/>
-          <p:nvPr/>
-        </p:nvSpPr>
-        <p:spPr>
-          <a:xfrm>
             <a:off x="535474" y="192372"/>
             <a:ext cx="10608906" cy="2339102"/>
           </a:xfrm>
@@ -4398,7 +4262,7 @@
 </p:sld>
 </file>
 
-<file path=ppt/slides/slide12.xml><?xml version="1.0" encoding="utf-8"?>
+<file path=ppt/slides/slide11.xml><?xml version="1.0" encoding="utf-8"?>
 <p:sld xmlns:a="http://schemas.openxmlformats.org/drawingml/2006/main" xmlns:r="http://schemas.openxmlformats.org/officeDocument/2006/relationships" xmlns:p="http://schemas.openxmlformats.org/presentationml/2006/main">
   <p:cSld>
     <p:spTree>
@@ -4960,7 +4824,7 @@
 </p:sld>
 </file>
 
-<file path=ppt/slides/slide13.xml><?xml version="1.0" encoding="utf-8"?>
+<file path=ppt/slides/slide12.xml><?xml version="1.0" encoding="utf-8"?>
 <p:sld xmlns:a="http://schemas.openxmlformats.org/drawingml/2006/main" xmlns:r="http://schemas.openxmlformats.org/officeDocument/2006/relationships" xmlns:p="http://schemas.openxmlformats.org/presentationml/2006/main">
   <p:cSld>
     <p:spTree>
@@ -5482,7 +5346,7 @@
         <p:spPr>
           <a:xfrm>
             <a:off x="569582" y="1247347"/>
-            <a:ext cx="1390261" cy="400110"/>
+            <a:ext cx="1390261" cy="553998"/>
           </a:xfrm>
           <a:prstGeom prst="rect">
             <a:avLst/>
@@ -5497,7 +5361,11 @@
           <a:p>
             <a:r>
               <a:rPr lang="en-US" sz="1000" dirty="0" smtClean="0"/>
-              <a:t>Create a toplogy of every page searched</a:t>
+              <a:t>Create a toplogy of every page </a:t>
+            </a:r>
+            <a:r>
+              <a:rPr lang="en-US" sz="1000" dirty="0" smtClean="0"/>
+              <a:t>searched, for a query</a:t>
             </a:r>
             <a:endParaRPr lang="en-US" sz="1000" dirty="0"/>
           </a:p>
@@ -6163,7 +6031,7 @@
 </p:sld>
 </file>
 
-<file path=ppt/slides/slide14.xml><?xml version="1.0" encoding="utf-8"?>
+<file path=ppt/slides/slide13.xml><?xml version="1.0" encoding="utf-8"?>
 <p:sld xmlns:a="http://schemas.openxmlformats.org/drawingml/2006/main" xmlns:r="http://schemas.openxmlformats.org/officeDocument/2006/relationships" xmlns:p="http://schemas.openxmlformats.org/presentationml/2006/main">
   <p:cSld>
     <p:spTree>
@@ -7504,6 +7372,169 @@
 </p:sld>
 </file>
 
+<file path=ppt/slides/slide14.xml><?xml version="1.0" encoding="utf-8"?>
+<p:sld xmlns:a="http://schemas.openxmlformats.org/drawingml/2006/main" xmlns:r="http://schemas.openxmlformats.org/officeDocument/2006/relationships" xmlns:p="http://schemas.openxmlformats.org/presentationml/2006/main">
+  <p:cSld>
+    <p:spTree>
+      <p:nvGrpSpPr>
+        <p:cNvPr id="1" name=""/>
+        <p:cNvGrpSpPr/>
+        <p:nvPr/>
+      </p:nvGrpSpPr>
+      <p:grpSpPr>
+        <a:xfrm>
+          <a:off x="0" y="0"/>
+          <a:ext cx="0" cy="0"/>
+          <a:chOff x="0" y="0"/>
+          <a:chExt cx="0" cy="0"/>
+        </a:xfrm>
+      </p:grpSpPr>
+      <p:sp>
+        <p:nvSpPr>
+          <p:cNvPr id="6" name="TextBox 5"/>
+          <p:cNvSpPr txBox="1"/>
+          <p:nvPr/>
+        </p:nvSpPr>
+        <p:spPr>
+          <a:xfrm>
+            <a:off x="503852" y="625151"/>
+            <a:ext cx="10608906" cy="4278094"/>
+          </a:xfrm>
+          <a:prstGeom prst="rect">
+            <a:avLst/>
+          </a:prstGeom>
+          <a:noFill/>
+        </p:spPr>
+        <p:txBody>
+          <a:bodyPr wrap="square" rtlCol="0">
+            <a:spAutoFit/>
+          </a:bodyPr>
+          <a:lstStyle/>
+          <a:p>
+            <a:r>
+              <a:rPr lang="en-US" sz="2800" dirty="0" smtClean="0"/>
+              <a:t>PAGE Queue Object</a:t>
+            </a:r>
+          </a:p>
+          <a:p>
+            <a:r>
+              <a:rPr lang="en-US" dirty="0" smtClean="0"/>
+              <a:t>{</a:t>
+            </a:r>
+          </a:p>
+          <a:p>
+            <a:r>
+              <a:rPr lang="en-US" dirty="0" smtClean="0"/>
+              <a:t>   URL,</a:t>
+            </a:r>
+          </a:p>
+          <a:p>
+            <a:r>
+              <a:rPr lang="en-US" dirty="0"/>
+              <a:t> </a:t>
+            </a:r>
+            <a:r>
+              <a:rPr lang="en-US" dirty="0" smtClean="0"/>
+              <a:t>  QUERY ID,</a:t>
+            </a:r>
+          </a:p>
+          <a:p>
+            <a:r>
+              <a:rPr lang="en-US" dirty="0"/>
+              <a:t> </a:t>
+            </a:r>
+            <a:r>
+              <a:rPr lang="en-US" dirty="0" smtClean="0"/>
+              <a:t>  PARENT PAGE ID</a:t>
+            </a:r>
+          </a:p>
+          <a:p>
+            <a:r>
+              <a:rPr lang="en-US" dirty="0" smtClean="0"/>
+              <a:t>}</a:t>
+            </a:r>
+          </a:p>
+          <a:p>
+            <a:endParaRPr lang="en-US" dirty="0" smtClean="0"/>
+          </a:p>
+          <a:p>
+            <a:r>
+              <a:rPr lang="en-US" sz="2800" dirty="0"/>
+              <a:t>IMG Queue Object</a:t>
+            </a:r>
+          </a:p>
+          <a:p>
+            <a:r>
+              <a:rPr lang="en-US" dirty="0"/>
+              <a:t>{</a:t>
+            </a:r>
+          </a:p>
+          <a:p>
+            <a:r>
+              <a:rPr lang="en-US" dirty="0"/>
+              <a:t>    </a:t>
+            </a:r>
+            <a:r>
+              <a:rPr lang="en-US" dirty="0" smtClean="0"/>
+              <a:t>QUERY </a:t>
+            </a:r>
+            <a:r>
+              <a:rPr lang="en-US" dirty="0"/>
+              <a:t>ID,</a:t>
+            </a:r>
+            <a:endParaRPr lang="en-US" dirty="0" smtClean="0"/>
+          </a:p>
+          <a:p>
+            <a:r>
+              <a:rPr lang="en-US" dirty="0"/>
+              <a:t> </a:t>
+            </a:r>
+            <a:r>
+              <a:rPr lang="en-US" dirty="0" smtClean="0"/>
+              <a:t>   IMG </a:t>
+            </a:r>
+            <a:r>
+              <a:rPr lang="en-US" dirty="0"/>
+              <a:t>URL,</a:t>
+            </a:r>
+          </a:p>
+          <a:p>
+            <a:r>
+              <a:rPr lang="en-US" dirty="0"/>
+              <a:t>    PAGE ID</a:t>
+            </a:r>
+          </a:p>
+          <a:p>
+            <a:r>
+              <a:rPr lang="en-US" dirty="0"/>
+              <a:t>}</a:t>
+            </a:r>
+          </a:p>
+          <a:p>
+            <a:endParaRPr lang="en-US" dirty="0" smtClean="0"/>
+          </a:p>
+        </p:txBody>
+      </p:sp>
+    </p:spTree>
+    <p:extLst>
+      <p:ext uri="{BB962C8B-B14F-4D97-AF65-F5344CB8AC3E}">
+        <p14:creationId xmlns:p14="http://schemas.microsoft.com/office/powerpoint/2010/main" val="41853612"/>
+      </p:ext>
+    </p:extLst>
+  </p:cSld>
+  <p:clrMapOvr>
+    <a:masterClrMapping/>
+  </p:clrMapOvr>
+  <p:timing>
+    <p:tnLst>
+      <p:par>
+        <p:cTn id="1" dur="indefinite" restart="never" nodeType="tmRoot"/>
+      </p:par>
+    </p:tnLst>
+  </p:timing>
+</p:sld>
+</file>
+
 <file path=ppt/slides/slide15.xml><?xml version="1.0" encoding="utf-8"?>
 <p:sld xmlns:a="http://schemas.openxmlformats.org/drawingml/2006/main" xmlns:r="http://schemas.openxmlformats.org/officeDocument/2006/relationships" xmlns:p="http://schemas.openxmlformats.org/presentationml/2006/main">
   <p:cSld>
@@ -7529,8 +7560,8 @@
         </p:nvSpPr>
         <p:spPr>
           <a:xfrm>
-            <a:off x="535474" y="192372"/>
-            <a:ext cx="10608906" cy="1938992"/>
+            <a:off x="503852" y="625151"/>
+            <a:ext cx="10608906" cy="1631216"/>
           </a:xfrm>
           <a:prstGeom prst="rect">
             <a:avLst/>
@@ -7544,1066 +7575,55 @@
           <a:lstStyle/>
           <a:p>
             <a:r>
+              <a:rPr lang="en-US" sz="2800" dirty="0" err="1" smtClean="0"/>
+              <a:t>Enum</a:t>
+            </a:r>
+            <a:r>
               <a:rPr lang="en-US" sz="2800" dirty="0" smtClean="0"/>
-              <a:t>Database Tables</a:t>
-            </a:r>
-          </a:p>
-          <a:p>
+              <a:t> </a:t>
+            </a:r>
+            <a:r>
+              <a:rPr lang="en-US" sz="2800" dirty="0" err="1" smtClean="0"/>
+              <a:t>QueryStatus</a:t>
+            </a:r>
             <a:endParaRPr lang="en-US" sz="2800" dirty="0" smtClean="0"/>
           </a:p>
           <a:p>
-            <a:endParaRPr lang="en-US" dirty="0"/>
-          </a:p>
-          <a:p>
+            <a:r>
+              <a:rPr lang="en-US" dirty="0" smtClean="0"/>
+              <a:t>{</a:t>
+            </a:r>
+          </a:p>
+          <a:p>
+            <a:r>
+              <a:rPr lang="en-US" dirty="0" smtClean="0"/>
+              <a:t>   RUNNING,</a:t>
+            </a:r>
+          </a:p>
+          <a:p>
+            <a:r>
+              <a:rPr lang="en-US" dirty="0"/>
+              <a:t> </a:t>
+            </a:r>
+            <a:r>
+              <a:rPr lang="en-US" dirty="0" smtClean="0"/>
+              <a:t>  STOPPED</a:t>
+            </a:r>
             <a:endParaRPr lang="en-US" dirty="0" smtClean="0"/>
           </a:p>
           <a:p>
-            <a:endParaRPr lang="en-US" sz="1000" dirty="0">
-              <a:solidFill>
-                <a:schemeClr val="dk1"/>
-              </a:solidFill>
-            </a:endParaRPr>
-          </a:p>
-          <a:p>
+            <a:r>
+              <a:rPr lang="en-US" dirty="0" smtClean="0"/>
+              <a:t>}</a:t>
+            </a:r>
             <a:endParaRPr lang="en-US" dirty="0" smtClean="0"/>
-          </a:p>
-        </p:txBody>
-      </p:sp>
-      <p:graphicFrame>
-        <p:nvGraphicFramePr>
-          <p:cNvPr id="2" name="Table 1"/>
-          <p:cNvGraphicFramePr>
-            <a:graphicFrameLocks noGrp="1"/>
-          </p:cNvGraphicFramePr>
-          <p:nvPr>
-            <p:extLst>
-              <p:ext uri="{D42A27DB-BD31-4B8C-83A1-F6EECF244321}">
-                <p14:modId xmlns:p14="http://schemas.microsoft.com/office/powerpoint/2010/main" val="1600205025"/>
-              </p:ext>
-            </p:extLst>
-          </p:nvPr>
-        </p:nvGraphicFramePr>
-        <p:xfrm>
-          <a:off x="2940178" y="789890"/>
-          <a:ext cx="6586376" cy="1585990"/>
-        </p:xfrm>
-        <a:graphic>
-          <a:graphicData uri="http://schemas.openxmlformats.org/drawingml/2006/table">
-            <a:tbl>
-              <a:tblPr firstRow="1" bandRow="1">
-                <a:tableStyleId>{5C22544A-7EE6-4342-B048-85BDC9FD1C3A}</a:tableStyleId>
-              </a:tblPr>
-              <a:tblGrid>
-                <a:gridCol w="1651425"/>
-                <a:gridCol w="1641763"/>
-                <a:gridCol w="1646594"/>
-                <a:gridCol w="1646594"/>
-              </a:tblGrid>
-              <a:tr h="0">
-                <a:tc>
-                  <a:txBody>
-                    <a:bodyPr/>
-                    <a:lstStyle/>
-                    <a:p>
-                      <a:r>
-                        <a:rPr lang="en-US" sz="1000" dirty="0" smtClean="0"/>
-                        <a:t>Name</a:t>
-                      </a:r>
-                      <a:endParaRPr lang="en-US" sz="1000" dirty="0"/>
-                    </a:p>
-                  </a:txBody>
-                  <a:tcPr/>
-                </a:tc>
-                <a:tc>
-                  <a:txBody>
-                    <a:bodyPr/>
-                    <a:lstStyle/>
-                    <a:p>
-                      <a:r>
-                        <a:rPr lang="en-US" sz="1000" dirty="0" smtClean="0"/>
-                        <a:t>Type</a:t>
-                      </a:r>
-                      <a:endParaRPr lang="en-US" sz="1000" dirty="0"/>
-                    </a:p>
-                  </a:txBody>
-                  <a:tcPr/>
-                </a:tc>
-                <a:tc>
-                  <a:txBody>
-                    <a:bodyPr/>
-                    <a:lstStyle/>
-                    <a:p>
-                      <a:r>
-                        <a:rPr lang="en-US" sz="1000" dirty="0" smtClean="0"/>
-                        <a:t>Constraint</a:t>
-                      </a:r>
-                      <a:endParaRPr lang="en-US" sz="1000" dirty="0"/>
-                    </a:p>
-                  </a:txBody>
-                  <a:tcPr/>
-                </a:tc>
-                <a:tc>
-                  <a:txBody>
-                    <a:bodyPr/>
-                    <a:lstStyle/>
-                    <a:p>
-                      <a:r>
-                        <a:rPr lang="en-US" sz="1000" dirty="0" smtClean="0"/>
-                        <a:t>Description</a:t>
-                      </a:r>
-                      <a:endParaRPr lang="en-US" sz="1000" dirty="0"/>
-                    </a:p>
-                  </a:txBody>
-                  <a:tcPr/>
-                </a:tc>
-              </a:tr>
-              <a:tr h="274835">
-                <a:tc>
-                  <a:txBody>
-                    <a:bodyPr/>
-                    <a:lstStyle/>
-                    <a:p>
-                      <a:r>
-                        <a:rPr lang="en-US" sz="1000" dirty="0" smtClean="0"/>
-                        <a:t>id</a:t>
-                      </a:r>
-                      <a:endParaRPr lang="en-US" sz="1000" dirty="0"/>
-                    </a:p>
-                  </a:txBody>
-                  <a:tcPr/>
-                </a:tc>
-                <a:tc>
-                  <a:txBody>
-                    <a:bodyPr/>
-                    <a:lstStyle/>
-                    <a:p>
-                      <a:r>
-                        <a:rPr lang="en-US" sz="1000" dirty="0" smtClean="0"/>
-                        <a:t>INT</a:t>
-                      </a:r>
-                      <a:endParaRPr lang="en-US" sz="1000" dirty="0"/>
-                    </a:p>
-                  </a:txBody>
-                  <a:tcPr/>
-                </a:tc>
-                <a:tc>
-                  <a:txBody>
-                    <a:bodyPr/>
-                    <a:lstStyle/>
-                    <a:p>
-                      <a:r>
-                        <a:rPr lang="en-US" sz="1000" dirty="0" smtClean="0"/>
-                        <a:t>Primary Key, auto increment</a:t>
-                      </a:r>
-                      <a:endParaRPr lang="en-US" sz="1000" dirty="0"/>
-                    </a:p>
-                  </a:txBody>
-                  <a:tcPr/>
-                </a:tc>
-                <a:tc>
-                  <a:txBody>
-                    <a:bodyPr/>
-                    <a:lstStyle/>
-                    <a:p>
-                      <a:r>
-                        <a:rPr lang="en-US" sz="1000" dirty="0" smtClean="0"/>
-                        <a:t>ID</a:t>
-                      </a:r>
-                      <a:endParaRPr lang="en-US" sz="1000" dirty="0"/>
-                    </a:p>
-                  </a:txBody>
-                  <a:tcPr/>
-                </a:tc>
-              </a:tr>
-              <a:tr h="274835">
-                <a:tc>
-                  <a:txBody>
-                    <a:bodyPr/>
-                    <a:lstStyle/>
-                    <a:p>
-                      <a:r>
-                        <a:rPr lang="en-US" sz="1000" dirty="0" err="1" smtClean="0"/>
-                        <a:t>query_id</a:t>
-                      </a:r>
-                      <a:endParaRPr lang="en-US" sz="1000" dirty="0"/>
-                    </a:p>
-                  </a:txBody>
-                  <a:tcPr/>
-                </a:tc>
-                <a:tc>
-                  <a:txBody>
-                    <a:bodyPr/>
-                    <a:lstStyle/>
-                    <a:p>
-                      <a:r>
-                        <a:rPr lang="en-US" sz="1000" dirty="0" smtClean="0"/>
-                        <a:t>INT</a:t>
-                      </a:r>
-                      <a:endParaRPr lang="en-US" sz="1000" dirty="0"/>
-                    </a:p>
-                  </a:txBody>
-                  <a:tcPr/>
-                </a:tc>
-                <a:tc>
-                  <a:txBody>
-                    <a:bodyPr/>
-                    <a:lstStyle/>
-                    <a:p>
-                      <a:r>
-                        <a:rPr lang="en-US" sz="1000" dirty="0" smtClean="0"/>
-                        <a:t>Foreign</a:t>
-                      </a:r>
-                      <a:r>
-                        <a:rPr lang="en-US" sz="1000" baseline="0" dirty="0" smtClean="0"/>
-                        <a:t> key</a:t>
-                      </a:r>
-                      <a:endParaRPr lang="en-US" sz="1000" dirty="0"/>
-                    </a:p>
-                  </a:txBody>
-                  <a:tcPr/>
-                </a:tc>
-                <a:tc>
-                  <a:txBody>
-                    <a:bodyPr/>
-                    <a:lstStyle/>
-                    <a:p>
-                      <a:r>
-                        <a:rPr lang="en-US" sz="1000" dirty="0" smtClean="0"/>
-                        <a:t>Foreign key to query table</a:t>
-                      </a:r>
-                      <a:endParaRPr lang="en-US" sz="1000" dirty="0"/>
-                    </a:p>
-                  </a:txBody>
-                  <a:tcPr/>
-                </a:tc>
-              </a:tr>
-              <a:tr h="274835">
-                <a:tc>
-                  <a:txBody>
-                    <a:bodyPr/>
-                    <a:lstStyle/>
-                    <a:p>
-                      <a:r>
-                        <a:rPr lang="en-US" sz="1000" dirty="0" err="1" smtClean="0"/>
-                        <a:t>Start_time</a:t>
-                      </a:r>
-                      <a:endParaRPr lang="en-US" sz="1000" dirty="0"/>
-                    </a:p>
-                  </a:txBody>
-                  <a:tcPr/>
-                </a:tc>
-                <a:tc>
-                  <a:txBody>
-                    <a:bodyPr/>
-                    <a:lstStyle/>
-                    <a:p>
-                      <a:r>
-                        <a:rPr lang="en-US" sz="1000" dirty="0" smtClean="0"/>
-                        <a:t>TIMESTAMP</a:t>
-                      </a:r>
-                      <a:endParaRPr lang="en-US" sz="1000" dirty="0"/>
-                    </a:p>
-                  </a:txBody>
-                  <a:tcPr/>
-                </a:tc>
-                <a:tc>
-                  <a:txBody>
-                    <a:bodyPr/>
-                    <a:lstStyle/>
-                    <a:p>
-                      <a:r>
-                        <a:rPr lang="en-US" sz="1000" dirty="0" smtClean="0"/>
-                        <a:t>Not null</a:t>
-                      </a:r>
-                      <a:endParaRPr lang="en-US" sz="1000" dirty="0"/>
-                    </a:p>
-                  </a:txBody>
-                  <a:tcPr/>
-                </a:tc>
-                <a:tc>
-                  <a:txBody>
-                    <a:bodyPr/>
-                    <a:lstStyle/>
-                    <a:p>
-                      <a:pPr marL="0" marR="0" lvl="0" indent="0" algn="l" defTabSz="914400" rtl="0" eaLnBrk="1" fontAlgn="auto" latinLnBrk="0" hangingPunct="1">
-                        <a:lnSpc>
-                          <a:spcPct val="100000"/>
-                        </a:lnSpc>
-                        <a:spcBef>
-                          <a:spcPts val="0"/>
-                        </a:spcBef>
-                        <a:spcAft>
-                          <a:spcPts val="0"/>
-                        </a:spcAft>
-                        <a:buClrTx/>
-                        <a:buSzTx/>
-                        <a:buFontTx/>
-                        <a:buNone/>
-                        <a:tabLst/>
-                        <a:defRPr/>
-                      </a:pPr>
-                      <a:r>
-                        <a:rPr lang="en-US" sz="1000" dirty="0" smtClean="0"/>
-                        <a:t>The time when the search was</a:t>
-                      </a:r>
-                      <a:r>
-                        <a:rPr lang="en-US" sz="1000" baseline="0" dirty="0" smtClean="0"/>
-                        <a:t> started</a:t>
-                      </a:r>
-                      <a:endParaRPr lang="en-US" sz="1000" dirty="0" smtClean="0"/>
-                    </a:p>
-                  </a:txBody>
-                  <a:tcPr/>
-                </a:tc>
-              </a:tr>
-              <a:tr h="274835">
-                <a:tc>
-                  <a:txBody>
-                    <a:bodyPr/>
-                    <a:lstStyle/>
-                    <a:p>
-                      <a:r>
-                        <a:rPr lang="en-US" sz="1000" dirty="0" smtClean="0"/>
-                        <a:t>Status</a:t>
-                      </a:r>
-                      <a:endParaRPr lang="en-US" sz="1000" dirty="0"/>
-                    </a:p>
-                  </a:txBody>
-                  <a:tcPr>
-                    <a:solidFill>
-                      <a:schemeClr val="accent4"/>
-                    </a:solidFill>
-                  </a:tcPr>
-                </a:tc>
-                <a:tc>
-                  <a:txBody>
-                    <a:bodyPr/>
-                    <a:lstStyle/>
-                    <a:p>
-                      <a:r>
-                        <a:rPr lang="en-US" sz="1000" dirty="0" smtClean="0"/>
-                        <a:t>VARCHAR(20)</a:t>
-                      </a:r>
-                      <a:endParaRPr lang="en-US" sz="1000" dirty="0"/>
-                    </a:p>
-                  </a:txBody>
-                  <a:tcPr>
-                    <a:solidFill>
-                      <a:schemeClr val="accent4"/>
-                    </a:solidFill>
-                  </a:tcPr>
-                </a:tc>
-                <a:tc>
-                  <a:txBody>
-                    <a:bodyPr/>
-                    <a:lstStyle/>
-                    <a:p>
-                      <a:r>
-                        <a:rPr lang="en-US" sz="1000" dirty="0" smtClean="0"/>
-                        <a:t>Not Null</a:t>
-                      </a:r>
-                      <a:endParaRPr lang="en-US" sz="1000" dirty="0"/>
-                    </a:p>
-                  </a:txBody>
-                  <a:tcPr>
-                    <a:solidFill>
-                      <a:schemeClr val="accent4"/>
-                    </a:solidFill>
-                  </a:tcPr>
-                </a:tc>
-                <a:tc>
-                  <a:txBody>
-                    <a:bodyPr/>
-                    <a:lstStyle/>
-                    <a:p>
-                      <a:pPr marL="0" marR="0" lvl="0" indent="0" algn="l" defTabSz="914400" rtl="0" eaLnBrk="1" fontAlgn="auto" latinLnBrk="0" hangingPunct="1">
-                        <a:lnSpc>
-                          <a:spcPct val="100000"/>
-                        </a:lnSpc>
-                        <a:spcBef>
-                          <a:spcPts val="0"/>
-                        </a:spcBef>
-                        <a:spcAft>
-                          <a:spcPts val="0"/>
-                        </a:spcAft>
-                        <a:buClrTx/>
-                        <a:buSzTx/>
-                        <a:buFontTx/>
-                        <a:buNone/>
-                        <a:tabLst/>
-                        <a:defRPr/>
-                      </a:pPr>
-                      <a:r>
-                        <a:rPr lang="en-US" sz="1000" dirty="0" smtClean="0"/>
-                        <a:t>In</a:t>
-                      </a:r>
-                      <a:r>
-                        <a:rPr lang="en-US" sz="1000" baseline="0" dirty="0" smtClean="0"/>
-                        <a:t> Progress, Stopped</a:t>
-                      </a:r>
-                      <a:endParaRPr lang="en-US" sz="1000" dirty="0" smtClean="0"/>
-                    </a:p>
-                  </a:txBody>
-                  <a:tcPr>
-                    <a:solidFill>
-                      <a:schemeClr val="accent4"/>
-                    </a:solidFill>
-                  </a:tcPr>
-                </a:tc>
-              </a:tr>
-            </a:tbl>
-          </a:graphicData>
-        </a:graphic>
-      </p:graphicFrame>
-      <p:sp>
-        <p:nvSpPr>
-          <p:cNvPr id="9" name="Rectangle 8"/>
-          <p:cNvSpPr/>
-          <p:nvPr/>
-        </p:nvSpPr>
-        <p:spPr>
-          <a:xfrm>
-            <a:off x="687874" y="743139"/>
-            <a:ext cx="1559273" cy="369332"/>
-          </a:xfrm>
-          <a:prstGeom prst="rect">
-            <a:avLst/>
-          </a:prstGeom>
-        </p:spPr>
-        <p:txBody>
-          <a:bodyPr wrap="none">
-            <a:spAutoFit/>
-          </a:bodyPr>
-          <a:lstStyle/>
-          <a:p>
-            <a:r>
-              <a:rPr lang="en-US" dirty="0" err="1" smtClean="0"/>
-              <a:t>current_query</a:t>
-            </a:r>
-            <a:endParaRPr lang="en-US" dirty="0"/>
-          </a:p>
-        </p:txBody>
-      </p:sp>
-      <p:sp>
-        <p:nvSpPr>
-          <p:cNvPr id="10" name="TextBox 9"/>
-          <p:cNvSpPr txBox="1"/>
-          <p:nvPr/>
-        </p:nvSpPr>
-        <p:spPr>
-          <a:xfrm>
-            <a:off x="687874" y="1121523"/>
-            <a:ext cx="1390261" cy="400110"/>
-          </a:xfrm>
-          <a:prstGeom prst="rect">
-            <a:avLst/>
-          </a:prstGeom>
-          <a:noFill/>
-        </p:spPr>
-        <p:txBody>
-          <a:bodyPr wrap="square" rtlCol="0">
-            <a:spAutoFit/>
-          </a:bodyPr>
-          <a:lstStyle/>
-          <a:p>
-            <a:r>
-              <a:rPr lang="en-US" sz="1000" dirty="0" smtClean="0"/>
-              <a:t>Status for current </a:t>
-            </a:r>
-            <a:r>
-              <a:rPr lang="en-US" sz="1000" dirty="0" smtClean="0"/>
-              <a:t>search queries</a:t>
-            </a:r>
-            <a:endParaRPr lang="en-US" sz="1000" dirty="0"/>
-          </a:p>
-        </p:txBody>
-      </p:sp>
-      <p:graphicFrame>
-        <p:nvGraphicFramePr>
-          <p:cNvPr id="13" name="Table 12"/>
-          <p:cNvGraphicFramePr>
-            <a:graphicFrameLocks noGrp="1"/>
-          </p:cNvGraphicFramePr>
-          <p:nvPr>
-            <p:extLst>
-              <p:ext uri="{D42A27DB-BD31-4B8C-83A1-F6EECF244321}">
-                <p14:modId xmlns:p14="http://schemas.microsoft.com/office/powerpoint/2010/main" val="4142426787"/>
-              </p:ext>
-            </p:extLst>
-          </p:nvPr>
-        </p:nvGraphicFramePr>
-        <p:xfrm>
-          <a:off x="2940178" y="2612469"/>
-          <a:ext cx="6586376" cy="914915"/>
-        </p:xfrm>
-        <a:graphic>
-          <a:graphicData uri="http://schemas.openxmlformats.org/drawingml/2006/table">
-            <a:tbl>
-              <a:tblPr firstRow="1" bandRow="1">
-                <a:tableStyleId>{5C22544A-7EE6-4342-B048-85BDC9FD1C3A}</a:tableStyleId>
-              </a:tblPr>
-              <a:tblGrid>
-                <a:gridCol w="1651425"/>
-                <a:gridCol w="1641763"/>
-                <a:gridCol w="1646594"/>
-                <a:gridCol w="1646594"/>
-              </a:tblGrid>
-              <a:tr h="0">
-                <a:tc>
-                  <a:txBody>
-                    <a:bodyPr/>
-                    <a:lstStyle/>
-                    <a:p>
-                      <a:r>
-                        <a:rPr lang="en-US" sz="1000" dirty="0" smtClean="0"/>
-                        <a:t>Name</a:t>
-                      </a:r>
-                      <a:endParaRPr lang="en-US" sz="1000" dirty="0"/>
-                    </a:p>
-                  </a:txBody>
-                  <a:tcPr/>
-                </a:tc>
-                <a:tc>
-                  <a:txBody>
-                    <a:bodyPr/>
-                    <a:lstStyle/>
-                    <a:p>
-                      <a:r>
-                        <a:rPr lang="en-US" sz="1000" dirty="0" smtClean="0"/>
-                        <a:t>Type</a:t>
-                      </a:r>
-                      <a:endParaRPr lang="en-US" sz="1000" dirty="0"/>
-                    </a:p>
-                  </a:txBody>
-                  <a:tcPr/>
-                </a:tc>
-                <a:tc>
-                  <a:txBody>
-                    <a:bodyPr/>
-                    <a:lstStyle/>
-                    <a:p>
-                      <a:r>
-                        <a:rPr lang="en-US" sz="1000" dirty="0" smtClean="0"/>
-                        <a:t>Constraint</a:t>
-                      </a:r>
-                      <a:endParaRPr lang="en-US" sz="1000" dirty="0"/>
-                    </a:p>
-                  </a:txBody>
-                  <a:tcPr/>
-                </a:tc>
-                <a:tc>
-                  <a:txBody>
-                    <a:bodyPr/>
-                    <a:lstStyle/>
-                    <a:p>
-                      <a:r>
-                        <a:rPr lang="en-US" sz="1000" dirty="0" smtClean="0"/>
-                        <a:t>Description</a:t>
-                      </a:r>
-                      <a:endParaRPr lang="en-US" sz="1000" dirty="0"/>
-                    </a:p>
-                  </a:txBody>
-                  <a:tcPr/>
-                </a:tc>
-              </a:tr>
-              <a:tr h="274835">
-                <a:tc>
-                  <a:txBody>
-                    <a:bodyPr/>
-                    <a:lstStyle/>
-                    <a:p>
-                      <a:r>
-                        <a:rPr lang="en-US" sz="1000" dirty="0" err="1" smtClean="0"/>
-                        <a:t>current_query_id</a:t>
-                      </a:r>
-                      <a:endParaRPr lang="en-US" sz="1000" dirty="0"/>
-                    </a:p>
-                  </a:txBody>
-                  <a:tcPr/>
-                </a:tc>
-                <a:tc>
-                  <a:txBody>
-                    <a:bodyPr/>
-                    <a:lstStyle/>
-                    <a:p>
-                      <a:r>
-                        <a:rPr lang="en-US" sz="1000" dirty="0" smtClean="0"/>
-                        <a:t>INT</a:t>
-                      </a:r>
-                      <a:endParaRPr lang="en-US" sz="1000" dirty="0"/>
-                    </a:p>
-                  </a:txBody>
-                  <a:tcPr/>
-                </a:tc>
-                <a:tc>
-                  <a:txBody>
-                    <a:bodyPr/>
-                    <a:lstStyle/>
-                    <a:p>
-                      <a:r>
-                        <a:rPr lang="en-US" sz="1000" dirty="0" smtClean="0"/>
-                        <a:t>Foreign</a:t>
-                      </a:r>
-                      <a:r>
-                        <a:rPr lang="en-US" sz="1000" baseline="0" dirty="0" smtClean="0"/>
-                        <a:t> key</a:t>
-                      </a:r>
-                      <a:endParaRPr lang="en-US" sz="1000" dirty="0"/>
-                    </a:p>
-                  </a:txBody>
-                  <a:tcPr/>
-                </a:tc>
-                <a:tc>
-                  <a:txBody>
-                    <a:bodyPr/>
-                    <a:lstStyle/>
-                    <a:p>
-                      <a:r>
-                        <a:rPr lang="en-US" sz="1000" dirty="0" smtClean="0"/>
-                        <a:t>Foreign key to </a:t>
-                      </a:r>
-                      <a:r>
-                        <a:rPr lang="en-US" sz="1000" dirty="0" err="1" smtClean="0"/>
-                        <a:t>current_query</a:t>
-                      </a:r>
-                      <a:r>
-                        <a:rPr lang="en-US" sz="1000" dirty="0" smtClean="0"/>
-                        <a:t> </a:t>
-                      </a:r>
-                      <a:r>
-                        <a:rPr lang="en-US" sz="1000" baseline="0" dirty="0" smtClean="0"/>
-                        <a:t>table</a:t>
-                      </a:r>
-                      <a:endParaRPr lang="en-US" sz="1000" dirty="0"/>
-                    </a:p>
-                  </a:txBody>
-                  <a:tcPr/>
-                </a:tc>
-              </a:tr>
-              <a:tr h="274835">
-                <a:tc>
-                  <a:txBody>
-                    <a:bodyPr/>
-                    <a:lstStyle/>
-                    <a:p>
-                      <a:r>
-                        <a:rPr lang="en-US" sz="1000" dirty="0" err="1" smtClean="0"/>
-                        <a:t>page_id</a:t>
-                      </a:r>
-                      <a:endParaRPr lang="en-US" sz="1000" dirty="0"/>
-                    </a:p>
-                  </a:txBody>
-                  <a:tcPr/>
-                </a:tc>
-                <a:tc>
-                  <a:txBody>
-                    <a:bodyPr/>
-                    <a:lstStyle/>
-                    <a:p>
-                      <a:r>
-                        <a:rPr lang="en-US" sz="1000" dirty="0" smtClean="0"/>
-                        <a:t>INT</a:t>
-                      </a:r>
-                      <a:endParaRPr lang="en-US" sz="1000" dirty="0"/>
-                    </a:p>
-                  </a:txBody>
-                  <a:tcPr/>
-                </a:tc>
-                <a:tc>
-                  <a:txBody>
-                    <a:bodyPr/>
-                    <a:lstStyle/>
-                    <a:p>
-                      <a:r>
-                        <a:rPr lang="en-US" sz="1000" dirty="0" smtClean="0"/>
-                        <a:t>Foreign</a:t>
-                      </a:r>
-                      <a:r>
-                        <a:rPr lang="en-US" sz="1000" baseline="0" dirty="0" smtClean="0"/>
-                        <a:t> key</a:t>
-                      </a:r>
-                      <a:endParaRPr lang="en-US" sz="1000" dirty="0"/>
-                    </a:p>
-                  </a:txBody>
-                  <a:tcPr/>
-                </a:tc>
-                <a:tc>
-                  <a:txBody>
-                    <a:bodyPr/>
-                    <a:lstStyle/>
-                    <a:p>
-                      <a:r>
-                        <a:rPr lang="en-US" sz="1000" dirty="0" smtClean="0"/>
-                        <a:t>Foreign key to page</a:t>
-                      </a:r>
-                      <a:r>
-                        <a:rPr lang="en-US" sz="1000" baseline="0" dirty="0" smtClean="0"/>
-                        <a:t> table</a:t>
-                      </a:r>
-                      <a:endParaRPr lang="en-US" sz="1000" dirty="0"/>
-                    </a:p>
-                  </a:txBody>
-                  <a:tcPr/>
-                </a:tc>
-              </a:tr>
-            </a:tbl>
-          </a:graphicData>
-        </a:graphic>
-      </p:graphicFrame>
-      <p:sp>
-        <p:nvSpPr>
-          <p:cNvPr id="14" name="Rectangle 13"/>
-          <p:cNvSpPr/>
-          <p:nvPr/>
-        </p:nvSpPr>
-        <p:spPr>
-          <a:xfrm>
-            <a:off x="687874" y="2565718"/>
-            <a:ext cx="2219390" cy="369332"/>
-          </a:xfrm>
-          <a:prstGeom prst="rect">
-            <a:avLst/>
-          </a:prstGeom>
-        </p:spPr>
-        <p:txBody>
-          <a:bodyPr wrap="none">
-            <a:spAutoFit/>
-          </a:bodyPr>
-          <a:lstStyle/>
-          <a:p>
-            <a:r>
-              <a:rPr lang="en-US" dirty="0" err="1" smtClean="0"/>
-              <a:t>current_query_pages</a:t>
-            </a:r>
-            <a:endParaRPr lang="en-US" dirty="0"/>
-          </a:p>
-        </p:txBody>
-      </p:sp>
-      <p:sp>
-        <p:nvSpPr>
-          <p:cNvPr id="15" name="TextBox 14"/>
-          <p:cNvSpPr txBox="1"/>
-          <p:nvPr/>
-        </p:nvSpPr>
-        <p:spPr>
-          <a:xfrm>
-            <a:off x="687874" y="2944102"/>
-            <a:ext cx="1390261" cy="400110"/>
-          </a:xfrm>
-          <a:prstGeom prst="rect">
-            <a:avLst/>
-          </a:prstGeom>
-          <a:noFill/>
-        </p:spPr>
-        <p:txBody>
-          <a:bodyPr wrap="square" rtlCol="0">
-            <a:spAutoFit/>
-          </a:bodyPr>
-          <a:lstStyle/>
-          <a:p>
-            <a:r>
-              <a:rPr lang="en-US" sz="1000" dirty="0" smtClean="0"/>
-              <a:t>The pages found during a search</a:t>
-            </a:r>
-            <a:endParaRPr lang="en-US" sz="1000" dirty="0"/>
-          </a:p>
-        </p:txBody>
-      </p:sp>
-      <p:graphicFrame>
-        <p:nvGraphicFramePr>
-          <p:cNvPr id="16" name="Table 15"/>
-          <p:cNvGraphicFramePr>
-            <a:graphicFrameLocks noGrp="1"/>
-          </p:cNvGraphicFramePr>
-          <p:nvPr>
-            <p:extLst>
-              <p:ext uri="{D42A27DB-BD31-4B8C-83A1-F6EECF244321}">
-                <p14:modId xmlns:p14="http://schemas.microsoft.com/office/powerpoint/2010/main" val="1282330827"/>
-              </p:ext>
-            </p:extLst>
-          </p:nvPr>
-        </p:nvGraphicFramePr>
-        <p:xfrm>
-          <a:off x="2940178" y="4033832"/>
-          <a:ext cx="6586376" cy="914915"/>
-        </p:xfrm>
-        <a:graphic>
-          <a:graphicData uri="http://schemas.openxmlformats.org/drawingml/2006/table">
-            <a:tbl>
-              <a:tblPr firstRow="1" bandRow="1">
-                <a:tableStyleId>{5C22544A-7EE6-4342-B048-85BDC9FD1C3A}</a:tableStyleId>
-              </a:tblPr>
-              <a:tblGrid>
-                <a:gridCol w="1651425"/>
-                <a:gridCol w="1641763"/>
-                <a:gridCol w="1646594"/>
-                <a:gridCol w="1646594"/>
-              </a:tblGrid>
-              <a:tr h="0">
-                <a:tc>
-                  <a:txBody>
-                    <a:bodyPr/>
-                    <a:lstStyle/>
-                    <a:p>
-                      <a:r>
-                        <a:rPr lang="en-US" sz="1000" dirty="0" smtClean="0"/>
-                        <a:t>Name</a:t>
-                      </a:r>
-                      <a:endParaRPr lang="en-US" sz="1000" dirty="0"/>
-                    </a:p>
-                  </a:txBody>
-                  <a:tcPr/>
-                </a:tc>
-                <a:tc>
-                  <a:txBody>
-                    <a:bodyPr/>
-                    <a:lstStyle/>
-                    <a:p>
-                      <a:r>
-                        <a:rPr lang="en-US" sz="1000" dirty="0" smtClean="0"/>
-                        <a:t>Type</a:t>
-                      </a:r>
-                      <a:endParaRPr lang="en-US" sz="1000" dirty="0"/>
-                    </a:p>
-                  </a:txBody>
-                  <a:tcPr/>
-                </a:tc>
-                <a:tc>
-                  <a:txBody>
-                    <a:bodyPr/>
-                    <a:lstStyle/>
-                    <a:p>
-                      <a:r>
-                        <a:rPr lang="en-US" sz="1000" dirty="0" smtClean="0"/>
-                        <a:t>Constraint</a:t>
-                      </a:r>
-                      <a:endParaRPr lang="en-US" sz="1000" dirty="0"/>
-                    </a:p>
-                  </a:txBody>
-                  <a:tcPr/>
-                </a:tc>
-                <a:tc>
-                  <a:txBody>
-                    <a:bodyPr/>
-                    <a:lstStyle/>
-                    <a:p>
-                      <a:r>
-                        <a:rPr lang="en-US" sz="1000" dirty="0" smtClean="0"/>
-                        <a:t>Description</a:t>
-                      </a:r>
-                      <a:endParaRPr lang="en-US" sz="1000" dirty="0"/>
-                    </a:p>
-                  </a:txBody>
-                  <a:tcPr/>
-                </a:tc>
-              </a:tr>
-              <a:tr h="274835">
-                <a:tc>
-                  <a:txBody>
-                    <a:bodyPr/>
-                    <a:lstStyle/>
-                    <a:p>
-                      <a:r>
-                        <a:rPr lang="en-US" sz="1000" dirty="0" err="1" smtClean="0"/>
-                        <a:t>current_query_id</a:t>
-                      </a:r>
-                      <a:endParaRPr lang="en-US" sz="1000" dirty="0"/>
-                    </a:p>
-                  </a:txBody>
-                  <a:tcPr/>
-                </a:tc>
-                <a:tc>
-                  <a:txBody>
-                    <a:bodyPr/>
-                    <a:lstStyle/>
-                    <a:p>
-                      <a:r>
-                        <a:rPr lang="en-US" sz="1000" dirty="0" smtClean="0"/>
-                        <a:t>INT</a:t>
-                      </a:r>
-                      <a:endParaRPr lang="en-US" sz="1000" dirty="0"/>
-                    </a:p>
-                  </a:txBody>
-                  <a:tcPr/>
-                </a:tc>
-                <a:tc>
-                  <a:txBody>
-                    <a:bodyPr/>
-                    <a:lstStyle/>
-                    <a:p>
-                      <a:r>
-                        <a:rPr lang="en-US" sz="1000" dirty="0" smtClean="0"/>
-                        <a:t>Foreign</a:t>
-                      </a:r>
-                      <a:r>
-                        <a:rPr lang="en-US" sz="1000" baseline="0" dirty="0" smtClean="0"/>
-                        <a:t> key</a:t>
-                      </a:r>
-                      <a:endParaRPr lang="en-US" sz="1000" dirty="0"/>
-                    </a:p>
-                  </a:txBody>
-                  <a:tcPr/>
-                </a:tc>
-                <a:tc>
-                  <a:txBody>
-                    <a:bodyPr/>
-                    <a:lstStyle/>
-                    <a:p>
-                      <a:r>
-                        <a:rPr lang="en-US" sz="1000" dirty="0" smtClean="0"/>
-                        <a:t>Foreign key to </a:t>
-                      </a:r>
-                      <a:r>
-                        <a:rPr lang="en-US" sz="1000" dirty="0" err="1" smtClean="0"/>
-                        <a:t>current_query</a:t>
-                      </a:r>
-                      <a:r>
-                        <a:rPr lang="en-US" sz="1000" dirty="0" smtClean="0"/>
-                        <a:t> </a:t>
-                      </a:r>
-                      <a:r>
-                        <a:rPr lang="en-US" sz="1000" baseline="0" dirty="0" smtClean="0"/>
-                        <a:t>table</a:t>
-                      </a:r>
-                      <a:endParaRPr lang="en-US" sz="1000" dirty="0"/>
-                    </a:p>
-                  </a:txBody>
-                  <a:tcPr/>
-                </a:tc>
-              </a:tr>
-              <a:tr h="274835">
-                <a:tc>
-                  <a:txBody>
-                    <a:bodyPr/>
-                    <a:lstStyle/>
-                    <a:p>
-                      <a:r>
-                        <a:rPr lang="en-US" sz="1000" dirty="0" err="1" smtClean="0"/>
-                        <a:t>Image_id</a:t>
-                      </a:r>
-                      <a:endParaRPr lang="en-US" sz="1000" dirty="0"/>
-                    </a:p>
-                  </a:txBody>
-                  <a:tcPr/>
-                </a:tc>
-                <a:tc>
-                  <a:txBody>
-                    <a:bodyPr/>
-                    <a:lstStyle/>
-                    <a:p>
-                      <a:r>
-                        <a:rPr lang="en-US" sz="1000" dirty="0" smtClean="0"/>
-                        <a:t>INT</a:t>
-                      </a:r>
-                      <a:endParaRPr lang="en-US" sz="1000" dirty="0"/>
-                    </a:p>
-                  </a:txBody>
-                  <a:tcPr/>
-                </a:tc>
-                <a:tc>
-                  <a:txBody>
-                    <a:bodyPr/>
-                    <a:lstStyle/>
-                    <a:p>
-                      <a:r>
-                        <a:rPr lang="en-US" sz="1000" dirty="0" smtClean="0"/>
-                        <a:t>Foreign</a:t>
-                      </a:r>
-                      <a:r>
-                        <a:rPr lang="en-US" sz="1000" baseline="0" dirty="0" smtClean="0"/>
-                        <a:t> key</a:t>
-                      </a:r>
-                      <a:endParaRPr lang="en-US" sz="1000" dirty="0"/>
-                    </a:p>
-                  </a:txBody>
-                  <a:tcPr/>
-                </a:tc>
-                <a:tc>
-                  <a:txBody>
-                    <a:bodyPr/>
-                    <a:lstStyle/>
-                    <a:p>
-                      <a:r>
-                        <a:rPr lang="en-US" sz="1000" dirty="0" smtClean="0"/>
-                        <a:t>Foreign key to image </a:t>
-                      </a:r>
-                      <a:r>
-                        <a:rPr lang="en-US" sz="1000" baseline="0" dirty="0" smtClean="0"/>
-                        <a:t>table</a:t>
-                      </a:r>
-                      <a:endParaRPr lang="en-US" sz="1000" dirty="0"/>
-                    </a:p>
-                  </a:txBody>
-                  <a:tcPr/>
-                </a:tc>
-              </a:tr>
-            </a:tbl>
-          </a:graphicData>
-        </a:graphic>
-      </p:graphicFrame>
-      <p:sp>
-        <p:nvSpPr>
-          <p:cNvPr id="17" name="Rectangle 16"/>
-          <p:cNvSpPr/>
-          <p:nvPr/>
-        </p:nvSpPr>
-        <p:spPr>
-          <a:xfrm>
-            <a:off x="687874" y="3987081"/>
-            <a:ext cx="2334806" cy="369332"/>
-          </a:xfrm>
-          <a:prstGeom prst="rect">
-            <a:avLst/>
-          </a:prstGeom>
-        </p:spPr>
-        <p:txBody>
-          <a:bodyPr wrap="none">
-            <a:spAutoFit/>
-          </a:bodyPr>
-          <a:lstStyle/>
-          <a:p>
-            <a:r>
-              <a:rPr lang="en-US" dirty="0" err="1" smtClean="0"/>
-              <a:t>current_query_images</a:t>
-            </a:r>
-            <a:endParaRPr lang="en-US" dirty="0"/>
-          </a:p>
-        </p:txBody>
-      </p:sp>
-      <p:sp>
-        <p:nvSpPr>
-          <p:cNvPr id="18" name="TextBox 17"/>
-          <p:cNvSpPr txBox="1"/>
-          <p:nvPr/>
-        </p:nvSpPr>
-        <p:spPr>
-          <a:xfrm>
-            <a:off x="687874" y="4365465"/>
-            <a:ext cx="1390261" cy="400110"/>
-          </a:xfrm>
-          <a:prstGeom prst="rect">
-            <a:avLst/>
-          </a:prstGeom>
-          <a:noFill/>
-        </p:spPr>
-        <p:txBody>
-          <a:bodyPr wrap="square" rtlCol="0">
-            <a:spAutoFit/>
-          </a:bodyPr>
-          <a:lstStyle/>
-          <a:p>
-            <a:r>
-              <a:rPr lang="en-US" sz="1000" dirty="0" smtClean="0"/>
-              <a:t>The images found during a search</a:t>
-            </a:r>
-            <a:endParaRPr lang="en-US" sz="1000" dirty="0"/>
           </a:p>
         </p:txBody>
       </p:sp>
     </p:spTree>
     <p:extLst>
       <p:ext uri="{BB962C8B-B14F-4D97-AF65-F5344CB8AC3E}">
-        <p14:creationId xmlns:p14="http://schemas.microsoft.com/office/powerpoint/2010/main" val="4031162409"/>
+        <p14:creationId xmlns:p14="http://schemas.microsoft.com/office/powerpoint/2010/main" val="3770978"/>
       </p:ext>
     </p:extLst>
   </p:cSld>
@@ -8645,8 +7665,8 @@
         </p:nvSpPr>
         <p:spPr>
           <a:xfrm>
-            <a:off x="503852" y="625151"/>
-            <a:ext cx="10608906" cy="4278094"/>
+            <a:off x="951722" y="1045029"/>
+            <a:ext cx="10608906" cy="2400657"/>
           </a:xfrm>
           <a:prstGeom prst="rect">
             <a:avLst/>
@@ -8661,112 +7681,540 @@
           <a:p>
             <a:r>
               <a:rPr lang="en-US" sz="2800" dirty="0" smtClean="0"/>
-              <a:t>PAGE Queue Object</a:t>
-            </a:r>
-          </a:p>
-          <a:p>
-            <a:r>
-              <a:rPr lang="en-US" dirty="0" smtClean="0"/>
-              <a:t>{</a:t>
-            </a:r>
-          </a:p>
-          <a:p>
-            <a:r>
-              <a:rPr lang="en-US" dirty="0" smtClean="0"/>
-              <a:t>   URL,</a:t>
-            </a:r>
-          </a:p>
-          <a:p>
-            <a:r>
-              <a:rPr lang="en-US" dirty="0"/>
-              <a:t> </a:t>
-            </a:r>
-            <a:r>
-              <a:rPr lang="en-US" dirty="0" smtClean="0"/>
-              <a:t>  QUERY ID,</a:t>
-            </a:r>
-          </a:p>
-          <a:p>
-            <a:r>
-              <a:rPr lang="en-US" dirty="0"/>
-              <a:t> </a:t>
-            </a:r>
-            <a:r>
-              <a:rPr lang="en-US" dirty="0" smtClean="0"/>
-              <a:t>  PARENT PAGE ID</a:t>
-            </a:r>
-          </a:p>
-          <a:p>
-            <a:r>
-              <a:rPr lang="en-US" dirty="0" smtClean="0"/>
-              <a:t>}</a:t>
-            </a:r>
-          </a:p>
-          <a:p>
+              <a:t>REST API</a:t>
+            </a:r>
+            <a:endParaRPr lang="en-US" sz="2800" dirty="0" smtClean="0"/>
+          </a:p>
+          <a:p>
+            <a:endParaRPr lang="en-US" sz="2800" dirty="0" smtClean="0"/>
+          </a:p>
+          <a:p>
+            <a:endParaRPr lang="en-US" sz="1200" dirty="0"/>
+          </a:p>
+          <a:p>
+            <a:pPr marL="342900" indent="-342900">
+              <a:buFont typeface="+mj-lt"/>
+              <a:buAutoNum type="arabicPeriod"/>
+            </a:pPr>
             <a:endParaRPr lang="en-US" dirty="0" smtClean="0"/>
           </a:p>
           <a:p>
-            <a:r>
-              <a:rPr lang="en-US" sz="2800" dirty="0"/>
-              <a:t>IMG Queue Object</a:t>
-            </a:r>
-          </a:p>
-          <a:p>
-            <a:r>
-              <a:rPr lang="en-US" dirty="0"/>
-              <a:t>{</a:t>
-            </a:r>
-          </a:p>
-          <a:p>
-            <a:r>
-              <a:rPr lang="en-US" dirty="0"/>
-              <a:t>    </a:t>
-            </a:r>
-            <a:r>
-              <a:rPr lang="en-US" dirty="0" smtClean="0"/>
-              <a:t>QUERY </a:t>
-            </a:r>
-            <a:r>
-              <a:rPr lang="en-US" dirty="0"/>
-              <a:t>ID,</a:t>
-            </a:r>
+            <a:pPr marL="342900" indent="-342900">
+              <a:buFont typeface="+mj-lt"/>
+              <a:buAutoNum type="arabicPeriod"/>
+            </a:pPr>
+            <a:endParaRPr lang="en-US" dirty="0"/>
+          </a:p>
+          <a:p>
+            <a:pPr marL="342900" indent="-342900">
+              <a:buFont typeface="+mj-lt"/>
+              <a:buAutoNum type="arabicPeriod"/>
+            </a:pPr>
             <a:endParaRPr lang="en-US" dirty="0" smtClean="0"/>
           </a:p>
           <a:p>
-            <a:r>
-              <a:rPr lang="en-US" dirty="0"/>
-              <a:t> </a:t>
-            </a:r>
-            <a:r>
-              <a:rPr lang="en-US" dirty="0" smtClean="0"/>
-              <a:t>   IMG </a:t>
-            </a:r>
-            <a:r>
-              <a:rPr lang="en-US" dirty="0"/>
-              <a:t>URL,</a:t>
-            </a:r>
-          </a:p>
-          <a:p>
-            <a:r>
-              <a:rPr lang="en-US" dirty="0"/>
-              <a:t>    PAGE ID</a:t>
-            </a:r>
-          </a:p>
-          <a:p>
-            <a:r>
-              <a:rPr lang="en-US" dirty="0"/>
-              <a:t>}</a:t>
-            </a:r>
-          </a:p>
-          <a:p>
-            <a:endParaRPr lang="en-US" dirty="0" smtClean="0"/>
-          </a:p>
-        </p:txBody>
-      </p:sp>
+            <a:pPr marL="342900" indent="-342900">
+              <a:buFont typeface="+mj-lt"/>
+              <a:buAutoNum type="arabicPeriod"/>
+            </a:pPr>
+            <a:endParaRPr lang="en-US" sz="2800" dirty="0"/>
+          </a:p>
+        </p:txBody>
+      </p:sp>
+      <p:graphicFrame>
+        <p:nvGraphicFramePr>
+          <p:cNvPr id="2" name="Table 1"/>
+          <p:cNvGraphicFramePr>
+            <a:graphicFrameLocks noGrp="1"/>
+          </p:cNvGraphicFramePr>
+          <p:nvPr>
+            <p:extLst>
+              <p:ext uri="{D42A27DB-BD31-4B8C-83A1-F6EECF244321}">
+                <p14:modId xmlns:p14="http://schemas.microsoft.com/office/powerpoint/2010/main" val="432316237"/>
+              </p:ext>
+            </p:extLst>
+          </p:nvPr>
+        </p:nvGraphicFramePr>
+        <p:xfrm>
+          <a:off x="1229568" y="2081935"/>
+          <a:ext cx="9528628" cy="2966720"/>
+        </p:xfrm>
+        <a:graphic>
+          <a:graphicData uri="http://schemas.openxmlformats.org/drawingml/2006/table">
+            <a:tbl>
+              <a:tblPr firstRow="1" bandRow="1">
+                <a:tableStyleId>{5C22544A-7EE6-4342-B048-85BDC9FD1C3A}</a:tableStyleId>
+              </a:tblPr>
+              <a:tblGrid>
+                <a:gridCol w="2382157"/>
+                <a:gridCol w="2382157"/>
+                <a:gridCol w="2382157"/>
+                <a:gridCol w="2382157"/>
+              </a:tblGrid>
+              <a:tr h="370840">
+                <a:tc>
+                  <a:txBody>
+                    <a:bodyPr/>
+                    <a:lstStyle/>
+                    <a:p>
+                      <a:r>
+                        <a:rPr lang="en-US" dirty="0" smtClean="0"/>
+                        <a:t>API Call</a:t>
+                      </a:r>
+                      <a:endParaRPr lang="en-US" dirty="0"/>
+                    </a:p>
+                  </a:txBody>
+                  <a:tcPr/>
+                </a:tc>
+                <a:tc>
+                  <a:txBody>
+                    <a:bodyPr/>
+                    <a:lstStyle/>
+                    <a:p>
+                      <a:r>
+                        <a:rPr lang="en-US" dirty="0" smtClean="0"/>
+                        <a:t>GET/POST/DELETE</a:t>
+                      </a:r>
+                      <a:endParaRPr lang="en-US" dirty="0"/>
+                    </a:p>
+                  </a:txBody>
+                  <a:tcPr/>
+                </a:tc>
+                <a:tc>
+                  <a:txBody>
+                    <a:bodyPr/>
+                    <a:lstStyle/>
+                    <a:p>
+                      <a:endParaRPr lang="en-US" dirty="0"/>
+                    </a:p>
+                  </a:txBody>
+                  <a:tcPr/>
+                </a:tc>
+                <a:tc>
+                  <a:txBody>
+                    <a:bodyPr/>
+                    <a:lstStyle/>
+                    <a:p>
+                      <a:r>
+                        <a:rPr lang="en-US" dirty="0" smtClean="0"/>
+                        <a:t>Description</a:t>
+                      </a:r>
+                      <a:endParaRPr lang="en-US" dirty="0"/>
+                    </a:p>
+                  </a:txBody>
+                  <a:tcPr/>
+                </a:tc>
+              </a:tr>
+              <a:tr h="370840">
+                <a:tc>
+                  <a:txBody>
+                    <a:bodyPr/>
+                    <a:lstStyle/>
+                    <a:p>
+                      <a:r>
+                        <a:rPr lang="en-US" dirty="0" smtClean="0"/>
+                        <a:t>/search/status</a:t>
+                      </a:r>
+                      <a:endParaRPr lang="en-US" dirty="0"/>
+                    </a:p>
+                  </a:txBody>
+                  <a:tcPr/>
+                </a:tc>
+                <a:tc>
+                  <a:txBody>
+                    <a:bodyPr/>
+                    <a:lstStyle/>
+                    <a:p>
+                      <a:r>
+                        <a:rPr lang="en-US" dirty="0" smtClean="0"/>
+                        <a:t>GET</a:t>
+                      </a:r>
+                      <a:endParaRPr lang="en-US" dirty="0"/>
+                    </a:p>
+                  </a:txBody>
+                  <a:tcPr/>
+                </a:tc>
+                <a:tc>
+                  <a:txBody>
+                    <a:bodyPr/>
+                    <a:lstStyle/>
+                    <a:p>
+                      <a:endParaRPr lang="en-US" dirty="0"/>
+                    </a:p>
+                  </a:txBody>
+                  <a:tcPr/>
+                </a:tc>
+                <a:tc>
+                  <a:txBody>
+                    <a:bodyPr/>
+                    <a:lstStyle/>
+                    <a:p>
+                      <a:r>
+                        <a:rPr lang="en-US" dirty="0" smtClean="0"/>
+                        <a:t>Status of Search</a:t>
+                      </a:r>
+                      <a:endParaRPr lang="en-US" dirty="0"/>
+                    </a:p>
+                  </a:txBody>
+                  <a:tcPr/>
+                </a:tc>
+              </a:tr>
+              <a:tr h="370840">
+                <a:tc>
+                  <a:txBody>
+                    <a:bodyPr/>
+                    <a:lstStyle/>
+                    <a:p>
+                      <a:r>
+                        <a:rPr lang="en-US" dirty="0" smtClean="0"/>
+                        <a:t>/search/start</a:t>
+                      </a:r>
+                      <a:endParaRPr lang="en-US" dirty="0"/>
+                    </a:p>
+                  </a:txBody>
+                  <a:tcPr/>
+                </a:tc>
+                <a:tc>
+                  <a:txBody>
+                    <a:bodyPr/>
+                    <a:lstStyle/>
+                    <a:p>
+                      <a:r>
+                        <a:rPr lang="en-US" dirty="0" smtClean="0"/>
+                        <a:t>POST</a:t>
+                      </a:r>
+                      <a:endParaRPr lang="en-US" dirty="0"/>
+                    </a:p>
+                  </a:txBody>
+                  <a:tcPr/>
+                </a:tc>
+                <a:tc>
+                  <a:txBody>
+                    <a:bodyPr/>
+                    <a:lstStyle/>
+                    <a:p>
+                      <a:r>
+                        <a:rPr lang="en-US" dirty="0" smtClean="0"/>
+                        <a:t>{</a:t>
+                      </a:r>
+                      <a:r>
+                        <a:rPr lang="en-US" dirty="0" err="1" smtClean="0"/>
+                        <a:t>url</a:t>
+                      </a:r>
+                      <a:r>
+                        <a:rPr lang="en-US" dirty="0" smtClean="0"/>
+                        <a:t>}</a:t>
+                      </a:r>
+                      <a:endParaRPr lang="en-US" dirty="0"/>
+                    </a:p>
+                  </a:txBody>
+                  <a:tcPr/>
+                </a:tc>
+                <a:tc>
+                  <a:txBody>
+                    <a:bodyPr/>
+                    <a:lstStyle/>
+                    <a:p>
+                      <a:r>
+                        <a:rPr lang="en-US" dirty="0" smtClean="0"/>
+                        <a:t>Start a search</a:t>
+                      </a:r>
+                      <a:endParaRPr lang="en-US" dirty="0"/>
+                    </a:p>
+                  </a:txBody>
+                  <a:tcPr/>
+                </a:tc>
+              </a:tr>
+              <a:tr h="370840">
+                <a:tc>
+                  <a:txBody>
+                    <a:bodyPr/>
+                    <a:lstStyle/>
+                    <a:p>
+                      <a:r>
+                        <a:rPr lang="en-US" dirty="0" smtClean="0"/>
+                        <a:t>/search/stop</a:t>
+                      </a:r>
+                      <a:endParaRPr lang="en-US" dirty="0"/>
+                    </a:p>
+                  </a:txBody>
+                  <a:tcPr/>
+                </a:tc>
+                <a:tc>
+                  <a:txBody>
+                    <a:bodyPr/>
+                    <a:lstStyle/>
+                    <a:p>
+                      <a:r>
+                        <a:rPr lang="en-US" dirty="0" smtClean="0"/>
+                        <a:t>POST</a:t>
+                      </a:r>
+                      <a:endParaRPr lang="en-US" dirty="0"/>
+                    </a:p>
+                  </a:txBody>
+                  <a:tcPr/>
+                </a:tc>
+                <a:tc>
+                  <a:txBody>
+                    <a:bodyPr/>
+                    <a:lstStyle/>
+                    <a:p>
+                      <a:r>
+                        <a:rPr lang="en-US" dirty="0" smtClean="0"/>
+                        <a:t>{</a:t>
+                      </a:r>
+                      <a:r>
+                        <a:rPr lang="en-US" dirty="0" err="1" smtClean="0"/>
+                        <a:t>url</a:t>
+                      </a:r>
+                      <a:r>
+                        <a:rPr lang="en-US" dirty="0" smtClean="0"/>
+                        <a:t>}</a:t>
+                      </a:r>
+                      <a:endParaRPr lang="en-US" dirty="0"/>
+                    </a:p>
+                  </a:txBody>
+                  <a:tcPr/>
+                </a:tc>
+                <a:tc>
+                  <a:txBody>
+                    <a:bodyPr/>
+                    <a:lstStyle/>
+                    <a:p>
+                      <a:r>
+                        <a:rPr lang="en-US" dirty="0" smtClean="0"/>
+                        <a:t>Stop a search</a:t>
+                      </a:r>
+                      <a:endParaRPr lang="en-US" dirty="0"/>
+                    </a:p>
+                  </a:txBody>
+                  <a:tcPr/>
+                </a:tc>
+              </a:tr>
+              <a:tr h="370840">
+                <a:tc>
+                  <a:txBody>
+                    <a:bodyPr/>
+                    <a:lstStyle/>
+                    <a:p>
+                      <a:r>
+                        <a:rPr lang="en-US" dirty="0" smtClean="0"/>
+                        <a:t>/query</a:t>
+                      </a:r>
+                      <a:endParaRPr lang="en-US" dirty="0"/>
+                    </a:p>
+                  </a:txBody>
+                  <a:tcPr/>
+                </a:tc>
+                <a:tc>
+                  <a:txBody>
+                    <a:bodyPr/>
+                    <a:lstStyle/>
+                    <a:p>
+                      <a:r>
+                        <a:rPr lang="en-US" dirty="0" smtClean="0"/>
+                        <a:t>GET</a:t>
+                      </a:r>
+                      <a:endParaRPr lang="en-US" dirty="0"/>
+                    </a:p>
+                  </a:txBody>
+                  <a:tcPr/>
+                </a:tc>
+                <a:tc>
+                  <a:txBody>
+                    <a:bodyPr/>
+                    <a:lstStyle/>
+                    <a:p>
+                      <a:endParaRPr lang="en-US" dirty="0"/>
+                    </a:p>
+                  </a:txBody>
+                  <a:tcPr/>
+                </a:tc>
+                <a:tc>
+                  <a:txBody>
+                    <a:bodyPr/>
+                    <a:lstStyle/>
+                    <a:p>
+                      <a:r>
+                        <a:rPr lang="en-US" dirty="0" smtClean="0"/>
+                        <a:t>List all queries</a:t>
+                      </a:r>
+                      <a:endParaRPr lang="en-US" dirty="0"/>
+                    </a:p>
+                  </a:txBody>
+                  <a:tcPr/>
+                </a:tc>
+              </a:tr>
+              <a:tr h="370840">
+                <a:tc>
+                  <a:txBody>
+                    <a:bodyPr/>
+                    <a:lstStyle/>
+                    <a:p>
+                      <a:r>
+                        <a:rPr lang="en-US" dirty="0" smtClean="0"/>
+                        <a:t>/query/id</a:t>
+                      </a:r>
+                      <a:endParaRPr lang="en-US" dirty="0"/>
+                    </a:p>
+                  </a:txBody>
+                  <a:tcPr/>
+                </a:tc>
+                <a:tc>
+                  <a:txBody>
+                    <a:bodyPr/>
+                    <a:lstStyle/>
+                    <a:p>
+                      <a:r>
+                        <a:rPr lang="en-US" dirty="0" smtClean="0"/>
+                        <a:t>GET</a:t>
+                      </a:r>
+                      <a:endParaRPr lang="en-US" dirty="0"/>
+                    </a:p>
+                  </a:txBody>
+                  <a:tcPr/>
+                </a:tc>
+                <a:tc>
+                  <a:txBody>
+                    <a:bodyPr/>
+                    <a:lstStyle/>
+                    <a:p>
+                      <a:endParaRPr lang="en-US" dirty="0"/>
+                    </a:p>
+                  </a:txBody>
+                  <a:tcPr/>
+                </a:tc>
+                <a:tc>
+                  <a:txBody>
+                    <a:bodyPr/>
+                    <a:lstStyle/>
+                    <a:p>
+                      <a:endParaRPr lang="en-US" dirty="0"/>
+                    </a:p>
+                  </a:txBody>
+                  <a:tcPr/>
+                </a:tc>
+              </a:tr>
+              <a:tr h="370840">
+                <a:tc>
+                  <a:txBody>
+                    <a:bodyPr/>
+                    <a:lstStyle/>
+                    <a:p>
+                      <a:r>
+                        <a:rPr lang="en-US" dirty="0" smtClean="0"/>
+                        <a:t>/query/id</a:t>
+                      </a:r>
+                      <a:endParaRPr lang="en-US" dirty="0"/>
+                    </a:p>
+                  </a:txBody>
+                  <a:tcPr/>
+                </a:tc>
+                <a:tc>
+                  <a:txBody>
+                    <a:bodyPr/>
+                    <a:lstStyle/>
+                    <a:p>
+                      <a:r>
+                        <a:rPr lang="en-US" dirty="0" smtClean="0"/>
+                        <a:t>DELETE</a:t>
+                      </a:r>
+                      <a:endParaRPr lang="en-US" dirty="0"/>
+                    </a:p>
+                  </a:txBody>
+                  <a:tcPr/>
+                </a:tc>
+                <a:tc>
+                  <a:txBody>
+                    <a:bodyPr/>
+                    <a:lstStyle/>
+                    <a:p>
+                      <a:endParaRPr lang="en-US" dirty="0"/>
+                    </a:p>
+                  </a:txBody>
+                  <a:tcPr/>
+                </a:tc>
+                <a:tc>
+                  <a:txBody>
+                    <a:bodyPr/>
+                    <a:lstStyle/>
+                    <a:p>
+                      <a:r>
+                        <a:rPr lang="en-US" dirty="0" smtClean="0"/>
+                        <a:t>Delete a query</a:t>
+                      </a:r>
+                      <a:endParaRPr lang="en-US" dirty="0"/>
+                    </a:p>
+                  </a:txBody>
+                  <a:tcPr/>
+                </a:tc>
+              </a:tr>
+              <a:tr h="370840">
+                <a:tc>
+                  <a:txBody>
+                    <a:bodyPr/>
+                    <a:lstStyle/>
+                    <a:p>
+                      <a:r>
+                        <a:rPr lang="en-US" dirty="0" smtClean="0"/>
+                        <a:t>/query/map</a:t>
+                      </a:r>
+                      <a:endParaRPr lang="en-US" dirty="0"/>
+                    </a:p>
+                  </a:txBody>
+                  <a:tcPr/>
+                </a:tc>
+                <a:tc>
+                  <a:txBody>
+                    <a:bodyPr/>
+                    <a:lstStyle/>
+                    <a:p>
+                      <a:r>
+                        <a:rPr lang="en-US" dirty="0" smtClean="0"/>
+                        <a:t>GET</a:t>
+                      </a:r>
+                      <a:endParaRPr lang="en-US" dirty="0"/>
+                    </a:p>
+                  </a:txBody>
+                  <a:tcPr/>
+                </a:tc>
+                <a:tc>
+                  <a:txBody>
+                    <a:bodyPr/>
+                    <a:lstStyle/>
+                    <a:p>
+                      <a:endParaRPr lang="en-US" dirty="0"/>
+                    </a:p>
+                  </a:txBody>
+                  <a:tcPr/>
+                </a:tc>
+                <a:tc>
+                  <a:txBody>
+                    <a:bodyPr/>
+                    <a:lstStyle/>
+                    <a:p>
+                      <a:r>
+                        <a:rPr lang="en-US" dirty="0" smtClean="0"/>
+                        <a:t>Topology</a:t>
+                      </a:r>
+                      <a:r>
+                        <a:rPr lang="en-US" baseline="0" dirty="0" smtClean="0"/>
+                        <a:t> of pages</a:t>
+                      </a:r>
+                      <a:endParaRPr lang="en-US" dirty="0"/>
+                    </a:p>
+                  </a:txBody>
+                  <a:tcPr/>
+                </a:tc>
+              </a:tr>
+            </a:tbl>
+          </a:graphicData>
+        </a:graphic>
+      </p:graphicFrame>
     </p:spTree>
     <p:extLst>
       <p:ext uri="{BB962C8B-B14F-4D97-AF65-F5344CB8AC3E}">
-        <p14:creationId xmlns:p14="http://schemas.microsoft.com/office/powerpoint/2010/main" val="41853612"/>
+        <p14:creationId xmlns:p14="http://schemas.microsoft.com/office/powerpoint/2010/main" val="1300643417"/>
       </p:ext>
     </p:extLst>
   </p:cSld>
@@ -10447,7 +9895,7 @@
         <p:spPr>
           <a:xfrm>
             <a:off x="951722" y="1045029"/>
-            <a:ext cx="10608906" cy="1785104"/>
+            <a:ext cx="10608906" cy="2062103"/>
           </a:xfrm>
           <a:prstGeom prst="rect">
             <a:avLst/>
@@ -10475,7 +9923,7 @@
             </a:pPr>
             <a:r>
               <a:rPr lang="en-US" dirty="0" smtClean="0"/>
-              <a:t>REST call to provide search URL. Limits are previously set for number of pages and number of images</a:t>
+              <a:t>Create/Update Query Object. Set requested page and image limits</a:t>
             </a:r>
           </a:p>
           <a:p>
@@ -10485,8 +9933,9 @@
             </a:pPr>
             <a:r>
               <a:rPr lang="en-US" dirty="0" smtClean="0"/>
-              <a:t>Set state to true</a:t>
-            </a:r>
+              <a:t>Delete any existing page topology maps for the query</a:t>
+            </a:r>
+            <a:endParaRPr lang="en-US" dirty="0" smtClean="0"/>
           </a:p>
           <a:p>
             <a:pPr marL="342900" indent="-342900">
@@ -10495,8 +9944,48 @@
             </a:pPr>
             <a:r>
               <a:rPr lang="en-US" dirty="0" smtClean="0"/>
-              <a:t>Push page to URL Queue</a:t>
-            </a:r>
+              <a:t>Set &lt;Query</a:t>
+            </a:r>
+            <a:r>
+              <a:rPr lang="en-US" dirty="0"/>
+              <a:t>, </a:t>
+            </a:r>
+            <a:r>
+              <a:rPr lang="en-US" dirty="0" err="1" smtClean="0"/>
+              <a:t>QueryStatus</a:t>
+            </a:r>
+            <a:r>
+              <a:rPr lang="en-US" dirty="0" smtClean="0"/>
+              <a:t>&gt; </a:t>
+            </a:r>
+            <a:r>
+              <a:rPr lang="en-US" dirty="0" smtClean="0"/>
+              <a:t>map in </a:t>
+            </a:r>
+            <a:r>
+              <a:rPr lang="en-US" dirty="0" err="1" smtClean="0"/>
+              <a:t>QuerySingleton</a:t>
+            </a:r>
+            <a:r>
+              <a:rPr lang="en-US" dirty="0" smtClean="0"/>
+              <a:t> to ‘RUNNING’ for Query object</a:t>
+            </a:r>
+            <a:endParaRPr lang="en-US" dirty="0" smtClean="0"/>
+          </a:p>
+          <a:p>
+            <a:pPr marL="342900" indent="-342900">
+              <a:buFont typeface="+mj-lt"/>
+              <a:buAutoNum type="arabicPeriod"/>
+            </a:pPr>
+            <a:r>
+              <a:rPr lang="en-US" dirty="0" smtClean="0"/>
+              <a:t>Push page to </a:t>
+            </a:r>
+            <a:r>
+              <a:rPr lang="en-US" dirty="0" smtClean="0"/>
+              <a:t>MSG Queue</a:t>
+            </a:r>
+            <a:endParaRPr lang="en-US" dirty="0" smtClean="0"/>
           </a:p>
         </p:txBody>
       </p:sp>
@@ -10546,7 +10035,7 @@
         <p:spPr>
           <a:xfrm>
             <a:off x="951722" y="1045029"/>
-            <a:ext cx="10608906" cy="4555093"/>
+            <a:ext cx="10608906" cy="4832092"/>
           </a:xfrm>
           <a:prstGeom prst="rect">
             <a:avLst/>
@@ -10561,11 +10050,7 @@
           <a:p>
             <a:r>
               <a:rPr lang="en-US" sz="2800" dirty="0" smtClean="0"/>
-              <a:t>Search a </a:t>
-            </a:r>
-            <a:r>
-              <a:rPr lang="en-US" sz="2800" dirty="0" smtClean="0"/>
-              <a:t>Page URL</a:t>
+              <a:t>Search a Page URL</a:t>
             </a:r>
           </a:p>
           <a:p>
@@ -10595,25 +10080,22 @@
               <a:buAutoNum type="arabicPeriod"/>
             </a:pPr>
             <a:r>
+              <a:rPr lang="en-US" dirty="0"/>
+              <a:t>If &lt;Query, </a:t>
+            </a:r>
+            <a:r>
+              <a:rPr lang="en-US" dirty="0" err="1"/>
+              <a:t>QueryStatus</a:t>
+            </a:r>
+            <a:r>
+              <a:rPr lang="en-US" dirty="0"/>
+              <a:t>&gt; map </a:t>
+            </a:r>
+            <a:r>
               <a:rPr lang="en-US" dirty="0" smtClean="0"/>
-              <a:t>Check </a:t>
-            </a:r>
-            <a:r>
-              <a:rPr lang="en-US" dirty="0" smtClean="0"/>
-              <a:t>count in </a:t>
-            </a:r>
-            <a:r>
-              <a:rPr lang="en-US" dirty="0" err="1"/>
-              <a:t>current_query</a:t>
-            </a:r>
-            <a:r>
-              <a:rPr lang="en-US" dirty="0"/>
-              <a:t> table </a:t>
-            </a:r>
-            <a:r>
-              <a:rPr lang="en-US" dirty="0" smtClean="0"/>
-              <a:t>for this ID. If count exceeds page query limit stop parsing</a:t>
-            </a:r>
+              <a:t> state is ‘STOPPED’, stop parsing</a:t>
+            </a:r>
+            <a:endParaRPr lang="en-US" dirty="0" smtClean="0"/>
           </a:p>
           <a:p>
             <a:pPr marL="800100" lvl="1" indent="-342900">
@@ -10622,8 +10104,29 @@
             </a:pPr>
             <a:r>
               <a:rPr lang="en-US" dirty="0" smtClean="0"/>
-              <a:t>If state is stop, stop parsing</a:t>
-            </a:r>
+              <a:t>Check </a:t>
+            </a:r>
+            <a:r>
+              <a:rPr lang="en-US" dirty="0" smtClean="0"/>
+              <a:t>count in </a:t>
+            </a:r>
+            <a:r>
+              <a:rPr lang="en-US" dirty="0" smtClean="0"/>
+              <a:t>page topology </a:t>
+            </a:r>
+            <a:r>
+              <a:rPr lang="en-US" dirty="0" smtClean="0"/>
+              <a:t>for </a:t>
+            </a:r>
+            <a:r>
+              <a:rPr lang="en-US" dirty="0" smtClean="0"/>
+              <a:t>this ID. If count exceeds page query limit stop </a:t>
+            </a:r>
+            <a:r>
+              <a:rPr lang="en-US" dirty="0" smtClean="0"/>
+              <a:t>parsing, set query state to ‘STOPPED’</a:t>
+            </a:r>
+            <a:endParaRPr lang="en-US" dirty="0" smtClean="0"/>
           </a:p>
           <a:p>
             <a:pPr marL="800100" lvl="1" indent="-342900">
@@ -10631,16 +10134,12 @@
               <a:buAutoNum type="arabicPeriod"/>
             </a:pPr>
             <a:r>
-              <a:rPr lang="en-US" dirty="0" smtClean="0"/>
-              <a:t>Create a page entry in the </a:t>
+              <a:rPr lang="en-US" dirty="0"/>
+              <a:t>Calculate checksum for </a:t>
             </a:r>
             <a:r>
               <a:rPr lang="en-US" dirty="0" err="1" smtClean="0"/>
-              <a:t>msg</a:t>
-            </a:r>
-            <a:r>
-              <a:rPr lang="en-US" dirty="0" smtClean="0"/>
-              <a:t> query</a:t>
+              <a:t>url</a:t>
             </a:r>
             <a:endParaRPr lang="en-US" dirty="0" smtClean="0"/>
           </a:p>
@@ -10651,15 +10150,7 @@
             </a:pPr>
             <a:r>
               <a:rPr lang="en-US" dirty="0" smtClean="0"/>
-              <a:t>Check if page is in </a:t>
-            </a:r>
-            <a:r>
-              <a:rPr lang="en-US" dirty="0" err="1" smtClean="0"/>
-              <a:t>page_url</a:t>
-            </a:r>
-            <a:r>
-              <a:rPr lang="en-US" dirty="0" smtClean="0"/>
-              <a:t>:</a:t>
+              <a:t>If page in page topology for this query, stop parsing</a:t>
             </a:r>
           </a:p>
           <a:p>
@@ -10669,13 +10160,8 @@
             </a:pPr>
             <a:r>
               <a:rPr lang="en-US" dirty="0" smtClean="0"/>
-              <a:t>Calculate checksum for </a:t>
-            </a:r>
-            <a:r>
-              <a:rPr lang="en-US" dirty="0" err="1" smtClean="0"/>
-              <a:t>url</a:t>
-            </a:r>
-            <a:endParaRPr lang="en-US" dirty="0" smtClean="0"/>
+              <a:t>Add entry in page topology for this page</a:t>
+            </a:r>
           </a:p>
           <a:p>
             <a:pPr marL="800100" lvl="1" indent="-342900">
@@ -10684,7 +10170,11 @@
             </a:pPr>
             <a:r>
               <a:rPr lang="en-US" dirty="0" smtClean="0"/>
-              <a:t>If page entry is in </a:t>
+              <a:t>If </a:t>
+            </a:r>
+            <a:r>
+              <a:rPr lang="en-US" dirty="0" smtClean="0"/>
+              <a:t>page entry is in </a:t>
             </a:r>
             <a:r>
               <a:rPr lang="en-US" dirty="0" err="1" smtClean="0"/>
@@ -10706,7 +10196,21 @@
             </a:pPr>
             <a:r>
               <a:rPr lang="en-US" dirty="0" smtClean="0"/>
-              <a:t>Compare checksum for current page</a:t>
+              <a:t>Compare checksum for current </a:t>
+            </a:r>
+            <a:r>
+              <a:rPr lang="en-US" dirty="0" smtClean="0"/>
+              <a:t>page</a:t>
+            </a:r>
+          </a:p>
+          <a:p>
+            <a:pPr marL="1257300" lvl="2" indent="-342900">
+              <a:buFont typeface="+mj-lt"/>
+              <a:buAutoNum type="arabicPeriod"/>
+            </a:pPr>
+            <a:r>
+              <a:rPr lang="en-US" dirty="0" smtClean="0"/>
+              <a:t>If checksums match, stop processing</a:t>
             </a:r>
             <a:endParaRPr lang="en-US" dirty="0" smtClean="0"/>
           </a:p>
@@ -10717,11 +10221,7 @@
             </a:pPr>
             <a:r>
               <a:rPr lang="en-US" dirty="0" smtClean="0"/>
-              <a:t>If </a:t>
-            </a:r>
-            <a:r>
-              <a:rPr lang="en-US" dirty="0" smtClean="0"/>
-              <a:t>page entry is not in </a:t>
+              <a:t>If page entry is not in </a:t>
             </a:r>
             <a:r>
               <a:rPr lang="en-US" dirty="0" err="1" smtClean="0"/>
@@ -10729,15 +10229,7 @@
             </a:r>
             <a:r>
               <a:rPr lang="en-US" dirty="0" smtClean="0"/>
-              <a:t> table or </a:t>
-            </a:r>
-            <a:r>
-              <a:rPr lang="en-US" dirty="0" smtClean="0"/>
-              <a:t>checksum has </a:t>
-            </a:r>
-            <a:r>
-              <a:rPr lang="en-US" dirty="0" smtClean="0"/>
-              <a:t>changed</a:t>
+              <a:t> table or checksum has changed</a:t>
             </a:r>
           </a:p>
           <a:p>
@@ -10787,17 +10279,11 @@
             </a:pPr>
             <a:r>
               <a:rPr lang="en-US" dirty="0" smtClean="0"/>
-              <a:t>Create/update topology for the page</a:t>
-            </a:r>
-          </a:p>
-          <a:p>
-            <a:pPr marL="1257300" lvl="2" indent="-342900">
-              <a:buFont typeface="+mj-lt"/>
-              <a:buAutoNum type="arabicPeriod"/>
-            </a:pPr>
+              <a:t>Add </a:t>
+            </a:r>
             <a:r>
               <a:rPr lang="en-US" dirty="0" smtClean="0"/>
-              <a:t>Add page to </a:t>
+              <a:t>page to </a:t>
             </a:r>
             <a:r>
               <a:rPr lang="en-US" dirty="0" err="1" smtClean="0"/>
@@ -10807,7 +10293,6 @@
               <a:rPr lang="en-US" dirty="0" smtClean="0"/>
               <a:t> page list</a:t>
             </a:r>
-            <a:endParaRPr lang="en-US" dirty="0" smtClean="0"/>
           </a:p>
         </p:txBody>
       </p:sp>
@@ -10893,11 +10378,7 @@
             </a:r>
             <a:r>
               <a:rPr lang="en-US" dirty="0" smtClean="0"/>
-              <a:t> Queue</a:t>
-            </a:r>
-            <a:r>
-              <a:rPr lang="en-US" dirty="0" smtClean="0"/>
-              <a:t>:</a:t>
+              <a:t> Queue:</a:t>
             </a:r>
           </a:p>
           <a:p>
@@ -10909,7 +10390,6 @@
               <a:rPr lang="en-US" dirty="0" smtClean="0"/>
               <a:t>Calculate checksum for image</a:t>
             </a:r>
-            <a:endParaRPr lang="en-US" dirty="0" smtClean="0"/>
           </a:p>
           <a:p>
             <a:pPr marL="800100" lvl="1" indent="-342900">
@@ -10928,15 +10408,7 @@
             </a:pPr>
             <a:r>
               <a:rPr lang="en-US" dirty="0" smtClean="0"/>
-              <a:t>Get </a:t>
-            </a:r>
-            <a:r>
-              <a:rPr lang="en-US" dirty="0" smtClean="0"/>
-              <a:t>checksum of </a:t>
-            </a:r>
-            <a:r>
-              <a:rPr lang="en-US" dirty="0" smtClean="0"/>
-              <a:t>existing image</a:t>
+              <a:t>Get checksum of existing image</a:t>
             </a:r>
           </a:p>
           <a:p>
@@ -10946,16 +10418,9 @@
             </a:pPr>
             <a:r>
               <a:rPr lang="en-US" dirty="0" smtClean="0"/>
-              <a:t>Check if </a:t>
-            </a:r>
-            <a:r>
-              <a:rPr lang="en-US" dirty="0" smtClean="0"/>
-              <a:t>checksum has </a:t>
-            </a:r>
-            <a:r>
-              <a:rPr lang="en-US" dirty="0" smtClean="0"/>
-              <a:t>changed. </a:t>
-            </a:r>
+              <a:t>If checksum is the same stop processing</a:t>
+            </a:r>
+            <a:endParaRPr lang="en-US" dirty="0" smtClean="0"/>
           </a:p>
           <a:p>
             <a:pPr marL="800100" lvl="1" indent="-342900">
@@ -10964,11 +10429,7 @@
             </a:pPr>
             <a:r>
               <a:rPr lang="en-US" dirty="0" smtClean="0"/>
-              <a:t>If </a:t>
-            </a:r>
-            <a:r>
-              <a:rPr lang="en-US" dirty="0" smtClean="0"/>
-              <a:t>image is not in image table or </a:t>
+              <a:t>If image is not in image table or </a:t>
             </a:r>
             <a:r>
               <a:rPr lang="en-US" dirty="0" err="1" smtClean="0"/>
@@ -10986,11 +10447,7 @@
             </a:pPr>
             <a:r>
               <a:rPr lang="en-US" dirty="0" smtClean="0"/>
-              <a:t>Download </a:t>
-            </a:r>
-            <a:r>
-              <a:rPr lang="en-US" dirty="0" smtClean="0"/>
-              <a:t>image</a:t>
+              <a:t>Download image</a:t>
             </a:r>
           </a:p>
           <a:p>
@@ -11000,11 +10457,11 @@
             </a:pPr>
             <a:r>
               <a:rPr lang="en-US" dirty="0" smtClean="0"/>
-              <a:t>Get size and </a:t>
-            </a:r>
-            <a:r>
-              <a:rPr lang="en-US" dirty="0" err="1" smtClean="0"/>
-              <a:t>etag</a:t>
+              <a:t>Get </a:t>
+            </a:r>
+            <a:r>
+              <a:rPr lang="en-US" dirty="0" smtClean="0"/>
+              <a:t>dimensions</a:t>
             </a:r>
             <a:endParaRPr lang="en-US" dirty="0" smtClean="0"/>
           </a:p>
@@ -11033,11 +10490,7 @@
             </a:r>
             <a:r>
               <a:rPr lang="en-US" dirty="0" smtClean="0"/>
-              <a:t> if not </a:t>
-            </a:r>
-            <a:r>
-              <a:rPr lang="en-US" dirty="0" smtClean="0"/>
-              <a:t>created</a:t>
+              <a:t> if not created</a:t>
             </a:r>
           </a:p>
           <a:p>
@@ -11057,7 +10510,6 @@
               <a:rPr lang="en-US" dirty="0" smtClean="0"/>
               <a:t> image list</a:t>
             </a:r>
-            <a:endParaRPr lang="en-US" dirty="0" smtClean="0"/>
           </a:p>
         </p:txBody>
       </p:sp>
@@ -11272,11 +10724,7 @@
           <a:p>
             <a:r>
               <a:rPr lang="en-US" dirty="0" smtClean="0"/>
-              <a:t>REST call to provide search URL. Limits are previously set for number of pages and number of </a:t>
-            </a:r>
-            <a:r>
-              <a:rPr lang="en-US" dirty="0" smtClean="0"/>
-              <a:t>images</a:t>
+              <a:t>REST call to provide search URL. Limits are previously set for number of pages and number of images</a:t>
             </a:r>
           </a:p>
           <a:p>
@@ -11288,16 +10736,28 @@
               <a:buAutoNum type="arabicPeriod"/>
             </a:pPr>
             <a:r>
+              <a:rPr lang="en-US" dirty="0"/>
+              <a:t>Set &lt;Query, </a:t>
+            </a:r>
+            <a:r>
+              <a:rPr lang="en-US" dirty="0" err="1"/>
+              <a:t>QueryStatus</a:t>
+            </a:r>
+            <a:r>
+              <a:rPr lang="en-US" dirty="0"/>
+              <a:t>&gt; map in </a:t>
+            </a:r>
+            <a:r>
+              <a:rPr lang="en-US" dirty="0" err="1"/>
+              <a:t>QuerySingleton</a:t>
+            </a:r>
+            <a:r>
+              <a:rPr lang="en-US" dirty="0"/>
+              <a:t> to ‘RUNNING’ for Query </a:t>
+            </a:r>
+            <a:r>
               <a:rPr lang="en-US" dirty="0" smtClean="0"/>
-              <a:t>Get query status from </a:t>
-            </a:r>
-            <a:r>
-              <a:rPr lang="en-US" dirty="0" err="1" smtClean="0"/>
-              <a:t>query_status</a:t>
-            </a:r>
-            <a:r>
-              <a:rPr lang="en-US" dirty="0" smtClean="0"/>
-              <a:t> table</a:t>
+              <a:t>object</a:t>
             </a:r>
           </a:p>
           <a:p>
@@ -11309,6 +10769,7 @@
               <a:rPr lang="en-US" dirty="0" smtClean="0"/>
               <a:t>Return status</a:t>
             </a:r>
+            <a:endParaRPr lang="en-US" dirty="0"/>
           </a:p>
         </p:txBody>
       </p:sp>
@@ -11358,7 +10819,7 @@
         <p:spPr>
           <a:xfrm>
             <a:off x="951722" y="1045029"/>
-            <a:ext cx="10608906" cy="3754874"/>
+            <a:ext cx="10608906" cy="4031873"/>
           </a:xfrm>
           <a:prstGeom prst="rect">
             <a:avLst/>
@@ -11441,7 +10902,50 @@
             </a:pPr>
             <a:r>
               <a:rPr lang="en-US" dirty="0"/>
-              <a:t>Once a thread receives a message, check the current status of </a:t>
+              <a:t>Set &lt;Query, </a:t>
+            </a:r>
+            <a:r>
+              <a:rPr lang="en-US" dirty="0" err="1"/>
+              <a:t>QueryStatus</a:t>
+            </a:r>
+            <a:r>
+              <a:rPr lang="en-US" dirty="0"/>
+              <a:t>&gt; map in </a:t>
+            </a:r>
+            <a:r>
+              <a:rPr lang="en-US" dirty="0" err="1"/>
+              <a:t>QuerySingleton</a:t>
+            </a:r>
+            <a:r>
+              <a:rPr lang="en-US" dirty="0"/>
+              <a:t> to </a:t>
+            </a:r>
+            <a:r>
+              <a:rPr lang="en-US" dirty="0" smtClean="0"/>
+              <a:t>‘STOPPED’ </a:t>
+            </a:r>
+            <a:r>
+              <a:rPr lang="en-US" dirty="0"/>
+              <a:t>for Query </a:t>
+            </a:r>
+            <a:r>
+              <a:rPr lang="en-US" dirty="0" smtClean="0"/>
+              <a:t>object</a:t>
+            </a:r>
+            <a:endParaRPr lang="en-US" dirty="0" smtClean="0"/>
+          </a:p>
+          <a:p>
+            <a:pPr marL="514350" indent="-514350">
+              <a:buFont typeface="+mj-lt"/>
+              <a:buAutoNum type="arabicPeriod"/>
+            </a:pPr>
+            <a:r>
+              <a:rPr lang="en-US" dirty="0" smtClean="0"/>
+              <a:t>Once </a:t>
+            </a:r>
+            <a:r>
+              <a:rPr lang="en-US" dirty="0"/>
+              <a:t>a thread receives a message, check the current status of </a:t>
             </a:r>
             <a:r>
               <a:rPr lang="en-US" dirty="0" smtClean="0"/>

</xml_diff>

<commit_message>
Add sub pages to search queue, add ui mockup file, change some buttons
</commit_message>
<xml_diff>
--- a/docs/design.pptx
+++ b/docs/design.pptx
@@ -259,7 +259,7 @@
           <a:p>
             <a:fld id="{30DA0606-474F-417C-8DB0-81402E3BEFB0}" type="datetimeFigureOut">
               <a:rPr lang="en-US" smtClean="0"/>
-              <a:t>5/8/2017</a:t>
+              <a:t>5/9/2017</a:t>
             </a:fld>
             <a:endParaRPr lang="en-US"/>
           </a:p>
@@ -429,7 +429,7 @@
           <a:p>
             <a:fld id="{30DA0606-474F-417C-8DB0-81402E3BEFB0}" type="datetimeFigureOut">
               <a:rPr lang="en-US" smtClean="0"/>
-              <a:t>5/8/2017</a:t>
+              <a:t>5/9/2017</a:t>
             </a:fld>
             <a:endParaRPr lang="en-US"/>
           </a:p>
@@ -609,7 +609,7 @@
           <a:p>
             <a:fld id="{30DA0606-474F-417C-8DB0-81402E3BEFB0}" type="datetimeFigureOut">
               <a:rPr lang="en-US" smtClean="0"/>
-              <a:t>5/8/2017</a:t>
+              <a:t>5/9/2017</a:t>
             </a:fld>
             <a:endParaRPr lang="en-US"/>
           </a:p>
@@ -779,7 +779,7 @@
           <a:p>
             <a:fld id="{30DA0606-474F-417C-8DB0-81402E3BEFB0}" type="datetimeFigureOut">
               <a:rPr lang="en-US" smtClean="0"/>
-              <a:t>5/8/2017</a:t>
+              <a:t>5/9/2017</a:t>
             </a:fld>
             <a:endParaRPr lang="en-US"/>
           </a:p>
@@ -1025,7 +1025,7 @@
           <a:p>
             <a:fld id="{30DA0606-474F-417C-8DB0-81402E3BEFB0}" type="datetimeFigureOut">
               <a:rPr lang="en-US" smtClean="0"/>
-              <a:t>5/8/2017</a:t>
+              <a:t>5/9/2017</a:t>
             </a:fld>
             <a:endParaRPr lang="en-US"/>
           </a:p>
@@ -1257,7 +1257,7 @@
           <a:p>
             <a:fld id="{30DA0606-474F-417C-8DB0-81402E3BEFB0}" type="datetimeFigureOut">
               <a:rPr lang="en-US" smtClean="0"/>
-              <a:t>5/8/2017</a:t>
+              <a:t>5/9/2017</a:t>
             </a:fld>
             <a:endParaRPr lang="en-US"/>
           </a:p>
@@ -1624,7 +1624,7 @@
           <a:p>
             <a:fld id="{30DA0606-474F-417C-8DB0-81402E3BEFB0}" type="datetimeFigureOut">
               <a:rPr lang="en-US" smtClean="0"/>
-              <a:t>5/8/2017</a:t>
+              <a:t>5/9/2017</a:t>
             </a:fld>
             <a:endParaRPr lang="en-US"/>
           </a:p>
@@ -1742,7 +1742,7 @@
           <a:p>
             <a:fld id="{30DA0606-474F-417C-8DB0-81402E3BEFB0}" type="datetimeFigureOut">
               <a:rPr lang="en-US" smtClean="0"/>
-              <a:t>5/8/2017</a:t>
+              <a:t>5/9/2017</a:t>
             </a:fld>
             <a:endParaRPr lang="en-US"/>
           </a:p>
@@ -1837,7 +1837,7 @@
           <a:p>
             <a:fld id="{30DA0606-474F-417C-8DB0-81402E3BEFB0}" type="datetimeFigureOut">
               <a:rPr lang="en-US" smtClean="0"/>
-              <a:t>5/8/2017</a:t>
+              <a:t>5/9/2017</a:t>
             </a:fld>
             <a:endParaRPr lang="en-US"/>
           </a:p>
@@ -2114,7 +2114,7 @@
           <a:p>
             <a:fld id="{30DA0606-474F-417C-8DB0-81402E3BEFB0}" type="datetimeFigureOut">
               <a:rPr lang="en-US" smtClean="0"/>
-              <a:t>5/8/2017</a:t>
+              <a:t>5/9/2017</a:t>
             </a:fld>
             <a:endParaRPr lang="en-US"/>
           </a:p>
@@ -2367,7 +2367,7 @@
           <a:p>
             <a:fld id="{30DA0606-474F-417C-8DB0-81402E3BEFB0}" type="datetimeFigureOut">
               <a:rPr lang="en-US" smtClean="0"/>
-              <a:t>5/8/2017</a:t>
+              <a:t>5/9/2017</a:t>
             </a:fld>
             <a:endParaRPr lang="en-US"/>
           </a:p>
@@ -2580,7 +2580,7 @@
           <a:p>
             <a:fld id="{30DA0606-474F-417C-8DB0-81402E3BEFB0}" type="datetimeFigureOut">
               <a:rPr lang="en-US" smtClean="0"/>
-              <a:t>5/8/2017</a:t>
+              <a:t>5/9/2017</a:t>
             </a:fld>
             <a:endParaRPr lang="en-US"/>
           </a:p>
@@ -5361,11 +5361,7 @@
           <a:p>
             <a:r>
               <a:rPr lang="en-US" sz="1000" dirty="0" smtClean="0"/>
-              <a:t>Create a toplogy of every page </a:t>
-            </a:r>
-            <a:r>
-              <a:rPr lang="en-US" sz="1000" dirty="0" smtClean="0"/>
-              <a:t>searched, for a query</a:t>
+              <a:t>Create a toplogy of every page searched, for a query</a:t>
             </a:r>
             <a:endParaRPr lang="en-US" sz="1000" dirty="0"/>
           </a:p>
@@ -7609,14 +7605,12 @@
               <a:rPr lang="en-US" dirty="0" smtClean="0"/>
               <a:t>  STOPPED</a:t>
             </a:r>
-            <a:endParaRPr lang="en-US" dirty="0" smtClean="0"/>
           </a:p>
           <a:p>
             <a:r>
               <a:rPr lang="en-US" dirty="0" smtClean="0"/>
               <a:t>}</a:t>
             </a:r>
-            <a:endParaRPr lang="en-US" dirty="0" smtClean="0"/>
           </a:p>
         </p:txBody>
       </p:sp>
@@ -7683,7 +7677,6 @@
               <a:rPr lang="en-US" sz="2800" dirty="0" smtClean="0"/>
               <a:t>REST API</a:t>
             </a:r>
-            <a:endParaRPr lang="en-US" sz="2800" dirty="0" smtClean="0"/>
           </a:p>
           <a:p>
             <a:endParaRPr lang="en-US" sz="2800" dirty="0" smtClean="0"/>
@@ -7730,14 +7723,14 @@
           <p:nvPr>
             <p:extLst>
               <p:ext uri="{D42A27DB-BD31-4B8C-83A1-F6EECF244321}">
-                <p14:modId xmlns:p14="http://schemas.microsoft.com/office/powerpoint/2010/main" val="432316237"/>
+                <p14:modId xmlns:p14="http://schemas.microsoft.com/office/powerpoint/2010/main" val="1045894604"/>
               </p:ext>
             </p:extLst>
           </p:nvPr>
         </p:nvGraphicFramePr>
         <p:xfrm>
           <a:off x="1229568" y="2081935"/>
-          <a:ext cx="9528628" cy="2966720"/>
+          <a:ext cx="9528628" cy="3606800"/>
         </p:xfrm>
         <a:graphic>
           <a:graphicData uri="http://schemas.openxmlformats.org/drawingml/2006/table">
@@ -8157,7 +8150,11 @@
                     <a:p>
                       <a:r>
                         <a:rPr lang="en-US" dirty="0" smtClean="0"/>
-                        <a:t>/query/map</a:t>
+                        <a:t>/</a:t>
+                      </a:r>
+                      <a:r>
+                        <a:rPr lang="en-US" dirty="0" smtClean="0"/>
+                        <a:t>query/id/map</a:t>
                       </a:r>
                       <a:endParaRPr lang="en-US" dirty="0"/>
                     </a:p>
@@ -8199,7 +8196,69 @@
                       </a:r>
                       <a:r>
                         <a:rPr lang="en-US" baseline="0" dirty="0" smtClean="0"/>
-                        <a:t> of pages</a:t>
+                        <a:t> of </a:t>
+                      </a:r>
+                      <a:r>
+                        <a:rPr lang="en-US" baseline="0" dirty="0" smtClean="0"/>
+                        <a:t>pages</a:t>
+                      </a:r>
+                      <a:endParaRPr lang="en-US" dirty="0"/>
+                    </a:p>
+                  </a:txBody>
+                  <a:tcPr/>
+                </a:tc>
+              </a:tr>
+              <a:tr h="370840">
+                <a:tc>
+                  <a:txBody>
+                    <a:bodyPr/>
+                    <a:lstStyle/>
+                    <a:p>
+                      <a:r>
+                        <a:rPr lang="en-US" dirty="0" smtClean="0"/>
+                        <a:t>/query/id/images</a:t>
+                      </a:r>
+                      <a:endParaRPr lang="en-US" dirty="0"/>
+                    </a:p>
+                  </a:txBody>
+                  <a:tcPr/>
+                </a:tc>
+                <a:tc>
+                  <a:txBody>
+                    <a:bodyPr/>
+                    <a:lstStyle/>
+                    <a:p>
+                      <a:r>
+                        <a:rPr lang="en-US" dirty="0" smtClean="0"/>
+                        <a:t>GET</a:t>
+                      </a:r>
+                      <a:endParaRPr lang="en-US" dirty="0"/>
+                    </a:p>
+                  </a:txBody>
+                  <a:tcPr/>
+                </a:tc>
+                <a:tc>
+                  <a:txBody>
+                    <a:bodyPr/>
+                    <a:lstStyle/>
+                    <a:p>
+                      <a:r>
+                        <a:rPr lang="en-US" dirty="0" smtClean="0"/>
+                        <a:t>{size filter}</a:t>
+                      </a:r>
+                      <a:endParaRPr lang="en-US" dirty="0"/>
+                    </a:p>
+                  </a:txBody>
+                  <a:tcPr/>
+                </a:tc>
+                <a:tc>
+                  <a:txBody>
+                    <a:bodyPr/>
+                    <a:lstStyle/>
+                    <a:p>
+                      <a:r>
+                        <a:rPr lang="en-US" dirty="0" smtClean="0"/>
+                        <a:t>Images associated with image</a:t>
                       </a:r>
                       <a:endParaRPr lang="en-US" dirty="0"/>
                     </a:p>
@@ -9935,7 +9994,6 @@
               <a:rPr lang="en-US" dirty="0" smtClean="0"/>
               <a:t>Delete any existing page topology maps for the query</a:t>
             </a:r>
-            <a:endParaRPr lang="en-US" dirty="0" smtClean="0"/>
           </a:p>
           <a:p>
             <a:pPr marL="342900" indent="-342900">
@@ -9956,11 +10014,7 @@
             </a:r>
             <a:r>
               <a:rPr lang="en-US" dirty="0" smtClean="0"/>
-              <a:t>&gt; </a:t>
-            </a:r>
-            <a:r>
-              <a:rPr lang="en-US" dirty="0" smtClean="0"/>
-              <a:t>map in </a:t>
+              <a:t>&gt; map in </a:t>
             </a:r>
             <a:r>
               <a:rPr lang="en-US" dirty="0" err="1" smtClean="0"/>
@@ -9970,7 +10024,6 @@
               <a:rPr lang="en-US" dirty="0" smtClean="0"/>
               <a:t> to ‘RUNNING’ for Query object</a:t>
             </a:r>
-            <a:endParaRPr lang="en-US" dirty="0" smtClean="0"/>
           </a:p>
           <a:p>
             <a:pPr marL="342900" indent="-342900">
@@ -9979,13 +10032,8 @@
             </a:pPr>
             <a:r>
               <a:rPr lang="en-US" dirty="0" smtClean="0"/>
-              <a:t>Push page to </a:t>
-            </a:r>
-            <a:r>
-              <a:rPr lang="en-US" dirty="0" smtClean="0"/>
-              <a:t>MSG Queue</a:t>
-            </a:r>
-            <a:endParaRPr lang="en-US" dirty="0" smtClean="0"/>
+              <a:t>Push page to MSG Queue</a:t>
+            </a:r>
           </a:p>
         </p:txBody>
       </p:sp>
@@ -10095,7 +10143,6 @@
               <a:rPr lang="en-US" dirty="0" smtClean="0"/>
               <a:t> state is ‘STOPPED’, stop parsing</a:t>
             </a:r>
-            <a:endParaRPr lang="en-US" dirty="0" smtClean="0"/>
           </a:p>
           <a:p>
             <a:pPr marL="800100" lvl="1" indent="-342900">
@@ -10104,29 +10151,8 @@
             </a:pPr>
             <a:r>
               <a:rPr lang="en-US" dirty="0" smtClean="0"/>
-              <a:t>Check </a:t>
-            </a:r>
-            <a:r>
-              <a:rPr lang="en-US" dirty="0" smtClean="0"/>
-              <a:t>count in </a:t>
-            </a:r>
-            <a:r>
-              <a:rPr lang="en-US" dirty="0" smtClean="0"/>
-              <a:t>page topology </a:t>
-            </a:r>
-            <a:r>
-              <a:rPr lang="en-US" dirty="0" smtClean="0"/>
-              <a:t>for </a:t>
-            </a:r>
-            <a:r>
-              <a:rPr lang="en-US" dirty="0" smtClean="0"/>
-              <a:t>this ID. If count exceeds page query limit stop </a:t>
-            </a:r>
-            <a:r>
-              <a:rPr lang="en-US" dirty="0" smtClean="0"/>
-              <a:t>parsing, set query state to ‘STOPPED’</a:t>
-            </a:r>
-            <a:endParaRPr lang="en-US" dirty="0" smtClean="0"/>
+              <a:t>Check count in page topology for this ID. If count exceeds page query limit stop parsing, set query state to ‘STOPPED’</a:t>
+            </a:r>
           </a:p>
           <a:p>
             <a:pPr marL="800100" lvl="1" indent="-342900">
@@ -10170,11 +10196,7 @@
             </a:pPr>
             <a:r>
               <a:rPr lang="en-US" dirty="0" smtClean="0"/>
-              <a:t>If </a:t>
-            </a:r>
-            <a:r>
-              <a:rPr lang="en-US" dirty="0" smtClean="0"/>
-              <a:t>page entry is in </a:t>
+              <a:t>If page entry is in </a:t>
             </a:r>
             <a:r>
               <a:rPr lang="en-US" dirty="0" err="1" smtClean="0"/>
@@ -10196,11 +10218,7 @@
             </a:pPr>
             <a:r>
               <a:rPr lang="en-US" dirty="0" smtClean="0"/>
-              <a:t>Compare checksum for current </a:t>
-            </a:r>
-            <a:r>
-              <a:rPr lang="en-US" dirty="0" smtClean="0"/>
-              <a:t>page</a:t>
+              <a:t>Compare checksum for current page</a:t>
             </a:r>
           </a:p>
           <a:p>
@@ -10212,7 +10230,6 @@
               <a:rPr lang="en-US" dirty="0" smtClean="0"/>
               <a:t>If checksums match, stop processing</a:t>
             </a:r>
-            <a:endParaRPr lang="en-US" dirty="0" smtClean="0"/>
           </a:p>
           <a:p>
             <a:pPr marL="800100" lvl="1" indent="-342900">
@@ -10279,11 +10296,7 @@
             </a:pPr>
             <a:r>
               <a:rPr lang="en-US" dirty="0" smtClean="0"/>
-              <a:t>Add </a:t>
-            </a:r>
-            <a:r>
-              <a:rPr lang="en-US" dirty="0" smtClean="0"/>
-              <a:t>page to </a:t>
+              <a:t>Add page to </a:t>
             </a:r>
             <a:r>
               <a:rPr lang="en-US" dirty="0" err="1" smtClean="0"/>
@@ -10420,7 +10433,6 @@
               <a:rPr lang="en-US" dirty="0" smtClean="0"/>
               <a:t>If checksum is the same stop processing</a:t>
             </a:r>
-            <a:endParaRPr lang="en-US" dirty="0" smtClean="0"/>
           </a:p>
           <a:p>
             <a:pPr marL="800100" lvl="1" indent="-342900">
@@ -10457,13 +10469,8 @@
             </a:pPr>
             <a:r>
               <a:rPr lang="en-US" dirty="0" smtClean="0"/>
-              <a:t>Get </a:t>
-            </a:r>
-            <a:r>
-              <a:rPr lang="en-US" dirty="0" smtClean="0"/>
-              <a:t>dimensions</a:t>
-            </a:r>
-            <a:endParaRPr lang="en-US" dirty="0" smtClean="0"/>
+              <a:t>Get dimensions</a:t>
+            </a:r>
           </a:p>
           <a:p>
             <a:pPr marL="1257300" lvl="2" indent="-342900">
@@ -10932,7 +10939,6 @@
               <a:rPr lang="en-US" dirty="0" smtClean="0"/>
               <a:t>object</a:t>
             </a:r>
-            <a:endParaRPr lang="en-US" dirty="0" smtClean="0"/>
           </a:p>
           <a:p>
             <a:pPr marL="514350" indent="-514350">

</xml_diff>

<commit_message>
Update UI mockups, add new buttons, update design
</commit_message>
<xml_diff>
--- a/docs/design.pptx
+++ b/docs/design.pptx
@@ -26,6 +26,8 @@
     <p:sldId id="279" r:id="rId20"/>
     <p:sldId id="277" r:id="rId21"/>
     <p:sldId id="271" r:id="rId22"/>
+    <p:sldId id="280" r:id="rId23"/>
+    <p:sldId id="281" r:id="rId24"/>
   </p:sldIdLst>
   <p:sldSz cx="12192000" cy="6858000"/>
   <p:notesSz cx="6858000" cy="9144000"/>
@@ -263,7 +265,7 @@
           <a:p>
             <a:fld id="{30DA0606-474F-417C-8DB0-81402E3BEFB0}" type="datetimeFigureOut">
               <a:rPr lang="en-US" smtClean="0"/>
-              <a:t>5/20/2017</a:t>
+              <a:t>5/21/2017</a:t>
             </a:fld>
             <a:endParaRPr lang="en-US"/>
           </a:p>
@@ -433,7 +435,7 @@
           <a:p>
             <a:fld id="{30DA0606-474F-417C-8DB0-81402E3BEFB0}" type="datetimeFigureOut">
               <a:rPr lang="en-US" smtClean="0"/>
-              <a:t>5/20/2017</a:t>
+              <a:t>5/21/2017</a:t>
             </a:fld>
             <a:endParaRPr lang="en-US"/>
           </a:p>
@@ -613,7 +615,7 @@
           <a:p>
             <a:fld id="{30DA0606-474F-417C-8DB0-81402E3BEFB0}" type="datetimeFigureOut">
               <a:rPr lang="en-US" smtClean="0"/>
-              <a:t>5/20/2017</a:t>
+              <a:t>5/21/2017</a:t>
             </a:fld>
             <a:endParaRPr lang="en-US"/>
           </a:p>
@@ -783,7 +785,7 @@
           <a:p>
             <a:fld id="{30DA0606-474F-417C-8DB0-81402E3BEFB0}" type="datetimeFigureOut">
               <a:rPr lang="en-US" smtClean="0"/>
-              <a:t>5/20/2017</a:t>
+              <a:t>5/21/2017</a:t>
             </a:fld>
             <a:endParaRPr lang="en-US"/>
           </a:p>
@@ -1029,7 +1031,7 @@
           <a:p>
             <a:fld id="{30DA0606-474F-417C-8DB0-81402E3BEFB0}" type="datetimeFigureOut">
               <a:rPr lang="en-US" smtClean="0"/>
-              <a:t>5/20/2017</a:t>
+              <a:t>5/21/2017</a:t>
             </a:fld>
             <a:endParaRPr lang="en-US"/>
           </a:p>
@@ -1261,7 +1263,7 @@
           <a:p>
             <a:fld id="{30DA0606-474F-417C-8DB0-81402E3BEFB0}" type="datetimeFigureOut">
               <a:rPr lang="en-US" smtClean="0"/>
-              <a:t>5/20/2017</a:t>
+              <a:t>5/21/2017</a:t>
             </a:fld>
             <a:endParaRPr lang="en-US"/>
           </a:p>
@@ -1628,7 +1630,7 @@
           <a:p>
             <a:fld id="{30DA0606-474F-417C-8DB0-81402E3BEFB0}" type="datetimeFigureOut">
               <a:rPr lang="en-US" smtClean="0"/>
-              <a:t>5/20/2017</a:t>
+              <a:t>5/21/2017</a:t>
             </a:fld>
             <a:endParaRPr lang="en-US"/>
           </a:p>
@@ -1746,7 +1748,7 @@
           <a:p>
             <a:fld id="{30DA0606-474F-417C-8DB0-81402E3BEFB0}" type="datetimeFigureOut">
               <a:rPr lang="en-US" smtClean="0"/>
-              <a:t>5/20/2017</a:t>
+              <a:t>5/21/2017</a:t>
             </a:fld>
             <a:endParaRPr lang="en-US"/>
           </a:p>
@@ -1841,7 +1843,7 @@
           <a:p>
             <a:fld id="{30DA0606-474F-417C-8DB0-81402E3BEFB0}" type="datetimeFigureOut">
               <a:rPr lang="en-US" smtClean="0"/>
-              <a:t>5/20/2017</a:t>
+              <a:t>5/21/2017</a:t>
             </a:fld>
             <a:endParaRPr lang="en-US"/>
           </a:p>
@@ -2118,7 +2120,7 @@
           <a:p>
             <a:fld id="{30DA0606-474F-417C-8DB0-81402E3BEFB0}" type="datetimeFigureOut">
               <a:rPr lang="en-US" smtClean="0"/>
-              <a:t>5/20/2017</a:t>
+              <a:t>5/21/2017</a:t>
             </a:fld>
             <a:endParaRPr lang="en-US"/>
           </a:p>
@@ -2371,7 +2373,7 @@
           <a:p>
             <a:fld id="{30DA0606-474F-417C-8DB0-81402E3BEFB0}" type="datetimeFigureOut">
               <a:rPr lang="en-US" smtClean="0"/>
-              <a:t>5/20/2017</a:t>
+              <a:t>5/21/2017</a:t>
             </a:fld>
             <a:endParaRPr lang="en-US"/>
           </a:p>
@@ -2584,7 +2586,7 @@
           <a:p>
             <a:fld id="{30DA0606-474F-417C-8DB0-81402E3BEFB0}" type="datetimeFigureOut">
               <a:rPr lang="en-US" smtClean="0"/>
-              <a:t>5/20/2017</a:t>
+              <a:t>5/21/2017</a:t>
             </a:fld>
             <a:endParaRPr lang="en-US"/>
           </a:p>
@@ -10791,6 +10793,654 @@
 </p:sld>
 </file>
 
+<file path=ppt/slides/slide22.xml><?xml version="1.0" encoding="utf-8"?>
+<p:sld xmlns:a="http://schemas.openxmlformats.org/drawingml/2006/main" xmlns:r="http://schemas.openxmlformats.org/officeDocument/2006/relationships" xmlns:p="http://schemas.openxmlformats.org/presentationml/2006/main">
+  <p:cSld>
+    <p:spTree>
+      <p:nvGrpSpPr>
+        <p:cNvPr id="1" name=""/>
+        <p:cNvGrpSpPr/>
+        <p:nvPr/>
+      </p:nvGrpSpPr>
+      <p:grpSpPr>
+        <a:xfrm>
+          <a:off x="0" y="0"/>
+          <a:ext cx="0" cy="0"/>
+          <a:chOff x="0" y="0"/>
+          <a:chExt cx="0" cy="0"/>
+        </a:xfrm>
+      </p:grpSpPr>
+      <p:sp>
+        <p:nvSpPr>
+          <p:cNvPr id="4" name="TextBox 3"/>
+          <p:cNvSpPr txBox="1"/>
+          <p:nvPr/>
+        </p:nvSpPr>
+        <p:spPr>
+          <a:xfrm>
+            <a:off x="652108" y="307911"/>
+            <a:ext cx="10608906" cy="2400657"/>
+          </a:xfrm>
+          <a:prstGeom prst="rect">
+            <a:avLst/>
+          </a:prstGeom>
+          <a:noFill/>
+        </p:spPr>
+        <p:txBody>
+          <a:bodyPr wrap="square" rtlCol="0">
+            <a:spAutoFit/>
+          </a:bodyPr>
+          <a:lstStyle/>
+          <a:p>
+            <a:r>
+              <a:rPr lang="en-US" sz="2800" dirty="0" smtClean="0"/>
+              <a:t>UI File Structure</a:t>
+            </a:r>
+            <a:endParaRPr lang="en-US" sz="2800" dirty="0" smtClean="0"/>
+          </a:p>
+          <a:p>
+            <a:endParaRPr lang="en-US" sz="2800" dirty="0" smtClean="0"/>
+          </a:p>
+          <a:p>
+            <a:endParaRPr lang="en-US" sz="1200" dirty="0"/>
+          </a:p>
+          <a:p>
+            <a:pPr marL="342900" indent="-342900">
+              <a:buFont typeface="+mj-lt"/>
+              <a:buAutoNum type="arabicPeriod"/>
+            </a:pPr>
+            <a:endParaRPr lang="en-US" dirty="0" smtClean="0"/>
+          </a:p>
+          <a:p>
+            <a:pPr marL="342900" indent="-342900">
+              <a:buFont typeface="+mj-lt"/>
+              <a:buAutoNum type="arabicPeriod"/>
+            </a:pPr>
+            <a:endParaRPr lang="en-US" dirty="0"/>
+          </a:p>
+          <a:p>
+            <a:pPr marL="342900" indent="-342900">
+              <a:buFont typeface="+mj-lt"/>
+              <a:buAutoNum type="arabicPeriod"/>
+            </a:pPr>
+            <a:endParaRPr lang="en-US" dirty="0" smtClean="0"/>
+          </a:p>
+          <a:p>
+            <a:pPr marL="342900" indent="-342900">
+              <a:buFont typeface="+mj-lt"/>
+              <a:buAutoNum type="arabicPeriod"/>
+            </a:pPr>
+            <a:endParaRPr lang="en-US" sz="2800" dirty="0"/>
+          </a:p>
+        </p:txBody>
+      </p:sp>
+      <p:sp>
+        <p:nvSpPr>
+          <p:cNvPr id="5" name="TextBox 4"/>
+          <p:cNvSpPr txBox="1"/>
+          <p:nvPr/>
+        </p:nvSpPr>
+        <p:spPr>
+          <a:xfrm>
+            <a:off x="830424" y="1548882"/>
+            <a:ext cx="1188980" cy="369332"/>
+          </a:xfrm>
+          <a:prstGeom prst="rect">
+            <a:avLst/>
+          </a:prstGeom>
+          <a:noFill/>
+        </p:spPr>
+        <p:txBody>
+          <a:bodyPr wrap="none" rtlCol="0">
+            <a:spAutoFit/>
+          </a:bodyPr>
+          <a:lstStyle/>
+          <a:p>
+            <a:r>
+              <a:rPr lang="en-US" dirty="0" smtClean="0"/>
+              <a:t>Index.html</a:t>
+            </a:r>
+            <a:endParaRPr lang="en-US" dirty="0"/>
+          </a:p>
+        </p:txBody>
+      </p:sp>
+      <p:sp>
+        <p:nvSpPr>
+          <p:cNvPr id="6" name="TextBox 5"/>
+          <p:cNvSpPr txBox="1"/>
+          <p:nvPr/>
+        </p:nvSpPr>
+        <p:spPr>
+          <a:xfrm>
+            <a:off x="2597019" y="1595048"/>
+            <a:ext cx="805029" cy="276999"/>
+          </a:xfrm>
+          <a:prstGeom prst="rect">
+            <a:avLst/>
+          </a:prstGeom>
+          <a:noFill/>
+        </p:spPr>
+        <p:txBody>
+          <a:bodyPr wrap="none" rtlCol="0">
+            <a:spAutoFit/>
+          </a:bodyPr>
+          <a:lstStyle/>
+          <a:p>
+            <a:r>
+              <a:rPr lang="en-US" sz="1200" dirty="0" smtClean="0"/>
+              <a:t>SquidUI.js</a:t>
+            </a:r>
+            <a:endParaRPr lang="en-US" sz="1200" dirty="0"/>
+          </a:p>
+        </p:txBody>
+      </p:sp>
+      <p:cxnSp>
+        <p:nvCxnSpPr>
+          <p:cNvPr id="8" name="Straight Arrow Connector 7"/>
+          <p:cNvCxnSpPr>
+            <a:stCxn id="5" idx="3"/>
+            <a:endCxn id="6" idx="1"/>
+          </p:cNvCxnSpPr>
+          <p:nvPr/>
+        </p:nvCxnSpPr>
+        <p:spPr>
+          <a:xfrm>
+            <a:off x="2019404" y="1733548"/>
+            <a:ext cx="577615" cy="0"/>
+          </a:xfrm>
+          <a:prstGeom prst="straightConnector1">
+            <a:avLst/>
+          </a:prstGeom>
+          <a:ln>
+            <a:tailEnd type="triangle"/>
+          </a:ln>
+        </p:spPr>
+        <p:style>
+          <a:lnRef idx="2">
+            <a:schemeClr val="dk1"/>
+          </a:lnRef>
+          <a:fillRef idx="0">
+            <a:schemeClr val="dk1"/>
+          </a:fillRef>
+          <a:effectRef idx="1">
+            <a:schemeClr val="dk1"/>
+          </a:effectRef>
+          <a:fontRef idx="minor">
+            <a:schemeClr val="tx1"/>
+          </a:fontRef>
+        </p:style>
+      </p:cxnSp>
+      <p:sp>
+        <p:nvSpPr>
+          <p:cNvPr id="13" name="TextBox 12"/>
+          <p:cNvSpPr txBox="1"/>
+          <p:nvPr/>
+        </p:nvSpPr>
+        <p:spPr>
+          <a:xfrm>
+            <a:off x="3472778" y="2128725"/>
+            <a:ext cx="928652" cy="276999"/>
+          </a:xfrm>
+          <a:prstGeom prst="rect">
+            <a:avLst/>
+          </a:prstGeom>
+          <a:noFill/>
+        </p:spPr>
+        <p:txBody>
+          <a:bodyPr wrap="none" rtlCol="0">
+            <a:spAutoFit/>
+          </a:bodyPr>
+          <a:lstStyle/>
+          <a:p>
+            <a:r>
+              <a:rPr lang="en-US" sz="1200" dirty="0" smtClean="0"/>
+              <a:t>IconPanel.js</a:t>
+            </a:r>
+            <a:endParaRPr lang="en-US" sz="1200" dirty="0"/>
+          </a:p>
+        </p:txBody>
+      </p:sp>
+      <p:cxnSp>
+        <p:nvCxnSpPr>
+          <p:cNvPr id="18" name="Elbow Connector 17"/>
+          <p:cNvCxnSpPr>
+            <a:stCxn id="6" idx="2"/>
+            <a:endCxn id="13" idx="1"/>
+          </p:cNvCxnSpPr>
+          <p:nvPr/>
+        </p:nvCxnSpPr>
+        <p:spPr>
+          <a:xfrm rot="16200000" flipH="1">
+            <a:off x="3038567" y="1833014"/>
+            <a:ext cx="395178" cy="473244"/>
+          </a:xfrm>
+          <a:prstGeom prst="bentConnector2">
+            <a:avLst/>
+          </a:prstGeom>
+          <a:ln>
+            <a:tailEnd type="triangle"/>
+          </a:ln>
+        </p:spPr>
+        <p:style>
+          <a:lnRef idx="2">
+            <a:schemeClr val="dk1"/>
+          </a:lnRef>
+          <a:fillRef idx="0">
+            <a:schemeClr val="dk1"/>
+          </a:fillRef>
+          <a:effectRef idx="1">
+            <a:schemeClr val="dk1"/>
+          </a:effectRef>
+          <a:fontRef idx="minor">
+            <a:schemeClr val="tx1"/>
+          </a:fontRef>
+        </p:style>
+      </p:cxnSp>
+      <p:sp>
+        <p:nvSpPr>
+          <p:cNvPr id="19" name="TextBox 18"/>
+          <p:cNvSpPr txBox="1"/>
+          <p:nvPr/>
+        </p:nvSpPr>
+        <p:spPr>
+          <a:xfrm>
+            <a:off x="3472778" y="3554361"/>
+            <a:ext cx="1131335" cy="276999"/>
+          </a:xfrm>
+          <a:prstGeom prst="rect">
+            <a:avLst/>
+          </a:prstGeom>
+          <a:noFill/>
+        </p:spPr>
+        <p:txBody>
+          <a:bodyPr wrap="none" rtlCol="0">
+            <a:spAutoFit/>
+          </a:bodyPr>
+          <a:lstStyle/>
+          <a:p>
+            <a:r>
+              <a:rPr lang="en-US" sz="1200" dirty="0" smtClean="0"/>
+              <a:t>SquidVersion.js</a:t>
+            </a:r>
+            <a:endParaRPr lang="en-US" sz="1200" dirty="0"/>
+          </a:p>
+        </p:txBody>
+      </p:sp>
+      <p:cxnSp>
+        <p:nvCxnSpPr>
+          <p:cNvPr id="21" name="Elbow Connector 20"/>
+          <p:cNvCxnSpPr>
+            <a:stCxn id="6" idx="2"/>
+            <a:endCxn id="19" idx="1"/>
+          </p:cNvCxnSpPr>
+          <p:nvPr/>
+        </p:nvCxnSpPr>
+        <p:spPr>
+          <a:xfrm rot="16200000" flipH="1">
+            <a:off x="2325749" y="2545832"/>
+            <a:ext cx="1820814" cy="473244"/>
+          </a:xfrm>
+          <a:prstGeom prst="bentConnector2">
+            <a:avLst/>
+          </a:prstGeom>
+          <a:ln>
+            <a:tailEnd type="triangle"/>
+          </a:ln>
+        </p:spPr>
+        <p:style>
+          <a:lnRef idx="2">
+            <a:schemeClr val="dk1"/>
+          </a:lnRef>
+          <a:fillRef idx="0">
+            <a:schemeClr val="dk1"/>
+          </a:fillRef>
+          <a:effectRef idx="1">
+            <a:schemeClr val="dk1"/>
+          </a:effectRef>
+          <a:fontRef idx="minor">
+            <a:schemeClr val="tx1"/>
+          </a:fontRef>
+        </p:style>
+      </p:cxnSp>
+      <p:sp>
+        <p:nvSpPr>
+          <p:cNvPr id="25" name="TextBox 24"/>
+          <p:cNvSpPr txBox="1"/>
+          <p:nvPr/>
+        </p:nvSpPr>
+        <p:spPr>
+          <a:xfrm>
+            <a:off x="3472777" y="4677153"/>
+            <a:ext cx="1037463" cy="276999"/>
+          </a:xfrm>
+          <a:prstGeom prst="rect">
+            <a:avLst/>
+          </a:prstGeom>
+          <a:noFill/>
+        </p:spPr>
+        <p:txBody>
+          <a:bodyPr wrap="none" rtlCol="0">
+            <a:spAutoFit/>
+          </a:bodyPr>
+          <a:lstStyle/>
+          <a:p>
+            <a:r>
+              <a:rPr lang="en-US" sz="1200" dirty="0" smtClean="0"/>
+              <a:t>PhotoPanel.js</a:t>
+            </a:r>
+            <a:endParaRPr lang="en-US" sz="1200" dirty="0"/>
+          </a:p>
+        </p:txBody>
+      </p:sp>
+      <p:cxnSp>
+        <p:nvCxnSpPr>
+          <p:cNvPr id="27" name="Elbow Connector 26"/>
+          <p:cNvCxnSpPr>
+            <a:stCxn id="6" idx="2"/>
+            <a:endCxn id="25" idx="1"/>
+          </p:cNvCxnSpPr>
+          <p:nvPr/>
+        </p:nvCxnSpPr>
+        <p:spPr>
+          <a:xfrm rot="16200000" flipH="1">
+            <a:off x="1764352" y="3107228"/>
+            <a:ext cx="2943606" cy="473243"/>
+          </a:xfrm>
+          <a:prstGeom prst="bentConnector2">
+            <a:avLst/>
+          </a:prstGeom>
+          <a:ln>
+            <a:tailEnd type="triangle"/>
+          </a:ln>
+        </p:spPr>
+        <p:style>
+          <a:lnRef idx="2">
+            <a:schemeClr val="dk1"/>
+          </a:lnRef>
+          <a:fillRef idx="0">
+            <a:schemeClr val="dk1"/>
+          </a:fillRef>
+          <a:effectRef idx="1">
+            <a:schemeClr val="dk1"/>
+          </a:effectRef>
+          <a:fontRef idx="minor">
+            <a:schemeClr val="tx1"/>
+          </a:fontRef>
+        </p:style>
+      </p:cxnSp>
+    </p:spTree>
+    <p:extLst>
+      <p:ext uri="{BB962C8B-B14F-4D97-AF65-F5344CB8AC3E}">
+        <p14:creationId xmlns:p14="http://schemas.microsoft.com/office/powerpoint/2010/main" val="1688053944"/>
+      </p:ext>
+    </p:extLst>
+  </p:cSld>
+  <p:clrMapOvr>
+    <a:masterClrMapping/>
+  </p:clrMapOvr>
+</p:sld>
+</file>
+
+<file path=ppt/slides/slide23.xml><?xml version="1.0" encoding="utf-8"?>
+<p:sld xmlns:a="http://schemas.openxmlformats.org/drawingml/2006/main" xmlns:r="http://schemas.openxmlformats.org/officeDocument/2006/relationships" xmlns:p="http://schemas.openxmlformats.org/presentationml/2006/main">
+  <p:cSld>
+    <p:spTree>
+      <p:nvGrpSpPr>
+        <p:cNvPr id="1" name=""/>
+        <p:cNvGrpSpPr/>
+        <p:nvPr/>
+      </p:nvGrpSpPr>
+      <p:grpSpPr>
+        <a:xfrm>
+          <a:off x="0" y="0"/>
+          <a:ext cx="0" cy="0"/>
+          <a:chOff x="0" y="0"/>
+          <a:chExt cx="0" cy="0"/>
+        </a:xfrm>
+      </p:grpSpPr>
+      <p:sp>
+        <p:nvSpPr>
+          <p:cNvPr id="4" name="TextBox 3"/>
+          <p:cNvSpPr txBox="1"/>
+          <p:nvPr/>
+        </p:nvSpPr>
+        <p:spPr>
+          <a:xfrm>
+            <a:off x="652108" y="307911"/>
+            <a:ext cx="10608906" cy="2400657"/>
+          </a:xfrm>
+          <a:prstGeom prst="rect">
+            <a:avLst/>
+          </a:prstGeom>
+          <a:noFill/>
+        </p:spPr>
+        <p:txBody>
+          <a:bodyPr wrap="square" rtlCol="0">
+            <a:spAutoFit/>
+          </a:bodyPr>
+          <a:lstStyle/>
+          <a:p>
+            <a:r>
+              <a:rPr lang="en-US" sz="2800" dirty="0" smtClean="0"/>
+              <a:t>UI Layout – SearchPage.PS</a:t>
+            </a:r>
+            <a:endParaRPr lang="en-US" sz="2800" dirty="0" smtClean="0"/>
+          </a:p>
+          <a:p>
+            <a:endParaRPr lang="en-US" sz="2800" dirty="0" smtClean="0"/>
+          </a:p>
+          <a:p>
+            <a:endParaRPr lang="en-US" sz="1200" dirty="0"/>
+          </a:p>
+          <a:p>
+            <a:pPr marL="342900" indent="-342900">
+              <a:buFont typeface="+mj-lt"/>
+              <a:buAutoNum type="arabicPeriod"/>
+            </a:pPr>
+            <a:endParaRPr lang="en-US" dirty="0" smtClean="0"/>
+          </a:p>
+          <a:p>
+            <a:pPr marL="342900" indent="-342900">
+              <a:buFont typeface="+mj-lt"/>
+              <a:buAutoNum type="arabicPeriod"/>
+            </a:pPr>
+            <a:endParaRPr lang="en-US" dirty="0"/>
+          </a:p>
+          <a:p>
+            <a:pPr marL="342900" indent="-342900">
+              <a:buFont typeface="+mj-lt"/>
+              <a:buAutoNum type="arabicPeriod"/>
+            </a:pPr>
+            <a:endParaRPr lang="en-US" dirty="0" smtClean="0"/>
+          </a:p>
+          <a:p>
+            <a:pPr marL="342900" indent="-342900">
+              <a:buFont typeface="+mj-lt"/>
+              <a:buAutoNum type="arabicPeriod"/>
+            </a:pPr>
+            <a:endParaRPr lang="en-US" sz="2800" dirty="0"/>
+          </a:p>
+        </p:txBody>
+      </p:sp>
+      <p:sp>
+        <p:nvSpPr>
+          <p:cNvPr id="2" name="Rectangle 1"/>
+          <p:cNvSpPr/>
+          <p:nvPr/>
+        </p:nvSpPr>
+        <p:spPr>
+          <a:xfrm>
+            <a:off x="886408" y="1184988"/>
+            <a:ext cx="11056776" cy="5365102"/>
+          </a:xfrm>
+          <a:prstGeom prst="rect">
+            <a:avLst/>
+          </a:prstGeom>
+        </p:spPr>
+        <p:style>
+          <a:lnRef idx="2">
+            <a:schemeClr val="dk1"/>
+          </a:lnRef>
+          <a:fillRef idx="1">
+            <a:schemeClr val="lt1"/>
+          </a:fillRef>
+          <a:effectRef idx="0">
+            <a:schemeClr val="dk1"/>
+          </a:effectRef>
+          <a:fontRef idx="minor">
+            <a:schemeClr val="dk1"/>
+          </a:fontRef>
+        </p:style>
+        <p:txBody>
+          <a:bodyPr rtlCol="0" anchor="ctr"/>
+          <a:lstStyle/>
+          <a:p>
+            <a:pPr algn="ctr"/>
+            <a:endParaRPr lang="en-US"/>
+          </a:p>
+        </p:txBody>
+      </p:sp>
+      <p:sp>
+        <p:nvSpPr>
+          <p:cNvPr id="3" name="Rectangle 2"/>
+          <p:cNvSpPr/>
+          <p:nvPr/>
+        </p:nvSpPr>
+        <p:spPr>
+          <a:xfrm>
+            <a:off x="886408" y="1184989"/>
+            <a:ext cx="11056776" cy="223934"/>
+          </a:xfrm>
+          <a:prstGeom prst="rect">
+            <a:avLst/>
+          </a:prstGeom>
+        </p:spPr>
+        <p:style>
+          <a:lnRef idx="2">
+            <a:schemeClr val="accent1">
+              <a:shade val="50000"/>
+            </a:schemeClr>
+          </a:lnRef>
+          <a:fillRef idx="1">
+            <a:schemeClr val="accent1"/>
+          </a:fillRef>
+          <a:effectRef idx="0">
+            <a:schemeClr val="accent1"/>
+          </a:effectRef>
+          <a:fontRef idx="minor">
+            <a:schemeClr val="lt1"/>
+          </a:fontRef>
+        </p:style>
+        <p:txBody>
+          <a:bodyPr rtlCol="0" anchor="ctr"/>
+          <a:lstStyle/>
+          <a:p>
+            <a:pPr algn="ctr"/>
+            <a:r>
+              <a:rPr lang="en-US" sz="1000" dirty="0" err="1" smtClean="0"/>
+              <a:t>TopPanel</a:t>
+            </a:r>
+            <a:endParaRPr lang="en-US" sz="1000" dirty="0"/>
+          </a:p>
+        </p:txBody>
+      </p:sp>
+      <p:sp>
+        <p:nvSpPr>
+          <p:cNvPr id="9" name="Rectangle 8"/>
+          <p:cNvSpPr/>
+          <p:nvPr/>
+        </p:nvSpPr>
+        <p:spPr>
+          <a:xfrm>
+            <a:off x="886408" y="1408923"/>
+            <a:ext cx="11056776" cy="5141167"/>
+          </a:xfrm>
+          <a:prstGeom prst="rect">
+            <a:avLst/>
+          </a:prstGeom>
+        </p:spPr>
+        <p:style>
+          <a:lnRef idx="2">
+            <a:schemeClr val="dk1"/>
+          </a:lnRef>
+          <a:fillRef idx="1">
+            <a:schemeClr val="lt1"/>
+          </a:fillRef>
+          <a:effectRef idx="0">
+            <a:schemeClr val="dk1"/>
+          </a:effectRef>
+          <a:fontRef idx="minor">
+            <a:schemeClr val="dk1"/>
+          </a:fontRef>
+        </p:style>
+        <p:txBody>
+          <a:bodyPr rtlCol="0" anchor="t"/>
+          <a:lstStyle/>
+          <a:p>
+            <a:pPr algn="ctr"/>
+            <a:r>
+              <a:rPr lang="en-US" sz="1200" dirty="0" smtClean="0"/>
+              <a:t>Search</a:t>
+            </a:r>
+            <a:endParaRPr lang="en-US" sz="1200" dirty="0"/>
+          </a:p>
+        </p:txBody>
+      </p:sp>
+      <p:sp>
+        <p:nvSpPr>
+          <p:cNvPr id="10" name="Rectangle 9"/>
+          <p:cNvSpPr/>
+          <p:nvPr/>
+        </p:nvSpPr>
+        <p:spPr>
+          <a:xfrm>
+            <a:off x="886408" y="6326156"/>
+            <a:ext cx="11056776" cy="223934"/>
+          </a:xfrm>
+          <a:prstGeom prst="rect">
+            <a:avLst/>
+          </a:prstGeom>
+        </p:spPr>
+        <p:style>
+          <a:lnRef idx="2">
+            <a:schemeClr val="dk1"/>
+          </a:lnRef>
+          <a:fillRef idx="1">
+            <a:schemeClr val="lt1"/>
+          </a:fillRef>
+          <a:effectRef idx="0">
+            <a:schemeClr val="dk1"/>
+          </a:effectRef>
+          <a:fontRef idx="minor">
+            <a:schemeClr val="dk1"/>
+          </a:fontRef>
+        </p:style>
+        <p:txBody>
+          <a:bodyPr rtlCol="0" anchor="ctr"/>
+          <a:lstStyle/>
+          <a:p>
+            <a:pPr algn="ctr"/>
+            <a:r>
+              <a:rPr lang="en-US" sz="1000" dirty="0" err="1" smtClean="0"/>
+              <a:t>SearchBottomPanel</a:t>
+            </a:r>
+            <a:endParaRPr lang="en-US" sz="1000" dirty="0"/>
+          </a:p>
+        </p:txBody>
+      </p:sp>
+    </p:spTree>
+    <p:extLst>
+      <p:ext uri="{BB962C8B-B14F-4D97-AF65-F5344CB8AC3E}">
+        <p14:creationId xmlns:p14="http://schemas.microsoft.com/office/powerpoint/2010/main" val="3141404880"/>
+      </p:ext>
+    </p:extLst>
+  </p:cSld>
+  <p:clrMapOvr>
+    <a:masterClrMapping/>
+  </p:clrMapOvr>
+</p:sld>
+</file>
+
 <file path=ppt/slides/slide3.xml><?xml version="1.0" encoding="utf-8"?>
 <p:sld xmlns:a="http://schemas.openxmlformats.org/drawingml/2006/main" xmlns:r="http://schemas.openxmlformats.org/officeDocument/2006/relationships" xmlns:p="http://schemas.openxmlformats.org/presentationml/2006/main">
   <p:cSld>
@@ -12213,17 +12863,8 @@
             </a:pPr>
             <a:r>
               <a:rPr lang="en-US" dirty="0" smtClean="0"/>
-              <a:t>Check count in page topology for this ID. If count exceeds page query limit stop parsing, set query state to ‘STOPPED</a:t>
-            </a:r>
-            <a:r>
-              <a:rPr lang="en-US" dirty="0" smtClean="0"/>
-              <a:t>’ and sto</a:t>
-            </a:r>
-            <a:r>
-              <a:rPr lang="en-US" dirty="0" smtClean="0"/>
-              <a:t>p parsing</a:t>
-            </a:r>
-            <a:endParaRPr lang="en-US" dirty="0" smtClean="0"/>
+              <a:t>Check count in page topology for this ID. If count exceeds page query limit stop parsing, set query state to ‘STOPPED’ and stop parsing</a:t>
+            </a:r>
           </a:p>
           <a:p>
             <a:pPr marL="800100" lvl="1" indent="-342900">
@@ -12490,11 +13131,7 @@
             </a:pPr>
             <a:r>
               <a:rPr lang="en-US" dirty="0" smtClean="0"/>
-              <a:t>Calculate </a:t>
-            </a:r>
-            <a:r>
-              <a:rPr lang="en-US" dirty="0" smtClean="0"/>
-              <a:t>checksum for image</a:t>
+              <a:t>Calculate checksum for image</a:t>
             </a:r>
           </a:p>
           <a:p>
@@ -12542,11 +13179,7 @@
             </a:r>
             <a:r>
               <a:rPr lang="en-US" dirty="0" smtClean="0"/>
-              <a:t> </a:t>
-            </a:r>
-            <a:r>
-              <a:rPr lang="en-US" dirty="0" smtClean="0"/>
-              <a:t>has changed </a:t>
+              <a:t> has changed </a:t>
             </a:r>
           </a:p>
           <a:p>
@@ -12612,11 +13245,7 @@
             </a:r>
             <a:r>
               <a:rPr lang="en-US" dirty="0" smtClean="0"/>
-              <a:t> image </a:t>
-            </a:r>
-            <a:r>
-              <a:rPr lang="en-US" dirty="0" smtClean="0"/>
-              <a:t>list</a:t>
+              <a:t> image list</a:t>
             </a:r>
           </a:p>
           <a:p>
@@ -12636,7 +13265,6 @@
               <a:rPr lang="en-US" dirty="0" smtClean="0"/>
               <a:t> if it is not there</a:t>
             </a:r>
-            <a:endParaRPr lang="en-US" dirty="0" smtClean="0"/>
           </a:p>
         </p:txBody>
       </p:sp>
@@ -12882,11 +13510,7 @@
             </a:pPr>
             <a:r>
               <a:rPr lang="en-US" dirty="0" smtClean="0"/>
-              <a:t>Return </a:t>
-            </a:r>
-            <a:r>
-              <a:rPr lang="en-US" dirty="0" smtClean="0"/>
-              <a:t>status</a:t>
+              <a:t>Return status</a:t>
             </a:r>
             <a:endParaRPr lang="en-US" dirty="0"/>
           </a:p>

</xml_diff>

<commit_message>
Update design, add react-router library
</commit_message>
<xml_diff>
--- a/docs/design.pptx
+++ b/docs/design.pptx
@@ -265,7 +265,7 @@
           <a:p>
             <a:fld id="{30DA0606-474F-417C-8DB0-81402E3BEFB0}" type="datetimeFigureOut">
               <a:rPr lang="en-US" smtClean="0"/>
-              <a:t>5/21/2017</a:t>
+              <a:t>5/22/2017</a:t>
             </a:fld>
             <a:endParaRPr lang="en-US"/>
           </a:p>
@@ -435,7 +435,7 @@
           <a:p>
             <a:fld id="{30DA0606-474F-417C-8DB0-81402E3BEFB0}" type="datetimeFigureOut">
               <a:rPr lang="en-US" smtClean="0"/>
-              <a:t>5/21/2017</a:t>
+              <a:t>5/22/2017</a:t>
             </a:fld>
             <a:endParaRPr lang="en-US"/>
           </a:p>
@@ -615,7 +615,7 @@
           <a:p>
             <a:fld id="{30DA0606-474F-417C-8DB0-81402E3BEFB0}" type="datetimeFigureOut">
               <a:rPr lang="en-US" smtClean="0"/>
-              <a:t>5/21/2017</a:t>
+              <a:t>5/22/2017</a:t>
             </a:fld>
             <a:endParaRPr lang="en-US"/>
           </a:p>
@@ -785,7 +785,7 @@
           <a:p>
             <a:fld id="{30DA0606-474F-417C-8DB0-81402E3BEFB0}" type="datetimeFigureOut">
               <a:rPr lang="en-US" smtClean="0"/>
-              <a:t>5/21/2017</a:t>
+              <a:t>5/22/2017</a:t>
             </a:fld>
             <a:endParaRPr lang="en-US"/>
           </a:p>
@@ -1031,7 +1031,7 @@
           <a:p>
             <a:fld id="{30DA0606-474F-417C-8DB0-81402E3BEFB0}" type="datetimeFigureOut">
               <a:rPr lang="en-US" smtClean="0"/>
-              <a:t>5/21/2017</a:t>
+              <a:t>5/22/2017</a:t>
             </a:fld>
             <a:endParaRPr lang="en-US"/>
           </a:p>
@@ -1263,7 +1263,7 @@
           <a:p>
             <a:fld id="{30DA0606-474F-417C-8DB0-81402E3BEFB0}" type="datetimeFigureOut">
               <a:rPr lang="en-US" smtClean="0"/>
-              <a:t>5/21/2017</a:t>
+              <a:t>5/22/2017</a:t>
             </a:fld>
             <a:endParaRPr lang="en-US"/>
           </a:p>
@@ -1630,7 +1630,7 @@
           <a:p>
             <a:fld id="{30DA0606-474F-417C-8DB0-81402E3BEFB0}" type="datetimeFigureOut">
               <a:rPr lang="en-US" smtClean="0"/>
-              <a:t>5/21/2017</a:t>
+              <a:t>5/22/2017</a:t>
             </a:fld>
             <a:endParaRPr lang="en-US"/>
           </a:p>
@@ -1748,7 +1748,7 @@
           <a:p>
             <a:fld id="{30DA0606-474F-417C-8DB0-81402E3BEFB0}" type="datetimeFigureOut">
               <a:rPr lang="en-US" smtClean="0"/>
-              <a:t>5/21/2017</a:t>
+              <a:t>5/22/2017</a:t>
             </a:fld>
             <a:endParaRPr lang="en-US"/>
           </a:p>
@@ -1843,7 +1843,7 @@
           <a:p>
             <a:fld id="{30DA0606-474F-417C-8DB0-81402E3BEFB0}" type="datetimeFigureOut">
               <a:rPr lang="en-US" smtClean="0"/>
-              <a:t>5/21/2017</a:t>
+              <a:t>5/22/2017</a:t>
             </a:fld>
             <a:endParaRPr lang="en-US"/>
           </a:p>
@@ -2120,7 +2120,7 @@
           <a:p>
             <a:fld id="{30DA0606-474F-417C-8DB0-81402E3BEFB0}" type="datetimeFigureOut">
               <a:rPr lang="en-US" smtClean="0"/>
-              <a:t>5/21/2017</a:t>
+              <a:t>5/22/2017</a:t>
             </a:fld>
             <a:endParaRPr lang="en-US"/>
           </a:p>
@@ -2373,7 +2373,7 @@
           <a:p>
             <a:fld id="{30DA0606-474F-417C-8DB0-81402E3BEFB0}" type="datetimeFigureOut">
               <a:rPr lang="en-US" smtClean="0"/>
-              <a:t>5/21/2017</a:t>
+              <a:t>5/22/2017</a:t>
             </a:fld>
             <a:endParaRPr lang="en-US"/>
           </a:p>
@@ -2586,7 +2586,7 @@
           <a:p>
             <a:fld id="{30DA0606-474F-417C-8DB0-81402E3BEFB0}" type="datetimeFigureOut">
               <a:rPr lang="en-US" smtClean="0"/>
-              <a:t>5/21/2017</a:t>
+              <a:t>5/22/2017</a:t>
             </a:fld>
             <a:endParaRPr lang="en-US"/>
           </a:p>
@@ -10818,7 +10818,7 @@
         </p:nvSpPr>
         <p:spPr>
           <a:xfrm>
-            <a:off x="652108" y="307911"/>
+            <a:off x="624116" y="259684"/>
             <a:ext cx="10608906" cy="2400657"/>
           </a:xfrm>
           <a:prstGeom prst="rect">
@@ -10836,7 +10836,6 @@
               <a:rPr lang="en-US" sz="2800" dirty="0" smtClean="0"/>
               <a:t>UI File Structure</a:t>
             </a:r>
-            <a:endParaRPr lang="en-US" sz="2800" dirty="0" smtClean="0"/>
           </a:p>
           <a:p>
             <a:endParaRPr lang="en-US" sz="2800" dirty="0" smtClean="0"/>
@@ -10979,7 +10978,7 @@
         <p:spPr>
           <a:xfrm>
             <a:off x="3472778" y="2128725"/>
-            <a:ext cx="928652" cy="276999"/>
+            <a:ext cx="1864165" cy="276999"/>
           </a:xfrm>
           <a:prstGeom prst="rect">
             <a:avLst/>
@@ -10994,7 +10993,7 @@
           <a:p>
             <a:r>
               <a:rPr lang="en-US" sz="1200" dirty="0" smtClean="0"/>
-              <a:t>IconPanel.js</a:t>
+              <a:t>pages/image/ImagePage.js</a:t>
             </a:r>
             <a:endParaRPr lang="en-US" sz="1200" dirty="0"/>
           </a:p>
@@ -11045,7 +11044,7 @@
         <p:spPr>
           <a:xfrm>
             <a:off x="3472778" y="3554361"/>
-            <a:ext cx="1131335" cy="276999"/>
+            <a:ext cx="1844223" cy="276999"/>
           </a:xfrm>
           <a:prstGeom prst="rect">
             <a:avLst/>
@@ -11060,7 +11059,7 @@
           <a:p>
             <a:r>
               <a:rPr lang="en-US" sz="1200" dirty="0" smtClean="0"/>
-              <a:t>SquidVersion.js</a:t>
+              <a:t>pages/query/QueryPage.js</a:t>
             </a:r>
             <a:endParaRPr lang="en-US" sz="1200" dirty="0"/>
           </a:p>
@@ -11111,7 +11110,7 @@
         <p:spPr>
           <a:xfrm>
             <a:off x="3472777" y="4677153"/>
-            <a:ext cx="1037463" cy="276999"/>
+            <a:ext cx="1893916" cy="276999"/>
           </a:xfrm>
           <a:prstGeom prst="rect">
             <a:avLst/>
@@ -11126,7 +11125,7 @@
           <a:p>
             <a:r>
               <a:rPr lang="en-US" sz="1200" dirty="0" smtClean="0"/>
-              <a:t>PhotoPanel.js</a:t>
+              <a:t>pages/admin/AdminPage.js</a:t>
             </a:r>
             <a:endParaRPr lang="en-US" sz="1200" dirty="0"/>
           </a:p>
@@ -11145,6 +11144,72 @@
           <a:xfrm rot="16200000" flipH="1">
             <a:off x="1764352" y="3107228"/>
             <a:ext cx="2943606" cy="473243"/>
+          </a:xfrm>
+          <a:prstGeom prst="bentConnector2">
+            <a:avLst/>
+          </a:prstGeom>
+          <a:ln>
+            <a:tailEnd type="triangle"/>
+          </a:ln>
+        </p:spPr>
+        <p:style>
+          <a:lnRef idx="2">
+            <a:schemeClr val="dk1"/>
+          </a:lnRef>
+          <a:fillRef idx="0">
+            <a:schemeClr val="dk1"/>
+          </a:fillRef>
+          <a:effectRef idx="1">
+            <a:schemeClr val="dk1"/>
+          </a:effectRef>
+          <a:fontRef idx="minor">
+            <a:schemeClr val="tx1"/>
+          </a:fontRef>
+        </p:style>
+      </p:cxnSp>
+      <p:sp>
+        <p:nvSpPr>
+          <p:cNvPr id="12" name="TextBox 11"/>
+          <p:cNvSpPr txBox="1"/>
+          <p:nvPr/>
+        </p:nvSpPr>
+        <p:spPr>
+          <a:xfrm>
+            <a:off x="3436453" y="5305223"/>
+            <a:ext cx="1966564" cy="276999"/>
+          </a:xfrm>
+          <a:prstGeom prst="rect">
+            <a:avLst/>
+          </a:prstGeom>
+          <a:noFill/>
+        </p:spPr>
+        <p:txBody>
+          <a:bodyPr wrap="none" rtlCol="0">
+            <a:spAutoFit/>
+          </a:bodyPr>
+          <a:lstStyle/>
+          <a:p>
+            <a:r>
+              <a:rPr lang="en-US" sz="1200" dirty="0" smtClean="0"/>
+              <a:t>common/header/TopPane.js</a:t>
+            </a:r>
+            <a:endParaRPr lang="en-US" sz="1200" dirty="0"/>
+          </a:p>
+        </p:txBody>
+      </p:sp>
+      <p:cxnSp>
+        <p:nvCxnSpPr>
+          <p:cNvPr id="3" name="Elbow Connector 2"/>
+          <p:cNvCxnSpPr>
+            <a:stCxn id="6" idx="2"/>
+            <a:endCxn id="12" idx="1"/>
+          </p:cNvCxnSpPr>
+          <p:nvPr/>
+        </p:nvCxnSpPr>
+        <p:spPr>
+          <a:xfrm rot="16200000" flipH="1">
+            <a:off x="1432155" y="3439425"/>
+            <a:ext cx="3571676" cy="436919"/>
           </a:xfrm>
           <a:prstGeom prst="bentConnector2">
             <a:avLst/>
@@ -11224,7 +11289,6 @@
               <a:rPr lang="en-US" sz="2800" dirty="0" smtClean="0"/>
               <a:t>UI Layout – SearchPage.PS</a:t>
             </a:r>
-            <a:endParaRPr lang="en-US" sz="2800" dirty="0" smtClean="0"/>
           </a:p>
           <a:p>
             <a:endParaRPr lang="en-US" sz="2800" dirty="0" smtClean="0"/>
@@ -11338,7 +11402,7 @@
             <a:pPr algn="ctr"/>
             <a:r>
               <a:rPr lang="en-US" sz="1000" dirty="0" err="1" smtClean="0"/>
-              <a:t>TopPanel</a:t>
+              <a:t>TopPane</a:t>
             </a:r>
             <a:endParaRPr lang="en-US" sz="1000" dirty="0"/>
           </a:p>
@@ -11422,7 +11486,7 @@
             <a:pPr algn="ctr"/>
             <a:r>
               <a:rPr lang="en-US" sz="1000" dirty="0" err="1" smtClean="0"/>
-              <a:t>SearchBottomPanel</a:t>
+              <a:t>SearchBottomPane</a:t>
             </a:r>
             <a:endParaRPr lang="en-US" sz="1000" dirty="0"/>
           </a:p>

</xml_diff>

<commit_message>
Add basic react routing to UI (#18)
* update travis build

* Add basics of new UI pages. Update design rest
</commit_message>
<xml_diff>
--- a/docs/design.pptx
+++ b/docs/design.pptx
@@ -265,7 +265,7 @@
           <a:p>
             <a:fld id="{30DA0606-474F-417C-8DB0-81402E3BEFB0}" type="datetimeFigureOut">
               <a:rPr lang="en-US" smtClean="0"/>
-              <a:t>5/22/2017</a:t>
+              <a:t>5/31/2017</a:t>
             </a:fld>
             <a:endParaRPr lang="en-US"/>
           </a:p>
@@ -435,7 +435,7 @@
           <a:p>
             <a:fld id="{30DA0606-474F-417C-8DB0-81402E3BEFB0}" type="datetimeFigureOut">
               <a:rPr lang="en-US" smtClean="0"/>
-              <a:t>5/22/2017</a:t>
+              <a:t>5/31/2017</a:t>
             </a:fld>
             <a:endParaRPr lang="en-US"/>
           </a:p>
@@ -615,7 +615,7 @@
           <a:p>
             <a:fld id="{30DA0606-474F-417C-8DB0-81402E3BEFB0}" type="datetimeFigureOut">
               <a:rPr lang="en-US" smtClean="0"/>
-              <a:t>5/22/2017</a:t>
+              <a:t>5/31/2017</a:t>
             </a:fld>
             <a:endParaRPr lang="en-US"/>
           </a:p>
@@ -785,7 +785,7 @@
           <a:p>
             <a:fld id="{30DA0606-474F-417C-8DB0-81402E3BEFB0}" type="datetimeFigureOut">
               <a:rPr lang="en-US" smtClean="0"/>
-              <a:t>5/22/2017</a:t>
+              <a:t>5/31/2017</a:t>
             </a:fld>
             <a:endParaRPr lang="en-US"/>
           </a:p>
@@ -1031,7 +1031,7 @@
           <a:p>
             <a:fld id="{30DA0606-474F-417C-8DB0-81402E3BEFB0}" type="datetimeFigureOut">
               <a:rPr lang="en-US" smtClean="0"/>
-              <a:t>5/22/2017</a:t>
+              <a:t>5/31/2017</a:t>
             </a:fld>
             <a:endParaRPr lang="en-US"/>
           </a:p>
@@ -1263,7 +1263,7 @@
           <a:p>
             <a:fld id="{30DA0606-474F-417C-8DB0-81402E3BEFB0}" type="datetimeFigureOut">
               <a:rPr lang="en-US" smtClean="0"/>
-              <a:t>5/22/2017</a:t>
+              <a:t>5/31/2017</a:t>
             </a:fld>
             <a:endParaRPr lang="en-US"/>
           </a:p>
@@ -1630,7 +1630,7 @@
           <a:p>
             <a:fld id="{30DA0606-474F-417C-8DB0-81402E3BEFB0}" type="datetimeFigureOut">
               <a:rPr lang="en-US" smtClean="0"/>
-              <a:t>5/22/2017</a:t>
+              <a:t>5/31/2017</a:t>
             </a:fld>
             <a:endParaRPr lang="en-US"/>
           </a:p>
@@ -1748,7 +1748,7 @@
           <a:p>
             <a:fld id="{30DA0606-474F-417C-8DB0-81402E3BEFB0}" type="datetimeFigureOut">
               <a:rPr lang="en-US" smtClean="0"/>
-              <a:t>5/22/2017</a:t>
+              <a:t>5/31/2017</a:t>
             </a:fld>
             <a:endParaRPr lang="en-US"/>
           </a:p>
@@ -1843,7 +1843,7 @@
           <a:p>
             <a:fld id="{30DA0606-474F-417C-8DB0-81402E3BEFB0}" type="datetimeFigureOut">
               <a:rPr lang="en-US" smtClean="0"/>
-              <a:t>5/22/2017</a:t>
+              <a:t>5/31/2017</a:t>
             </a:fld>
             <a:endParaRPr lang="en-US"/>
           </a:p>
@@ -2120,7 +2120,7 @@
           <a:p>
             <a:fld id="{30DA0606-474F-417C-8DB0-81402E3BEFB0}" type="datetimeFigureOut">
               <a:rPr lang="en-US" smtClean="0"/>
-              <a:t>5/22/2017</a:t>
+              <a:t>5/31/2017</a:t>
             </a:fld>
             <a:endParaRPr lang="en-US"/>
           </a:p>
@@ -2373,7 +2373,7 @@
           <a:p>
             <a:fld id="{30DA0606-474F-417C-8DB0-81402E3BEFB0}" type="datetimeFigureOut">
               <a:rPr lang="en-US" smtClean="0"/>
-              <a:t>5/22/2017</a:t>
+              <a:t>5/31/2017</a:t>
             </a:fld>
             <a:endParaRPr lang="en-US"/>
           </a:p>
@@ -2586,7 +2586,7 @@
           <a:p>
             <a:fld id="{30DA0606-474F-417C-8DB0-81402E3BEFB0}" type="datetimeFigureOut">
               <a:rPr lang="en-US" smtClean="0"/>
-              <a:t>5/22/2017</a:t>
+              <a:t>5/31/2017</a:t>
             </a:fld>
             <a:endParaRPr lang="en-US"/>
           </a:p>
@@ -8292,14 +8292,14 @@
           <p:nvPr>
             <p:extLst>
               <p:ext uri="{D42A27DB-BD31-4B8C-83A1-F6EECF244321}">
-                <p14:modId xmlns:p14="http://schemas.microsoft.com/office/powerpoint/2010/main" val="1984622677"/>
+                <p14:modId xmlns:p14="http://schemas.microsoft.com/office/powerpoint/2010/main" val="2713329249"/>
               </p:ext>
             </p:extLst>
           </p:nvPr>
         </p:nvGraphicFramePr>
         <p:xfrm>
           <a:off x="1238899" y="1036907"/>
-          <a:ext cx="9528630" cy="5308600"/>
+          <a:ext cx="9528630" cy="5674360"/>
         </p:xfrm>
         <a:graphic>
           <a:graphicData uri="http://schemas.openxmlformats.org/drawingml/2006/table">
@@ -8394,7 +8394,11 @@
                     <a:p>
                       <a:r>
                         <a:rPr lang="en-US" dirty="0" smtClean="0"/>
-                        <a:t>/query/all</a:t>
+                        <a:t>/</a:t>
+                      </a:r>
+                      <a:r>
+                        <a:rPr lang="en-US" dirty="0" smtClean="0"/>
+                        <a:t>query/</a:t>
                       </a:r>
                       <a:endParaRPr lang="en-US" dirty="0"/>
                     </a:p>
@@ -8514,7 +8518,11 @@
                       </a:r>
                       <a:r>
                         <a:rPr lang="en-US" baseline="0" dirty="0" smtClean="0"/>
-                        <a:t> All Queries</a:t>
+                        <a:t> </a:t>
+                      </a:r>
+                      <a:r>
+                        <a:rPr lang="en-US" baseline="0" dirty="0" smtClean="0"/>
+                        <a:t>all query objects</a:t>
                       </a:r>
                       <a:endParaRPr lang="en-US" dirty="0"/>
                     </a:p>
@@ -8691,8 +8699,86 @@
                           <a:ea typeface="+mn-ea"/>
                           <a:cs typeface="+mn-cs"/>
                         </a:rPr>
-                        <a:t>"maxImages":10000</a:t>
-                      </a:r>
+                        <a:t>"maxImages":</a:t>
+                      </a:r>
+                      <a:r>
+                        <a:rPr lang="en-US" sz="1200" kern="1200" dirty="0" smtClean="0">
+                          <a:solidFill>
+                            <a:schemeClr val="dk1"/>
+                          </a:solidFill>
+                          <a:latin typeface="+mn-lt"/>
+                          <a:ea typeface="+mn-ea"/>
+                          <a:cs typeface="+mn-cs"/>
+                        </a:rPr>
+                        <a:t>10000,</a:t>
+                      </a:r>
+                    </a:p>
+                    <a:p>
+                      <a:r>
+                        <a:rPr lang="en-US" sz="1200" kern="1200" dirty="0" err="1" smtClean="0">
+                          <a:solidFill>
+                            <a:schemeClr val="dk1"/>
+                          </a:solidFill>
+                          <a:latin typeface="+mn-lt"/>
+                          <a:ea typeface="+mn-ea"/>
+                          <a:cs typeface="+mn-cs"/>
+                        </a:rPr>
+                        <a:t>discoveredPages</a:t>
+                      </a:r>
+                      <a:r>
+                        <a:rPr lang="en-US" sz="1200" kern="1200" dirty="0" smtClean="0">
+                          <a:solidFill>
+                            <a:schemeClr val="dk1"/>
+                          </a:solidFill>
+                          <a:latin typeface="+mn-lt"/>
+                          <a:ea typeface="+mn-ea"/>
+                          <a:cs typeface="+mn-cs"/>
+                        </a:rPr>
+                        <a:t>:</a:t>
+                      </a:r>
+                      <a:r>
+                        <a:rPr lang="en-US" sz="1200" kern="1200" baseline="0" dirty="0" smtClean="0">
+                          <a:solidFill>
+                            <a:schemeClr val="dk1"/>
+                          </a:solidFill>
+                          <a:latin typeface="+mn-lt"/>
+                          <a:ea typeface="+mn-ea"/>
+                          <a:cs typeface="+mn-cs"/>
+                        </a:rPr>
+                        <a:t> &lt;#&gt;,</a:t>
+                      </a:r>
+                    </a:p>
+                    <a:p>
+                      <a:r>
+                        <a:rPr lang="en-US" sz="1200" kern="1200" baseline="0" dirty="0" err="1" smtClean="0">
+                          <a:solidFill>
+                            <a:schemeClr val="dk1"/>
+                          </a:solidFill>
+                          <a:latin typeface="+mn-lt"/>
+                          <a:ea typeface="+mn-ea"/>
+                          <a:cs typeface="+mn-cs"/>
+                        </a:rPr>
+                        <a:t>discoveredImages</a:t>
+                      </a:r>
+                      <a:r>
+                        <a:rPr lang="en-US" sz="1200" kern="1200" baseline="0" dirty="0" smtClean="0">
+                          <a:solidFill>
+                            <a:schemeClr val="dk1"/>
+                          </a:solidFill>
+                          <a:latin typeface="+mn-lt"/>
+                          <a:ea typeface="+mn-ea"/>
+                          <a:cs typeface="+mn-cs"/>
+                        </a:rPr>
+                        <a:t>: &lt;#&gt;</a:t>
+                      </a:r>
+                      <a:endParaRPr lang="en-US" sz="1200" kern="1200" dirty="0" smtClean="0">
+                        <a:solidFill>
+                          <a:schemeClr val="dk1"/>
+                        </a:solidFill>
+                        <a:latin typeface="+mn-lt"/>
+                        <a:ea typeface="+mn-ea"/>
+                        <a:cs typeface="+mn-cs"/>
+                      </a:endParaRPr>
                     </a:p>
                     <a:p>
                       <a:r>
@@ -8725,6 +8811,14 @@
                     <a:bodyPr/>
                     <a:lstStyle/>
                     <a:p>
+                      <a:r>
+                        <a:rPr lang="en-US" dirty="0" smtClean="0"/>
+                        <a:t>Query information including any discovered images or pages associated with the</a:t>
+                      </a:r>
+                      <a:r>
+                        <a:rPr lang="en-US" baseline="0" dirty="0" smtClean="0"/>
+                        <a:t> query</a:t>
+                      </a:r>
                       <a:endParaRPr lang="en-US" dirty="0"/>
                     </a:p>
                   </a:txBody>
@@ -8988,442 +9082,6 @@
           <a:chExt cx="0" cy="0"/>
         </a:xfrm>
       </p:grpSpPr>
-      <p:graphicFrame>
-        <p:nvGraphicFramePr>
-          <p:cNvPr id="2" name="Table 1"/>
-          <p:cNvGraphicFramePr>
-            <a:graphicFrameLocks noGrp="1"/>
-          </p:cNvGraphicFramePr>
-          <p:nvPr>
-            <p:extLst>
-              <p:ext uri="{D42A27DB-BD31-4B8C-83A1-F6EECF244321}">
-                <p14:modId xmlns:p14="http://schemas.microsoft.com/office/powerpoint/2010/main" val="2551126553"/>
-              </p:ext>
-            </p:extLst>
-          </p:nvPr>
-        </p:nvGraphicFramePr>
-        <p:xfrm>
-          <a:off x="1126932" y="999584"/>
-          <a:ext cx="9528630" cy="3576320"/>
-        </p:xfrm>
-        <a:graphic>
-          <a:graphicData uri="http://schemas.openxmlformats.org/drawingml/2006/table">
-            <a:tbl>
-              <a:tblPr firstRow="1" bandRow="1">
-                <a:tableStyleId>{5C22544A-7EE6-4342-B048-85BDC9FD1C3A}</a:tableStyleId>
-              </a:tblPr>
-              <a:tblGrid>
-                <a:gridCol w="1905726"/>
-                <a:gridCol w="1905726"/>
-                <a:gridCol w="1905726"/>
-                <a:gridCol w="1905726"/>
-                <a:gridCol w="1905726"/>
-              </a:tblGrid>
-              <a:tr h="370840">
-                <a:tc>
-                  <a:txBody>
-                    <a:bodyPr/>
-                    <a:lstStyle/>
-                    <a:p>
-                      <a:r>
-                        <a:rPr lang="en-US" dirty="0" smtClean="0"/>
-                        <a:t>API Call</a:t>
-                      </a:r>
-                      <a:endParaRPr lang="en-US" dirty="0"/>
-                    </a:p>
-                  </a:txBody>
-                  <a:tcPr/>
-                </a:tc>
-                <a:tc>
-                  <a:txBody>
-                    <a:bodyPr/>
-                    <a:lstStyle/>
-                    <a:p>
-                      <a:r>
-                        <a:rPr lang="en-US" dirty="0" smtClean="0"/>
-                        <a:t>GET/POST/DELETE</a:t>
-                      </a:r>
-                      <a:endParaRPr lang="en-US" dirty="0"/>
-                    </a:p>
-                  </a:txBody>
-                  <a:tcPr/>
-                </a:tc>
-                <a:tc>
-                  <a:txBody>
-                    <a:bodyPr/>
-                    <a:lstStyle/>
-                    <a:p>
-                      <a:r>
-                        <a:rPr lang="en-US" dirty="0" smtClean="0"/>
-                        <a:t>PARAMETERS</a:t>
-                      </a:r>
-                      <a:endParaRPr lang="en-US" dirty="0"/>
-                    </a:p>
-                  </a:txBody>
-                  <a:tcPr/>
-                </a:tc>
-                <a:tc>
-                  <a:txBody>
-                    <a:bodyPr/>
-                    <a:lstStyle/>
-                    <a:p>
-                      <a:r>
-                        <a:rPr lang="en-US" dirty="0" smtClean="0"/>
-                        <a:t>RETURNS</a:t>
-                      </a:r>
-                      <a:endParaRPr lang="en-US" dirty="0"/>
-                    </a:p>
-                  </a:txBody>
-                  <a:tcPr/>
-                </a:tc>
-                <a:tc>
-                  <a:txBody>
-                    <a:bodyPr/>
-                    <a:lstStyle/>
-                    <a:p>
-                      <a:r>
-                        <a:rPr lang="en-US" dirty="0" smtClean="0"/>
-                        <a:t>Description</a:t>
-                      </a:r>
-                      <a:endParaRPr lang="en-US" dirty="0"/>
-                    </a:p>
-                  </a:txBody>
-                  <a:tcPr/>
-                </a:tc>
-              </a:tr>
-              <a:tr h="370840">
-                <a:tc>
-                  <a:txBody>
-                    <a:bodyPr/>
-                    <a:lstStyle/>
-                    <a:p>
-                      <a:r>
-                        <a:rPr lang="en-US" dirty="0" smtClean="0"/>
-                        <a:t>/query/id/map</a:t>
-                      </a:r>
-                      <a:endParaRPr lang="en-US" dirty="0"/>
-                    </a:p>
-                  </a:txBody>
-                  <a:tcPr/>
-                </a:tc>
-                <a:tc>
-                  <a:txBody>
-                    <a:bodyPr/>
-                    <a:lstStyle/>
-                    <a:p>
-                      <a:r>
-                        <a:rPr lang="en-US" dirty="0" smtClean="0"/>
-                        <a:t>GET</a:t>
-                      </a:r>
-                      <a:endParaRPr lang="en-US" dirty="0"/>
-                    </a:p>
-                  </a:txBody>
-                  <a:tcPr/>
-                </a:tc>
-                <a:tc>
-                  <a:txBody>
-                    <a:bodyPr/>
-                    <a:lstStyle/>
-                    <a:p>
-                      <a:endParaRPr lang="en-US" dirty="0"/>
-                    </a:p>
-                  </a:txBody>
-                  <a:tcPr/>
-                </a:tc>
-                <a:tc>
-                  <a:txBody>
-                    <a:bodyPr/>
-                    <a:lstStyle/>
-                    <a:p>
-                      <a:endParaRPr lang="en-US" sz="1200" dirty="0"/>
-                    </a:p>
-                  </a:txBody>
-                  <a:tcPr/>
-                </a:tc>
-                <a:tc>
-                  <a:txBody>
-                    <a:bodyPr/>
-                    <a:lstStyle/>
-                    <a:p>
-                      <a:r>
-                        <a:rPr lang="en-US" dirty="0" smtClean="0"/>
-                        <a:t>Topology</a:t>
-                      </a:r>
-                      <a:r>
-                        <a:rPr lang="en-US" baseline="0" dirty="0" smtClean="0"/>
-                        <a:t> of pages and images</a:t>
-                      </a:r>
-                      <a:endParaRPr lang="en-US" dirty="0"/>
-                    </a:p>
-                  </a:txBody>
-                  <a:tcPr/>
-                </a:tc>
-              </a:tr>
-              <a:tr h="370840">
-                <a:tc>
-                  <a:txBody>
-                    <a:bodyPr/>
-                    <a:lstStyle/>
-                    <a:p>
-                      <a:r>
-                        <a:rPr lang="en-US" dirty="0" smtClean="0"/>
-                        <a:t>/query/id/images</a:t>
-                      </a:r>
-                      <a:endParaRPr lang="en-US" dirty="0"/>
-                    </a:p>
-                  </a:txBody>
-                  <a:tcPr/>
-                </a:tc>
-                <a:tc>
-                  <a:txBody>
-                    <a:bodyPr/>
-                    <a:lstStyle/>
-                    <a:p>
-                      <a:r>
-                        <a:rPr lang="en-US" dirty="0" smtClean="0"/>
-                        <a:t>GET</a:t>
-                      </a:r>
-                      <a:endParaRPr lang="en-US" dirty="0"/>
-                    </a:p>
-                  </a:txBody>
-                  <a:tcPr/>
-                </a:tc>
-                <a:tc>
-                  <a:txBody>
-                    <a:bodyPr/>
-                    <a:lstStyle/>
-                    <a:p>
-                      <a:r>
-                        <a:rPr lang="en-US" dirty="0" smtClean="0"/>
-                        <a:t>{size filter}</a:t>
-                      </a:r>
-                      <a:endParaRPr lang="en-US" dirty="0"/>
-                    </a:p>
-                  </a:txBody>
-                  <a:tcPr/>
-                </a:tc>
-                <a:tc>
-                  <a:txBody>
-                    <a:bodyPr/>
-                    <a:lstStyle/>
-                    <a:p>
-                      <a:endParaRPr lang="en-US" sz="1200" dirty="0"/>
-                    </a:p>
-                  </a:txBody>
-                  <a:tcPr/>
-                </a:tc>
-                <a:tc>
-                  <a:txBody>
-                    <a:bodyPr/>
-                    <a:lstStyle/>
-                    <a:p>
-                      <a:r>
-                        <a:rPr lang="en-US" dirty="0" smtClean="0"/>
-                        <a:t>Images associated with query</a:t>
-                      </a:r>
-                      <a:endParaRPr lang="en-US" dirty="0"/>
-                    </a:p>
-                  </a:txBody>
-                  <a:tcPr/>
-                </a:tc>
-              </a:tr>
-              <a:tr h="370840">
-                <a:tc>
-                  <a:txBody>
-                    <a:bodyPr/>
-                    <a:lstStyle/>
-                    <a:p>
-                      <a:r>
-                        <a:rPr lang="en-US" dirty="0" smtClean="0"/>
-                        <a:t>/query/id/pages</a:t>
-                      </a:r>
-                      <a:endParaRPr lang="en-US" dirty="0"/>
-                    </a:p>
-                  </a:txBody>
-                  <a:tcPr/>
-                </a:tc>
-                <a:tc>
-                  <a:txBody>
-                    <a:bodyPr/>
-                    <a:lstStyle/>
-                    <a:p>
-                      <a:r>
-                        <a:rPr lang="en-US" dirty="0" smtClean="0"/>
-                        <a:t>GET</a:t>
-                      </a:r>
-                      <a:endParaRPr lang="en-US" dirty="0"/>
-                    </a:p>
-                  </a:txBody>
-                  <a:tcPr/>
-                </a:tc>
-                <a:tc>
-                  <a:txBody>
-                    <a:bodyPr/>
-                    <a:lstStyle/>
-                    <a:p>
-                      <a:r>
-                        <a:rPr lang="en-US" dirty="0" smtClean="0"/>
-                        <a:t>{size filter}</a:t>
-                      </a:r>
-                      <a:endParaRPr lang="en-US" dirty="0"/>
-                    </a:p>
-                  </a:txBody>
-                  <a:tcPr/>
-                </a:tc>
-                <a:tc>
-                  <a:txBody>
-                    <a:bodyPr/>
-                    <a:lstStyle/>
-                    <a:p>
-                      <a:endParaRPr lang="en-US" sz="1200" dirty="0"/>
-                    </a:p>
-                  </a:txBody>
-                  <a:tcPr/>
-                </a:tc>
-                <a:tc>
-                  <a:txBody>
-                    <a:bodyPr/>
-                    <a:lstStyle/>
-                    <a:p>
-                      <a:r>
-                        <a:rPr lang="en-US" dirty="0" smtClean="0"/>
-                        <a:t>Pages associated with query</a:t>
-                      </a:r>
-                    </a:p>
-                  </a:txBody>
-                  <a:tcPr/>
-                </a:tc>
-              </a:tr>
-              <a:tr h="370840">
-                <a:tc>
-                  <a:txBody>
-                    <a:bodyPr/>
-                    <a:lstStyle/>
-                    <a:p>
-                      <a:r>
-                        <a:rPr lang="en-US" dirty="0" smtClean="0"/>
-                        <a:t>/query/id/status</a:t>
-                      </a:r>
-                      <a:endParaRPr lang="en-US" dirty="0"/>
-                    </a:p>
-                  </a:txBody>
-                  <a:tcPr/>
-                </a:tc>
-                <a:tc>
-                  <a:txBody>
-                    <a:bodyPr/>
-                    <a:lstStyle/>
-                    <a:p>
-                      <a:r>
-                        <a:rPr lang="en-US" dirty="0" smtClean="0"/>
-                        <a:t>GET</a:t>
-                      </a:r>
-                      <a:endParaRPr lang="en-US" dirty="0"/>
-                    </a:p>
-                  </a:txBody>
-                  <a:tcPr/>
-                </a:tc>
-                <a:tc>
-                  <a:txBody>
-                    <a:bodyPr/>
-                    <a:lstStyle/>
-                    <a:p>
-                      <a:endParaRPr lang="en-US" dirty="0"/>
-                    </a:p>
-                  </a:txBody>
-                  <a:tcPr/>
-                </a:tc>
-                <a:tc>
-                  <a:txBody>
-                    <a:bodyPr/>
-                    <a:lstStyle/>
-                    <a:p>
-                      <a:endParaRPr lang="en-US" sz="1200" dirty="0"/>
-                    </a:p>
-                  </a:txBody>
-                  <a:tcPr/>
-                </a:tc>
-                <a:tc>
-                  <a:txBody>
-                    <a:bodyPr/>
-                    <a:lstStyle/>
-                    <a:p>
-                      <a:r>
-                        <a:rPr lang="en-US" dirty="0" smtClean="0"/>
-                        <a:t>Status of a query along with page and image counts</a:t>
-                      </a:r>
-                    </a:p>
-                  </a:txBody>
-                  <a:tcPr/>
-                </a:tc>
-              </a:tr>
-              <a:tr h="370840">
-                <a:tc>
-                  <a:txBody>
-                    <a:bodyPr/>
-                    <a:lstStyle/>
-                    <a:p>
-                      <a:r>
-                        <a:rPr lang="en-US" dirty="0" smtClean="0"/>
-                        <a:t>/query/queries</a:t>
-                      </a:r>
-                      <a:endParaRPr lang="en-US" dirty="0"/>
-                    </a:p>
-                  </a:txBody>
-                  <a:tcPr/>
-                </a:tc>
-                <a:tc>
-                  <a:txBody>
-                    <a:bodyPr/>
-                    <a:lstStyle/>
-                    <a:p>
-                      <a:r>
-                        <a:rPr lang="en-US" dirty="0" smtClean="0"/>
-                        <a:t>GET</a:t>
-                      </a:r>
-                      <a:endParaRPr lang="en-US" dirty="0"/>
-                    </a:p>
-                  </a:txBody>
-                  <a:tcPr/>
-                </a:tc>
-                <a:tc>
-                  <a:txBody>
-                    <a:bodyPr/>
-                    <a:lstStyle/>
-                    <a:p>
-                      <a:endParaRPr lang="en-US" dirty="0"/>
-                    </a:p>
-                  </a:txBody>
-                  <a:tcPr/>
-                </a:tc>
-                <a:tc>
-                  <a:txBody>
-                    <a:bodyPr/>
-                    <a:lstStyle/>
-                    <a:p>
-                      <a:endParaRPr lang="en-US" sz="1200" dirty="0"/>
-                    </a:p>
-                  </a:txBody>
-                  <a:tcPr/>
-                </a:tc>
-                <a:tc>
-                  <a:txBody>
-                    <a:bodyPr/>
-                    <a:lstStyle/>
-                    <a:p>
-                      <a:r>
-                        <a:rPr lang="en-US" dirty="0" smtClean="0"/>
-                        <a:t>List of all queries</a:t>
-                      </a:r>
-                    </a:p>
-                  </a:txBody>
-                  <a:tcPr/>
-                </a:tc>
-              </a:tr>
-            </a:tbl>
-          </a:graphicData>
-        </a:graphic>
-      </p:graphicFrame>
       <p:sp>
         <p:nvSpPr>
           <p:cNvPr id="4" name="TextBox 3"/>
@@ -9487,6 +9145,332 @@
           </a:p>
         </p:txBody>
       </p:sp>
+      <p:graphicFrame>
+        <p:nvGraphicFramePr>
+          <p:cNvPr id="2" name="Table 1"/>
+          <p:cNvGraphicFramePr>
+            <a:graphicFrameLocks noGrp="1"/>
+          </p:cNvGraphicFramePr>
+          <p:nvPr>
+            <p:extLst>
+              <p:ext uri="{D42A27DB-BD31-4B8C-83A1-F6EECF244321}">
+                <p14:modId xmlns:p14="http://schemas.microsoft.com/office/powerpoint/2010/main" val="1469466355"/>
+              </p:ext>
+            </p:extLst>
+          </p:nvPr>
+        </p:nvGraphicFramePr>
+        <p:xfrm>
+          <a:off x="1126932" y="999584"/>
+          <a:ext cx="9528630" cy="3114040"/>
+        </p:xfrm>
+        <a:graphic>
+          <a:graphicData uri="http://schemas.openxmlformats.org/drawingml/2006/table">
+            <a:tbl>
+              <a:tblPr firstRow="1" bandRow="1">
+                <a:tableStyleId>{5C22544A-7EE6-4342-B048-85BDC9FD1C3A}</a:tableStyleId>
+              </a:tblPr>
+              <a:tblGrid>
+                <a:gridCol w="1905726"/>
+                <a:gridCol w="1905726"/>
+                <a:gridCol w="1905726"/>
+                <a:gridCol w="1905726"/>
+                <a:gridCol w="1905726"/>
+              </a:tblGrid>
+              <a:tr h="370840">
+                <a:tc>
+                  <a:txBody>
+                    <a:bodyPr/>
+                    <a:lstStyle/>
+                    <a:p>
+                      <a:r>
+                        <a:rPr lang="en-US" dirty="0" smtClean="0"/>
+                        <a:t>API Call</a:t>
+                      </a:r>
+                      <a:endParaRPr lang="en-US" dirty="0"/>
+                    </a:p>
+                  </a:txBody>
+                  <a:tcPr/>
+                </a:tc>
+                <a:tc>
+                  <a:txBody>
+                    <a:bodyPr/>
+                    <a:lstStyle/>
+                    <a:p>
+                      <a:r>
+                        <a:rPr lang="en-US" dirty="0" smtClean="0"/>
+                        <a:t>GET/POST/DELETE</a:t>
+                      </a:r>
+                      <a:endParaRPr lang="en-US" dirty="0"/>
+                    </a:p>
+                  </a:txBody>
+                  <a:tcPr/>
+                </a:tc>
+                <a:tc>
+                  <a:txBody>
+                    <a:bodyPr/>
+                    <a:lstStyle/>
+                    <a:p>
+                      <a:r>
+                        <a:rPr lang="en-US" dirty="0" smtClean="0"/>
+                        <a:t>PARAMETERS</a:t>
+                      </a:r>
+                      <a:endParaRPr lang="en-US" dirty="0"/>
+                    </a:p>
+                  </a:txBody>
+                  <a:tcPr/>
+                </a:tc>
+                <a:tc>
+                  <a:txBody>
+                    <a:bodyPr/>
+                    <a:lstStyle/>
+                    <a:p>
+                      <a:r>
+                        <a:rPr lang="en-US" dirty="0" smtClean="0"/>
+                        <a:t>RETURNS</a:t>
+                      </a:r>
+                      <a:endParaRPr lang="en-US" dirty="0"/>
+                    </a:p>
+                  </a:txBody>
+                  <a:tcPr/>
+                </a:tc>
+                <a:tc>
+                  <a:txBody>
+                    <a:bodyPr/>
+                    <a:lstStyle/>
+                    <a:p>
+                      <a:r>
+                        <a:rPr lang="en-US" dirty="0" smtClean="0"/>
+                        <a:t>Description</a:t>
+                      </a:r>
+                      <a:endParaRPr lang="en-US" dirty="0"/>
+                    </a:p>
+                  </a:txBody>
+                  <a:tcPr/>
+                </a:tc>
+              </a:tr>
+              <a:tr h="370840">
+                <a:tc>
+                  <a:txBody>
+                    <a:bodyPr/>
+                    <a:lstStyle/>
+                    <a:p>
+                      <a:r>
+                        <a:rPr lang="en-US" dirty="0" smtClean="0"/>
+                        <a:t>/query/id/map</a:t>
+                      </a:r>
+                      <a:endParaRPr lang="en-US" dirty="0"/>
+                    </a:p>
+                  </a:txBody>
+                  <a:tcPr/>
+                </a:tc>
+                <a:tc>
+                  <a:txBody>
+                    <a:bodyPr/>
+                    <a:lstStyle/>
+                    <a:p>
+                      <a:r>
+                        <a:rPr lang="en-US" dirty="0" smtClean="0"/>
+                        <a:t>GET</a:t>
+                      </a:r>
+                      <a:endParaRPr lang="en-US" dirty="0"/>
+                    </a:p>
+                  </a:txBody>
+                  <a:tcPr/>
+                </a:tc>
+                <a:tc>
+                  <a:txBody>
+                    <a:bodyPr/>
+                    <a:lstStyle/>
+                    <a:p>
+                      <a:endParaRPr lang="en-US" dirty="0"/>
+                    </a:p>
+                  </a:txBody>
+                  <a:tcPr/>
+                </a:tc>
+                <a:tc>
+                  <a:txBody>
+                    <a:bodyPr/>
+                    <a:lstStyle/>
+                    <a:p>
+                      <a:endParaRPr lang="en-US" sz="1200" dirty="0"/>
+                    </a:p>
+                  </a:txBody>
+                  <a:tcPr/>
+                </a:tc>
+                <a:tc>
+                  <a:txBody>
+                    <a:bodyPr/>
+                    <a:lstStyle/>
+                    <a:p>
+                      <a:r>
+                        <a:rPr lang="en-US" dirty="0" smtClean="0"/>
+                        <a:t>Topology</a:t>
+                      </a:r>
+                      <a:r>
+                        <a:rPr lang="en-US" baseline="0" dirty="0" smtClean="0"/>
+                        <a:t> of pages and </a:t>
+                      </a:r>
+                      <a:r>
+                        <a:rPr lang="en-US" baseline="0" dirty="0" smtClean="0"/>
+                        <a:t>images associated with query</a:t>
+                      </a:r>
+                      <a:endParaRPr lang="en-US" dirty="0"/>
+                    </a:p>
+                  </a:txBody>
+                  <a:tcPr/>
+                </a:tc>
+              </a:tr>
+              <a:tr h="370840">
+                <a:tc>
+                  <a:txBody>
+                    <a:bodyPr/>
+                    <a:lstStyle/>
+                    <a:p>
+                      <a:r>
+                        <a:rPr lang="en-US" dirty="0" smtClean="0"/>
+                        <a:t>/</a:t>
+                      </a:r>
+                      <a:r>
+                        <a:rPr lang="en-US" dirty="0" smtClean="0"/>
+                        <a:t>query/id/image</a:t>
+                      </a:r>
+                      <a:endParaRPr lang="en-US" dirty="0"/>
+                    </a:p>
+                  </a:txBody>
+                  <a:tcPr/>
+                </a:tc>
+                <a:tc>
+                  <a:txBody>
+                    <a:bodyPr/>
+                    <a:lstStyle/>
+                    <a:p>
+                      <a:r>
+                        <a:rPr lang="en-US" dirty="0" smtClean="0"/>
+                        <a:t>GET</a:t>
+                      </a:r>
+                      <a:endParaRPr lang="en-US" dirty="0"/>
+                    </a:p>
+                  </a:txBody>
+                  <a:tcPr/>
+                </a:tc>
+                <a:tc>
+                  <a:txBody>
+                    <a:bodyPr/>
+                    <a:lstStyle/>
+                    <a:p>
+                      <a:r>
+                        <a:rPr lang="en-US" dirty="0" smtClean="0"/>
+                        <a:t>{size filter}</a:t>
+                      </a:r>
+                      <a:endParaRPr lang="en-US" dirty="0"/>
+                    </a:p>
+                  </a:txBody>
+                  <a:tcPr/>
+                </a:tc>
+                <a:tc>
+                  <a:txBody>
+                    <a:bodyPr/>
+                    <a:lstStyle/>
+                    <a:p>
+                      <a:endParaRPr lang="en-US" sz="1200" dirty="0"/>
+                    </a:p>
+                  </a:txBody>
+                  <a:tcPr/>
+                </a:tc>
+                <a:tc>
+                  <a:txBody>
+                    <a:bodyPr/>
+                    <a:lstStyle/>
+                    <a:p>
+                      <a:r>
+                        <a:rPr lang="en-US" dirty="0" smtClean="0"/>
+                        <a:t>All Images Objects associated with</a:t>
+                      </a:r>
+                      <a:r>
+                        <a:rPr lang="en-US" baseline="0" dirty="0" smtClean="0"/>
+                        <a:t> a query</a:t>
+                      </a:r>
+                      <a:endParaRPr lang="en-US" dirty="0"/>
+                    </a:p>
+                  </a:txBody>
+                  <a:tcPr/>
+                </a:tc>
+              </a:tr>
+              <a:tr h="370840">
+                <a:tc>
+                  <a:txBody>
+                    <a:bodyPr/>
+                    <a:lstStyle/>
+                    <a:p>
+                      <a:r>
+                        <a:rPr lang="en-US" dirty="0" smtClean="0"/>
+                        <a:t>/</a:t>
+                      </a:r>
+                      <a:r>
+                        <a:rPr lang="en-US" dirty="0" smtClean="0"/>
+                        <a:t>query/id/page</a:t>
+                      </a:r>
+                      <a:endParaRPr lang="en-US" dirty="0"/>
+                    </a:p>
+                  </a:txBody>
+                  <a:tcPr/>
+                </a:tc>
+                <a:tc>
+                  <a:txBody>
+                    <a:bodyPr/>
+                    <a:lstStyle/>
+                    <a:p>
+                      <a:r>
+                        <a:rPr lang="en-US" dirty="0" smtClean="0"/>
+                        <a:t>GET</a:t>
+                      </a:r>
+                      <a:endParaRPr lang="en-US" dirty="0"/>
+                    </a:p>
+                  </a:txBody>
+                  <a:tcPr/>
+                </a:tc>
+                <a:tc>
+                  <a:txBody>
+                    <a:bodyPr/>
+                    <a:lstStyle/>
+                    <a:p>
+                      <a:r>
+                        <a:rPr lang="en-US" dirty="0" smtClean="0"/>
+                        <a:t>{size filter}</a:t>
+                      </a:r>
+                      <a:endParaRPr lang="en-US" dirty="0"/>
+                    </a:p>
+                  </a:txBody>
+                  <a:tcPr/>
+                </a:tc>
+                <a:tc>
+                  <a:txBody>
+                    <a:bodyPr/>
+                    <a:lstStyle/>
+                    <a:p>
+                      <a:endParaRPr lang="en-US" sz="1200" dirty="0"/>
+                    </a:p>
+                  </a:txBody>
+                  <a:tcPr/>
+                </a:tc>
+                <a:tc>
+                  <a:txBody>
+                    <a:bodyPr/>
+                    <a:lstStyle/>
+                    <a:p>
+                      <a:r>
+                        <a:rPr lang="en-US" dirty="0" smtClean="0"/>
+                        <a:t>Pages associated with query</a:t>
+                      </a:r>
+                    </a:p>
+                  </a:txBody>
+                  <a:tcPr/>
+                </a:tc>
+              </a:tr>
+            </a:tbl>
+          </a:graphicData>
+        </a:graphic>
+      </p:graphicFrame>
     </p:spTree>
     <p:extLst>
       <p:ext uri="{BB962C8B-B14F-4D97-AF65-F5344CB8AC3E}">
@@ -9524,333 +9508,6 @@
           <a:chExt cx="0" cy="0"/>
         </a:xfrm>
       </p:grpSpPr>
-      <p:graphicFrame>
-        <p:nvGraphicFramePr>
-          <p:cNvPr id="2" name="Table 1"/>
-          <p:cNvGraphicFramePr>
-            <a:graphicFrameLocks noGrp="1"/>
-          </p:cNvGraphicFramePr>
-          <p:nvPr>
-            <p:extLst>
-              <p:ext uri="{D42A27DB-BD31-4B8C-83A1-F6EECF244321}">
-                <p14:modId xmlns:p14="http://schemas.microsoft.com/office/powerpoint/2010/main" val="2435816349"/>
-              </p:ext>
-            </p:extLst>
-          </p:nvPr>
-        </p:nvGraphicFramePr>
-        <p:xfrm>
-          <a:off x="1192246" y="1092890"/>
-          <a:ext cx="9528630" cy="1483360"/>
-        </p:xfrm>
-        <a:graphic>
-          <a:graphicData uri="http://schemas.openxmlformats.org/drawingml/2006/table">
-            <a:tbl>
-              <a:tblPr firstRow="1" bandRow="1">
-                <a:tableStyleId>{5C22544A-7EE6-4342-B048-85BDC9FD1C3A}</a:tableStyleId>
-              </a:tblPr>
-              <a:tblGrid>
-                <a:gridCol w="1905726"/>
-                <a:gridCol w="1905726"/>
-                <a:gridCol w="1905726"/>
-                <a:gridCol w="1905726"/>
-                <a:gridCol w="1905726"/>
-              </a:tblGrid>
-              <a:tr h="370840">
-                <a:tc>
-                  <a:txBody>
-                    <a:bodyPr/>
-                    <a:lstStyle/>
-                    <a:p>
-                      <a:r>
-                        <a:rPr lang="en-US" dirty="0" smtClean="0"/>
-                        <a:t>API Call</a:t>
-                      </a:r>
-                      <a:endParaRPr lang="en-US" dirty="0"/>
-                    </a:p>
-                  </a:txBody>
-                  <a:tcPr/>
-                </a:tc>
-                <a:tc>
-                  <a:txBody>
-                    <a:bodyPr/>
-                    <a:lstStyle/>
-                    <a:p>
-                      <a:r>
-                        <a:rPr lang="en-US" dirty="0" smtClean="0"/>
-                        <a:t>GET/POST/DELETE</a:t>
-                      </a:r>
-                      <a:endParaRPr lang="en-US" dirty="0"/>
-                    </a:p>
-                  </a:txBody>
-                  <a:tcPr/>
-                </a:tc>
-                <a:tc>
-                  <a:txBody>
-                    <a:bodyPr/>
-                    <a:lstStyle/>
-                    <a:p>
-                      <a:r>
-                        <a:rPr lang="en-US" dirty="0" smtClean="0"/>
-                        <a:t>PARAMETERS</a:t>
-                      </a:r>
-                      <a:endParaRPr lang="en-US" dirty="0"/>
-                    </a:p>
-                  </a:txBody>
-                  <a:tcPr/>
-                </a:tc>
-                <a:tc>
-                  <a:txBody>
-                    <a:bodyPr/>
-                    <a:lstStyle/>
-                    <a:p>
-                      <a:r>
-                        <a:rPr lang="en-US" dirty="0" smtClean="0"/>
-                        <a:t>RETURNS</a:t>
-                      </a:r>
-                      <a:endParaRPr lang="en-US" dirty="0"/>
-                    </a:p>
-                  </a:txBody>
-                  <a:tcPr/>
-                </a:tc>
-                <a:tc>
-                  <a:txBody>
-                    <a:bodyPr/>
-                    <a:lstStyle/>
-                    <a:p>
-                      <a:r>
-                        <a:rPr lang="en-US" dirty="0" smtClean="0"/>
-                        <a:t>Description</a:t>
-                      </a:r>
-                      <a:endParaRPr lang="en-US" dirty="0"/>
-                    </a:p>
-                  </a:txBody>
-                  <a:tcPr/>
-                </a:tc>
-              </a:tr>
-              <a:tr h="370840">
-                <a:tc>
-                  <a:txBody>
-                    <a:bodyPr/>
-                    <a:lstStyle/>
-                    <a:p>
-                      <a:r>
-                        <a:rPr lang="en-US" dirty="0" smtClean="0"/>
-                        <a:t>/search/latest</a:t>
-                      </a:r>
-                      <a:endParaRPr lang="en-US" dirty="0"/>
-                    </a:p>
-                  </a:txBody>
-                  <a:tcPr/>
-                </a:tc>
-                <a:tc>
-                  <a:txBody>
-                    <a:bodyPr/>
-                    <a:lstStyle/>
-                    <a:p>
-                      <a:r>
-                        <a:rPr lang="en-US" dirty="0" smtClean="0"/>
-                        <a:t>GET</a:t>
-                      </a:r>
-                      <a:endParaRPr lang="en-US" dirty="0"/>
-                    </a:p>
-                  </a:txBody>
-                  <a:tcPr/>
-                </a:tc>
-                <a:tc>
-                  <a:txBody>
-                    <a:bodyPr/>
-                    <a:lstStyle/>
-                    <a:p>
-                      <a:endParaRPr lang="en-US" dirty="0"/>
-                    </a:p>
-                  </a:txBody>
-                  <a:tcPr/>
-                </a:tc>
-                <a:tc>
-                  <a:txBody>
-                    <a:bodyPr/>
-                    <a:lstStyle/>
-                    <a:p>
-                      <a:endParaRPr lang="en-US" sz="1400" dirty="0"/>
-                    </a:p>
-                  </a:txBody>
-                  <a:tcPr/>
-                </a:tc>
-                <a:tc>
-                  <a:txBody>
-                    <a:bodyPr/>
-                    <a:lstStyle/>
-                    <a:p>
-                      <a:r>
-                        <a:rPr lang="en-US" dirty="0" smtClean="0"/>
-                        <a:t>Last</a:t>
-                      </a:r>
-                      <a:r>
-                        <a:rPr lang="en-US" baseline="0" dirty="0" smtClean="0"/>
-                        <a:t> search to run</a:t>
-                      </a:r>
-                      <a:endParaRPr lang="en-US" dirty="0"/>
-                    </a:p>
-                  </a:txBody>
-                  <a:tcPr/>
-                </a:tc>
-              </a:tr>
-              <a:tr h="370840">
-                <a:tc>
-                  <a:txBody>
-                    <a:bodyPr/>
-                    <a:lstStyle/>
-                    <a:p>
-                      <a:r>
-                        <a:rPr lang="en-US" dirty="0" smtClean="0"/>
-                        <a:t>/search/start</a:t>
-                      </a:r>
-                      <a:endParaRPr lang="en-US" dirty="0"/>
-                    </a:p>
-                  </a:txBody>
-                  <a:tcPr/>
-                </a:tc>
-                <a:tc>
-                  <a:txBody>
-                    <a:bodyPr/>
-                    <a:lstStyle/>
-                    <a:p>
-                      <a:r>
-                        <a:rPr lang="en-US" dirty="0" smtClean="0"/>
-                        <a:t>POST</a:t>
-                      </a:r>
-                      <a:endParaRPr lang="en-US" dirty="0"/>
-                    </a:p>
-                  </a:txBody>
-                  <a:tcPr/>
-                </a:tc>
-                <a:tc>
-                  <a:txBody>
-                    <a:bodyPr/>
-                    <a:lstStyle/>
-                    <a:p>
-                      <a:r>
-                        <a:rPr lang="en-US" dirty="0" smtClean="0"/>
-                        <a:t>{</a:t>
-                      </a:r>
-                      <a:r>
-                        <a:rPr lang="en-US" dirty="0" err="1" smtClean="0"/>
-                        <a:t>url</a:t>
-                      </a:r>
-                      <a:r>
-                        <a:rPr lang="en-US" dirty="0" smtClean="0"/>
-                        <a:t>}</a:t>
-                      </a:r>
-                      <a:endParaRPr lang="en-US" dirty="0"/>
-                    </a:p>
-                  </a:txBody>
-                  <a:tcPr/>
-                </a:tc>
-                <a:tc>
-                  <a:txBody>
-                    <a:bodyPr/>
-                    <a:lstStyle/>
-                    <a:p>
-                      <a:endParaRPr lang="en-US" sz="1400" dirty="0"/>
-                    </a:p>
-                  </a:txBody>
-                  <a:tcPr/>
-                </a:tc>
-                <a:tc>
-                  <a:txBody>
-                    <a:bodyPr/>
-                    <a:lstStyle/>
-                    <a:p>
-                      <a:r>
-                        <a:rPr lang="en-US" dirty="0" smtClean="0"/>
-                        <a:t>Start a search</a:t>
-                      </a:r>
-                      <a:endParaRPr lang="en-US" dirty="0"/>
-                    </a:p>
-                  </a:txBody>
-                  <a:tcPr/>
-                </a:tc>
-              </a:tr>
-              <a:tr h="370840">
-                <a:tc>
-                  <a:txBody>
-                    <a:bodyPr/>
-                    <a:lstStyle/>
-                    <a:p>
-                      <a:r>
-                        <a:rPr lang="en-US" dirty="0" smtClean="0"/>
-                        <a:t>/search/stop</a:t>
-                      </a:r>
-                      <a:endParaRPr lang="en-US" dirty="0"/>
-                    </a:p>
-                  </a:txBody>
-                  <a:tcPr/>
-                </a:tc>
-                <a:tc>
-                  <a:txBody>
-                    <a:bodyPr/>
-                    <a:lstStyle/>
-                    <a:p>
-                      <a:r>
-                        <a:rPr lang="en-US" dirty="0" smtClean="0"/>
-                        <a:t>POST</a:t>
-                      </a:r>
-                      <a:endParaRPr lang="en-US" dirty="0"/>
-                    </a:p>
-                  </a:txBody>
-                  <a:tcPr/>
-                </a:tc>
-                <a:tc>
-                  <a:txBody>
-                    <a:bodyPr/>
-                    <a:lstStyle/>
-                    <a:p>
-                      <a:r>
-                        <a:rPr lang="en-US" dirty="0" smtClean="0"/>
-                        <a:t>{</a:t>
-                      </a:r>
-                      <a:r>
-                        <a:rPr lang="en-US" dirty="0" err="1" smtClean="0"/>
-                        <a:t>url</a:t>
-                      </a:r>
-                      <a:r>
-                        <a:rPr lang="en-US" dirty="0" smtClean="0"/>
-                        <a:t>}</a:t>
-                      </a:r>
-                      <a:endParaRPr lang="en-US" dirty="0"/>
-                    </a:p>
-                  </a:txBody>
-                  <a:tcPr/>
-                </a:tc>
-                <a:tc>
-                  <a:txBody>
-                    <a:bodyPr/>
-                    <a:lstStyle/>
-                    <a:p>
-                      <a:endParaRPr lang="en-US" sz="1400" dirty="0"/>
-                    </a:p>
-                  </a:txBody>
-                  <a:tcPr/>
-                </a:tc>
-                <a:tc>
-                  <a:txBody>
-                    <a:bodyPr/>
-                    <a:lstStyle/>
-                    <a:p>
-                      <a:r>
-                        <a:rPr lang="en-US" dirty="0" smtClean="0"/>
-                        <a:t>Stop a search</a:t>
-                      </a:r>
-                      <a:endParaRPr lang="en-US" dirty="0"/>
-                    </a:p>
-                  </a:txBody>
-                  <a:tcPr/>
-                </a:tc>
-              </a:tr>
-            </a:tbl>
-          </a:graphicData>
-        </a:graphic>
-      </p:graphicFrame>
       <p:sp>
         <p:nvSpPr>
           <p:cNvPr id="4" name="TextBox 3"/>
@@ -9914,6 +9571,378 @@
           </a:p>
         </p:txBody>
       </p:sp>
+      <p:graphicFrame>
+        <p:nvGraphicFramePr>
+          <p:cNvPr id="2" name="Table 1"/>
+          <p:cNvGraphicFramePr>
+            <a:graphicFrameLocks noGrp="1"/>
+          </p:cNvGraphicFramePr>
+          <p:nvPr>
+            <p:extLst>
+              <p:ext uri="{D42A27DB-BD31-4B8C-83A1-F6EECF244321}">
+                <p14:modId xmlns:p14="http://schemas.microsoft.com/office/powerpoint/2010/main" val="2189414601"/>
+              </p:ext>
+            </p:extLst>
+          </p:nvPr>
+        </p:nvGraphicFramePr>
+        <p:xfrm>
+          <a:off x="1192246" y="1092890"/>
+          <a:ext cx="9528630" cy="2484120"/>
+        </p:xfrm>
+        <a:graphic>
+          <a:graphicData uri="http://schemas.openxmlformats.org/drawingml/2006/table">
+            <a:tbl>
+              <a:tblPr firstRow="1" bandRow="1">
+                <a:tableStyleId>{5C22544A-7EE6-4342-B048-85BDC9FD1C3A}</a:tableStyleId>
+              </a:tblPr>
+              <a:tblGrid>
+                <a:gridCol w="1905726"/>
+                <a:gridCol w="1905726"/>
+                <a:gridCol w="1905726"/>
+                <a:gridCol w="1905726"/>
+                <a:gridCol w="1905726"/>
+              </a:tblGrid>
+              <a:tr h="370840">
+                <a:tc>
+                  <a:txBody>
+                    <a:bodyPr/>
+                    <a:lstStyle/>
+                    <a:p>
+                      <a:r>
+                        <a:rPr lang="en-US" dirty="0" smtClean="0"/>
+                        <a:t>API Call</a:t>
+                      </a:r>
+                      <a:endParaRPr lang="en-US" dirty="0"/>
+                    </a:p>
+                  </a:txBody>
+                  <a:tcPr/>
+                </a:tc>
+                <a:tc>
+                  <a:txBody>
+                    <a:bodyPr/>
+                    <a:lstStyle/>
+                    <a:p>
+                      <a:r>
+                        <a:rPr lang="en-US" dirty="0" smtClean="0"/>
+                        <a:t>GET/POST/DELETE</a:t>
+                      </a:r>
+                      <a:endParaRPr lang="en-US" dirty="0"/>
+                    </a:p>
+                  </a:txBody>
+                  <a:tcPr/>
+                </a:tc>
+                <a:tc>
+                  <a:txBody>
+                    <a:bodyPr/>
+                    <a:lstStyle/>
+                    <a:p>
+                      <a:r>
+                        <a:rPr lang="en-US" dirty="0" smtClean="0"/>
+                        <a:t>PARAMETERS</a:t>
+                      </a:r>
+                      <a:endParaRPr lang="en-US" dirty="0"/>
+                    </a:p>
+                  </a:txBody>
+                  <a:tcPr/>
+                </a:tc>
+                <a:tc>
+                  <a:txBody>
+                    <a:bodyPr/>
+                    <a:lstStyle/>
+                    <a:p>
+                      <a:r>
+                        <a:rPr lang="en-US" dirty="0" smtClean="0"/>
+                        <a:t>RETURNS</a:t>
+                      </a:r>
+                      <a:endParaRPr lang="en-US" dirty="0"/>
+                    </a:p>
+                  </a:txBody>
+                  <a:tcPr/>
+                </a:tc>
+                <a:tc>
+                  <a:txBody>
+                    <a:bodyPr/>
+                    <a:lstStyle/>
+                    <a:p>
+                      <a:r>
+                        <a:rPr lang="en-US" dirty="0" smtClean="0"/>
+                        <a:t>Description</a:t>
+                      </a:r>
+                      <a:endParaRPr lang="en-US" dirty="0"/>
+                    </a:p>
+                  </a:txBody>
+                  <a:tcPr/>
+                </a:tc>
+              </a:tr>
+              <a:tr h="370840">
+                <a:tc>
+                  <a:txBody>
+                    <a:bodyPr/>
+                    <a:lstStyle/>
+                    <a:p>
+                      <a:r>
+                        <a:rPr lang="en-US" dirty="0" smtClean="0"/>
+                        <a:t>/search/start</a:t>
+                      </a:r>
+                      <a:endParaRPr lang="en-US" dirty="0"/>
+                    </a:p>
+                  </a:txBody>
+                  <a:tcPr/>
+                </a:tc>
+                <a:tc>
+                  <a:txBody>
+                    <a:bodyPr/>
+                    <a:lstStyle/>
+                    <a:p>
+                      <a:r>
+                        <a:rPr lang="en-US" dirty="0" smtClean="0"/>
+                        <a:t>POST</a:t>
+                      </a:r>
+                      <a:endParaRPr lang="en-US" dirty="0"/>
+                    </a:p>
+                  </a:txBody>
+                  <a:tcPr/>
+                </a:tc>
+                <a:tc>
+                  <a:txBody>
+                    <a:bodyPr/>
+                    <a:lstStyle/>
+                    <a:p>
+                      <a:r>
+                        <a:rPr lang="en-US" dirty="0" smtClean="0"/>
+                        <a:t>{</a:t>
+                      </a:r>
+                      <a:r>
+                        <a:rPr lang="en-US" dirty="0" err="1" smtClean="0"/>
+                        <a:t>url</a:t>
+                      </a:r>
+                      <a:r>
+                        <a:rPr lang="en-US" dirty="0" smtClean="0"/>
+                        <a:t>}</a:t>
+                      </a:r>
+                      <a:endParaRPr lang="en-US" dirty="0"/>
+                    </a:p>
+                  </a:txBody>
+                  <a:tcPr/>
+                </a:tc>
+                <a:tc>
+                  <a:txBody>
+                    <a:bodyPr/>
+                    <a:lstStyle/>
+                    <a:p>
+                      <a:endParaRPr lang="en-US" sz="1400" dirty="0"/>
+                    </a:p>
+                  </a:txBody>
+                  <a:tcPr/>
+                </a:tc>
+                <a:tc>
+                  <a:txBody>
+                    <a:bodyPr/>
+                    <a:lstStyle/>
+                    <a:p>
+                      <a:r>
+                        <a:rPr lang="en-US" dirty="0" smtClean="0"/>
+                        <a:t>Start a search</a:t>
+                      </a:r>
+                      <a:endParaRPr lang="en-US" dirty="0"/>
+                    </a:p>
+                  </a:txBody>
+                  <a:tcPr/>
+                </a:tc>
+              </a:tr>
+              <a:tr h="370840">
+                <a:tc>
+                  <a:txBody>
+                    <a:bodyPr/>
+                    <a:lstStyle/>
+                    <a:p>
+                      <a:r>
+                        <a:rPr lang="en-US" dirty="0" smtClean="0"/>
+                        <a:t>/search/stop</a:t>
+                      </a:r>
+                      <a:endParaRPr lang="en-US" dirty="0"/>
+                    </a:p>
+                  </a:txBody>
+                  <a:tcPr/>
+                </a:tc>
+                <a:tc>
+                  <a:txBody>
+                    <a:bodyPr/>
+                    <a:lstStyle/>
+                    <a:p>
+                      <a:r>
+                        <a:rPr lang="en-US" dirty="0" smtClean="0"/>
+                        <a:t>POST</a:t>
+                      </a:r>
+                      <a:endParaRPr lang="en-US" dirty="0"/>
+                    </a:p>
+                  </a:txBody>
+                  <a:tcPr/>
+                </a:tc>
+                <a:tc>
+                  <a:txBody>
+                    <a:bodyPr/>
+                    <a:lstStyle/>
+                    <a:p>
+                      <a:endParaRPr lang="en-US" dirty="0"/>
+                    </a:p>
+                  </a:txBody>
+                  <a:tcPr/>
+                </a:tc>
+                <a:tc>
+                  <a:txBody>
+                    <a:bodyPr/>
+                    <a:lstStyle/>
+                    <a:p>
+                      <a:endParaRPr lang="en-US" sz="1400" dirty="0"/>
+                    </a:p>
+                  </a:txBody>
+                  <a:tcPr/>
+                </a:tc>
+                <a:tc>
+                  <a:txBody>
+                    <a:bodyPr/>
+                    <a:lstStyle/>
+                    <a:p>
+                      <a:r>
+                        <a:rPr lang="en-US" dirty="0" smtClean="0"/>
+                        <a:t>Stop a </a:t>
+                      </a:r>
+                      <a:r>
+                        <a:rPr lang="en-US" dirty="0" smtClean="0"/>
+                        <a:t>search</a:t>
+                      </a:r>
+                      <a:endParaRPr lang="en-US" dirty="0"/>
+                    </a:p>
+                  </a:txBody>
+                  <a:tcPr/>
+                </a:tc>
+              </a:tr>
+              <a:tr h="370840">
+                <a:tc>
+                  <a:txBody>
+                    <a:bodyPr/>
+                    <a:lstStyle/>
+                    <a:p>
+                      <a:r>
+                        <a:rPr lang="en-US" dirty="0" smtClean="0"/>
+                        <a:t>/search/status</a:t>
+                      </a:r>
+                      <a:endParaRPr lang="en-US" dirty="0"/>
+                    </a:p>
+                  </a:txBody>
+                  <a:tcPr/>
+                </a:tc>
+                <a:tc>
+                  <a:txBody>
+                    <a:bodyPr/>
+                    <a:lstStyle/>
+                    <a:p>
+                      <a:r>
+                        <a:rPr lang="en-US" dirty="0" smtClean="0"/>
+                        <a:t>GET</a:t>
+                      </a:r>
+                      <a:endParaRPr lang="en-US" dirty="0"/>
+                    </a:p>
+                  </a:txBody>
+                  <a:tcPr/>
+                </a:tc>
+                <a:tc>
+                  <a:txBody>
+                    <a:bodyPr/>
+                    <a:lstStyle/>
+                    <a:p>
+                      <a:endParaRPr lang="en-US" dirty="0"/>
+                    </a:p>
+                  </a:txBody>
+                  <a:tcPr/>
+                </a:tc>
+                <a:tc>
+                  <a:txBody>
+                    <a:bodyPr/>
+                    <a:lstStyle/>
+                    <a:p>
+                      <a:r>
+                        <a:rPr lang="en-US" sz="1400" dirty="0" smtClean="0"/>
+                        <a:t>{id:</a:t>
+                      </a:r>
+                      <a:r>
+                        <a:rPr lang="en-US" sz="1400" baseline="0" dirty="0" smtClean="0"/>
+                        <a:t> &lt;</a:t>
+                      </a:r>
+                      <a:r>
+                        <a:rPr lang="en-US" sz="1400" baseline="0" dirty="0" err="1" smtClean="0"/>
+                        <a:t>queryid</a:t>
+                      </a:r>
+                      <a:r>
+                        <a:rPr lang="en-US" sz="1400" baseline="0" dirty="0" smtClean="0"/>
+                        <a:t>&gt;,</a:t>
+                      </a:r>
+                    </a:p>
+                    <a:p>
+                      <a:r>
+                        <a:rPr lang="en-US" sz="1400" baseline="0" dirty="0" smtClean="0"/>
+                        <a:t> status: &lt;RUN/STOP&gt;,</a:t>
+                      </a:r>
+                    </a:p>
+                    <a:p>
+                      <a:r>
+                        <a:rPr lang="en-US" sz="1400" baseline="0" dirty="0" smtClean="0"/>
+                        <a:t>Images: &lt;#&gt;,</a:t>
+                      </a:r>
+                    </a:p>
+                    <a:p>
+                      <a:r>
+                        <a:rPr lang="en-US" sz="1400" baseline="0" dirty="0" err="1" smtClean="0"/>
+                        <a:t>allowedImages</a:t>
+                      </a:r>
+                      <a:r>
+                        <a:rPr lang="en-US" sz="1400" baseline="0" dirty="0" smtClean="0"/>
+                        <a:t>: &lt;#&gt;</a:t>
+                      </a:r>
+                    </a:p>
+                    <a:p>
+                      <a:r>
+                        <a:rPr lang="en-US" sz="1400" baseline="0" dirty="0" smtClean="0"/>
+                        <a:t>Pages: &lt;#&gt;,</a:t>
+                      </a:r>
+                    </a:p>
+                    <a:p>
+                      <a:r>
+                        <a:rPr lang="en-US" sz="1400" baseline="0" dirty="0" err="1" smtClean="0"/>
+                        <a:t>allowedPages</a:t>
+                      </a:r>
+                      <a:r>
+                        <a:rPr lang="en-US" sz="1400" baseline="0" dirty="0" smtClean="0"/>
+                        <a:t>: &lt;#&gt;</a:t>
+                      </a:r>
+                    </a:p>
+                  </a:txBody>
+                  <a:tcPr/>
+                </a:tc>
+                <a:tc>
+                  <a:txBody>
+                    <a:bodyPr/>
+                    <a:lstStyle/>
+                    <a:p>
+                      <a:r>
+                        <a:rPr lang="en-US" dirty="0" smtClean="0"/>
+                        <a:t>Status of the last or current</a:t>
+                      </a:r>
+                      <a:r>
+                        <a:rPr lang="en-US" baseline="0" dirty="0" smtClean="0"/>
+                        <a:t> query</a:t>
+                      </a:r>
+                      <a:endParaRPr lang="en-US" dirty="0"/>
+                    </a:p>
+                  </a:txBody>
+                  <a:tcPr/>
+                </a:tc>
+              </a:tr>
+            </a:tbl>
+          </a:graphicData>
+        </a:graphic>
+      </p:graphicFrame>
     </p:spTree>
     <p:extLst>
       <p:ext uri="{BB962C8B-B14F-4D97-AF65-F5344CB8AC3E}">
@@ -10002,8 +10031,8 @@
         </p:nvSpPr>
         <p:spPr>
           <a:xfrm>
-            <a:off x="4389465" y="2954652"/>
-            <a:ext cx="2785775" cy="889559"/>
+            <a:off x="4209915" y="2834945"/>
+            <a:ext cx="3200855" cy="1022103"/>
           </a:xfrm>
           <a:prstGeom prst="rect">
             <a:avLst/>
@@ -10044,8 +10073,8 @@
         </p:nvSpPr>
         <p:spPr>
           <a:xfrm>
-            <a:off x="4389465" y="1429623"/>
-            <a:ext cx="2785775" cy="968344"/>
+            <a:off x="4209915" y="1309915"/>
+            <a:ext cx="3200855" cy="1112627"/>
           </a:xfrm>
           <a:prstGeom prst="rect">
             <a:avLst/>
@@ -10226,6 +10255,88 @@
           </a:p>
         </p:txBody>
       </p:sp>
+      <p:pic>
+        <p:nvPicPr>
+          <p:cNvPr id="1026" name="Picture 2" descr="Image result for spring boot logo"/>
+          <p:cNvPicPr>
+            <a:picLocks noChangeAspect="1" noChangeArrowheads="1"/>
+          </p:cNvPicPr>
+          <p:nvPr/>
+        </p:nvPicPr>
+        <p:blipFill>
+          <a:blip r:embed="rId2" cstate="print">
+            <a:extLst>
+              <a:ext uri="{28A0092B-C50C-407E-A947-70E740481C1C}">
+                <a14:useLocalDpi xmlns:a14="http://schemas.microsoft.com/office/drawing/2010/main" val="0"/>
+              </a:ext>
+            </a:extLst>
+          </a:blip>
+          <a:srcRect/>
+          <a:stretch>
+            <a:fillRect/>
+          </a:stretch>
+        </p:blipFill>
+        <p:spPr bwMode="auto">
+          <a:xfrm>
+            <a:off x="7034531" y="3479440"/>
+            <a:ext cx="320256" cy="266880"/>
+          </a:xfrm>
+          <a:prstGeom prst="rect">
+            <a:avLst/>
+          </a:prstGeom>
+          <a:noFill/>
+          <a:extLst>
+            <a:ext uri="{909E8E84-426E-40DD-AFC4-6F175D3DCCD1}">
+              <a14:hiddenFill xmlns:a14="http://schemas.microsoft.com/office/drawing/2010/main">
+                <a:solidFill>
+                  <a:srgbClr val="FFFFFF"/>
+                </a:solidFill>
+              </a14:hiddenFill>
+            </a:ext>
+          </a:extLst>
+        </p:spPr>
+      </p:pic>
+      <p:pic>
+        <p:nvPicPr>
+          <p:cNvPr id="1034" name="Picture 10" descr="Image result for reactjs logo"/>
+          <p:cNvPicPr>
+            <a:picLocks noChangeAspect="1" noChangeArrowheads="1"/>
+          </p:cNvPicPr>
+          <p:nvPr/>
+        </p:nvPicPr>
+        <p:blipFill>
+          <a:blip r:embed="rId3" cstate="print">
+            <a:extLst>
+              <a:ext uri="{28A0092B-C50C-407E-A947-70E740481C1C}">
+                <a14:useLocalDpi xmlns:a14="http://schemas.microsoft.com/office/drawing/2010/main" val="0"/>
+              </a:ext>
+            </a:extLst>
+          </a:blip>
+          <a:srcRect/>
+          <a:stretch>
+            <a:fillRect/>
+          </a:stretch>
+        </p:blipFill>
+        <p:spPr bwMode="auto">
+          <a:xfrm>
+            <a:off x="6835295" y="1752445"/>
+            <a:ext cx="398471" cy="584199"/>
+          </a:xfrm>
+          <a:prstGeom prst="rect">
+            <a:avLst/>
+          </a:prstGeom>
+          <a:noFill/>
+          <a:extLst>
+            <a:ext uri="{909E8E84-426E-40DD-AFC4-6F175D3DCCD1}">
+              <a14:hiddenFill xmlns:a14="http://schemas.microsoft.com/office/drawing/2010/main">
+                <a:solidFill>
+                  <a:srgbClr val="FFFFFF"/>
+                </a:solidFill>
+              </a14:hiddenFill>
+            </a:ext>
+          </a:extLst>
+        </p:spPr>
+      </p:pic>
     </p:spTree>
     <p:extLst>
       <p:ext uri="{BB962C8B-B14F-4D97-AF65-F5344CB8AC3E}">
@@ -10335,14 +10446,14 @@
           <p:nvPr>
             <p:extLst>
               <p:ext uri="{D42A27DB-BD31-4B8C-83A1-F6EECF244321}">
-                <p14:modId xmlns:p14="http://schemas.microsoft.com/office/powerpoint/2010/main" val="2795629145"/>
+                <p14:modId xmlns:p14="http://schemas.microsoft.com/office/powerpoint/2010/main" val="967142920"/>
               </p:ext>
             </p:extLst>
           </p:nvPr>
         </p:nvGraphicFramePr>
         <p:xfrm>
           <a:off x="1229568" y="2081935"/>
-          <a:ext cx="9528630" cy="2026920"/>
+          <a:ext cx="9528630" cy="5227320"/>
         </p:xfrm>
         <a:graphic>
           <a:graphicData uri="http://schemas.openxmlformats.org/drawingml/2006/table">
@@ -10437,7 +10548,7 @@
                     <a:p>
                       <a:r>
                         <a:rPr lang="en-US" dirty="0" smtClean="0"/>
-                        <a:t>/content/images</a:t>
+                        <a:t>/content/image</a:t>
                       </a:r>
                       <a:endParaRPr lang="en-US" dirty="0"/>
                     </a:p>
@@ -10501,7 +10612,71 @@
                     <a:p>
                       <a:r>
                         <a:rPr lang="en-US" dirty="0" smtClean="0"/>
-                        <a:t>/content/pages</a:t>
+                        <a:t>/content/image</a:t>
+                      </a:r>
+                      <a:endParaRPr lang="en-US" dirty="0"/>
+                    </a:p>
+                  </a:txBody>
+                  <a:tcPr/>
+                </a:tc>
+                <a:tc>
+                  <a:txBody>
+                    <a:bodyPr/>
+                    <a:lstStyle/>
+                    <a:p>
+                      <a:r>
+                        <a:rPr lang="en-US" dirty="0" smtClean="0"/>
+                        <a:t>DELETE</a:t>
+                      </a:r>
+                      <a:endParaRPr lang="en-US" dirty="0"/>
+                    </a:p>
+                  </a:txBody>
+                  <a:tcPr/>
+                </a:tc>
+                <a:tc>
+                  <a:txBody>
+                    <a:bodyPr/>
+                    <a:lstStyle/>
+                    <a:p>
+                      <a:endParaRPr lang="en-US" dirty="0"/>
+                    </a:p>
+                  </a:txBody>
+                  <a:tcPr/>
+                </a:tc>
+                <a:tc>
+                  <a:txBody>
+                    <a:bodyPr/>
+                    <a:lstStyle/>
+                    <a:p>
+                      <a:endParaRPr lang="en-US" dirty="0"/>
+                    </a:p>
+                  </a:txBody>
+                  <a:tcPr/>
+                </a:tc>
+                <a:tc>
+                  <a:txBody>
+                    <a:bodyPr/>
+                    <a:lstStyle/>
+                    <a:p>
+                      <a:r>
+                        <a:rPr lang="en-US" dirty="0" smtClean="0"/>
+                        <a:t>Delete all Image records</a:t>
+                      </a:r>
+                      <a:endParaRPr lang="en-US" dirty="0"/>
+                    </a:p>
+                  </a:txBody>
+                  <a:tcPr/>
+                </a:tc>
+              </a:tr>
+              <a:tr h="370840">
+                <a:tc>
+                  <a:txBody>
+                    <a:bodyPr/>
+                    <a:lstStyle/>
+                    <a:p>
+                      <a:r>
+                        <a:rPr lang="en-US" dirty="0" smtClean="0"/>
+                        <a:t>/content/image/id</a:t>
                       </a:r>
                       <a:endParaRPr lang="en-US" dirty="0"/>
                     </a:p>
@@ -10549,7 +10724,275 @@
                     <a:p>
                       <a:r>
                         <a:rPr lang="en-US" dirty="0" smtClean="0"/>
+                        <a:t>Get an </a:t>
+                      </a:r>
+                      <a:r>
+                        <a:rPr lang="en-US" dirty="0" smtClean="0"/>
+                        <a:t>Image object</a:t>
+                      </a:r>
+                      <a:endParaRPr lang="en-US" dirty="0"/>
+                    </a:p>
+                  </a:txBody>
+                  <a:tcPr/>
+                </a:tc>
+              </a:tr>
+              <a:tr h="370840">
+                <a:tc>
+                  <a:txBody>
+                    <a:bodyPr/>
+                    <a:lstStyle/>
+                    <a:p>
+                      <a:r>
+                        <a:rPr lang="en-US" dirty="0" smtClean="0"/>
+                        <a:t>/content/image/id</a:t>
+                      </a:r>
+                      <a:endParaRPr lang="en-US" dirty="0"/>
+                    </a:p>
+                  </a:txBody>
+                  <a:tcPr/>
+                </a:tc>
+                <a:tc>
+                  <a:txBody>
+                    <a:bodyPr/>
+                    <a:lstStyle/>
+                    <a:p>
+                      <a:r>
+                        <a:rPr lang="en-US" dirty="0" smtClean="0"/>
+                        <a:t>Delete</a:t>
+                      </a:r>
+                      <a:endParaRPr lang="en-US" dirty="0"/>
+                    </a:p>
+                  </a:txBody>
+                  <a:tcPr/>
+                </a:tc>
+                <a:tc>
+                  <a:txBody>
+                    <a:bodyPr/>
+                    <a:lstStyle/>
+                    <a:p>
+                      <a:endParaRPr lang="en-US" dirty="0"/>
+                    </a:p>
+                  </a:txBody>
+                  <a:tcPr/>
+                </a:tc>
+                <a:tc>
+                  <a:txBody>
+                    <a:bodyPr/>
+                    <a:lstStyle/>
+                    <a:p>
+                      <a:endParaRPr lang="en-US" dirty="0"/>
+                    </a:p>
+                  </a:txBody>
+                  <a:tcPr/>
+                </a:tc>
+                <a:tc>
+                  <a:txBody>
+                    <a:bodyPr/>
+                    <a:lstStyle/>
+                    <a:p>
+                      <a:r>
+                        <a:rPr lang="en-US" dirty="0" smtClean="0"/>
+                        <a:t>Get an </a:t>
+                      </a:r>
+                      <a:r>
+                        <a:rPr lang="en-US" dirty="0" smtClean="0"/>
+                        <a:t>Image object</a:t>
+                      </a:r>
+                      <a:endParaRPr lang="en-US" dirty="0"/>
+                    </a:p>
+                  </a:txBody>
+                  <a:tcPr/>
+                </a:tc>
+              </a:tr>
+              <a:tr h="370840">
+                <a:tc>
+                  <a:txBody>
+                    <a:bodyPr/>
+                    <a:lstStyle/>
+                    <a:p>
+                      <a:r>
+                        <a:rPr lang="en-US" dirty="0" smtClean="0"/>
+                        <a:t>/content/image/download/id</a:t>
+                      </a:r>
+                      <a:endParaRPr lang="en-US" dirty="0"/>
+                    </a:p>
+                  </a:txBody>
+                  <a:tcPr/>
+                </a:tc>
+                <a:tc>
+                  <a:txBody>
+                    <a:bodyPr/>
+                    <a:lstStyle/>
+                    <a:p>
+                      <a:r>
+                        <a:rPr lang="en-US" dirty="0" smtClean="0"/>
+                        <a:t>POST</a:t>
+                      </a:r>
+                      <a:endParaRPr lang="en-US" dirty="0"/>
+                    </a:p>
+                  </a:txBody>
+                  <a:tcPr/>
+                </a:tc>
+                <a:tc>
+                  <a:txBody>
+                    <a:bodyPr/>
+                    <a:lstStyle/>
+                    <a:p>
+                      <a:endParaRPr lang="en-US" dirty="0"/>
+                    </a:p>
+                  </a:txBody>
+                  <a:tcPr/>
+                </a:tc>
+                <a:tc>
+                  <a:txBody>
+                    <a:bodyPr/>
+                    <a:lstStyle/>
+                    <a:p>
+                      <a:endParaRPr lang="en-US" dirty="0"/>
+                    </a:p>
+                  </a:txBody>
+                  <a:tcPr/>
+                </a:tc>
+                <a:tc>
+                  <a:txBody>
+                    <a:bodyPr/>
+                    <a:lstStyle/>
+                    <a:p>
+                      <a:r>
+                        <a:rPr lang="en-US" smtClean="0"/>
+                        <a:t>Download an id</a:t>
+                      </a:r>
+                      <a:endParaRPr lang="en-US" dirty="0"/>
+                    </a:p>
+                  </a:txBody>
+                  <a:tcPr/>
+                </a:tc>
+              </a:tr>
+              <a:tr h="370840">
+                <a:tc>
+                  <a:txBody>
+                    <a:bodyPr/>
+                    <a:lstStyle/>
+                    <a:p>
+                      <a:r>
+                        <a:rPr lang="en-US" dirty="0" smtClean="0"/>
+                        <a:t>/</a:t>
+                      </a:r>
+                      <a:r>
+                        <a:rPr lang="en-US" dirty="0" smtClean="0"/>
+                        <a:t>content/page</a:t>
+                      </a:r>
+                      <a:endParaRPr lang="en-US" dirty="0"/>
+                    </a:p>
+                  </a:txBody>
+                  <a:tcPr/>
+                </a:tc>
+                <a:tc>
+                  <a:txBody>
+                    <a:bodyPr/>
+                    <a:lstStyle/>
+                    <a:p>
+                      <a:r>
+                        <a:rPr lang="en-US" dirty="0" smtClean="0"/>
+                        <a:t>GET</a:t>
+                      </a:r>
+                      <a:endParaRPr lang="en-US" dirty="0"/>
+                    </a:p>
+                  </a:txBody>
+                  <a:tcPr/>
+                </a:tc>
+                <a:tc>
+                  <a:txBody>
+                    <a:bodyPr/>
+                    <a:lstStyle/>
+                    <a:p>
+                      <a:endParaRPr lang="en-US" dirty="0"/>
+                    </a:p>
+                  </a:txBody>
+                  <a:tcPr/>
+                </a:tc>
+                <a:tc>
+                  <a:txBody>
+                    <a:bodyPr/>
+                    <a:lstStyle/>
+                    <a:p>
+                      <a:endParaRPr lang="en-US" dirty="0"/>
+                    </a:p>
+                  </a:txBody>
+                  <a:tcPr/>
+                </a:tc>
+                <a:tc>
+                  <a:txBody>
+                    <a:bodyPr/>
+                    <a:lstStyle/>
+                    <a:p>
+                      <a:r>
+                        <a:rPr lang="en-US" dirty="0" smtClean="0"/>
                         <a:t>List all pages</a:t>
+                      </a:r>
+                      <a:endParaRPr lang="en-US" dirty="0"/>
+                    </a:p>
+                  </a:txBody>
+                  <a:tcPr/>
+                </a:tc>
+              </a:tr>
+              <a:tr h="370840">
+                <a:tc>
+                  <a:txBody>
+                    <a:bodyPr/>
+                    <a:lstStyle/>
+                    <a:p>
+                      <a:r>
+                        <a:rPr lang="en-US" dirty="0" smtClean="0"/>
+                        <a:t>/content/page</a:t>
+                      </a:r>
+                      <a:endParaRPr lang="en-US" dirty="0"/>
+                    </a:p>
+                  </a:txBody>
+                  <a:tcPr/>
+                </a:tc>
+                <a:tc>
+                  <a:txBody>
+                    <a:bodyPr/>
+                    <a:lstStyle/>
+                    <a:p>
+                      <a:r>
+                        <a:rPr lang="en-US" dirty="0" smtClean="0"/>
+                        <a:t>DELETE</a:t>
+                      </a:r>
+                      <a:endParaRPr lang="en-US" dirty="0"/>
+                    </a:p>
+                  </a:txBody>
+                  <a:tcPr/>
+                </a:tc>
+                <a:tc>
+                  <a:txBody>
+                    <a:bodyPr/>
+                    <a:lstStyle/>
+                    <a:p>
+                      <a:endParaRPr lang="en-US" dirty="0"/>
+                    </a:p>
+                  </a:txBody>
+                  <a:tcPr/>
+                </a:tc>
+                <a:tc>
+                  <a:txBody>
+                    <a:bodyPr/>
+                    <a:lstStyle/>
+                    <a:p>
+                      <a:endParaRPr lang="en-US" dirty="0"/>
+                    </a:p>
+                  </a:txBody>
+                  <a:tcPr/>
+                </a:tc>
+                <a:tc>
+                  <a:txBody>
+                    <a:bodyPr/>
+                    <a:lstStyle/>
+                    <a:p>
+                      <a:r>
+                        <a:rPr lang="en-US" dirty="0" smtClean="0"/>
+                        <a:t>Delete all page records</a:t>
                       </a:r>
                       <a:endParaRPr lang="en-US" dirty="0"/>
                     </a:p>
@@ -11287,8 +11730,13 @@
           <a:p>
             <a:r>
               <a:rPr lang="en-US" sz="2800" dirty="0" smtClean="0"/>
-              <a:t>UI Layout – SearchPage.PS</a:t>
-            </a:r>
+              <a:t>UI Layout – </a:t>
+            </a:r>
+            <a:r>
+              <a:rPr lang="en-US" sz="2800" dirty="0" err="1" smtClean="0"/>
+              <a:t>SearchPage</a:t>
+            </a:r>
+            <a:endParaRPr lang="en-US" sz="2800" dirty="0" smtClean="0"/>
           </a:p>
           <a:p>
             <a:endParaRPr lang="en-US" sz="2800" dirty="0" smtClean="0"/>
@@ -11401,8 +11849,8 @@
           <a:p>
             <a:pPr algn="ctr"/>
             <a:r>
-              <a:rPr lang="en-US" sz="1000" dirty="0" err="1" smtClean="0"/>
-              <a:t>TopPane</a:t>
+              <a:rPr lang="en-US" sz="1000" dirty="0" smtClean="0"/>
+              <a:t>Navigation</a:t>
             </a:r>
             <a:endParaRPr lang="en-US" sz="1000" dirty="0"/>
           </a:p>
@@ -11442,10 +11890,6 @@
           <a:lstStyle/>
           <a:p>
             <a:pPr algn="ctr"/>
-            <a:r>
-              <a:rPr lang="en-US" sz="1200" dirty="0" smtClean="0"/>
-              <a:t>Search</a:t>
-            </a:r>
             <a:endParaRPr lang="en-US" sz="1200" dirty="0"/>
           </a:p>
         </p:txBody>
@@ -11458,8 +11902,8 @@
         </p:nvSpPr>
         <p:spPr>
           <a:xfrm>
-            <a:off x="886408" y="6326156"/>
-            <a:ext cx="11056776" cy="223934"/>
+            <a:off x="2948473" y="6184587"/>
+            <a:ext cx="8546839" cy="223935"/>
           </a:xfrm>
           <a:prstGeom prst="rect">
             <a:avLst/>
@@ -11486,9 +11930,233 @@
             <a:pPr algn="ctr"/>
             <a:r>
               <a:rPr lang="en-US" sz="1000" dirty="0" err="1" smtClean="0"/>
-              <a:t>SearchBottomPane</a:t>
+              <a:t>SearchStatus</a:t>
+            </a:r>
+            <a:r>
+              <a:rPr lang="en-US" sz="1000" dirty="0" smtClean="0"/>
+              <a:t> </a:t>
             </a:r>
             <a:endParaRPr lang="en-US" sz="1000" dirty="0"/>
+          </a:p>
+        </p:txBody>
+      </p:sp>
+      <p:sp>
+        <p:nvSpPr>
+          <p:cNvPr id="5" name="Rectangle 4"/>
+          <p:cNvSpPr/>
+          <p:nvPr/>
+        </p:nvSpPr>
+        <p:spPr>
+          <a:xfrm>
+            <a:off x="886408" y="1408923"/>
+            <a:ext cx="2062065" cy="5141167"/>
+          </a:xfrm>
+          <a:prstGeom prst="rect">
+            <a:avLst/>
+          </a:prstGeom>
+        </p:spPr>
+        <p:style>
+          <a:lnRef idx="2">
+            <a:schemeClr val="accent4">
+              <a:shade val="50000"/>
+            </a:schemeClr>
+          </a:lnRef>
+          <a:fillRef idx="1">
+            <a:schemeClr val="accent4"/>
+          </a:fillRef>
+          <a:effectRef idx="0">
+            <a:schemeClr val="accent4"/>
+          </a:effectRef>
+          <a:fontRef idx="minor">
+            <a:schemeClr val="lt1"/>
+          </a:fontRef>
+        </p:style>
+        <p:txBody>
+          <a:bodyPr rtlCol="0" anchor="ctr"/>
+          <a:lstStyle/>
+          <a:p>
+            <a:pPr algn="ctr"/>
+            <a:r>
+              <a:rPr lang="en-US" dirty="0" smtClean="0"/>
+              <a:t>Side Bar</a:t>
+            </a:r>
+            <a:endParaRPr lang="en-US" dirty="0"/>
+          </a:p>
+        </p:txBody>
+      </p:sp>
+      <p:sp>
+        <p:nvSpPr>
+          <p:cNvPr id="6" name="Rectangle 5"/>
+          <p:cNvSpPr/>
+          <p:nvPr/>
+        </p:nvSpPr>
+        <p:spPr>
+          <a:xfrm>
+            <a:off x="2948473" y="2187400"/>
+            <a:ext cx="8546841" cy="1042338"/>
+          </a:xfrm>
+          <a:prstGeom prst="rect">
+            <a:avLst/>
+          </a:prstGeom>
+        </p:spPr>
+        <p:style>
+          <a:lnRef idx="2">
+            <a:schemeClr val="accent1">
+              <a:shade val="50000"/>
+            </a:schemeClr>
+          </a:lnRef>
+          <a:fillRef idx="1">
+            <a:schemeClr val="accent1"/>
+          </a:fillRef>
+          <a:effectRef idx="0">
+            <a:schemeClr val="accent1"/>
+          </a:effectRef>
+          <a:fontRef idx="minor">
+            <a:schemeClr val="lt1"/>
+          </a:fontRef>
+        </p:style>
+        <p:txBody>
+          <a:bodyPr rtlCol="0" anchor="t"/>
+          <a:lstStyle/>
+          <a:p>
+            <a:pPr algn="ctr"/>
+            <a:r>
+              <a:rPr lang="en-US" dirty="0" smtClean="0"/>
+              <a:t>Search</a:t>
+            </a:r>
+            <a:endParaRPr lang="en-US" dirty="0"/>
+          </a:p>
+        </p:txBody>
+      </p:sp>
+      <p:sp>
+        <p:nvSpPr>
+          <p:cNvPr id="7" name="Oval 6"/>
+          <p:cNvSpPr/>
+          <p:nvPr/>
+        </p:nvSpPr>
+        <p:spPr>
+          <a:xfrm>
+            <a:off x="10085358" y="2314035"/>
+            <a:ext cx="783771" cy="783771"/>
+          </a:xfrm>
+          <a:prstGeom prst="ellipse">
+            <a:avLst/>
+          </a:prstGeom>
+        </p:spPr>
+        <p:style>
+          <a:lnRef idx="2">
+            <a:schemeClr val="accent6">
+              <a:shade val="50000"/>
+            </a:schemeClr>
+          </a:lnRef>
+          <a:fillRef idx="1">
+            <a:schemeClr val="accent6"/>
+          </a:fillRef>
+          <a:effectRef idx="0">
+            <a:schemeClr val="accent6"/>
+          </a:effectRef>
+          <a:fontRef idx="minor">
+            <a:schemeClr val="lt1"/>
+          </a:fontRef>
+        </p:style>
+        <p:txBody>
+          <a:bodyPr rtlCol="0" anchor="ctr"/>
+          <a:lstStyle/>
+          <a:p>
+            <a:pPr algn="ctr"/>
+            <a:r>
+              <a:rPr lang="en-US" sz="1000" dirty="0" smtClean="0"/>
+              <a:t>Button</a:t>
+            </a:r>
+            <a:endParaRPr lang="en-US" sz="1000" dirty="0"/>
+          </a:p>
+        </p:txBody>
+      </p:sp>
+      <p:sp>
+        <p:nvSpPr>
+          <p:cNvPr id="8" name="Rectangle 7"/>
+          <p:cNvSpPr/>
+          <p:nvPr/>
+        </p:nvSpPr>
+        <p:spPr>
+          <a:xfrm>
+            <a:off x="3782012" y="2604938"/>
+            <a:ext cx="6186196" cy="457851"/>
+          </a:xfrm>
+          <a:prstGeom prst="rect">
+            <a:avLst/>
+          </a:prstGeom>
+        </p:spPr>
+        <p:style>
+          <a:lnRef idx="2">
+            <a:schemeClr val="accent3">
+              <a:shade val="50000"/>
+            </a:schemeClr>
+          </a:lnRef>
+          <a:fillRef idx="1">
+            <a:schemeClr val="accent3"/>
+          </a:fillRef>
+          <a:effectRef idx="0">
+            <a:schemeClr val="accent3"/>
+          </a:effectRef>
+          <a:fontRef idx="minor">
+            <a:schemeClr val="lt1"/>
+          </a:fontRef>
+        </p:style>
+        <p:txBody>
+          <a:bodyPr rtlCol="0" anchor="ctr"/>
+          <a:lstStyle/>
+          <a:p>
+            <a:pPr algn="ctr"/>
+            <a:r>
+              <a:rPr lang="en-US" dirty="0" smtClean="0"/>
+              <a:t>Search Bar</a:t>
+            </a:r>
+            <a:endParaRPr lang="en-US" dirty="0"/>
+          </a:p>
+        </p:txBody>
+      </p:sp>
+      <p:sp>
+        <p:nvSpPr>
+          <p:cNvPr id="11" name="Rectangle 10"/>
+          <p:cNvSpPr/>
+          <p:nvPr/>
+        </p:nvSpPr>
+        <p:spPr>
+          <a:xfrm>
+            <a:off x="2948474" y="3321435"/>
+            <a:ext cx="8546840" cy="2771455"/>
+          </a:xfrm>
+          <a:prstGeom prst="rect">
+            <a:avLst/>
+          </a:prstGeom>
+        </p:spPr>
+        <p:style>
+          <a:lnRef idx="2">
+            <a:schemeClr val="accent3">
+              <a:shade val="50000"/>
+            </a:schemeClr>
+          </a:lnRef>
+          <a:fillRef idx="1">
+            <a:schemeClr val="accent3"/>
+          </a:fillRef>
+          <a:effectRef idx="0">
+            <a:schemeClr val="accent3"/>
+          </a:effectRef>
+          <a:fontRef idx="minor">
+            <a:schemeClr val="lt1"/>
+          </a:fontRef>
+        </p:style>
+        <p:txBody>
+          <a:bodyPr rtlCol="0" anchor="ctr"/>
+          <a:lstStyle/>
+          <a:p>
+            <a:pPr algn="ctr"/>
+            <a:r>
+              <a:rPr lang="en-US" dirty="0" smtClean="0"/>
+              <a:t>Results</a:t>
+            </a:r>
+            <a:endParaRPr lang="en-US" dirty="0"/>
           </a:p>
         </p:txBody>
       </p:sp>

</xml_diff>

<commit_message>
Connect Search Button to Back End (#21)
* Add initial search container component

* Add initial state to reducers, components

* get initial reducer working

* add thunk

* Fix search post method on BE controller

* Trigger search query from start button

* Add start and stop to search button

* clear input when input clicked for the first time
</commit_message>
<xml_diff>
--- a/docs/design.pptx
+++ b/docs/design.pptx
@@ -265,7 +265,7 @@
           <a:p>
             <a:fld id="{30DA0606-474F-417C-8DB0-81402E3BEFB0}" type="datetimeFigureOut">
               <a:rPr lang="en-US" smtClean="0"/>
-              <a:t>8/17/2017</a:t>
+              <a:t>8/30/2017</a:t>
             </a:fld>
             <a:endParaRPr lang="en-US"/>
           </a:p>
@@ -435,7 +435,7 @@
           <a:p>
             <a:fld id="{30DA0606-474F-417C-8DB0-81402E3BEFB0}" type="datetimeFigureOut">
               <a:rPr lang="en-US" smtClean="0"/>
-              <a:t>8/17/2017</a:t>
+              <a:t>8/30/2017</a:t>
             </a:fld>
             <a:endParaRPr lang="en-US"/>
           </a:p>
@@ -615,7 +615,7 @@
           <a:p>
             <a:fld id="{30DA0606-474F-417C-8DB0-81402E3BEFB0}" type="datetimeFigureOut">
               <a:rPr lang="en-US" smtClean="0"/>
-              <a:t>8/17/2017</a:t>
+              <a:t>8/30/2017</a:t>
             </a:fld>
             <a:endParaRPr lang="en-US"/>
           </a:p>
@@ -785,7 +785,7 @@
           <a:p>
             <a:fld id="{30DA0606-474F-417C-8DB0-81402E3BEFB0}" type="datetimeFigureOut">
               <a:rPr lang="en-US" smtClean="0"/>
-              <a:t>8/17/2017</a:t>
+              <a:t>8/30/2017</a:t>
             </a:fld>
             <a:endParaRPr lang="en-US"/>
           </a:p>
@@ -1031,7 +1031,7 @@
           <a:p>
             <a:fld id="{30DA0606-474F-417C-8DB0-81402E3BEFB0}" type="datetimeFigureOut">
               <a:rPr lang="en-US" smtClean="0"/>
-              <a:t>8/17/2017</a:t>
+              <a:t>8/30/2017</a:t>
             </a:fld>
             <a:endParaRPr lang="en-US"/>
           </a:p>
@@ -1263,7 +1263,7 @@
           <a:p>
             <a:fld id="{30DA0606-474F-417C-8DB0-81402E3BEFB0}" type="datetimeFigureOut">
               <a:rPr lang="en-US" smtClean="0"/>
-              <a:t>8/17/2017</a:t>
+              <a:t>8/30/2017</a:t>
             </a:fld>
             <a:endParaRPr lang="en-US"/>
           </a:p>
@@ -1630,7 +1630,7 @@
           <a:p>
             <a:fld id="{30DA0606-474F-417C-8DB0-81402E3BEFB0}" type="datetimeFigureOut">
               <a:rPr lang="en-US" smtClean="0"/>
-              <a:t>8/17/2017</a:t>
+              <a:t>8/30/2017</a:t>
             </a:fld>
             <a:endParaRPr lang="en-US"/>
           </a:p>
@@ -1748,7 +1748,7 @@
           <a:p>
             <a:fld id="{30DA0606-474F-417C-8DB0-81402E3BEFB0}" type="datetimeFigureOut">
               <a:rPr lang="en-US" smtClean="0"/>
-              <a:t>8/17/2017</a:t>
+              <a:t>8/30/2017</a:t>
             </a:fld>
             <a:endParaRPr lang="en-US"/>
           </a:p>
@@ -1843,7 +1843,7 @@
           <a:p>
             <a:fld id="{30DA0606-474F-417C-8DB0-81402E3BEFB0}" type="datetimeFigureOut">
               <a:rPr lang="en-US" smtClean="0"/>
-              <a:t>8/17/2017</a:t>
+              <a:t>8/30/2017</a:t>
             </a:fld>
             <a:endParaRPr lang="en-US"/>
           </a:p>
@@ -2120,7 +2120,7 @@
           <a:p>
             <a:fld id="{30DA0606-474F-417C-8DB0-81402E3BEFB0}" type="datetimeFigureOut">
               <a:rPr lang="en-US" smtClean="0"/>
-              <a:t>8/17/2017</a:t>
+              <a:t>8/30/2017</a:t>
             </a:fld>
             <a:endParaRPr lang="en-US"/>
           </a:p>
@@ -2373,7 +2373,7 @@
           <a:p>
             <a:fld id="{30DA0606-474F-417C-8DB0-81402E3BEFB0}" type="datetimeFigureOut">
               <a:rPr lang="en-US" smtClean="0"/>
-              <a:t>8/17/2017</a:t>
+              <a:t>8/30/2017</a:t>
             </a:fld>
             <a:endParaRPr lang="en-US"/>
           </a:p>
@@ -2586,7 +2586,7 @@
           <a:p>
             <a:fld id="{30DA0606-474F-417C-8DB0-81402E3BEFB0}" type="datetimeFigureOut">
               <a:rPr lang="en-US" smtClean="0"/>
-              <a:t>8/17/2017</a:t>
+              <a:t>8/30/2017</a:t>
             </a:fld>
             <a:endParaRPr lang="en-US"/>
           </a:p>
@@ -9549,7 +9549,7 @@
           <p:nvPr>
             <p:extLst>
               <p:ext uri="{D42A27DB-BD31-4B8C-83A1-F6EECF244321}">
-                <p14:modId xmlns:p14="http://schemas.microsoft.com/office/powerpoint/2010/main" val="2189414601"/>
+                <p14:modId xmlns:p14="http://schemas.microsoft.com/office/powerpoint/2010/main" val="1864385353"/>
               </p:ext>
             </p:extLst>
           </p:nvPr>
@@ -11230,8 +11230,9 @@
           <a:p>
             <a:r>
               <a:rPr lang="en-US" sz="2800" dirty="0" smtClean="0"/>
-              <a:t>UI File Structure</a:t>
-            </a:r>
+              <a:t>Search UX Query State Diagram</a:t>
+            </a:r>
+            <a:endParaRPr lang="en-US" sz="2800" dirty="0" smtClean="0"/>
           </a:p>
           <a:p>
             <a:endParaRPr lang="en-US" sz="2800" dirty="0" smtClean="0"/>
@@ -11271,14 +11272,206 @@
       </p:sp>
       <p:sp>
         <p:nvSpPr>
-          <p:cNvPr id="5" name="TextBox 4"/>
+          <p:cNvPr id="7" name="Oval 6"/>
+          <p:cNvSpPr/>
+          <p:nvPr/>
+        </p:nvSpPr>
+        <p:spPr>
+          <a:xfrm>
+            <a:off x="5187821" y="1320052"/>
+            <a:ext cx="279919" cy="279919"/>
+          </a:xfrm>
+          <a:prstGeom prst="ellipse">
+            <a:avLst/>
+          </a:prstGeom>
+        </p:spPr>
+        <p:style>
+          <a:lnRef idx="2">
+            <a:schemeClr val="dk1">
+              <a:shade val="50000"/>
+            </a:schemeClr>
+          </a:lnRef>
+          <a:fillRef idx="1">
+            <a:schemeClr val="dk1"/>
+          </a:fillRef>
+          <a:effectRef idx="0">
+            <a:schemeClr val="dk1"/>
+          </a:effectRef>
+          <a:fontRef idx="minor">
+            <a:schemeClr val="lt1"/>
+          </a:fontRef>
+        </p:style>
+        <p:txBody>
+          <a:bodyPr rtlCol="0" anchor="ctr"/>
+          <a:lstStyle/>
+          <a:p>
+            <a:pPr algn="ctr"/>
+            <a:endParaRPr lang="en-US"/>
+          </a:p>
+        </p:txBody>
+      </p:sp>
+      <p:cxnSp>
+        <p:nvCxnSpPr>
+          <p:cNvPr id="10" name="Straight Arrow Connector 9"/>
+          <p:cNvCxnSpPr/>
+          <p:nvPr/>
+        </p:nvCxnSpPr>
+        <p:spPr>
+          <a:xfrm>
+            <a:off x="5327780" y="1599971"/>
+            <a:ext cx="0" cy="378119"/>
+          </a:xfrm>
+          <a:prstGeom prst="straightConnector1">
+            <a:avLst/>
+          </a:prstGeom>
+          <a:ln>
+            <a:tailEnd type="triangle"/>
+          </a:ln>
+        </p:spPr>
+        <p:style>
+          <a:lnRef idx="3">
+            <a:schemeClr val="accent1"/>
+          </a:lnRef>
+          <a:fillRef idx="0">
+            <a:schemeClr val="accent1"/>
+          </a:fillRef>
+          <a:effectRef idx="2">
+            <a:schemeClr val="accent1"/>
+          </a:effectRef>
+          <a:fontRef idx="minor">
+            <a:schemeClr val="tx1"/>
+          </a:fontRef>
+        </p:style>
+      </p:cxnSp>
+      <p:sp>
+        <p:nvSpPr>
+          <p:cNvPr id="11" name="Rectangle 10"/>
+          <p:cNvSpPr/>
+          <p:nvPr/>
+        </p:nvSpPr>
+        <p:spPr>
+          <a:xfrm>
+            <a:off x="4335885" y="1978090"/>
+            <a:ext cx="1983789" cy="285686"/>
+          </a:xfrm>
+          <a:prstGeom prst="rect">
+            <a:avLst/>
+          </a:prstGeom>
+        </p:spPr>
+        <p:style>
+          <a:lnRef idx="2">
+            <a:schemeClr val="accent3"/>
+          </a:lnRef>
+          <a:fillRef idx="1">
+            <a:schemeClr val="lt1"/>
+          </a:fillRef>
+          <a:effectRef idx="0">
+            <a:schemeClr val="accent3"/>
+          </a:effectRef>
+          <a:fontRef idx="minor">
+            <a:schemeClr val="dk1"/>
+          </a:fontRef>
+        </p:style>
+        <p:txBody>
+          <a:bodyPr rtlCol="0" anchor="ctr"/>
+          <a:lstStyle/>
+          <a:p>
+            <a:pPr algn="ctr"/>
+            <a:r>
+              <a:rPr lang="en-US" sz="1100" dirty="0" smtClean="0"/>
+              <a:t>SEARCH_STOPPED</a:t>
+            </a:r>
+            <a:endParaRPr lang="en-US" sz="1100" dirty="0"/>
+          </a:p>
+        </p:txBody>
+      </p:sp>
+      <p:cxnSp>
+        <p:nvCxnSpPr>
+          <p:cNvPr id="15" name="Straight Arrow Connector 14"/>
+          <p:cNvCxnSpPr>
+            <a:stCxn id="11" idx="2"/>
+          </p:cNvCxnSpPr>
+          <p:nvPr/>
+        </p:nvCxnSpPr>
+        <p:spPr>
+          <a:xfrm flipH="1">
+            <a:off x="5327779" y="2263776"/>
+            <a:ext cx="1" cy="396565"/>
+          </a:xfrm>
+          <a:prstGeom prst="straightConnector1">
+            <a:avLst/>
+          </a:prstGeom>
+          <a:ln>
+            <a:tailEnd type="triangle"/>
+          </a:ln>
+        </p:spPr>
+        <p:style>
+          <a:lnRef idx="3">
+            <a:schemeClr val="accent1"/>
+          </a:lnRef>
+          <a:fillRef idx="0">
+            <a:schemeClr val="accent1"/>
+          </a:fillRef>
+          <a:effectRef idx="2">
+            <a:schemeClr val="accent1"/>
+          </a:effectRef>
+          <a:fontRef idx="minor">
+            <a:schemeClr val="tx1"/>
+          </a:fontRef>
+        </p:style>
+      </p:cxnSp>
+      <p:sp>
+        <p:nvSpPr>
+          <p:cNvPr id="22" name="Rectangle 21"/>
+          <p:cNvSpPr/>
+          <p:nvPr/>
+        </p:nvSpPr>
+        <p:spPr>
+          <a:xfrm>
+            <a:off x="4335885" y="2641895"/>
+            <a:ext cx="1983789" cy="285686"/>
+          </a:xfrm>
+          <a:prstGeom prst="rect">
+            <a:avLst/>
+          </a:prstGeom>
+        </p:spPr>
+        <p:style>
+          <a:lnRef idx="2">
+            <a:schemeClr val="accent3"/>
+          </a:lnRef>
+          <a:fillRef idx="1">
+            <a:schemeClr val="lt1"/>
+          </a:fillRef>
+          <a:effectRef idx="0">
+            <a:schemeClr val="accent3"/>
+          </a:effectRef>
+          <a:fontRef idx="minor">
+            <a:schemeClr val="dk1"/>
+          </a:fontRef>
+        </p:style>
+        <p:txBody>
+          <a:bodyPr rtlCol="0" anchor="ctr"/>
+          <a:lstStyle/>
+          <a:p>
+            <a:pPr algn="ctr"/>
+            <a:r>
+              <a:rPr lang="en-US" sz="1100" dirty="0" smtClean="0"/>
+              <a:t>SEARCH_RUNNING</a:t>
+            </a:r>
+            <a:endParaRPr lang="en-US" sz="1100" dirty="0"/>
+          </a:p>
+        </p:txBody>
+      </p:sp>
+      <p:sp>
+        <p:nvSpPr>
+          <p:cNvPr id="16" name="TextBox 15"/>
           <p:cNvSpPr txBox="1"/>
           <p:nvPr/>
         </p:nvSpPr>
         <p:spPr>
           <a:xfrm>
-            <a:off x="830424" y="1548882"/>
-            <a:ext cx="1188980" cy="369332"/>
+            <a:off x="5430772" y="2330125"/>
+            <a:ext cx="1752403" cy="261610"/>
           </a:xfrm>
           <a:prstGeom prst="rect">
             <a:avLst/>
@@ -11292,23 +11485,62 @@
           <a:lstStyle/>
           <a:p>
             <a:r>
-              <a:rPr lang="en-US" dirty="0" smtClean="0"/>
-              <a:t>Index.html</a:t>
-            </a:r>
-            <a:endParaRPr lang="en-US" dirty="0"/>
+              <a:rPr lang="en-US" sz="1050" dirty="0" smtClean="0"/>
+              <a:t>SEARCH START REQUESTED</a:t>
+            </a:r>
+            <a:endParaRPr lang="en-US" sz="1050" dirty="0"/>
           </a:p>
         </p:txBody>
       </p:sp>
+      <p:cxnSp>
+        <p:nvCxnSpPr>
+          <p:cNvPr id="20" name="Elbow Connector 19"/>
+          <p:cNvCxnSpPr>
+            <a:stCxn id="22" idx="2"/>
+            <a:endCxn id="22" idx="3"/>
+          </p:cNvCxnSpPr>
+          <p:nvPr/>
+        </p:nvCxnSpPr>
+        <p:spPr>
+          <a:xfrm rot="5400000" flipH="1" flipV="1">
+            <a:off x="5752305" y="2360213"/>
+            <a:ext cx="142843" cy="991894"/>
+          </a:xfrm>
+          <a:prstGeom prst="bentConnector4">
+            <a:avLst>
+              <a:gd name="adj1" fmla="val -160036"/>
+              <a:gd name="adj2" fmla="val 123047"/>
+            </a:avLst>
+          </a:prstGeom>
+          <a:ln>
+            <a:tailEnd type="triangle"/>
+          </a:ln>
+        </p:spPr>
+        <p:style>
+          <a:lnRef idx="3">
+            <a:schemeClr val="accent1"/>
+          </a:lnRef>
+          <a:fillRef idx="0">
+            <a:schemeClr val="accent1"/>
+          </a:fillRef>
+          <a:effectRef idx="2">
+            <a:schemeClr val="accent1"/>
+          </a:effectRef>
+          <a:fontRef idx="minor">
+            <a:schemeClr val="tx1"/>
+          </a:fontRef>
+        </p:style>
+      </p:cxnSp>
       <p:sp>
         <p:nvSpPr>
-          <p:cNvPr id="6" name="TextBox 5"/>
+          <p:cNvPr id="28" name="TextBox 27"/>
           <p:cNvSpPr txBox="1"/>
           <p:nvPr/>
         </p:nvSpPr>
         <p:spPr>
           <a:xfrm>
-            <a:off x="2597019" y="1595048"/>
-            <a:ext cx="805029" cy="276999"/>
+            <a:off x="6543868" y="2856160"/>
+            <a:ext cx="1552028" cy="253916"/>
           </a:xfrm>
           <a:prstGeom prst="rect">
             <a:avLst/>
@@ -11322,43 +11554,45 @@
           <a:lstStyle/>
           <a:p>
             <a:r>
-              <a:rPr lang="en-US" sz="1200" dirty="0" smtClean="0"/>
-              <a:t>SquidUI.js</a:t>
-            </a:r>
-            <a:endParaRPr lang="en-US" sz="1200" dirty="0"/>
+              <a:rPr lang="en-US" sz="1050" dirty="0" smtClean="0"/>
+              <a:t>SEARCH STATUS UPDATE</a:t>
+            </a:r>
+            <a:endParaRPr lang="en-US" sz="1050" dirty="0"/>
           </a:p>
         </p:txBody>
       </p:sp>
       <p:cxnSp>
         <p:nvCxnSpPr>
-          <p:cNvPr id="8" name="Straight Arrow Connector 7"/>
+          <p:cNvPr id="30" name="Elbow Connector 29"/>
           <p:cNvCxnSpPr>
-            <a:stCxn id="5" idx="3"/>
-            <a:endCxn id="6" idx="1"/>
+            <a:stCxn id="22" idx="1"/>
+            <a:endCxn id="11" idx="1"/>
           </p:cNvCxnSpPr>
           <p:nvPr/>
         </p:nvCxnSpPr>
         <p:spPr>
-          <a:xfrm>
-            <a:off x="2019404" y="1733548"/>
-            <a:ext cx="577615" cy="0"/>
+          <a:xfrm rot="10800000">
+            <a:off x="4335885" y="2120934"/>
+            <a:ext cx="12700" cy="663805"/>
           </a:xfrm>
-          <a:prstGeom prst="straightConnector1">
-            <a:avLst/>
+          <a:prstGeom prst="bentConnector3">
+            <a:avLst>
+              <a:gd name="adj1" fmla="val 7383677"/>
+            </a:avLst>
           </a:prstGeom>
           <a:ln>
             <a:tailEnd type="triangle"/>
           </a:ln>
         </p:spPr>
         <p:style>
-          <a:lnRef idx="2">
-            <a:schemeClr val="dk1"/>
+          <a:lnRef idx="3">
+            <a:schemeClr val="accent1"/>
           </a:lnRef>
           <a:fillRef idx="0">
-            <a:schemeClr val="dk1"/>
+            <a:schemeClr val="accent1"/>
           </a:fillRef>
-          <a:effectRef idx="1">
-            <a:schemeClr val="dk1"/>
+          <a:effectRef idx="2">
+            <a:schemeClr val="accent1"/>
           </a:effectRef>
           <a:fontRef idx="minor">
             <a:schemeClr val="tx1"/>
@@ -11367,14 +11601,14 @@
       </p:cxnSp>
       <p:sp>
         <p:nvSpPr>
-          <p:cNvPr id="13" name="TextBox 12"/>
+          <p:cNvPr id="32" name="TextBox 31"/>
           <p:cNvSpPr txBox="1"/>
           <p:nvPr/>
         </p:nvSpPr>
         <p:spPr>
           <a:xfrm>
-            <a:off x="3472778" y="2128725"/>
-            <a:ext cx="1864165" cy="276999"/>
+            <a:off x="1639858" y="2339476"/>
+            <a:ext cx="1628972" cy="253916"/>
           </a:xfrm>
           <a:prstGeom prst="rect">
             <a:avLst/>
@@ -11388,247 +11622,13 @@
           <a:lstStyle/>
           <a:p>
             <a:r>
-              <a:rPr lang="en-US" sz="1200" dirty="0" smtClean="0"/>
-              <a:t>pages/image/ImagePage.js</a:t>
-            </a:r>
-            <a:endParaRPr lang="en-US" sz="1200" dirty="0"/>
+              <a:rPr lang="en-US" sz="1050" dirty="0" smtClean="0"/>
+              <a:t>SEARCH STOP REQUESTED</a:t>
+            </a:r>
+            <a:endParaRPr lang="en-US" sz="1050" dirty="0"/>
           </a:p>
         </p:txBody>
       </p:sp>
-      <p:cxnSp>
-        <p:nvCxnSpPr>
-          <p:cNvPr id="18" name="Elbow Connector 17"/>
-          <p:cNvCxnSpPr>
-            <a:stCxn id="6" idx="2"/>
-            <a:endCxn id="13" idx="1"/>
-          </p:cNvCxnSpPr>
-          <p:nvPr/>
-        </p:nvCxnSpPr>
-        <p:spPr>
-          <a:xfrm rot="16200000" flipH="1">
-            <a:off x="3038567" y="1833014"/>
-            <a:ext cx="395178" cy="473244"/>
-          </a:xfrm>
-          <a:prstGeom prst="bentConnector2">
-            <a:avLst/>
-          </a:prstGeom>
-          <a:ln>
-            <a:tailEnd type="triangle"/>
-          </a:ln>
-        </p:spPr>
-        <p:style>
-          <a:lnRef idx="2">
-            <a:schemeClr val="dk1"/>
-          </a:lnRef>
-          <a:fillRef idx="0">
-            <a:schemeClr val="dk1"/>
-          </a:fillRef>
-          <a:effectRef idx="1">
-            <a:schemeClr val="dk1"/>
-          </a:effectRef>
-          <a:fontRef idx="minor">
-            <a:schemeClr val="tx1"/>
-          </a:fontRef>
-        </p:style>
-      </p:cxnSp>
-      <p:sp>
-        <p:nvSpPr>
-          <p:cNvPr id="19" name="TextBox 18"/>
-          <p:cNvSpPr txBox="1"/>
-          <p:nvPr/>
-        </p:nvSpPr>
-        <p:spPr>
-          <a:xfrm>
-            <a:off x="3472778" y="3554361"/>
-            <a:ext cx="1844223" cy="276999"/>
-          </a:xfrm>
-          <a:prstGeom prst="rect">
-            <a:avLst/>
-          </a:prstGeom>
-          <a:noFill/>
-        </p:spPr>
-        <p:txBody>
-          <a:bodyPr wrap="none" rtlCol="0">
-            <a:spAutoFit/>
-          </a:bodyPr>
-          <a:lstStyle/>
-          <a:p>
-            <a:r>
-              <a:rPr lang="en-US" sz="1200" dirty="0" smtClean="0"/>
-              <a:t>pages/query/QueryPage.js</a:t>
-            </a:r>
-            <a:endParaRPr lang="en-US" sz="1200" dirty="0"/>
-          </a:p>
-        </p:txBody>
-      </p:sp>
-      <p:cxnSp>
-        <p:nvCxnSpPr>
-          <p:cNvPr id="21" name="Elbow Connector 20"/>
-          <p:cNvCxnSpPr>
-            <a:stCxn id="6" idx="2"/>
-            <a:endCxn id="19" idx="1"/>
-          </p:cNvCxnSpPr>
-          <p:nvPr/>
-        </p:nvCxnSpPr>
-        <p:spPr>
-          <a:xfrm rot="16200000" flipH="1">
-            <a:off x="2325749" y="2545832"/>
-            <a:ext cx="1820814" cy="473244"/>
-          </a:xfrm>
-          <a:prstGeom prst="bentConnector2">
-            <a:avLst/>
-          </a:prstGeom>
-          <a:ln>
-            <a:tailEnd type="triangle"/>
-          </a:ln>
-        </p:spPr>
-        <p:style>
-          <a:lnRef idx="2">
-            <a:schemeClr val="dk1"/>
-          </a:lnRef>
-          <a:fillRef idx="0">
-            <a:schemeClr val="dk1"/>
-          </a:fillRef>
-          <a:effectRef idx="1">
-            <a:schemeClr val="dk1"/>
-          </a:effectRef>
-          <a:fontRef idx="minor">
-            <a:schemeClr val="tx1"/>
-          </a:fontRef>
-        </p:style>
-      </p:cxnSp>
-      <p:sp>
-        <p:nvSpPr>
-          <p:cNvPr id="25" name="TextBox 24"/>
-          <p:cNvSpPr txBox="1"/>
-          <p:nvPr/>
-        </p:nvSpPr>
-        <p:spPr>
-          <a:xfrm>
-            <a:off x="3472777" y="4677153"/>
-            <a:ext cx="1893916" cy="276999"/>
-          </a:xfrm>
-          <a:prstGeom prst="rect">
-            <a:avLst/>
-          </a:prstGeom>
-          <a:noFill/>
-        </p:spPr>
-        <p:txBody>
-          <a:bodyPr wrap="none" rtlCol="0">
-            <a:spAutoFit/>
-          </a:bodyPr>
-          <a:lstStyle/>
-          <a:p>
-            <a:r>
-              <a:rPr lang="en-US" sz="1200" dirty="0" smtClean="0"/>
-              <a:t>pages/admin/AdminPage.js</a:t>
-            </a:r>
-            <a:endParaRPr lang="en-US" sz="1200" dirty="0"/>
-          </a:p>
-        </p:txBody>
-      </p:sp>
-      <p:cxnSp>
-        <p:nvCxnSpPr>
-          <p:cNvPr id="27" name="Elbow Connector 26"/>
-          <p:cNvCxnSpPr>
-            <a:stCxn id="6" idx="2"/>
-            <a:endCxn id="25" idx="1"/>
-          </p:cNvCxnSpPr>
-          <p:nvPr/>
-        </p:nvCxnSpPr>
-        <p:spPr>
-          <a:xfrm rot="16200000" flipH="1">
-            <a:off x="1764352" y="3107228"/>
-            <a:ext cx="2943606" cy="473243"/>
-          </a:xfrm>
-          <a:prstGeom prst="bentConnector2">
-            <a:avLst/>
-          </a:prstGeom>
-          <a:ln>
-            <a:tailEnd type="triangle"/>
-          </a:ln>
-        </p:spPr>
-        <p:style>
-          <a:lnRef idx="2">
-            <a:schemeClr val="dk1"/>
-          </a:lnRef>
-          <a:fillRef idx="0">
-            <a:schemeClr val="dk1"/>
-          </a:fillRef>
-          <a:effectRef idx="1">
-            <a:schemeClr val="dk1"/>
-          </a:effectRef>
-          <a:fontRef idx="minor">
-            <a:schemeClr val="tx1"/>
-          </a:fontRef>
-        </p:style>
-      </p:cxnSp>
-      <p:sp>
-        <p:nvSpPr>
-          <p:cNvPr id="12" name="TextBox 11"/>
-          <p:cNvSpPr txBox="1"/>
-          <p:nvPr/>
-        </p:nvSpPr>
-        <p:spPr>
-          <a:xfrm>
-            <a:off x="3436453" y="5305223"/>
-            <a:ext cx="1966564" cy="276999"/>
-          </a:xfrm>
-          <a:prstGeom prst="rect">
-            <a:avLst/>
-          </a:prstGeom>
-          <a:noFill/>
-        </p:spPr>
-        <p:txBody>
-          <a:bodyPr wrap="none" rtlCol="0">
-            <a:spAutoFit/>
-          </a:bodyPr>
-          <a:lstStyle/>
-          <a:p>
-            <a:r>
-              <a:rPr lang="en-US" sz="1200" dirty="0" smtClean="0"/>
-              <a:t>common/header/TopPane.js</a:t>
-            </a:r>
-            <a:endParaRPr lang="en-US" sz="1200" dirty="0"/>
-          </a:p>
-        </p:txBody>
-      </p:sp>
-      <p:cxnSp>
-        <p:nvCxnSpPr>
-          <p:cNvPr id="3" name="Elbow Connector 2"/>
-          <p:cNvCxnSpPr>
-            <a:stCxn id="6" idx="2"/>
-            <a:endCxn id="12" idx="1"/>
-          </p:cNvCxnSpPr>
-          <p:nvPr/>
-        </p:nvCxnSpPr>
-        <p:spPr>
-          <a:xfrm rot="16200000" flipH="1">
-            <a:off x="1432155" y="3439425"/>
-            <a:ext cx="3571676" cy="436919"/>
-          </a:xfrm>
-          <a:prstGeom prst="bentConnector2">
-            <a:avLst/>
-          </a:prstGeom>
-          <a:ln>
-            <a:tailEnd type="triangle"/>
-          </a:ln>
-        </p:spPr>
-        <p:style>
-          <a:lnRef idx="2">
-            <a:schemeClr val="dk1"/>
-          </a:lnRef>
-          <a:fillRef idx="0">
-            <a:schemeClr val="dk1"/>
-          </a:fillRef>
-          <a:effectRef idx="1">
-            <a:schemeClr val="dk1"/>
-          </a:effectRef>
-          <a:fontRef idx="minor">
-            <a:schemeClr val="tx1"/>
-          </a:fontRef>
-        </p:style>
-      </p:cxnSp>
     </p:spTree>
     <p:extLst>
       <p:ext uri="{BB962C8B-B14F-4D97-AF65-F5344CB8AC3E}">
@@ -11683,7 +11683,7 @@
           <a:p>
             <a:r>
               <a:rPr lang="en-US" sz="2800" dirty="0" smtClean="0"/>
-              <a:t>Query Page</a:t>
+              <a:t>UX Query Page</a:t>
             </a:r>
             <a:endParaRPr lang="en-US" sz="2800" dirty="0" smtClean="0"/>
           </a:p>
@@ -11775,33 +11775,34 @@
           <a:prstGeom prst="rect">
             <a:avLst/>
           </a:prstGeom>
+          <a:ln/>
         </p:spPr>
         <p:style>
-          <a:lnRef idx="1">
-            <a:schemeClr val="accent1"/>
+          <a:lnRef idx="2">
+            <a:schemeClr val="dk1"/>
           </a:lnRef>
-          <a:fillRef idx="2">
-            <a:schemeClr val="accent1"/>
+          <a:fillRef idx="1">
+            <a:schemeClr val="lt1"/>
           </a:fillRef>
-          <a:effectRef idx="1">
-            <a:schemeClr val="accent1"/>
+          <a:effectRef idx="0">
+            <a:schemeClr val="dk1"/>
           </a:effectRef>
           <a:fontRef idx="minor">
             <a:schemeClr val="dk1"/>
           </a:fontRef>
         </p:style>
         <p:txBody>
-          <a:bodyPr rtlCol="0" anchor="ctr"/>
+          <a:bodyPr rtlCol="0" anchor="t"/>
           <a:lstStyle/>
           <a:p>
             <a:pPr algn="ctr"/>
             <a:r>
+              <a:rPr lang="en-US" dirty="0" smtClean="0"/>
+              <a:t>Search Status </a:t>
+            </a:r>
+            <a:r>
               <a:rPr lang="en-US" dirty="0"/>
-              <a:t>Status </a:t>
-            </a:r>
-            <a:r>
-              <a:rPr lang="en-US" dirty="0" smtClean="0"/>
-              <a:t>Component</a:t>
+              <a:t>Container</a:t>
             </a:r>
             <a:endParaRPr lang="en-US" dirty="0"/>
           </a:p>
@@ -11821,16 +11822,17 @@
           <a:prstGeom prst="rect">
             <a:avLst/>
           </a:prstGeom>
+          <a:ln/>
         </p:spPr>
         <p:style>
-          <a:lnRef idx="1">
-            <a:schemeClr val="accent1"/>
+          <a:lnRef idx="2">
+            <a:schemeClr val="dk1"/>
           </a:lnRef>
-          <a:fillRef idx="2">
-            <a:schemeClr val="accent1"/>
+          <a:fillRef idx="1">
+            <a:schemeClr val="lt1"/>
           </a:fillRef>
-          <a:effectRef idx="1">
-            <a:schemeClr val="accent1"/>
+          <a:effectRef idx="0">
+            <a:schemeClr val="dk1"/>
           </a:effectRef>
           <a:fontRef idx="minor">
             <a:schemeClr val="dk1"/>
@@ -11842,8 +11844,12 @@
           <a:p>
             <a:pPr algn="ctr"/>
             <a:r>
+              <a:rPr lang="en-US" dirty="0"/>
+              <a:t>Menu </a:t>
+            </a:r>
+            <a:r>
               <a:rPr lang="en-US" dirty="0" smtClean="0"/>
-              <a:t>Filter Component</a:t>
+              <a:t>Container</a:t>
             </a:r>
             <a:endParaRPr lang="en-US" dirty="0"/>
           </a:p>
@@ -11858,21 +11864,22 @@
         <p:spPr>
           <a:xfrm>
             <a:off x="2948472" y="1184986"/>
-            <a:ext cx="8994712" cy="1042338"/>
+            <a:ext cx="8994712" cy="1399594"/>
           </a:xfrm>
           <a:prstGeom prst="rect">
             <a:avLst/>
           </a:prstGeom>
+          <a:ln/>
         </p:spPr>
         <p:style>
-          <a:lnRef idx="1">
-            <a:schemeClr val="accent1"/>
+          <a:lnRef idx="2">
+            <a:schemeClr val="dk1"/>
           </a:lnRef>
-          <a:fillRef idx="2">
-            <a:schemeClr val="accent1"/>
+          <a:fillRef idx="1">
+            <a:schemeClr val="lt1"/>
           </a:fillRef>
-          <a:effectRef idx="1">
-            <a:schemeClr val="accent1"/>
+          <a:effectRef idx="0">
+            <a:schemeClr val="dk1"/>
           </a:effectRef>
           <a:fontRef idx="minor">
             <a:schemeClr val="dk1"/>
@@ -11885,7 +11892,11 @@
             <a:pPr algn="ctr"/>
             <a:r>
               <a:rPr lang="en-US" dirty="0" smtClean="0"/>
-              <a:t>Search Component</a:t>
+              <a:t>Search </a:t>
+            </a:r>
+            <a:r>
+              <a:rPr lang="en-US" dirty="0" smtClean="0"/>
+              <a:t>Container</a:t>
             </a:r>
             <a:endParaRPr lang="en-US" dirty="0"/>
           </a:p>
@@ -11899,7 +11910,7 @@
         </p:nvSpPr>
         <p:spPr>
           <a:xfrm>
-            <a:off x="10222725" y="1292290"/>
+            <a:off x="10085358" y="1576068"/>
             <a:ext cx="783771" cy="783771"/>
           </a:xfrm>
           <a:prstGeom prst="ellipse">
@@ -11943,8 +11954,8 @@
         </p:nvSpPr>
         <p:spPr>
           <a:xfrm>
-            <a:off x="3782011" y="1675723"/>
-            <a:ext cx="6186196" cy="354221"/>
+            <a:off x="3707366" y="2031923"/>
+            <a:ext cx="6186196" cy="259820"/>
           </a:xfrm>
           <a:prstGeom prst="rect">
             <a:avLst/>
@@ -11987,8 +11998,63 @@
         </p:nvSpPr>
         <p:spPr>
           <a:xfrm>
-            <a:off x="2948472" y="2227324"/>
-            <a:ext cx="8994712" cy="3865566"/>
+            <a:off x="2948472" y="2584580"/>
+            <a:ext cx="8994712" cy="3508310"/>
+          </a:xfrm>
+          <a:prstGeom prst="rect">
+            <a:avLst/>
+          </a:prstGeom>
+          <a:ln/>
+        </p:spPr>
+        <p:style>
+          <a:lnRef idx="2">
+            <a:schemeClr val="dk1"/>
+          </a:lnRef>
+          <a:fillRef idx="1">
+            <a:schemeClr val="lt1"/>
+          </a:fillRef>
+          <a:effectRef idx="0">
+            <a:schemeClr val="dk1"/>
+          </a:effectRef>
+          <a:fontRef idx="minor">
+            <a:schemeClr val="dk1"/>
+          </a:fontRef>
+        </p:style>
+        <p:txBody>
+          <a:bodyPr rtlCol="0" anchor="ctr"/>
+          <a:lstStyle/>
+          <a:p>
+            <a:pPr algn="ctr"/>
+            <a:r>
+              <a:rPr lang="en-US" dirty="0" smtClean="0">
+                <a:solidFill>
+                  <a:schemeClr val="dk1"/>
+                </a:solidFill>
+              </a:rPr>
+              <a:t>Grid </a:t>
+            </a:r>
+            <a:r>
+              <a:rPr lang="en-US" dirty="0" smtClean="0"/>
+              <a:t>Container</a:t>
+            </a:r>
+            <a:endParaRPr lang="en-US" dirty="0">
+              <a:solidFill>
+                <a:schemeClr val="dk1"/>
+              </a:solidFill>
+            </a:endParaRPr>
+          </a:p>
+        </p:txBody>
+      </p:sp>
+      <p:sp>
+        <p:nvSpPr>
+          <p:cNvPr id="12" name="Rectangle 11"/>
+          <p:cNvSpPr/>
+          <p:nvPr/>
+        </p:nvSpPr>
+        <p:spPr>
+          <a:xfrm>
+            <a:off x="3707366" y="1706070"/>
+            <a:ext cx="6186196" cy="261884"/>
           </a:xfrm>
           <a:prstGeom prst="rect">
             <a:avLst/>
@@ -12016,14 +12082,10 @@
           <a:p>
             <a:pPr algn="ctr"/>
             <a:r>
-              <a:rPr lang="en-US" dirty="0" smtClean="0"/>
-              <a:t>Results </a:t>
-            </a:r>
-            <a:r>
-              <a:rPr lang="en-US" dirty="0" smtClean="0"/>
-              <a:t>Component</a:t>
-            </a:r>
-            <a:endParaRPr lang="en-US" dirty="0"/>
+              <a:rPr lang="en-US" sz="1400" dirty="0" smtClean="0"/>
+              <a:t>Search State Spinners</a:t>
+            </a:r>
+            <a:endParaRPr lang="en-US" sz="1400" dirty="0"/>
           </a:p>
         </p:txBody>
       </p:sp>

</xml_diff>

<commit_message>
Fix duplicate image problem (#24)
* Remove old files. Fix duplicate image records

* remove fixme statements
</commit_message>
<xml_diff>
--- a/docs/design.pptx
+++ b/docs/design.pptx
@@ -265,7 +265,7 @@
           <a:p>
             <a:fld id="{30DA0606-474F-417C-8DB0-81402E3BEFB0}" type="datetimeFigureOut">
               <a:rPr lang="en-US" smtClean="0"/>
-              <a:t>8/30/2017</a:t>
+              <a:t>9/8/2017</a:t>
             </a:fld>
             <a:endParaRPr lang="en-US"/>
           </a:p>
@@ -435,7 +435,7 @@
           <a:p>
             <a:fld id="{30DA0606-474F-417C-8DB0-81402E3BEFB0}" type="datetimeFigureOut">
               <a:rPr lang="en-US" smtClean="0"/>
-              <a:t>8/30/2017</a:t>
+              <a:t>9/8/2017</a:t>
             </a:fld>
             <a:endParaRPr lang="en-US"/>
           </a:p>
@@ -615,7 +615,7 @@
           <a:p>
             <a:fld id="{30DA0606-474F-417C-8DB0-81402E3BEFB0}" type="datetimeFigureOut">
               <a:rPr lang="en-US" smtClean="0"/>
-              <a:t>8/30/2017</a:t>
+              <a:t>9/8/2017</a:t>
             </a:fld>
             <a:endParaRPr lang="en-US"/>
           </a:p>
@@ -785,7 +785,7 @@
           <a:p>
             <a:fld id="{30DA0606-474F-417C-8DB0-81402E3BEFB0}" type="datetimeFigureOut">
               <a:rPr lang="en-US" smtClean="0"/>
-              <a:t>8/30/2017</a:t>
+              <a:t>9/8/2017</a:t>
             </a:fld>
             <a:endParaRPr lang="en-US"/>
           </a:p>
@@ -1031,7 +1031,7 @@
           <a:p>
             <a:fld id="{30DA0606-474F-417C-8DB0-81402E3BEFB0}" type="datetimeFigureOut">
               <a:rPr lang="en-US" smtClean="0"/>
-              <a:t>8/30/2017</a:t>
+              <a:t>9/8/2017</a:t>
             </a:fld>
             <a:endParaRPr lang="en-US"/>
           </a:p>
@@ -1263,7 +1263,7 @@
           <a:p>
             <a:fld id="{30DA0606-474F-417C-8DB0-81402E3BEFB0}" type="datetimeFigureOut">
               <a:rPr lang="en-US" smtClean="0"/>
-              <a:t>8/30/2017</a:t>
+              <a:t>9/8/2017</a:t>
             </a:fld>
             <a:endParaRPr lang="en-US"/>
           </a:p>
@@ -1630,7 +1630,7 @@
           <a:p>
             <a:fld id="{30DA0606-474F-417C-8DB0-81402E3BEFB0}" type="datetimeFigureOut">
               <a:rPr lang="en-US" smtClean="0"/>
-              <a:t>8/30/2017</a:t>
+              <a:t>9/8/2017</a:t>
             </a:fld>
             <a:endParaRPr lang="en-US"/>
           </a:p>
@@ -1748,7 +1748,7 @@
           <a:p>
             <a:fld id="{30DA0606-474F-417C-8DB0-81402E3BEFB0}" type="datetimeFigureOut">
               <a:rPr lang="en-US" smtClean="0"/>
-              <a:t>8/30/2017</a:t>
+              <a:t>9/8/2017</a:t>
             </a:fld>
             <a:endParaRPr lang="en-US"/>
           </a:p>
@@ -1843,7 +1843,7 @@
           <a:p>
             <a:fld id="{30DA0606-474F-417C-8DB0-81402E3BEFB0}" type="datetimeFigureOut">
               <a:rPr lang="en-US" smtClean="0"/>
-              <a:t>8/30/2017</a:t>
+              <a:t>9/8/2017</a:t>
             </a:fld>
             <a:endParaRPr lang="en-US"/>
           </a:p>
@@ -2120,7 +2120,7 @@
           <a:p>
             <a:fld id="{30DA0606-474F-417C-8DB0-81402E3BEFB0}" type="datetimeFigureOut">
               <a:rPr lang="en-US" smtClean="0"/>
-              <a:t>8/30/2017</a:t>
+              <a:t>9/8/2017</a:t>
             </a:fld>
             <a:endParaRPr lang="en-US"/>
           </a:p>
@@ -2373,7 +2373,7 @@
           <a:p>
             <a:fld id="{30DA0606-474F-417C-8DB0-81402E3BEFB0}" type="datetimeFigureOut">
               <a:rPr lang="en-US" smtClean="0"/>
-              <a:t>8/30/2017</a:t>
+              <a:t>9/8/2017</a:t>
             </a:fld>
             <a:endParaRPr lang="en-US"/>
           </a:p>
@@ -2586,7 +2586,7 @@
           <a:p>
             <a:fld id="{30DA0606-474F-417C-8DB0-81402E3BEFB0}" type="datetimeFigureOut">
               <a:rPr lang="en-US" smtClean="0"/>
-              <a:t>8/30/2017</a:t>
+              <a:t>9/8/2017</a:t>
             </a:fld>
             <a:endParaRPr lang="en-US"/>
           </a:p>
@@ -9135,14 +9135,14 @@
           <p:nvPr>
             <p:extLst>
               <p:ext uri="{D42A27DB-BD31-4B8C-83A1-F6EECF244321}">
-                <p14:modId xmlns:p14="http://schemas.microsoft.com/office/powerpoint/2010/main" val="1469466355"/>
+                <p14:modId xmlns:p14="http://schemas.microsoft.com/office/powerpoint/2010/main" val="2747206335"/>
               </p:ext>
             </p:extLst>
           </p:nvPr>
         </p:nvGraphicFramePr>
         <p:xfrm>
           <a:off x="1126932" y="999584"/>
-          <a:ext cx="9528630" cy="3114040"/>
+          <a:ext cx="10452358" cy="6314440"/>
         </p:xfrm>
         <a:graphic>
           <a:graphicData uri="http://schemas.openxmlformats.org/drawingml/2006/table">
@@ -9154,8 +9154,8 @@
                 <a:gridCol w="1905726"/>
                 <a:gridCol w="1905726"/>
                 <a:gridCol w="1905726"/>
-                <a:gridCol w="1905726"/>
-                <a:gridCol w="1905726"/>
+                <a:gridCol w="3195629"/>
+                <a:gridCol w="1539551"/>
               </a:tblGrid>
               <a:tr h="370840">
                 <a:tc>
@@ -9236,8 +9236,112 @@
                     <a:lstStyle/>
                     <a:p>
                       <a:r>
+                        <a:rPr lang="en-US" dirty="0" smtClean="0">
+                          <a:solidFill>
+                            <a:srgbClr val="7030A0"/>
+                          </a:solidFill>
+                        </a:rPr>
+                        <a:t>/query/id/map</a:t>
+                      </a:r>
+                      <a:endParaRPr lang="en-US" dirty="0">
+                        <a:solidFill>
+                          <a:srgbClr val="7030A0"/>
+                        </a:solidFill>
+                      </a:endParaRPr>
+                    </a:p>
+                  </a:txBody>
+                  <a:tcPr/>
+                </a:tc>
+                <a:tc>
+                  <a:txBody>
+                    <a:bodyPr/>
+                    <a:lstStyle/>
+                    <a:p>
+                      <a:r>
+                        <a:rPr lang="en-US" dirty="0" smtClean="0">
+                          <a:solidFill>
+                            <a:srgbClr val="7030A0"/>
+                          </a:solidFill>
+                        </a:rPr>
+                        <a:t>GET</a:t>
+                      </a:r>
+                      <a:endParaRPr lang="en-US" dirty="0">
+                        <a:solidFill>
+                          <a:srgbClr val="7030A0"/>
+                        </a:solidFill>
+                      </a:endParaRPr>
+                    </a:p>
+                  </a:txBody>
+                  <a:tcPr/>
+                </a:tc>
+                <a:tc>
+                  <a:txBody>
+                    <a:bodyPr/>
+                    <a:lstStyle/>
+                    <a:p>
+                      <a:endParaRPr lang="en-US" dirty="0">
+                        <a:solidFill>
+                          <a:srgbClr val="7030A0"/>
+                        </a:solidFill>
+                      </a:endParaRPr>
+                    </a:p>
+                  </a:txBody>
+                  <a:tcPr/>
+                </a:tc>
+                <a:tc>
+                  <a:txBody>
+                    <a:bodyPr/>
+                    <a:lstStyle/>
+                    <a:p>
+                      <a:endParaRPr lang="en-US" sz="1200" dirty="0">
+                        <a:solidFill>
+                          <a:srgbClr val="7030A0"/>
+                        </a:solidFill>
+                      </a:endParaRPr>
+                    </a:p>
+                  </a:txBody>
+                  <a:tcPr/>
+                </a:tc>
+                <a:tc>
+                  <a:txBody>
+                    <a:bodyPr/>
+                    <a:lstStyle/>
+                    <a:p>
+                      <a:r>
+                        <a:rPr lang="en-US" dirty="0" smtClean="0">
+                          <a:solidFill>
+                            <a:srgbClr val="7030A0"/>
+                          </a:solidFill>
+                        </a:rPr>
+                        <a:t>Topology</a:t>
+                      </a:r>
+                      <a:r>
+                        <a:rPr lang="en-US" baseline="0" dirty="0" smtClean="0">
+                          <a:solidFill>
+                            <a:srgbClr val="7030A0"/>
+                          </a:solidFill>
+                        </a:rPr>
+                        <a:t> of pages and images associated with query</a:t>
+                      </a:r>
+                      <a:endParaRPr lang="en-US" dirty="0">
+                        <a:solidFill>
+                          <a:srgbClr val="7030A0"/>
+                        </a:solidFill>
+                      </a:endParaRPr>
+                    </a:p>
+                  </a:txBody>
+                  <a:tcPr/>
+                </a:tc>
+              </a:tr>
+              <a:tr h="370840">
+                <a:tc>
+                  <a:txBody>
+                    <a:bodyPr/>
+                    <a:lstStyle/>
+                    <a:p>
+                      <a:r>
                         <a:rPr lang="en-US" dirty="0" smtClean="0"/>
-                        <a:t>/query/id/map</a:t>
+                        <a:t>/query/id/image</a:t>
                       </a:r>
                       <a:endParaRPr lang="en-US" dirty="0"/>
                     </a:p>
@@ -9263,6 +9367,10 @@
                     <a:bodyPr/>
                     <a:lstStyle/>
                     <a:p>
+                      <a:r>
+                        <a:rPr lang="en-US" dirty="0" smtClean="0"/>
+                        <a:t>{size filter}</a:t>
+                      </a:r>
                       <a:endParaRPr lang="en-US" dirty="0"/>
                     </a:p>
                   </a:txBody>
@@ -9273,6 +9381,34 @@
                     <a:bodyPr/>
                     <a:lstStyle/>
                     <a:p>
+                      <a:r>
+                        <a:rPr lang="en-US" sz="1200" dirty="0" smtClean="0"/>
+                        <a:t>[</a:t>
+                      </a:r>
+                    </a:p>
+                    <a:p>
+                      <a:r>
+                        <a:rPr lang="en-US" sz="1200" dirty="0" smtClean="0"/>
+                        <a:t>  {</a:t>
+                      </a:r>
+                    </a:p>
+                    <a:p>
+                      <a:r>
+                        <a:rPr lang="en-US" sz="1200" dirty="0" smtClean="0"/>
+                        <a:t>      </a:t>
+                      </a:r>
+                    </a:p>
+                    <a:p>
+                      <a:r>
+                        <a:rPr lang="en-US" sz="1200" dirty="0" smtClean="0"/>
+                        <a:t>   }</a:t>
+                      </a:r>
+                    </a:p>
+                    <a:p>
+                      <a:r>
+                        <a:rPr lang="en-US" sz="1200" dirty="0" smtClean="0"/>
+                        <a:t>]</a:t>
+                      </a:r>
                       <a:endParaRPr lang="en-US" sz="1200" dirty="0"/>
                     </a:p>
                   </a:txBody>
@@ -9285,11 +9421,11 @@
                     <a:p>
                       <a:r>
                         <a:rPr lang="en-US" dirty="0" smtClean="0"/>
-                        <a:t>Topology</a:t>
+                        <a:t>All Images Objects associated with</a:t>
                       </a:r>
                       <a:r>
                         <a:rPr lang="en-US" baseline="0" dirty="0" smtClean="0"/>
-                        <a:t> of pages and images associated with query</a:t>
+                        <a:t> a query</a:t>
                       </a:r>
                       <a:endParaRPr lang="en-US" dirty="0"/>
                     </a:p>
@@ -9305,7 +9441,7 @@
                     <a:p>
                       <a:r>
                         <a:rPr lang="en-US" dirty="0" smtClean="0"/>
-                        <a:t>/query/id/image</a:t>
+                        <a:t>/query/id/page</a:t>
                       </a:r>
                       <a:endParaRPr lang="en-US" dirty="0"/>
                     </a:p>
@@ -9345,6 +9481,59 @@
                     <a:bodyPr/>
                     <a:lstStyle/>
                     <a:p>
+                      <a:r>
+                        <a:rPr lang="en-US" sz="1200" dirty="0" smtClean="0"/>
+                        <a:t>[</a:t>
+                      </a:r>
+                    </a:p>
+                    <a:p>
+                      <a:r>
+                        <a:rPr lang="en-US" sz="1200" dirty="0" smtClean="0"/>
+                        <a:t>  {</a:t>
+                      </a:r>
+                    </a:p>
+                    <a:p>
+                      <a:r>
+                        <a:rPr lang="en-US" sz="1200" dirty="0" smtClean="0"/>
+                        <a:t>     “id”:</a:t>
+                      </a:r>
+                      <a:r>
+                        <a:rPr lang="en-US" sz="1200" baseline="0" dirty="0" smtClean="0"/>
+                        <a:t> [PAGE ID],</a:t>
+                      </a:r>
+                    </a:p>
+                    <a:p>
+                      <a:r>
+                        <a:rPr lang="en-US" sz="1200" baseline="0" dirty="0" smtClean="0"/>
+                        <a:t>      “</a:t>
+                      </a:r>
+                      <a:r>
+                        <a:rPr lang="en-US" sz="1200" baseline="0" dirty="0" err="1" smtClean="0"/>
+                        <a:t>url</a:t>
+                      </a:r>
+                      <a:r>
+                        <a:rPr lang="en-US" sz="1200" baseline="0" dirty="0" smtClean="0"/>
+                        <a:t>” : [PAGE URL],</a:t>
+                      </a:r>
+                    </a:p>
+                    <a:p>
+                      <a:r>
+                        <a:rPr lang="en-US" sz="1200" baseline="0" dirty="0" smtClean="0"/>
+                        <a:t>      “checksum” : [PAGE CHECKSUM]</a:t>
+                      </a:r>
+                    </a:p>
+                    <a:p>
+                      <a:r>
+                        <a:rPr lang="en-US" sz="1200" baseline="0" dirty="0" smtClean="0"/>
+                        <a:t>   }</a:t>
+                      </a:r>
+                      <a:endParaRPr lang="en-US" sz="1200" dirty="0" smtClean="0"/>
+                    </a:p>
+                    <a:p>
+                      <a:r>
+                        <a:rPr lang="en-US" sz="1200" dirty="0" smtClean="0"/>
+                        <a:t>]</a:t>
+                      </a:r>
                       <a:endParaRPr lang="en-US" sz="1200" dirty="0"/>
                     </a:p>
                   </a:txBody>
@@ -9357,13 +9546,8 @@
                     <a:p>
                       <a:r>
                         <a:rPr lang="en-US" dirty="0" smtClean="0"/>
-                        <a:t>All Images Objects associated with</a:t>
-                      </a:r>
-                      <a:r>
-                        <a:rPr lang="en-US" baseline="0" dirty="0" smtClean="0"/>
-                        <a:t> a query</a:t>
-                      </a:r>
-                      <a:endParaRPr lang="en-US" dirty="0"/>
+                        <a:t>Pages associated with query</a:t>
+                      </a:r>
                     </a:p>
                   </a:txBody>
                   <a:tcPr/>
@@ -9377,7 +9561,7 @@
                     <a:p>
                       <a:r>
                         <a:rPr lang="en-US" dirty="0" smtClean="0"/>
-                        <a:t>/query/id/page</a:t>
+                        <a:t>/query/all</a:t>
                       </a:r>
                       <a:endParaRPr lang="en-US" dirty="0"/>
                     </a:p>
@@ -9403,34 +9587,114 @@
                     <a:bodyPr/>
                     <a:lstStyle/>
                     <a:p>
+                      <a:endParaRPr lang="en-US" dirty="0"/>
+                    </a:p>
+                  </a:txBody>
+                  <a:tcPr/>
+                </a:tc>
+                <a:tc>
+                  <a:txBody>
+                    <a:bodyPr/>
+                    <a:lstStyle/>
+                    <a:p>
+                      <a:r>
+                        <a:rPr lang="en-US" sz="1200" dirty="0" smtClean="0"/>
+                        <a:t>[</a:t>
+                      </a:r>
+                    </a:p>
+                    <a:p>
+                      <a:r>
+                        <a:rPr lang="en-US" sz="1200" dirty="0" smtClean="0"/>
+                        <a:t>  {</a:t>
+                      </a:r>
+                    </a:p>
+                    <a:p>
+                      <a:r>
+                        <a:rPr lang="en-US" sz="1200" dirty="0" smtClean="0"/>
+                        <a:t>      “id”:</a:t>
+                      </a:r>
+                      <a:r>
+                        <a:rPr lang="en-US" sz="1200" baseline="0" dirty="0" smtClean="0"/>
+                        <a:t> [QUERY ID],</a:t>
+                      </a:r>
+                    </a:p>
+                    <a:p>
+                      <a:r>
+                        <a:rPr lang="en-US" sz="1200" baseline="0" dirty="0" smtClean="0"/>
+                        <a:t>      “name”: [NAME],</a:t>
+                      </a:r>
+                    </a:p>
+                    <a:p>
+                      <a:r>
+                        <a:rPr lang="en-US" sz="1200" baseline="0" dirty="0" smtClean="0"/>
+                        <a:t>      “</a:t>
+                      </a:r>
+                      <a:r>
+                        <a:rPr lang="en-US" sz="1200" baseline="0" dirty="0" err="1" smtClean="0"/>
+                        <a:t>url</a:t>
+                      </a:r>
+                      <a:r>
+                        <a:rPr lang="en-US" sz="1200" baseline="0" dirty="0" smtClean="0"/>
+                        <a:t>” : [ROOT QUERY URL],</a:t>
+                      </a:r>
+                    </a:p>
+                    <a:p>
+                      <a:r>
+                        <a:rPr lang="en-US" sz="1200" baseline="0" dirty="0" smtClean="0">
+                          <a:solidFill>
+                            <a:srgbClr val="7030A0"/>
+                          </a:solidFill>
+                        </a:rPr>
+                        <a:t>      </a:t>
+                      </a:r>
+                      <a:r>
+                        <a:rPr lang="en-US" sz="1200" dirty="0" smtClean="0">
+                          <a:solidFill>
+                            <a:srgbClr val="7030A0"/>
+                          </a:solidFill>
+                        </a:rPr>
+                        <a:t>"maxPages":50,</a:t>
+                      </a:r>
+                    </a:p>
+                    <a:p>
+                      <a:r>
+                        <a:rPr lang="en-US" sz="1200" dirty="0" smtClean="0">
+                          <a:solidFill>
+                            <a:srgbClr val="7030A0"/>
+                          </a:solidFill>
+                        </a:rPr>
+                        <a:t>       "maxImages":10000</a:t>
+                      </a:r>
+                    </a:p>
+                    <a:p>
+                      <a:endParaRPr lang="en-US" sz="1200" dirty="0" smtClean="0"/>
+                    </a:p>
+                    <a:p>
+                      <a:r>
+                        <a:rPr lang="en-US" sz="1200" dirty="0" smtClean="0"/>
+                        <a:t>  }</a:t>
+                      </a:r>
+                    </a:p>
+                    <a:p>
+                      <a:r>
+                        <a:rPr lang="en-US" sz="1200" dirty="0" smtClean="0"/>
+                        <a:t>]</a:t>
+                      </a:r>
+                      <a:endParaRPr lang="en-US" sz="1200" dirty="0"/>
+                    </a:p>
+                  </a:txBody>
+                  <a:tcPr/>
+                </a:tc>
+                <a:tc>
+                  <a:txBody>
+                    <a:bodyPr/>
+                    <a:lstStyle/>
+                    <a:p>
                       <a:r>
                         <a:rPr lang="en-US" dirty="0" smtClean="0"/>
-                        <a:t>{size filter}</a:t>
-                      </a:r>
-                      <a:endParaRPr lang="en-US" dirty="0"/>
-                    </a:p>
-                  </a:txBody>
-                  <a:tcPr/>
-                </a:tc>
-                <a:tc>
-                  <a:txBody>
-                    <a:bodyPr/>
-                    <a:lstStyle/>
-                    <a:p>
-                      <a:endParaRPr lang="en-US" sz="1200" dirty="0"/>
-                    </a:p>
-                  </a:txBody>
-                  <a:tcPr/>
-                </a:tc>
-                <a:tc>
-                  <a:txBody>
-                    <a:bodyPr/>
-                    <a:lstStyle/>
-                    <a:p>
-                      <a:r>
-                        <a:rPr lang="en-US" dirty="0" smtClean="0"/>
-                        <a:t>Pages associated with query</a:t>
-                      </a:r>
+                        <a:t>Return all queries</a:t>
+                      </a:r>
+                      <a:endParaRPr lang="en-US" dirty="0" smtClean="0"/>
                     </a:p>
                   </a:txBody>
                   <a:tcPr/>
@@ -9486,7 +9750,7 @@
         <p:spPr>
           <a:xfrm>
             <a:off x="652108" y="307911"/>
-            <a:ext cx="10608906" cy="2400657"/>
+            <a:ext cx="10608906" cy="2831544"/>
           </a:xfrm>
           <a:prstGeom prst="rect">
             <a:avLst/>
@@ -9508,6 +9772,9 @@
             <a:endParaRPr lang="en-US" sz="2800" dirty="0" smtClean="0"/>
           </a:p>
           <a:p>
+            <a:endParaRPr lang="en-US" sz="2800" dirty="0" smtClean="0"/>
+          </a:p>
+          <a:p>
             <a:endParaRPr lang="en-US" sz="1200" dirty="0"/>
           </a:p>
           <a:p>
@@ -9549,14 +9816,14 @@
           <p:nvPr>
             <p:extLst>
               <p:ext uri="{D42A27DB-BD31-4B8C-83A1-F6EECF244321}">
-                <p14:modId xmlns:p14="http://schemas.microsoft.com/office/powerpoint/2010/main" val="1864385353"/>
+                <p14:modId xmlns:p14="http://schemas.microsoft.com/office/powerpoint/2010/main" val="1151658501"/>
               </p:ext>
             </p:extLst>
           </p:nvPr>
         </p:nvGraphicFramePr>
         <p:xfrm>
           <a:off x="1192246" y="1092890"/>
-          <a:ext cx="9528630" cy="2484120"/>
+          <a:ext cx="9528630" cy="1112520"/>
         </p:xfrm>
         <a:graphic>
           <a:graphicData uri="http://schemas.openxmlformats.org/drawingml/2006/table">
@@ -9699,6 +9966,14 @@
                     <a:bodyPr/>
                     <a:lstStyle/>
                     <a:p>
+                      <a:r>
+                        <a:rPr lang="en-US" sz="1400" dirty="0" smtClean="0"/>
+                        <a:t>{query</a:t>
+                      </a:r>
+                      <a:r>
+                        <a:rPr lang="en-US" sz="1400" baseline="0" dirty="0" smtClean="0"/>
+                        <a:t> ID}</a:t>
+                      </a:r>
                       <a:endParaRPr lang="en-US" sz="1400" dirty="0"/>
                     </a:p>
                   </a:txBody>
@@ -9726,179 +10001,90 @@
                     <a:lstStyle/>
                     <a:p>
                       <a:r>
-                        <a:rPr lang="en-US" dirty="0" smtClean="0"/>
+                        <a:rPr lang="en-US" dirty="0" smtClean="0">
+                          <a:solidFill>
+                            <a:srgbClr val="7030A0"/>
+                          </a:solidFill>
+                        </a:rPr>
                         <a:t>/search/stop</a:t>
                       </a:r>
-                      <a:endParaRPr lang="en-US" dirty="0"/>
-                    </a:p>
-                  </a:txBody>
-                  <a:tcPr/>
-                </a:tc>
-                <a:tc>
-                  <a:txBody>
-                    <a:bodyPr/>
-                    <a:lstStyle/>
-                    <a:p>
-                      <a:r>
-                        <a:rPr lang="en-US" dirty="0" smtClean="0"/>
+                      <a:endParaRPr lang="en-US" dirty="0">
+                        <a:solidFill>
+                          <a:srgbClr val="7030A0"/>
+                        </a:solidFill>
+                      </a:endParaRPr>
+                    </a:p>
+                  </a:txBody>
+                  <a:tcPr/>
+                </a:tc>
+                <a:tc>
+                  <a:txBody>
+                    <a:bodyPr/>
+                    <a:lstStyle/>
+                    <a:p>
+                      <a:r>
+                        <a:rPr lang="en-US" dirty="0" smtClean="0">
+                          <a:solidFill>
+                            <a:srgbClr val="7030A0"/>
+                          </a:solidFill>
+                        </a:rPr>
                         <a:t>POST</a:t>
                       </a:r>
-                      <a:endParaRPr lang="en-US" dirty="0"/>
-                    </a:p>
-                  </a:txBody>
-                  <a:tcPr/>
-                </a:tc>
-                <a:tc>
-                  <a:txBody>
-                    <a:bodyPr/>
-                    <a:lstStyle/>
-                    <a:p>
-                      <a:endParaRPr lang="en-US" dirty="0"/>
-                    </a:p>
-                  </a:txBody>
-                  <a:tcPr/>
-                </a:tc>
-                <a:tc>
-                  <a:txBody>
-                    <a:bodyPr/>
-                    <a:lstStyle/>
-                    <a:p>
-                      <a:endParaRPr lang="en-US" sz="1400" dirty="0"/>
-                    </a:p>
-                  </a:txBody>
-                  <a:tcPr/>
-                </a:tc>
-                <a:tc>
-                  <a:txBody>
-                    <a:bodyPr/>
-                    <a:lstStyle/>
-                    <a:p>
-                      <a:r>
-                        <a:rPr lang="en-US" dirty="0" smtClean="0"/>
+                      <a:endParaRPr lang="en-US" dirty="0">
+                        <a:solidFill>
+                          <a:srgbClr val="7030A0"/>
+                        </a:solidFill>
+                      </a:endParaRPr>
+                    </a:p>
+                  </a:txBody>
+                  <a:tcPr/>
+                </a:tc>
+                <a:tc>
+                  <a:txBody>
+                    <a:bodyPr/>
+                    <a:lstStyle/>
+                    <a:p>
+                      <a:endParaRPr lang="en-US" dirty="0">
+                        <a:solidFill>
+                          <a:srgbClr val="7030A0"/>
+                        </a:solidFill>
+                      </a:endParaRPr>
+                    </a:p>
+                  </a:txBody>
+                  <a:tcPr/>
+                </a:tc>
+                <a:tc>
+                  <a:txBody>
+                    <a:bodyPr/>
+                    <a:lstStyle/>
+                    <a:p>
+                      <a:endParaRPr lang="en-US" sz="1400" dirty="0">
+                        <a:solidFill>
+                          <a:srgbClr val="7030A0"/>
+                        </a:solidFill>
+                      </a:endParaRPr>
+                    </a:p>
+                  </a:txBody>
+                  <a:tcPr/>
+                </a:tc>
+                <a:tc>
+                  <a:txBody>
+                    <a:bodyPr/>
+                    <a:lstStyle/>
+                    <a:p>
+                      <a:r>
+                        <a:rPr lang="en-US" dirty="0" smtClean="0">
+                          <a:solidFill>
+                            <a:srgbClr val="7030A0"/>
+                          </a:solidFill>
+                        </a:rPr>
                         <a:t>Stop a search</a:t>
                       </a:r>
-                      <a:endParaRPr lang="en-US" dirty="0"/>
-                    </a:p>
-                  </a:txBody>
-                  <a:tcPr/>
-                </a:tc>
-              </a:tr>
-              <a:tr h="370840">
-                <a:tc>
-                  <a:txBody>
-                    <a:bodyPr/>
-                    <a:lstStyle/>
-                    <a:p>
-                      <a:r>
-                        <a:rPr lang="en-US" dirty="0" smtClean="0"/>
-                        <a:t>/search/status</a:t>
-                      </a:r>
-                      <a:endParaRPr lang="en-US" dirty="0"/>
-                    </a:p>
-                  </a:txBody>
-                  <a:tcPr/>
-                </a:tc>
-                <a:tc>
-                  <a:txBody>
-                    <a:bodyPr/>
-                    <a:lstStyle/>
-                    <a:p>
-                      <a:r>
-                        <a:rPr lang="en-US" dirty="0" smtClean="0"/>
-                        <a:t>GET</a:t>
-                      </a:r>
-                      <a:endParaRPr lang="en-US" dirty="0"/>
-                    </a:p>
-                  </a:txBody>
-                  <a:tcPr/>
-                </a:tc>
-                <a:tc>
-                  <a:txBody>
-                    <a:bodyPr/>
-                    <a:lstStyle/>
-                    <a:p>
-                      <a:endParaRPr lang="en-US" dirty="0"/>
-                    </a:p>
-                  </a:txBody>
-                  <a:tcPr/>
-                </a:tc>
-                <a:tc>
-                  <a:txBody>
-                    <a:bodyPr/>
-                    <a:lstStyle/>
-                    <a:p>
-                      <a:r>
-                        <a:rPr lang="en-US" sz="1400" dirty="0" smtClean="0"/>
-                        <a:t>{id:</a:t>
-                      </a:r>
-                      <a:r>
-                        <a:rPr lang="en-US" sz="1400" baseline="0" dirty="0" smtClean="0"/>
-                        <a:t> &lt;</a:t>
-                      </a:r>
-                      <a:r>
-                        <a:rPr lang="en-US" sz="1400" baseline="0" dirty="0" err="1" smtClean="0"/>
-                        <a:t>queryid</a:t>
-                      </a:r>
-                      <a:r>
-                        <a:rPr lang="en-US" sz="1400" baseline="0" dirty="0" smtClean="0"/>
-                        <a:t>&gt;,</a:t>
-                      </a:r>
-                    </a:p>
-                    <a:p>
-                      <a:r>
-                        <a:rPr lang="en-US" sz="1400" baseline="0" dirty="0" smtClean="0"/>
-                        <a:t> status: &lt;RUN/STOP&gt;,</a:t>
-                      </a:r>
-                    </a:p>
-                    <a:p>
-                      <a:r>
-                        <a:rPr lang="en-US" sz="1400" baseline="0" dirty="0" smtClean="0"/>
-                        <a:t>Images: &lt;#&gt;,</a:t>
-                      </a:r>
-                    </a:p>
-                    <a:p>
-                      <a:r>
-                        <a:rPr lang="en-US" sz="1400" baseline="0" dirty="0" err="1" smtClean="0"/>
-                        <a:t>allowedImages</a:t>
-                      </a:r>
-                      <a:r>
-                        <a:rPr lang="en-US" sz="1400" baseline="0" dirty="0" smtClean="0"/>
-                        <a:t>: &lt;#&gt;</a:t>
-                      </a:r>
-                    </a:p>
-                    <a:p>
-                      <a:r>
-                        <a:rPr lang="en-US" sz="1400" baseline="0" dirty="0" smtClean="0"/>
-                        <a:t>Pages: &lt;#&gt;,</a:t>
-                      </a:r>
-                    </a:p>
-                    <a:p>
-                      <a:r>
-                        <a:rPr lang="en-US" sz="1400" baseline="0" dirty="0" err="1" smtClean="0"/>
-                        <a:t>allowedPages</a:t>
-                      </a:r>
-                      <a:r>
-                        <a:rPr lang="en-US" sz="1400" baseline="0" dirty="0" smtClean="0"/>
-                        <a:t>: &lt;#&gt;</a:t>
-                      </a:r>
-                    </a:p>
-                  </a:txBody>
-                  <a:tcPr/>
-                </a:tc>
-                <a:tc>
-                  <a:txBody>
-                    <a:bodyPr/>
-                    <a:lstStyle/>
-                    <a:p>
-                      <a:r>
-                        <a:rPr lang="en-US" dirty="0" smtClean="0"/>
-                        <a:t>Status of the last or current</a:t>
-                      </a:r>
-                      <a:r>
-                        <a:rPr lang="en-US" baseline="0" dirty="0" smtClean="0"/>
-                        <a:t> query</a:t>
-                      </a:r>
-                      <a:endParaRPr lang="en-US" dirty="0"/>
+                      <a:endParaRPr lang="en-US" dirty="0">
+                        <a:solidFill>
+                          <a:srgbClr val="7030A0"/>
+                        </a:solidFill>
+                      </a:endParaRPr>
                     </a:p>
                   </a:txBody>
                   <a:tcPr/>
@@ -10348,7 +10534,7 @@
         <p:spPr>
           <a:xfrm>
             <a:off x="951722" y="1045029"/>
-            <a:ext cx="10608906" cy="2400657"/>
+            <a:ext cx="10608906" cy="2154436"/>
           </a:xfrm>
           <a:prstGeom prst="rect">
             <a:avLst/>
@@ -10367,7 +10553,11 @@
             </a:r>
           </a:p>
           <a:p>
-            <a:endParaRPr lang="en-US" sz="2800" dirty="0" smtClean="0"/>
+            <a:r>
+              <a:rPr lang="en-US" sz="1200" dirty="0" smtClean="0"/>
+              <a:t>Page and image content that may be associated with more than one query</a:t>
+            </a:r>
+            <a:endParaRPr lang="en-US" sz="1200" dirty="0" smtClean="0"/>
           </a:p>
           <a:p>
             <a:endParaRPr lang="en-US" sz="1200" dirty="0"/>
@@ -10411,13 +10601,13 @@
           <p:nvPr>
             <p:extLst>
               <p:ext uri="{D42A27DB-BD31-4B8C-83A1-F6EECF244321}">
-                <p14:modId xmlns:p14="http://schemas.microsoft.com/office/powerpoint/2010/main" val="967142920"/>
+                <p14:modId xmlns:p14="http://schemas.microsoft.com/office/powerpoint/2010/main" val="3153462182"/>
               </p:ext>
             </p:extLst>
           </p:nvPr>
         </p:nvGraphicFramePr>
         <p:xfrm>
-          <a:off x="1229568" y="2081935"/>
+          <a:off x="1164253" y="1885992"/>
           <a:ext cx="9528630" cy="5227320"/>
         </p:xfrm>
         <a:graphic>
@@ -10512,58 +10702,90 @@
                     <a:lstStyle/>
                     <a:p>
                       <a:r>
-                        <a:rPr lang="en-US" dirty="0" smtClean="0"/>
+                        <a:rPr lang="en-US" dirty="0" smtClean="0">
+                          <a:solidFill>
+                            <a:srgbClr val="7030A0"/>
+                          </a:solidFill>
+                        </a:rPr>
                         <a:t>/content/image</a:t>
                       </a:r>
-                      <a:endParaRPr lang="en-US" dirty="0"/>
-                    </a:p>
-                  </a:txBody>
-                  <a:tcPr/>
-                </a:tc>
-                <a:tc>
-                  <a:txBody>
-                    <a:bodyPr/>
-                    <a:lstStyle/>
-                    <a:p>
-                      <a:r>
-                        <a:rPr lang="en-US" dirty="0" smtClean="0"/>
+                      <a:endParaRPr lang="en-US" dirty="0">
+                        <a:solidFill>
+                          <a:srgbClr val="7030A0"/>
+                        </a:solidFill>
+                      </a:endParaRPr>
+                    </a:p>
+                  </a:txBody>
+                  <a:tcPr/>
+                </a:tc>
+                <a:tc>
+                  <a:txBody>
+                    <a:bodyPr/>
+                    <a:lstStyle/>
+                    <a:p>
+                      <a:r>
+                        <a:rPr lang="en-US" dirty="0" smtClean="0">
+                          <a:solidFill>
+                            <a:srgbClr val="7030A0"/>
+                          </a:solidFill>
+                        </a:rPr>
                         <a:t>GET</a:t>
                       </a:r>
-                      <a:endParaRPr lang="en-US" dirty="0"/>
-                    </a:p>
-                  </a:txBody>
-                  <a:tcPr/>
-                </a:tc>
-                <a:tc>
-                  <a:txBody>
-                    <a:bodyPr/>
-                    <a:lstStyle/>
-                    <a:p>
-                      <a:endParaRPr lang="en-US" dirty="0"/>
-                    </a:p>
-                  </a:txBody>
-                  <a:tcPr/>
-                </a:tc>
-                <a:tc>
-                  <a:txBody>
-                    <a:bodyPr/>
-                    <a:lstStyle/>
-                    <a:p>
-                      <a:endParaRPr lang="en-US" dirty="0"/>
-                    </a:p>
-                  </a:txBody>
-                  <a:tcPr/>
-                </a:tc>
-                <a:tc>
-                  <a:txBody>
-                    <a:bodyPr/>
-                    <a:lstStyle/>
-                    <a:p>
-                      <a:r>
-                        <a:rPr lang="en-US" dirty="0" smtClean="0"/>
+                      <a:endParaRPr lang="en-US" dirty="0">
+                        <a:solidFill>
+                          <a:srgbClr val="7030A0"/>
+                        </a:solidFill>
+                      </a:endParaRPr>
+                    </a:p>
+                  </a:txBody>
+                  <a:tcPr/>
+                </a:tc>
+                <a:tc>
+                  <a:txBody>
+                    <a:bodyPr/>
+                    <a:lstStyle/>
+                    <a:p>
+                      <a:endParaRPr lang="en-US" dirty="0">
+                        <a:solidFill>
+                          <a:srgbClr val="7030A0"/>
+                        </a:solidFill>
+                      </a:endParaRPr>
+                    </a:p>
+                  </a:txBody>
+                  <a:tcPr/>
+                </a:tc>
+                <a:tc>
+                  <a:txBody>
+                    <a:bodyPr/>
+                    <a:lstStyle/>
+                    <a:p>
+                      <a:endParaRPr lang="en-US" dirty="0">
+                        <a:solidFill>
+                          <a:srgbClr val="7030A0"/>
+                        </a:solidFill>
+                      </a:endParaRPr>
+                    </a:p>
+                  </a:txBody>
+                  <a:tcPr/>
+                </a:tc>
+                <a:tc>
+                  <a:txBody>
+                    <a:bodyPr/>
+                    <a:lstStyle/>
+                    <a:p>
+                      <a:r>
+                        <a:rPr lang="en-US" dirty="0" smtClean="0">
+                          <a:solidFill>
+                            <a:srgbClr val="7030A0"/>
+                          </a:solidFill>
+                        </a:rPr>
                         <a:t>List all images</a:t>
                       </a:r>
-                      <a:endParaRPr lang="en-US" dirty="0"/>
+                      <a:endParaRPr lang="en-US" dirty="0">
+                        <a:solidFill>
+                          <a:srgbClr val="7030A0"/>
+                        </a:solidFill>
+                      </a:endParaRPr>
                     </a:p>
                   </a:txBody>
                   <a:tcPr/>
@@ -10576,58 +10798,90 @@
                     <a:lstStyle/>
                     <a:p>
                       <a:r>
-                        <a:rPr lang="en-US" dirty="0" smtClean="0"/>
+                        <a:rPr lang="en-US" dirty="0" smtClean="0">
+                          <a:solidFill>
+                            <a:srgbClr val="7030A0"/>
+                          </a:solidFill>
+                        </a:rPr>
                         <a:t>/content/image</a:t>
                       </a:r>
-                      <a:endParaRPr lang="en-US" dirty="0"/>
-                    </a:p>
-                  </a:txBody>
-                  <a:tcPr/>
-                </a:tc>
-                <a:tc>
-                  <a:txBody>
-                    <a:bodyPr/>
-                    <a:lstStyle/>
-                    <a:p>
-                      <a:r>
-                        <a:rPr lang="en-US" dirty="0" smtClean="0"/>
+                      <a:endParaRPr lang="en-US" dirty="0">
+                        <a:solidFill>
+                          <a:srgbClr val="7030A0"/>
+                        </a:solidFill>
+                      </a:endParaRPr>
+                    </a:p>
+                  </a:txBody>
+                  <a:tcPr/>
+                </a:tc>
+                <a:tc>
+                  <a:txBody>
+                    <a:bodyPr/>
+                    <a:lstStyle/>
+                    <a:p>
+                      <a:r>
+                        <a:rPr lang="en-US" dirty="0" smtClean="0">
+                          <a:solidFill>
+                            <a:srgbClr val="7030A0"/>
+                          </a:solidFill>
+                        </a:rPr>
                         <a:t>DELETE</a:t>
                       </a:r>
-                      <a:endParaRPr lang="en-US" dirty="0"/>
-                    </a:p>
-                  </a:txBody>
-                  <a:tcPr/>
-                </a:tc>
-                <a:tc>
-                  <a:txBody>
-                    <a:bodyPr/>
-                    <a:lstStyle/>
-                    <a:p>
-                      <a:endParaRPr lang="en-US" dirty="0"/>
-                    </a:p>
-                  </a:txBody>
-                  <a:tcPr/>
-                </a:tc>
-                <a:tc>
-                  <a:txBody>
-                    <a:bodyPr/>
-                    <a:lstStyle/>
-                    <a:p>
-                      <a:endParaRPr lang="en-US" dirty="0"/>
-                    </a:p>
-                  </a:txBody>
-                  <a:tcPr/>
-                </a:tc>
-                <a:tc>
-                  <a:txBody>
-                    <a:bodyPr/>
-                    <a:lstStyle/>
-                    <a:p>
-                      <a:r>
-                        <a:rPr lang="en-US" dirty="0" smtClean="0"/>
+                      <a:endParaRPr lang="en-US" dirty="0">
+                        <a:solidFill>
+                          <a:srgbClr val="7030A0"/>
+                        </a:solidFill>
+                      </a:endParaRPr>
+                    </a:p>
+                  </a:txBody>
+                  <a:tcPr/>
+                </a:tc>
+                <a:tc>
+                  <a:txBody>
+                    <a:bodyPr/>
+                    <a:lstStyle/>
+                    <a:p>
+                      <a:endParaRPr lang="en-US" dirty="0">
+                        <a:solidFill>
+                          <a:srgbClr val="7030A0"/>
+                        </a:solidFill>
+                      </a:endParaRPr>
+                    </a:p>
+                  </a:txBody>
+                  <a:tcPr/>
+                </a:tc>
+                <a:tc>
+                  <a:txBody>
+                    <a:bodyPr/>
+                    <a:lstStyle/>
+                    <a:p>
+                      <a:endParaRPr lang="en-US" dirty="0">
+                        <a:solidFill>
+                          <a:srgbClr val="7030A0"/>
+                        </a:solidFill>
+                      </a:endParaRPr>
+                    </a:p>
+                  </a:txBody>
+                  <a:tcPr/>
+                </a:tc>
+                <a:tc>
+                  <a:txBody>
+                    <a:bodyPr/>
+                    <a:lstStyle/>
+                    <a:p>
+                      <a:r>
+                        <a:rPr lang="en-US" dirty="0" smtClean="0">
+                          <a:solidFill>
+                            <a:srgbClr val="7030A0"/>
+                          </a:solidFill>
+                        </a:rPr>
                         <a:t>Delete all Image records</a:t>
                       </a:r>
-                      <a:endParaRPr lang="en-US" dirty="0"/>
+                      <a:endParaRPr lang="en-US" dirty="0">
+                        <a:solidFill>
+                          <a:srgbClr val="7030A0"/>
+                        </a:solidFill>
+                      </a:endParaRPr>
                     </a:p>
                   </a:txBody>
                   <a:tcPr/>
@@ -10640,58 +10894,90 @@
                     <a:lstStyle/>
                     <a:p>
                       <a:r>
-                        <a:rPr lang="en-US" dirty="0" smtClean="0"/>
+                        <a:rPr lang="en-US" dirty="0" smtClean="0">
+                          <a:solidFill>
+                            <a:srgbClr val="7030A0"/>
+                          </a:solidFill>
+                        </a:rPr>
                         <a:t>/content/image/id</a:t>
                       </a:r>
-                      <a:endParaRPr lang="en-US" dirty="0"/>
-                    </a:p>
-                  </a:txBody>
-                  <a:tcPr/>
-                </a:tc>
-                <a:tc>
-                  <a:txBody>
-                    <a:bodyPr/>
-                    <a:lstStyle/>
-                    <a:p>
-                      <a:r>
-                        <a:rPr lang="en-US" dirty="0" smtClean="0"/>
+                      <a:endParaRPr lang="en-US" dirty="0">
+                        <a:solidFill>
+                          <a:srgbClr val="7030A0"/>
+                        </a:solidFill>
+                      </a:endParaRPr>
+                    </a:p>
+                  </a:txBody>
+                  <a:tcPr/>
+                </a:tc>
+                <a:tc>
+                  <a:txBody>
+                    <a:bodyPr/>
+                    <a:lstStyle/>
+                    <a:p>
+                      <a:r>
+                        <a:rPr lang="en-US" dirty="0" smtClean="0">
+                          <a:solidFill>
+                            <a:srgbClr val="7030A0"/>
+                          </a:solidFill>
+                        </a:rPr>
                         <a:t>GET</a:t>
                       </a:r>
-                      <a:endParaRPr lang="en-US" dirty="0"/>
-                    </a:p>
-                  </a:txBody>
-                  <a:tcPr/>
-                </a:tc>
-                <a:tc>
-                  <a:txBody>
-                    <a:bodyPr/>
-                    <a:lstStyle/>
-                    <a:p>
-                      <a:endParaRPr lang="en-US" dirty="0"/>
-                    </a:p>
-                  </a:txBody>
-                  <a:tcPr/>
-                </a:tc>
-                <a:tc>
-                  <a:txBody>
-                    <a:bodyPr/>
-                    <a:lstStyle/>
-                    <a:p>
-                      <a:endParaRPr lang="en-US" dirty="0"/>
-                    </a:p>
-                  </a:txBody>
-                  <a:tcPr/>
-                </a:tc>
-                <a:tc>
-                  <a:txBody>
-                    <a:bodyPr/>
-                    <a:lstStyle/>
-                    <a:p>
-                      <a:r>
-                        <a:rPr lang="en-US" dirty="0" smtClean="0"/>
+                      <a:endParaRPr lang="en-US" dirty="0">
+                        <a:solidFill>
+                          <a:srgbClr val="7030A0"/>
+                        </a:solidFill>
+                      </a:endParaRPr>
+                    </a:p>
+                  </a:txBody>
+                  <a:tcPr/>
+                </a:tc>
+                <a:tc>
+                  <a:txBody>
+                    <a:bodyPr/>
+                    <a:lstStyle/>
+                    <a:p>
+                      <a:endParaRPr lang="en-US" dirty="0">
+                        <a:solidFill>
+                          <a:srgbClr val="7030A0"/>
+                        </a:solidFill>
+                      </a:endParaRPr>
+                    </a:p>
+                  </a:txBody>
+                  <a:tcPr/>
+                </a:tc>
+                <a:tc>
+                  <a:txBody>
+                    <a:bodyPr/>
+                    <a:lstStyle/>
+                    <a:p>
+                      <a:endParaRPr lang="en-US" dirty="0">
+                        <a:solidFill>
+                          <a:srgbClr val="7030A0"/>
+                        </a:solidFill>
+                      </a:endParaRPr>
+                    </a:p>
+                  </a:txBody>
+                  <a:tcPr/>
+                </a:tc>
+                <a:tc>
+                  <a:txBody>
+                    <a:bodyPr/>
+                    <a:lstStyle/>
+                    <a:p>
+                      <a:r>
+                        <a:rPr lang="en-US" dirty="0" smtClean="0">
+                          <a:solidFill>
+                            <a:srgbClr val="7030A0"/>
+                          </a:solidFill>
+                        </a:rPr>
                         <a:t>Get an Image object</a:t>
                       </a:r>
-                      <a:endParaRPr lang="en-US" dirty="0"/>
+                      <a:endParaRPr lang="en-US" dirty="0">
+                        <a:solidFill>
+                          <a:srgbClr val="7030A0"/>
+                        </a:solidFill>
+                      </a:endParaRPr>
                     </a:p>
                   </a:txBody>
                   <a:tcPr/>
@@ -10704,58 +10990,90 @@
                     <a:lstStyle/>
                     <a:p>
                       <a:r>
-                        <a:rPr lang="en-US" dirty="0" smtClean="0"/>
+                        <a:rPr lang="en-US" dirty="0" smtClean="0">
+                          <a:solidFill>
+                            <a:srgbClr val="7030A0"/>
+                          </a:solidFill>
+                        </a:rPr>
                         <a:t>/content/image/id</a:t>
                       </a:r>
-                      <a:endParaRPr lang="en-US" dirty="0"/>
-                    </a:p>
-                  </a:txBody>
-                  <a:tcPr/>
-                </a:tc>
-                <a:tc>
-                  <a:txBody>
-                    <a:bodyPr/>
-                    <a:lstStyle/>
-                    <a:p>
-                      <a:r>
-                        <a:rPr lang="en-US" dirty="0" smtClean="0"/>
+                      <a:endParaRPr lang="en-US" dirty="0">
+                        <a:solidFill>
+                          <a:srgbClr val="7030A0"/>
+                        </a:solidFill>
+                      </a:endParaRPr>
+                    </a:p>
+                  </a:txBody>
+                  <a:tcPr/>
+                </a:tc>
+                <a:tc>
+                  <a:txBody>
+                    <a:bodyPr/>
+                    <a:lstStyle/>
+                    <a:p>
+                      <a:r>
+                        <a:rPr lang="en-US" dirty="0" smtClean="0">
+                          <a:solidFill>
+                            <a:srgbClr val="7030A0"/>
+                          </a:solidFill>
+                        </a:rPr>
                         <a:t>Delete</a:t>
                       </a:r>
-                      <a:endParaRPr lang="en-US" dirty="0"/>
-                    </a:p>
-                  </a:txBody>
-                  <a:tcPr/>
-                </a:tc>
-                <a:tc>
-                  <a:txBody>
-                    <a:bodyPr/>
-                    <a:lstStyle/>
-                    <a:p>
-                      <a:endParaRPr lang="en-US" dirty="0"/>
-                    </a:p>
-                  </a:txBody>
-                  <a:tcPr/>
-                </a:tc>
-                <a:tc>
-                  <a:txBody>
-                    <a:bodyPr/>
-                    <a:lstStyle/>
-                    <a:p>
-                      <a:endParaRPr lang="en-US" dirty="0"/>
-                    </a:p>
-                  </a:txBody>
-                  <a:tcPr/>
-                </a:tc>
-                <a:tc>
-                  <a:txBody>
-                    <a:bodyPr/>
-                    <a:lstStyle/>
-                    <a:p>
-                      <a:r>
-                        <a:rPr lang="en-US" dirty="0" smtClean="0"/>
+                      <a:endParaRPr lang="en-US" dirty="0">
+                        <a:solidFill>
+                          <a:srgbClr val="7030A0"/>
+                        </a:solidFill>
+                      </a:endParaRPr>
+                    </a:p>
+                  </a:txBody>
+                  <a:tcPr/>
+                </a:tc>
+                <a:tc>
+                  <a:txBody>
+                    <a:bodyPr/>
+                    <a:lstStyle/>
+                    <a:p>
+                      <a:endParaRPr lang="en-US" dirty="0">
+                        <a:solidFill>
+                          <a:srgbClr val="7030A0"/>
+                        </a:solidFill>
+                      </a:endParaRPr>
+                    </a:p>
+                  </a:txBody>
+                  <a:tcPr/>
+                </a:tc>
+                <a:tc>
+                  <a:txBody>
+                    <a:bodyPr/>
+                    <a:lstStyle/>
+                    <a:p>
+                      <a:endParaRPr lang="en-US" dirty="0">
+                        <a:solidFill>
+                          <a:srgbClr val="7030A0"/>
+                        </a:solidFill>
+                      </a:endParaRPr>
+                    </a:p>
+                  </a:txBody>
+                  <a:tcPr/>
+                </a:tc>
+                <a:tc>
+                  <a:txBody>
+                    <a:bodyPr/>
+                    <a:lstStyle/>
+                    <a:p>
+                      <a:r>
+                        <a:rPr lang="en-US" dirty="0" smtClean="0">
+                          <a:solidFill>
+                            <a:srgbClr val="7030A0"/>
+                          </a:solidFill>
+                        </a:rPr>
                         <a:t>Get an Image object</a:t>
                       </a:r>
-                      <a:endParaRPr lang="en-US" dirty="0"/>
+                      <a:endParaRPr lang="en-US" dirty="0">
+                        <a:solidFill>
+                          <a:srgbClr val="7030A0"/>
+                        </a:solidFill>
+                      </a:endParaRPr>
                     </a:p>
                   </a:txBody>
                   <a:tcPr/>
@@ -10768,58 +11086,90 @@
                     <a:lstStyle/>
                     <a:p>
                       <a:r>
-                        <a:rPr lang="en-US" dirty="0" smtClean="0"/>
+                        <a:rPr lang="en-US" dirty="0" smtClean="0">
+                          <a:solidFill>
+                            <a:srgbClr val="7030A0"/>
+                          </a:solidFill>
+                        </a:rPr>
                         <a:t>/content/image/download/id</a:t>
                       </a:r>
-                      <a:endParaRPr lang="en-US" dirty="0"/>
-                    </a:p>
-                  </a:txBody>
-                  <a:tcPr/>
-                </a:tc>
-                <a:tc>
-                  <a:txBody>
-                    <a:bodyPr/>
-                    <a:lstStyle/>
-                    <a:p>
-                      <a:r>
-                        <a:rPr lang="en-US" dirty="0" smtClean="0"/>
+                      <a:endParaRPr lang="en-US" dirty="0">
+                        <a:solidFill>
+                          <a:srgbClr val="7030A0"/>
+                        </a:solidFill>
+                      </a:endParaRPr>
+                    </a:p>
+                  </a:txBody>
+                  <a:tcPr/>
+                </a:tc>
+                <a:tc>
+                  <a:txBody>
+                    <a:bodyPr/>
+                    <a:lstStyle/>
+                    <a:p>
+                      <a:r>
+                        <a:rPr lang="en-US" dirty="0" smtClean="0">
+                          <a:solidFill>
+                            <a:srgbClr val="7030A0"/>
+                          </a:solidFill>
+                        </a:rPr>
                         <a:t>POST</a:t>
                       </a:r>
-                      <a:endParaRPr lang="en-US" dirty="0"/>
-                    </a:p>
-                  </a:txBody>
-                  <a:tcPr/>
-                </a:tc>
-                <a:tc>
-                  <a:txBody>
-                    <a:bodyPr/>
-                    <a:lstStyle/>
-                    <a:p>
-                      <a:endParaRPr lang="en-US" dirty="0"/>
-                    </a:p>
-                  </a:txBody>
-                  <a:tcPr/>
-                </a:tc>
-                <a:tc>
-                  <a:txBody>
-                    <a:bodyPr/>
-                    <a:lstStyle/>
-                    <a:p>
-                      <a:endParaRPr lang="en-US" dirty="0"/>
-                    </a:p>
-                  </a:txBody>
-                  <a:tcPr/>
-                </a:tc>
-                <a:tc>
-                  <a:txBody>
-                    <a:bodyPr/>
-                    <a:lstStyle/>
-                    <a:p>
-                      <a:r>
-                        <a:rPr lang="en-US" smtClean="0"/>
+                      <a:endParaRPr lang="en-US" dirty="0">
+                        <a:solidFill>
+                          <a:srgbClr val="7030A0"/>
+                        </a:solidFill>
+                      </a:endParaRPr>
+                    </a:p>
+                  </a:txBody>
+                  <a:tcPr/>
+                </a:tc>
+                <a:tc>
+                  <a:txBody>
+                    <a:bodyPr/>
+                    <a:lstStyle/>
+                    <a:p>
+                      <a:endParaRPr lang="en-US" dirty="0">
+                        <a:solidFill>
+                          <a:srgbClr val="7030A0"/>
+                        </a:solidFill>
+                      </a:endParaRPr>
+                    </a:p>
+                  </a:txBody>
+                  <a:tcPr/>
+                </a:tc>
+                <a:tc>
+                  <a:txBody>
+                    <a:bodyPr/>
+                    <a:lstStyle/>
+                    <a:p>
+                      <a:endParaRPr lang="en-US" dirty="0">
+                        <a:solidFill>
+                          <a:srgbClr val="7030A0"/>
+                        </a:solidFill>
+                      </a:endParaRPr>
+                    </a:p>
+                  </a:txBody>
+                  <a:tcPr/>
+                </a:tc>
+                <a:tc>
+                  <a:txBody>
+                    <a:bodyPr/>
+                    <a:lstStyle/>
+                    <a:p>
+                      <a:r>
+                        <a:rPr lang="en-US" smtClean="0">
+                          <a:solidFill>
+                            <a:srgbClr val="7030A0"/>
+                          </a:solidFill>
+                        </a:rPr>
                         <a:t>Download an id</a:t>
                       </a:r>
-                      <a:endParaRPr lang="en-US" dirty="0"/>
+                      <a:endParaRPr lang="en-US" dirty="0">
+                        <a:solidFill>
+                          <a:srgbClr val="7030A0"/>
+                        </a:solidFill>
+                      </a:endParaRPr>
                     </a:p>
                   </a:txBody>
                   <a:tcPr/>
@@ -10832,58 +11182,90 @@
                     <a:lstStyle/>
                     <a:p>
                       <a:r>
-                        <a:rPr lang="en-US" dirty="0" smtClean="0"/>
+                        <a:rPr lang="en-US" dirty="0" smtClean="0">
+                          <a:solidFill>
+                            <a:srgbClr val="7030A0"/>
+                          </a:solidFill>
+                        </a:rPr>
                         <a:t>/content/page</a:t>
                       </a:r>
-                      <a:endParaRPr lang="en-US" dirty="0"/>
-                    </a:p>
-                  </a:txBody>
-                  <a:tcPr/>
-                </a:tc>
-                <a:tc>
-                  <a:txBody>
-                    <a:bodyPr/>
-                    <a:lstStyle/>
-                    <a:p>
-                      <a:r>
-                        <a:rPr lang="en-US" dirty="0" smtClean="0"/>
+                      <a:endParaRPr lang="en-US" dirty="0">
+                        <a:solidFill>
+                          <a:srgbClr val="7030A0"/>
+                        </a:solidFill>
+                      </a:endParaRPr>
+                    </a:p>
+                  </a:txBody>
+                  <a:tcPr/>
+                </a:tc>
+                <a:tc>
+                  <a:txBody>
+                    <a:bodyPr/>
+                    <a:lstStyle/>
+                    <a:p>
+                      <a:r>
+                        <a:rPr lang="en-US" dirty="0" smtClean="0">
+                          <a:solidFill>
+                            <a:srgbClr val="7030A0"/>
+                          </a:solidFill>
+                        </a:rPr>
                         <a:t>GET</a:t>
                       </a:r>
-                      <a:endParaRPr lang="en-US" dirty="0"/>
-                    </a:p>
-                  </a:txBody>
-                  <a:tcPr/>
-                </a:tc>
-                <a:tc>
-                  <a:txBody>
-                    <a:bodyPr/>
-                    <a:lstStyle/>
-                    <a:p>
-                      <a:endParaRPr lang="en-US" dirty="0"/>
-                    </a:p>
-                  </a:txBody>
-                  <a:tcPr/>
-                </a:tc>
-                <a:tc>
-                  <a:txBody>
-                    <a:bodyPr/>
-                    <a:lstStyle/>
-                    <a:p>
-                      <a:endParaRPr lang="en-US" dirty="0"/>
-                    </a:p>
-                  </a:txBody>
-                  <a:tcPr/>
-                </a:tc>
-                <a:tc>
-                  <a:txBody>
-                    <a:bodyPr/>
-                    <a:lstStyle/>
-                    <a:p>
-                      <a:r>
-                        <a:rPr lang="en-US" dirty="0" smtClean="0"/>
+                      <a:endParaRPr lang="en-US" dirty="0">
+                        <a:solidFill>
+                          <a:srgbClr val="7030A0"/>
+                        </a:solidFill>
+                      </a:endParaRPr>
+                    </a:p>
+                  </a:txBody>
+                  <a:tcPr/>
+                </a:tc>
+                <a:tc>
+                  <a:txBody>
+                    <a:bodyPr/>
+                    <a:lstStyle/>
+                    <a:p>
+                      <a:endParaRPr lang="en-US" dirty="0">
+                        <a:solidFill>
+                          <a:srgbClr val="7030A0"/>
+                        </a:solidFill>
+                      </a:endParaRPr>
+                    </a:p>
+                  </a:txBody>
+                  <a:tcPr/>
+                </a:tc>
+                <a:tc>
+                  <a:txBody>
+                    <a:bodyPr/>
+                    <a:lstStyle/>
+                    <a:p>
+                      <a:endParaRPr lang="en-US" dirty="0">
+                        <a:solidFill>
+                          <a:srgbClr val="7030A0"/>
+                        </a:solidFill>
+                      </a:endParaRPr>
+                    </a:p>
+                  </a:txBody>
+                  <a:tcPr/>
+                </a:tc>
+                <a:tc>
+                  <a:txBody>
+                    <a:bodyPr/>
+                    <a:lstStyle/>
+                    <a:p>
+                      <a:r>
+                        <a:rPr lang="en-US" dirty="0" smtClean="0">
+                          <a:solidFill>
+                            <a:srgbClr val="7030A0"/>
+                          </a:solidFill>
+                        </a:rPr>
                         <a:t>List all pages</a:t>
                       </a:r>
-                      <a:endParaRPr lang="en-US" dirty="0"/>
+                      <a:endParaRPr lang="en-US" dirty="0">
+                        <a:solidFill>
+                          <a:srgbClr val="7030A0"/>
+                        </a:solidFill>
+                      </a:endParaRPr>
                     </a:p>
                   </a:txBody>
                   <a:tcPr/>
@@ -10896,58 +11278,90 @@
                     <a:lstStyle/>
                     <a:p>
                       <a:r>
-                        <a:rPr lang="en-US" dirty="0" smtClean="0"/>
+                        <a:rPr lang="en-US" dirty="0" smtClean="0">
+                          <a:solidFill>
+                            <a:srgbClr val="7030A0"/>
+                          </a:solidFill>
+                        </a:rPr>
                         <a:t>/content/page</a:t>
                       </a:r>
-                      <a:endParaRPr lang="en-US" dirty="0"/>
-                    </a:p>
-                  </a:txBody>
-                  <a:tcPr/>
-                </a:tc>
-                <a:tc>
-                  <a:txBody>
-                    <a:bodyPr/>
-                    <a:lstStyle/>
-                    <a:p>
-                      <a:r>
-                        <a:rPr lang="en-US" dirty="0" smtClean="0"/>
+                      <a:endParaRPr lang="en-US" dirty="0">
+                        <a:solidFill>
+                          <a:srgbClr val="7030A0"/>
+                        </a:solidFill>
+                      </a:endParaRPr>
+                    </a:p>
+                  </a:txBody>
+                  <a:tcPr/>
+                </a:tc>
+                <a:tc>
+                  <a:txBody>
+                    <a:bodyPr/>
+                    <a:lstStyle/>
+                    <a:p>
+                      <a:r>
+                        <a:rPr lang="en-US" dirty="0" smtClean="0">
+                          <a:solidFill>
+                            <a:srgbClr val="7030A0"/>
+                          </a:solidFill>
+                        </a:rPr>
                         <a:t>DELETE</a:t>
                       </a:r>
-                      <a:endParaRPr lang="en-US" dirty="0"/>
-                    </a:p>
-                  </a:txBody>
-                  <a:tcPr/>
-                </a:tc>
-                <a:tc>
-                  <a:txBody>
-                    <a:bodyPr/>
-                    <a:lstStyle/>
-                    <a:p>
-                      <a:endParaRPr lang="en-US" dirty="0"/>
-                    </a:p>
-                  </a:txBody>
-                  <a:tcPr/>
-                </a:tc>
-                <a:tc>
-                  <a:txBody>
-                    <a:bodyPr/>
-                    <a:lstStyle/>
-                    <a:p>
-                      <a:endParaRPr lang="en-US" dirty="0"/>
-                    </a:p>
-                  </a:txBody>
-                  <a:tcPr/>
-                </a:tc>
-                <a:tc>
-                  <a:txBody>
-                    <a:bodyPr/>
-                    <a:lstStyle/>
-                    <a:p>
-                      <a:r>
-                        <a:rPr lang="en-US" dirty="0" smtClean="0"/>
+                      <a:endParaRPr lang="en-US" dirty="0">
+                        <a:solidFill>
+                          <a:srgbClr val="7030A0"/>
+                        </a:solidFill>
+                      </a:endParaRPr>
+                    </a:p>
+                  </a:txBody>
+                  <a:tcPr/>
+                </a:tc>
+                <a:tc>
+                  <a:txBody>
+                    <a:bodyPr/>
+                    <a:lstStyle/>
+                    <a:p>
+                      <a:endParaRPr lang="en-US" dirty="0">
+                        <a:solidFill>
+                          <a:srgbClr val="7030A0"/>
+                        </a:solidFill>
+                      </a:endParaRPr>
+                    </a:p>
+                  </a:txBody>
+                  <a:tcPr/>
+                </a:tc>
+                <a:tc>
+                  <a:txBody>
+                    <a:bodyPr/>
+                    <a:lstStyle/>
+                    <a:p>
+                      <a:endParaRPr lang="en-US" dirty="0">
+                        <a:solidFill>
+                          <a:srgbClr val="7030A0"/>
+                        </a:solidFill>
+                      </a:endParaRPr>
+                    </a:p>
+                  </a:txBody>
+                  <a:tcPr/>
+                </a:tc>
+                <a:tc>
+                  <a:txBody>
+                    <a:bodyPr/>
+                    <a:lstStyle/>
+                    <a:p>
+                      <a:r>
+                        <a:rPr lang="en-US" dirty="0" smtClean="0">
+                          <a:solidFill>
+                            <a:srgbClr val="7030A0"/>
+                          </a:solidFill>
+                        </a:rPr>
                         <a:t>Delete all page records</a:t>
                       </a:r>
-                      <a:endParaRPr lang="en-US" dirty="0"/>
+                      <a:endParaRPr lang="en-US" dirty="0">
+                        <a:solidFill>
+                          <a:srgbClr val="7030A0"/>
+                        </a:solidFill>
+                      </a:endParaRPr>
                     </a:p>
                   </a:txBody>
                   <a:tcPr/>
@@ -10960,74 +11374,122 @@
                     <a:lstStyle/>
                     <a:p>
                       <a:r>
-                        <a:rPr lang="en-US" dirty="0" smtClean="0"/>
+                        <a:rPr lang="en-US" dirty="0" smtClean="0">
+                          <a:solidFill>
+                            <a:srgbClr val="7030A0"/>
+                          </a:solidFill>
+                        </a:rPr>
                         <a:t>/content/statistics</a:t>
                       </a:r>
-                      <a:endParaRPr lang="en-US" dirty="0"/>
-                    </a:p>
-                  </a:txBody>
-                  <a:tcPr/>
-                </a:tc>
-                <a:tc>
-                  <a:txBody>
-                    <a:bodyPr/>
-                    <a:lstStyle/>
-                    <a:p>
-                      <a:r>
-                        <a:rPr lang="en-US" dirty="0" smtClean="0"/>
+                      <a:endParaRPr lang="en-US" dirty="0">
+                        <a:solidFill>
+                          <a:srgbClr val="7030A0"/>
+                        </a:solidFill>
+                      </a:endParaRPr>
+                    </a:p>
+                  </a:txBody>
+                  <a:tcPr/>
+                </a:tc>
+                <a:tc>
+                  <a:txBody>
+                    <a:bodyPr/>
+                    <a:lstStyle/>
+                    <a:p>
+                      <a:r>
+                        <a:rPr lang="en-US" dirty="0" smtClean="0">
+                          <a:solidFill>
+                            <a:srgbClr val="7030A0"/>
+                          </a:solidFill>
+                        </a:rPr>
                         <a:t>POST</a:t>
                       </a:r>
-                      <a:endParaRPr lang="en-US" dirty="0"/>
-                    </a:p>
-                  </a:txBody>
-                  <a:tcPr/>
-                </a:tc>
-                <a:tc>
-                  <a:txBody>
-                    <a:bodyPr/>
-                    <a:lstStyle/>
-                    <a:p>
-                      <a:r>
-                        <a:rPr lang="en-US" dirty="0" smtClean="0"/>
+                      <a:endParaRPr lang="en-US" dirty="0">
+                        <a:solidFill>
+                          <a:srgbClr val="7030A0"/>
+                        </a:solidFill>
+                      </a:endParaRPr>
+                    </a:p>
+                  </a:txBody>
+                  <a:tcPr/>
+                </a:tc>
+                <a:tc>
+                  <a:txBody>
+                    <a:bodyPr/>
+                    <a:lstStyle/>
+                    <a:p>
+                      <a:r>
+                        <a:rPr lang="en-US" dirty="0" smtClean="0">
+                          <a:solidFill>
+                            <a:srgbClr val="7030A0"/>
+                          </a:solidFill>
+                        </a:rPr>
                         <a:t>{</a:t>
                       </a:r>
                       <a:r>
-                        <a:rPr lang="en-US" dirty="0" err="1" smtClean="0"/>
+                        <a:rPr lang="en-US" dirty="0" err="1" smtClean="0">
+                          <a:solidFill>
+                            <a:srgbClr val="7030A0"/>
+                          </a:solidFill>
+                        </a:rPr>
                         <a:t>url</a:t>
                       </a:r>
                       <a:r>
-                        <a:rPr lang="en-US" dirty="0" smtClean="0"/>
+                        <a:rPr lang="en-US" dirty="0" smtClean="0">
+                          <a:solidFill>
+                            <a:srgbClr val="7030A0"/>
+                          </a:solidFill>
+                        </a:rPr>
                         <a:t>}</a:t>
                       </a:r>
-                      <a:endParaRPr lang="en-US" dirty="0"/>
-                    </a:p>
-                  </a:txBody>
-                  <a:tcPr/>
-                </a:tc>
-                <a:tc>
-                  <a:txBody>
-                    <a:bodyPr/>
-                    <a:lstStyle/>
-                    <a:p>
-                      <a:endParaRPr lang="en-US" dirty="0"/>
-                    </a:p>
-                  </a:txBody>
-                  <a:tcPr/>
-                </a:tc>
-                <a:tc>
-                  <a:txBody>
-                    <a:bodyPr/>
-                    <a:lstStyle/>
-                    <a:p>
-                      <a:r>
-                        <a:rPr lang="en-US" dirty="0" smtClean="0"/>
+                      <a:endParaRPr lang="en-US" dirty="0">
+                        <a:solidFill>
+                          <a:srgbClr val="7030A0"/>
+                        </a:solidFill>
+                      </a:endParaRPr>
+                    </a:p>
+                  </a:txBody>
+                  <a:tcPr/>
+                </a:tc>
+                <a:tc>
+                  <a:txBody>
+                    <a:bodyPr/>
+                    <a:lstStyle/>
+                    <a:p>
+                      <a:endParaRPr lang="en-US" dirty="0">
+                        <a:solidFill>
+                          <a:srgbClr val="7030A0"/>
+                        </a:solidFill>
+                      </a:endParaRPr>
+                    </a:p>
+                  </a:txBody>
+                  <a:tcPr/>
+                </a:tc>
+                <a:tc>
+                  <a:txBody>
+                    <a:bodyPr/>
+                    <a:lstStyle/>
+                    <a:p>
+                      <a:r>
+                        <a:rPr lang="en-US" dirty="0" smtClean="0">
+                          <a:solidFill>
+                            <a:srgbClr val="7030A0"/>
+                          </a:solidFill>
+                        </a:rPr>
                         <a:t>List</a:t>
                       </a:r>
                       <a:r>
-                        <a:rPr lang="en-US" baseline="0" dirty="0" smtClean="0"/>
+                        <a:rPr lang="en-US" baseline="0" dirty="0" smtClean="0">
+                          <a:solidFill>
+                            <a:srgbClr val="7030A0"/>
+                          </a:solidFill>
+                        </a:rPr>
                         <a:t> All Image Count and all Page Count</a:t>
                       </a:r>
-                      <a:endParaRPr lang="en-US" dirty="0"/>
+                      <a:endParaRPr lang="en-US" dirty="0">
+                        <a:solidFill>
+                          <a:srgbClr val="7030A0"/>
+                        </a:solidFill>
+                      </a:endParaRPr>
                     </a:p>
                   </a:txBody>
                   <a:tcPr/>
@@ -11232,7 +11694,6 @@
               <a:rPr lang="en-US" sz="2800" dirty="0" smtClean="0"/>
               <a:t>Search UX Query State Diagram</a:t>
             </a:r>
-            <a:endParaRPr lang="en-US" sz="2800" dirty="0" smtClean="0"/>
           </a:p>
           <a:p>
             <a:endParaRPr lang="en-US" sz="2800" dirty="0" smtClean="0"/>
@@ -11685,7 +12146,6 @@
               <a:rPr lang="en-US" sz="2800" dirty="0" smtClean="0"/>
               <a:t>UX Query Page</a:t>
             </a:r>
-            <a:endParaRPr lang="en-US" sz="2800" dirty="0" smtClean="0"/>
           </a:p>
           <a:p>
             <a:endParaRPr lang="en-US" sz="2800" dirty="0" smtClean="0"/>
@@ -11804,7 +12264,6 @@
               <a:rPr lang="en-US" dirty="0"/>
               <a:t>Container</a:t>
             </a:r>
-            <a:endParaRPr lang="en-US" dirty="0"/>
           </a:p>
         </p:txBody>
       </p:sp>
@@ -11892,11 +12351,7 @@
             <a:pPr algn="ctr"/>
             <a:r>
               <a:rPr lang="en-US" dirty="0" smtClean="0"/>
-              <a:t>Search </a:t>
-            </a:r>
-            <a:r>
-              <a:rPr lang="en-US" dirty="0" smtClean="0"/>
-              <a:t>Container</a:t>
+              <a:t>Search Container</a:t>
             </a:r>
             <a:endParaRPr lang="en-US" dirty="0"/>
           </a:p>

</xml_diff>